<commit_message>
cleaned up changlog in plugin.xml
</commit_message>
<xml_diff>
--- a/R4Intellij.pptx
+++ b/R4Intellij.pptx
@@ -293,7 +293,7 @@
           <a:p>
             <a:fld id="{903CF105-E729-A944-8550-FE8B359D2D68}" type="datetimeFigureOut">
               <a:rPr lang="en-US" smtClean="0"/>
-              <a:t>12/12/11</a:t>
+              <a:t>12/13/11</a:t>
             </a:fld>
             <a:endParaRPr lang="en-US"/>
           </a:p>
@@ -463,7 +463,7 @@
           <a:p>
             <a:fld id="{903CF105-E729-A944-8550-FE8B359D2D68}" type="datetimeFigureOut">
               <a:rPr lang="en-US" smtClean="0"/>
-              <a:t>12/12/11</a:t>
+              <a:t>12/13/11</a:t>
             </a:fld>
             <a:endParaRPr lang="en-US"/>
           </a:p>
@@ -643,7 +643,7 @@
           <a:p>
             <a:fld id="{903CF105-E729-A944-8550-FE8B359D2D68}" type="datetimeFigureOut">
               <a:rPr lang="en-US" smtClean="0"/>
-              <a:t>12/12/11</a:t>
+              <a:t>12/13/11</a:t>
             </a:fld>
             <a:endParaRPr lang="en-US"/>
           </a:p>
@@ -813,7 +813,7 @@
           <a:p>
             <a:fld id="{903CF105-E729-A944-8550-FE8B359D2D68}" type="datetimeFigureOut">
               <a:rPr lang="en-US" smtClean="0"/>
-              <a:t>12/12/11</a:t>
+              <a:t>12/13/11</a:t>
             </a:fld>
             <a:endParaRPr lang="en-US"/>
           </a:p>
@@ -1059,7 +1059,7 @@
           <a:p>
             <a:fld id="{903CF105-E729-A944-8550-FE8B359D2D68}" type="datetimeFigureOut">
               <a:rPr lang="en-US" smtClean="0"/>
-              <a:t>12/12/11</a:t>
+              <a:t>12/13/11</a:t>
             </a:fld>
             <a:endParaRPr lang="en-US"/>
           </a:p>
@@ -1347,7 +1347,7 @@
           <a:p>
             <a:fld id="{903CF105-E729-A944-8550-FE8B359D2D68}" type="datetimeFigureOut">
               <a:rPr lang="en-US" smtClean="0"/>
-              <a:t>12/12/11</a:t>
+              <a:t>12/13/11</a:t>
             </a:fld>
             <a:endParaRPr lang="en-US"/>
           </a:p>
@@ -1769,7 +1769,7 @@
           <a:p>
             <a:fld id="{903CF105-E729-A944-8550-FE8B359D2D68}" type="datetimeFigureOut">
               <a:rPr lang="en-US" smtClean="0"/>
-              <a:t>12/12/11</a:t>
+              <a:t>12/13/11</a:t>
             </a:fld>
             <a:endParaRPr lang="en-US"/>
           </a:p>
@@ -1887,7 +1887,7 @@
           <a:p>
             <a:fld id="{903CF105-E729-A944-8550-FE8B359D2D68}" type="datetimeFigureOut">
               <a:rPr lang="en-US" smtClean="0"/>
-              <a:t>12/12/11</a:t>
+              <a:t>12/13/11</a:t>
             </a:fld>
             <a:endParaRPr lang="en-US"/>
           </a:p>
@@ -1982,7 +1982,7 @@
           <a:p>
             <a:fld id="{903CF105-E729-A944-8550-FE8B359D2D68}" type="datetimeFigureOut">
               <a:rPr lang="en-US" smtClean="0"/>
-              <a:t>12/12/11</a:t>
+              <a:t>12/13/11</a:t>
             </a:fld>
             <a:endParaRPr lang="en-US"/>
           </a:p>
@@ -2259,7 +2259,7 @@
           <a:p>
             <a:fld id="{903CF105-E729-A944-8550-FE8B359D2D68}" type="datetimeFigureOut">
               <a:rPr lang="en-US" smtClean="0"/>
-              <a:t>12/12/11</a:t>
+              <a:t>12/13/11</a:t>
             </a:fld>
             <a:endParaRPr lang="en-US"/>
           </a:p>
@@ -2512,7 +2512,7 @@
           <a:p>
             <a:fld id="{903CF105-E729-A944-8550-FE8B359D2D68}" type="datetimeFigureOut">
               <a:rPr lang="en-US" smtClean="0"/>
-              <a:t>12/12/11</a:t>
+              <a:t>12/13/11</a:t>
             </a:fld>
             <a:endParaRPr lang="en-US"/>
           </a:p>
@@ -2725,7 +2725,7 @@
           <a:p>
             <a:fld id="{903CF105-E729-A944-8550-FE8B359D2D68}" type="datetimeFigureOut">
               <a:rPr lang="en-US" smtClean="0"/>
-              <a:t>12/12/11</a:t>
+              <a:t>12/13/11</a:t>
             </a:fld>
             <a:endParaRPr lang="en-US"/>
           </a:p>
@@ -3374,8 +3374,35 @@
             </a:r>
             <a:r>
               <a:rPr lang="en-US" dirty="0"/>
-              <a:t>())</a:t>
-            </a:r>
+              <a:t>()</a:t>
+            </a:r>
+            <a:r>
+              <a:rPr lang="en-US" dirty="0" smtClean="0"/>
+              <a:t>)</a:t>
+            </a:r>
+          </a:p>
+          <a:p>
+            <a:r>
+              <a:rPr lang="en-US" dirty="0" err="1" smtClean="0"/>
+              <a:t>BashElementTypes</a:t>
+            </a:r>
+            <a:r>
+              <a:rPr lang="en-US" dirty="0" smtClean="0"/>
+              <a:t> </a:t>
+            </a:r>
+            <a:r>
+              <a:rPr lang="en-US" dirty="0" err="1" smtClean="0"/>
+              <a:t>vs</a:t>
+            </a:r>
+            <a:r>
+              <a:rPr lang="en-US" dirty="0" smtClean="0"/>
+              <a:t> </a:t>
+            </a:r>
+            <a:r>
+              <a:rPr lang="en-US" smtClean="0"/>
+              <a:t>BashTokenTypes</a:t>
+            </a:r>
+            <a:endParaRPr lang="en-US" dirty="0"/>
           </a:p>
         </p:txBody>
       </p:sp>
@@ -3607,11 +3634,7 @@
             </a:r>
             <a:r>
               <a:rPr lang="en-US" dirty="0" smtClean="0"/>
-              <a:t> (see </a:t>
-            </a:r>
-            <a:r>
-              <a:rPr lang="en-US" smtClean="0"/>
-              <a:t>Bash implementation)</a:t>
+              <a:t> (see Bash implementation)</a:t>
             </a:r>
             <a:endParaRPr lang="en-US" dirty="0"/>
           </a:p>

</xml_diff>

<commit_message>
started antlr-based grammar implementation
</commit_message>
<xml_diff>
--- a/R4Intellij.pptx
+++ b/R4Intellij.pptx
@@ -4,13 +4,29 @@
   <p:sldMasterIdLst>
     <p:sldMasterId id="2147483648" r:id="rId1"/>
   </p:sldMasterIdLst>
+  <p:notesMasterIdLst>
+    <p:notesMasterId r:id="rId21"/>
+  </p:notesMasterIdLst>
   <p:sldIdLst>
     <p:sldId id="256" r:id="rId2"/>
     <p:sldId id="257" r:id="rId3"/>
     <p:sldId id="258" r:id="rId4"/>
-    <p:sldId id="259" r:id="rId5"/>
-    <p:sldId id="260" r:id="rId6"/>
-    <p:sldId id="261" r:id="rId7"/>
+    <p:sldId id="272" r:id="rId5"/>
+    <p:sldId id="259" r:id="rId6"/>
+    <p:sldId id="260" r:id="rId7"/>
+    <p:sldId id="261" r:id="rId8"/>
+    <p:sldId id="262" r:id="rId9"/>
+    <p:sldId id="263" r:id="rId10"/>
+    <p:sldId id="264" r:id="rId11"/>
+    <p:sldId id="265" r:id="rId12"/>
+    <p:sldId id="266" r:id="rId13"/>
+    <p:sldId id="269" r:id="rId14"/>
+    <p:sldId id="268" r:id="rId15"/>
+    <p:sldId id="267" r:id="rId16"/>
+    <p:sldId id="274" r:id="rId17"/>
+    <p:sldId id="271" r:id="rId18"/>
+    <p:sldId id="270" r:id="rId19"/>
+    <p:sldId id="273" r:id="rId20"/>
   </p:sldIdLst>
   <p:sldSz cx="9144000" cy="6858000" type="screen4x3"/>
   <p:notesSz cx="6858000" cy="9144000"/>
@@ -109,7 +125,698 @@
       </a:defRPr>
     </a:lvl9pPr>
   </p:defaultTextStyle>
+  <p:extLst>
+    <p:ext uri="{521415D9-36F7-43E2-AB2F-B90AF26B5E84}">
+      <p14:sectionLst xmlns:p14="http://schemas.microsoft.com/office/powerpoint/2010/main">
+        <p14:section name="Default Section" id="{B8AB686E-7E6E-3541-BB88-486C7D86959A}">
+          <p14:sldIdLst>
+            <p14:sldId id="256"/>
+          </p14:sldIdLst>
+        </p14:section>
+        <p14:section name="Developer Notes" id="{94DA6817-C3E6-6E46-84C3-EF347EEFF33D}">
+          <p14:sldIdLst>
+            <p14:sldId id="257"/>
+            <p14:sldId id="258"/>
+            <p14:sldId id="272"/>
+            <p14:sldId id="259"/>
+            <p14:sldId id="260"/>
+            <p14:sldId id="261"/>
+            <p14:sldId id="262"/>
+            <p14:sldId id="263"/>
+            <p14:sldId id="264"/>
+            <p14:sldId id="265"/>
+            <p14:sldId id="266"/>
+            <p14:sldId id="269"/>
+          </p14:sldIdLst>
+        </p14:section>
+        <p14:section name="Feature Overview" id="{8B615B06-FCEC-9144-A445-B2B6278F12C6}">
+          <p14:sldIdLst>
+            <p14:sldId id="268"/>
+            <p14:sldId id="267"/>
+            <p14:sldId id="274"/>
+          </p14:sldIdLst>
+        </p14:section>
+        <p14:section name="Misc" id="{DF1E1630-14B5-7143-97E3-30FE784F6331}">
+          <p14:sldIdLst>
+            <p14:sldId id="271"/>
+            <p14:sldId id="270"/>
+          </p14:sldIdLst>
+        </p14:section>
+        <p14:section name="Competitors" id="{3935CF84-C3EE-B94E-8CCA-1495280B1747}">
+          <p14:sldIdLst>
+            <p14:sldId id="273"/>
+          </p14:sldIdLst>
+        </p14:section>
+      </p14:sectionLst>
+    </p:ext>
+  </p:extLst>
 </p:presentation>
+</file>
+
+<file path=ppt/notesMasters/notesMaster1.xml><?xml version="1.0" encoding="utf-8"?>
+<p:notesMaster xmlns:a="http://schemas.openxmlformats.org/drawingml/2006/main" xmlns:r="http://schemas.openxmlformats.org/officeDocument/2006/relationships" xmlns:p="http://schemas.openxmlformats.org/presentationml/2006/main">
+  <p:cSld>
+    <p:bg>
+      <p:bgRef idx="1001">
+        <a:schemeClr val="bg1"/>
+      </p:bgRef>
+    </p:bg>
+    <p:spTree>
+      <p:nvGrpSpPr>
+        <p:cNvPr id="1" name=""/>
+        <p:cNvGrpSpPr/>
+        <p:nvPr/>
+      </p:nvGrpSpPr>
+      <p:grpSpPr>
+        <a:xfrm>
+          <a:off x="0" y="0"/>
+          <a:ext cx="0" cy="0"/>
+          <a:chOff x="0" y="0"/>
+          <a:chExt cx="0" cy="0"/>
+        </a:xfrm>
+      </p:grpSpPr>
+      <p:sp>
+        <p:nvSpPr>
+          <p:cNvPr id="2" name="Header Placeholder 1"/>
+          <p:cNvSpPr>
+            <a:spLocks noGrp="1"/>
+          </p:cNvSpPr>
+          <p:nvPr>
+            <p:ph type="hdr" sz="quarter"/>
+          </p:nvPr>
+        </p:nvSpPr>
+        <p:spPr>
+          <a:xfrm>
+            <a:off x="0" y="0"/>
+            <a:ext cx="2971800" cy="457200"/>
+          </a:xfrm>
+          <a:prstGeom prst="rect">
+            <a:avLst/>
+          </a:prstGeom>
+        </p:spPr>
+        <p:txBody>
+          <a:bodyPr vert="horz" lIns="91440" tIns="45720" rIns="91440" bIns="45720" rtlCol="0"/>
+          <a:lstStyle>
+            <a:lvl1pPr algn="l">
+              <a:defRPr sz="1200"/>
+            </a:lvl1pPr>
+          </a:lstStyle>
+          <a:p>
+            <a:endParaRPr lang="en-US"/>
+          </a:p>
+        </p:txBody>
+      </p:sp>
+      <p:sp>
+        <p:nvSpPr>
+          <p:cNvPr id="3" name="Date Placeholder 2"/>
+          <p:cNvSpPr>
+            <a:spLocks noGrp="1"/>
+          </p:cNvSpPr>
+          <p:nvPr>
+            <p:ph type="dt" idx="1"/>
+          </p:nvPr>
+        </p:nvSpPr>
+        <p:spPr>
+          <a:xfrm>
+            <a:off x="3884613" y="0"/>
+            <a:ext cx="2971800" cy="457200"/>
+          </a:xfrm>
+          <a:prstGeom prst="rect">
+            <a:avLst/>
+          </a:prstGeom>
+        </p:spPr>
+        <p:txBody>
+          <a:bodyPr vert="horz" lIns="91440" tIns="45720" rIns="91440" bIns="45720" rtlCol="0"/>
+          <a:lstStyle>
+            <a:lvl1pPr algn="r">
+              <a:defRPr sz="1200"/>
+            </a:lvl1pPr>
+          </a:lstStyle>
+          <a:p>
+            <a:fld id="{87682158-AFB6-1044-826E-FEC32920DECA}" type="datetimeFigureOut">
+              <a:rPr lang="en-US" smtClean="0"/>
+              <a:t>12/21/11</a:t>
+            </a:fld>
+            <a:endParaRPr lang="en-US"/>
+          </a:p>
+        </p:txBody>
+      </p:sp>
+      <p:sp>
+        <p:nvSpPr>
+          <p:cNvPr id="4" name="Slide Image Placeholder 3"/>
+          <p:cNvSpPr>
+            <a:spLocks noGrp="1" noRot="1" noChangeAspect="1"/>
+          </p:cNvSpPr>
+          <p:nvPr>
+            <p:ph type="sldImg" idx="2"/>
+          </p:nvPr>
+        </p:nvSpPr>
+        <p:spPr>
+          <a:xfrm>
+            <a:off x="1143000" y="685800"/>
+            <a:ext cx="4572000" cy="3429000"/>
+          </a:xfrm>
+          <a:prstGeom prst="rect">
+            <a:avLst/>
+          </a:prstGeom>
+          <a:noFill/>
+          <a:ln w="12700">
+            <a:solidFill>
+              <a:prstClr val="black"/>
+            </a:solidFill>
+          </a:ln>
+        </p:spPr>
+        <p:txBody>
+          <a:bodyPr vert="horz" lIns="91440" tIns="45720" rIns="91440" bIns="45720" rtlCol="0" anchor="ctr"/>
+          <a:lstStyle/>
+          <a:p>
+            <a:endParaRPr lang="en-US"/>
+          </a:p>
+        </p:txBody>
+      </p:sp>
+      <p:sp>
+        <p:nvSpPr>
+          <p:cNvPr id="5" name="Notes Placeholder 4"/>
+          <p:cNvSpPr>
+            <a:spLocks noGrp="1"/>
+          </p:cNvSpPr>
+          <p:nvPr>
+            <p:ph type="body" sz="quarter" idx="3"/>
+          </p:nvPr>
+        </p:nvSpPr>
+        <p:spPr>
+          <a:xfrm>
+            <a:off x="685800" y="4343400"/>
+            <a:ext cx="5486400" cy="4114800"/>
+          </a:xfrm>
+          <a:prstGeom prst="rect">
+            <a:avLst/>
+          </a:prstGeom>
+        </p:spPr>
+        <p:txBody>
+          <a:bodyPr vert="horz" lIns="91440" tIns="45720" rIns="91440" bIns="45720" rtlCol="0"/>
+          <a:lstStyle/>
+          <a:p>
+            <a:pPr lvl="0"/>
+            <a:r>
+              <a:rPr lang="en-US" smtClean="0"/>
+              <a:t>Click to edit Master text styles</a:t>
+            </a:r>
+          </a:p>
+          <a:p>
+            <a:pPr lvl="1"/>
+            <a:r>
+              <a:rPr lang="en-US" smtClean="0"/>
+              <a:t>Second level</a:t>
+            </a:r>
+          </a:p>
+          <a:p>
+            <a:pPr lvl="2"/>
+            <a:r>
+              <a:rPr lang="en-US" smtClean="0"/>
+              <a:t>Third level</a:t>
+            </a:r>
+          </a:p>
+          <a:p>
+            <a:pPr lvl="3"/>
+            <a:r>
+              <a:rPr lang="en-US" smtClean="0"/>
+              <a:t>Fourth level</a:t>
+            </a:r>
+          </a:p>
+          <a:p>
+            <a:pPr lvl="4"/>
+            <a:r>
+              <a:rPr lang="en-US" smtClean="0"/>
+              <a:t>Fifth level</a:t>
+            </a:r>
+            <a:endParaRPr lang="en-US"/>
+          </a:p>
+        </p:txBody>
+      </p:sp>
+      <p:sp>
+        <p:nvSpPr>
+          <p:cNvPr id="6" name="Footer Placeholder 5"/>
+          <p:cNvSpPr>
+            <a:spLocks noGrp="1"/>
+          </p:cNvSpPr>
+          <p:nvPr>
+            <p:ph type="ftr" sz="quarter" idx="4"/>
+          </p:nvPr>
+        </p:nvSpPr>
+        <p:spPr>
+          <a:xfrm>
+            <a:off x="0" y="8685213"/>
+            <a:ext cx="2971800" cy="457200"/>
+          </a:xfrm>
+          <a:prstGeom prst="rect">
+            <a:avLst/>
+          </a:prstGeom>
+        </p:spPr>
+        <p:txBody>
+          <a:bodyPr vert="horz" lIns="91440" tIns="45720" rIns="91440" bIns="45720" rtlCol="0" anchor="b"/>
+          <a:lstStyle>
+            <a:lvl1pPr algn="l">
+              <a:defRPr sz="1200"/>
+            </a:lvl1pPr>
+          </a:lstStyle>
+          <a:p>
+            <a:endParaRPr lang="en-US"/>
+          </a:p>
+        </p:txBody>
+      </p:sp>
+      <p:sp>
+        <p:nvSpPr>
+          <p:cNvPr id="7" name="Slide Number Placeholder 6"/>
+          <p:cNvSpPr>
+            <a:spLocks noGrp="1"/>
+          </p:cNvSpPr>
+          <p:nvPr>
+            <p:ph type="sldNum" sz="quarter" idx="5"/>
+          </p:nvPr>
+        </p:nvSpPr>
+        <p:spPr>
+          <a:xfrm>
+            <a:off x="3884613" y="8685213"/>
+            <a:ext cx="2971800" cy="457200"/>
+          </a:xfrm>
+          <a:prstGeom prst="rect">
+            <a:avLst/>
+          </a:prstGeom>
+        </p:spPr>
+        <p:txBody>
+          <a:bodyPr vert="horz" lIns="91440" tIns="45720" rIns="91440" bIns="45720" rtlCol="0" anchor="b"/>
+          <a:lstStyle>
+            <a:lvl1pPr algn="r">
+              <a:defRPr sz="1200"/>
+            </a:lvl1pPr>
+          </a:lstStyle>
+          <a:p>
+            <a:fld id="{4FA87827-956D-2D4E-9772-6863DC7B302B}" type="slidenum">
+              <a:rPr lang="en-US" smtClean="0"/>
+              <a:t>‹#›</a:t>
+            </a:fld>
+            <a:endParaRPr lang="en-US"/>
+          </a:p>
+        </p:txBody>
+      </p:sp>
+    </p:spTree>
+    <p:extLst>
+      <p:ext uri="{BB962C8B-B14F-4D97-AF65-F5344CB8AC3E}">
+        <p14:creationId xmlns:p14="http://schemas.microsoft.com/office/powerpoint/2010/main" val="4234983551"/>
+      </p:ext>
+    </p:extLst>
+  </p:cSld>
+  <p:clrMap bg1="lt1" tx1="dk1" bg2="lt2" tx2="dk2" accent1="accent1" accent2="accent2" accent3="accent3" accent4="accent4" accent5="accent5" accent6="accent6" hlink="hlink" folHlink="folHlink"/>
+  <p:notesStyle>
+    <a:lvl1pPr marL="0" algn="l" defTabSz="457200" rtl="0" eaLnBrk="1" latinLnBrk="0" hangingPunct="1">
+      <a:defRPr sz="1200" kern="1200">
+        <a:solidFill>
+          <a:schemeClr val="tx1"/>
+        </a:solidFill>
+        <a:latin typeface="+mn-lt"/>
+        <a:ea typeface="+mn-ea"/>
+        <a:cs typeface="+mn-cs"/>
+      </a:defRPr>
+    </a:lvl1pPr>
+    <a:lvl2pPr marL="457200" algn="l" defTabSz="457200" rtl="0" eaLnBrk="1" latinLnBrk="0" hangingPunct="1">
+      <a:defRPr sz="1200" kern="1200">
+        <a:solidFill>
+          <a:schemeClr val="tx1"/>
+        </a:solidFill>
+        <a:latin typeface="+mn-lt"/>
+        <a:ea typeface="+mn-ea"/>
+        <a:cs typeface="+mn-cs"/>
+      </a:defRPr>
+    </a:lvl2pPr>
+    <a:lvl3pPr marL="914400" algn="l" defTabSz="457200" rtl="0" eaLnBrk="1" latinLnBrk="0" hangingPunct="1">
+      <a:defRPr sz="1200" kern="1200">
+        <a:solidFill>
+          <a:schemeClr val="tx1"/>
+        </a:solidFill>
+        <a:latin typeface="+mn-lt"/>
+        <a:ea typeface="+mn-ea"/>
+        <a:cs typeface="+mn-cs"/>
+      </a:defRPr>
+    </a:lvl3pPr>
+    <a:lvl4pPr marL="1371600" algn="l" defTabSz="457200" rtl="0" eaLnBrk="1" latinLnBrk="0" hangingPunct="1">
+      <a:defRPr sz="1200" kern="1200">
+        <a:solidFill>
+          <a:schemeClr val="tx1"/>
+        </a:solidFill>
+        <a:latin typeface="+mn-lt"/>
+        <a:ea typeface="+mn-ea"/>
+        <a:cs typeface="+mn-cs"/>
+      </a:defRPr>
+    </a:lvl4pPr>
+    <a:lvl5pPr marL="1828800" algn="l" defTabSz="457200" rtl="0" eaLnBrk="1" latinLnBrk="0" hangingPunct="1">
+      <a:defRPr sz="1200" kern="1200">
+        <a:solidFill>
+          <a:schemeClr val="tx1"/>
+        </a:solidFill>
+        <a:latin typeface="+mn-lt"/>
+        <a:ea typeface="+mn-ea"/>
+        <a:cs typeface="+mn-cs"/>
+      </a:defRPr>
+    </a:lvl5pPr>
+    <a:lvl6pPr marL="2286000" algn="l" defTabSz="457200" rtl="0" eaLnBrk="1" latinLnBrk="0" hangingPunct="1">
+      <a:defRPr sz="1200" kern="1200">
+        <a:solidFill>
+          <a:schemeClr val="tx1"/>
+        </a:solidFill>
+        <a:latin typeface="+mn-lt"/>
+        <a:ea typeface="+mn-ea"/>
+        <a:cs typeface="+mn-cs"/>
+      </a:defRPr>
+    </a:lvl6pPr>
+    <a:lvl7pPr marL="2743200" algn="l" defTabSz="457200" rtl="0" eaLnBrk="1" latinLnBrk="0" hangingPunct="1">
+      <a:defRPr sz="1200" kern="1200">
+        <a:solidFill>
+          <a:schemeClr val="tx1"/>
+        </a:solidFill>
+        <a:latin typeface="+mn-lt"/>
+        <a:ea typeface="+mn-ea"/>
+        <a:cs typeface="+mn-cs"/>
+      </a:defRPr>
+    </a:lvl7pPr>
+    <a:lvl8pPr marL="3200400" algn="l" defTabSz="457200" rtl="0" eaLnBrk="1" latinLnBrk="0" hangingPunct="1">
+      <a:defRPr sz="1200" kern="1200">
+        <a:solidFill>
+          <a:schemeClr val="tx1"/>
+        </a:solidFill>
+        <a:latin typeface="+mn-lt"/>
+        <a:ea typeface="+mn-ea"/>
+        <a:cs typeface="+mn-cs"/>
+      </a:defRPr>
+    </a:lvl8pPr>
+    <a:lvl9pPr marL="3657600" algn="l" defTabSz="457200" rtl="0" eaLnBrk="1" latinLnBrk="0" hangingPunct="1">
+      <a:defRPr sz="1200" kern="1200">
+        <a:solidFill>
+          <a:schemeClr val="tx1"/>
+        </a:solidFill>
+        <a:latin typeface="+mn-lt"/>
+        <a:ea typeface="+mn-ea"/>
+        <a:cs typeface="+mn-cs"/>
+      </a:defRPr>
+    </a:lvl9pPr>
+  </p:notesStyle>
+</p:notesMaster>
+</file>
+
+<file path=ppt/notesSlides/notesSlide1.xml><?xml version="1.0" encoding="utf-8"?>
+<p:notes xmlns:a="http://schemas.openxmlformats.org/drawingml/2006/main" xmlns:r="http://schemas.openxmlformats.org/officeDocument/2006/relationships" xmlns:p="http://schemas.openxmlformats.org/presentationml/2006/main">
+  <p:cSld>
+    <p:spTree>
+      <p:nvGrpSpPr>
+        <p:cNvPr id="1" name=""/>
+        <p:cNvGrpSpPr/>
+        <p:nvPr/>
+      </p:nvGrpSpPr>
+      <p:grpSpPr>
+        <a:xfrm>
+          <a:off x="0" y="0"/>
+          <a:ext cx="0" cy="0"/>
+          <a:chOff x="0" y="0"/>
+          <a:chExt cx="0" cy="0"/>
+        </a:xfrm>
+      </p:grpSpPr>
+      <p:sp>
+        <p:nvSpPr>
+          <p:cNvPr id="2" name="Slide Image Placeholder 1"/>
+          <p:cNvSpPr>
+            <a:spLocks noGrp="1" noRot="1" noChangeAspect="1"/>
+          </p:cNvSpPr>
+          <p:nvPr>
+            <p:ph type="sldImg"/>
+          </p:nvPr>
+        </p:nvSpPr>
+        <p:spPr/>
+      </p:sp>
+      <p:sp>
+        <p:nvSpPr>
+          <p:cNvPr id="3" name="Notes Placeholder 2"/>
+          <p:cNvSpPr>
+            <a:spLocks noGrp="1"/>
+          </p:cNvSpPr>
+          <p:nvPr>
+            <p:ph type="body" idx="1"/>
+          </p:nvPr>
+        </p:nvSpPr>
+        <p:spPr/>
+        <p:txBody>
+          <a:bodyPr/>
+          <a:lstStyle/>
+          <a:p>
+            <a:r>
+              <a:rPr lang="en-US" dirty="0" smtClean="0"/>
+              <a:t>http://</a:t>
+            </a:r>
+            <a:r>
+              <a:rPr lang="en-US" dirty="0" err="1" smtClean="0"/>
+              <a:t>www.jetbrains.com</a:t>
+            </a:r>
+            <a:r>
+              <a:rPr lang="en-US" dirty="0" smtClean="0"/>
+              <a:t>/idea/plugins/</a:t>
+            </a:r>
+            <a:r>
+              <a:rPr lang="en-US" dirty="0" err="1" smtClean="0"/>
+              <a:t>PsiBuilder.gif</a:t>
+            </a:r>
+            <a:endParaRPr lang="en-US" dirty="0"/>
+          </a:p>
+        </p:txBody>
+      </p:sp>
+      <p:sp>
+        <p:nvSpPr>
+          <p:cNvPr id="4" name="Slide Number Placeholder 3"/>
+          <p:cNvSpPr>
+            <a:spLocks noGrp="1"/>
+          </p:cNvSpPr>
+          <p:nvPr>
+            <p:ph type="sldNum" sz="quarter" idx="10"/>
+          </p:nvPr>
+        </p:nvSpPr>
+        <p:spPr/>
+        <p:txBody>
+          <a:bodyPr/>
+          <a:lstStyle/>
+          <a:p>
+            <a:fld id="{4FA87827-956D-2D4E-9772-6863DC7B302B}" type="slidenum">
+              <a:rPr lang="en-US" smtClean="0"/>
+              <a:t>4</a:t>
+            </a:fld>
+            <a:endParaRPr lang="en-US"/>
+          </a:p>
+        </p:txBody>
+      </p:sp>
+    </p:spTree>
+    <p:extLst>
+      <p:ext uri="{BB962C8B-B14F-4D97-AF65-F5344CB8AC3E}">
+        <p14:creationId xmlns:p14="http://schemas.microsoft.com/office/powerpoint/2010/main" val="2630468623"/>
+      </p:ext>
+    </p:extLst>
+  </p:cSld>
+  <p:clrMapOvr>
+    <a:masterClrMapping/>
+  </p:clrMapOvr>
+</p:notes>
+</file>
+
+<file path=ppt/notesSlides/notesSlide2.xml><?xml version="1.0" encoding="utf-8"?>
+<p:notes xmlns:a="http://schemas.openxmlformats.org/drawingml/2006/main" xmlns:r="http://schemas.openxmlformats.org/officeDocument/2006/relationships" xmlns:p="http://schemas.openxmlformats.org/presentationml/2006/main">
+  <p:cSld>
+    <p:spTree>
+      <p:nvGrpSpPr>
+        <p:cNvPr id="1" name=""/>
+        <p:cNvGrpSpPr/>
+        <p:nvPr/>
+      </p:nvGrpSpPr>
+      <p:grpSpPr>
+        <a:xfrm>
+          <a:off x="0" y="0"/>
+          <a:ext cx="0" cy="0"/>
+          <a:chOff x="0" y="0"/>
+          <a:chExt cx="0" cy="0"/>
+        </a:xfrm>
+      </p:grpSpPr>
+      <p:sp>
+        <p:nvSpPr>
+          <p:cNvPr id="2" name="Slide Image Placeholder 1"/>
+          <p:cNvSpPr>
+            <a:spLocks noGrp="1" noRot="1" noChangeAspect="1"/>
+          </p:cNvSpPr>
+          <p:nvPr>
+            <p:ph type="sldImg"/>
+          </p:nvPr>
+        </p:nvSpPr>
+        <p:spPr/>
+      </p:sp>
+      <p:sp>
+        <p:nvSpPr>
+          <p:cNvPr id="3" name="Notes Placeholder 2"/>
+          <p:cNvSpPr>
+            <a:spLocks noGrp="1"/>
+          </p:cNvSpPr>
+          <p:nvPr>
+            <p:ph type="body" idx="1"/>
+          </p:nvPr>
+        </p:nvSpPr>
+        <p:spPr/>
+        <p:txBody>
+          <a:bodyPr/>
+          <a:lstStyle/>
+          <a:p>
+            <a:r>
+              <a:rPr lang="en-US" dirty="0" smtClean="0"/>
+              <a:t>http://</a:t>
+            </a:r>
+            <a:r>
+              <a:rPr lang="en-US" dirty="0" err="1" smtClean="0"/>
+              <a:t>en.wikipedia.org</a:t>
+            </a:r>
+            <a:r>
+              <a:rPr lang="en-US" dirty="0" smtClean="0"/>
+              <a:t>/wiki/</a:t>
+            </a:r>
+            <a:r>
+              <a:rPr lang="en-US" smtClean="0"/>
+              <a:t>Recursive_descent_parser</a:t>
+            </a:r>
+            <a:endParaRPr lang="en-US"/>
+          </a:p>
+        </p:txBody>
+      </p:sp>
+      <p:sp>
+        <p:nvSpPr>
+          <p:cNvPr id="4" name="Slide Number Placeholder 3"/>
+          <p:cNvSpPr>
+            <a:spLocks noGrp="1"/>
+          </p:cNvSpPr>
+          <p:nvPr>
+            <p:ph type="sldNum" sz="quarter" idx="10"/>
+          </p:nvPr>
+        </p:nvSpPr>
+        <p:spPr/>
+        <p:txBody>
+          <a:bodyPr/>
+          <a:lstStyle/>
+          <a:p>
+            <a:fld id="{4FA87827-956D-2D4E-9772-6863DC7B302B}" type="slidenum">
+              <a:rPr lang="en-US" smtClean="0"/>
+              <a:t>12</a:t>
+            </a:fld>
+            <a:endParaRPr lang="en-US"/>
+          </a:p>
+        </p:txBody>
+      </p:sp>
+    </p:spTree>
+    <p:extLst>
+      <p:ext uri="{BB962C8B-B14F-4D97-AF65-F5344CB8AC3E}">
+        <p14:creationId xmlns:p14="http://schemas.microsoft.com/office/powerpoint/2010/main" val="476068197"/>
+      </p:ext>
+    </p:extLst>
+  </p:cSld>
+  <p:clrMapOvr>
+    <a:masterClrMapping/>
+  </p:clrMapOvr>
+</p:notes>
+</file>
+
+<file path=ppt/notesSlides/notesSlide3.xml><?xml version="1.0" encoding="utf-8"?>
+<p:notes xmlns:a="http://schemas.openxmlformats.org/drawingml/2006/main" xmlns:r="http://schemas.openxmlformats.org/officeDocument/2006/relationships" xmlns:p="http://schemas.openxmlformats.org/presentationml/2006/main">
+  <p:cSld>
+    <p:spTree>
+      <p:nvGrpSpPr>
+        <p:cNvPr id="1" name=""/>
+        <p:cNvGrpSpPr/>
+        <p:nvPr/>
+      </p:nvGrpSpPr>
+      <p:grpSpPr>
+        <a:xfrm>
+          <a:off x="0" y="0"/>
+          <a:ext cx="0" cy="0"/>
+          <a:chOff x="0" y="0"/>
+          <a:chExt cx="0" cy="0"/>
+        </a:xfrm>
+      </p:grpSpPr>
+      <p:sp>
+        <p:nvSpPr>
+          <p:cNvPr id="2" name="Slide Image Placeholder 1"/>
+          <p:cNvSpPr>
+            <a:spLocks noGrp="1" noRot="1" noChangeAspect="1"/>
+          </p:cNvSpPr>
+          <p:nvPr>
+            <p:ph type="sldImg"/>
+          </p:nvPr>
+        </p:nvSpPr>
+        <p:spPr/>
+      </p:sp>
+      <p:sp>
+        <p:nvSpPr>
+          <p:cNvPr id="3" name="Notes Placeholder 2"/>
+          <p:cNvSpPr>
+            <a:spLocks noGrp="1"/>
+          </p:cNvSpPr>
+          <p:nvPr>
+            <p:ph type="body" idx="1"/>
+          </p:nvPr>
+        </p:nvSpPr>
+        <p:spPr/>
+        <p:txBody>
+          <a:bodyPr/>
+          <a:lstStyle/>
+          <a:p>
+            <a:r>
+              <a:rPr lang="en-US" dirty="0" smtClean="0"/>
+              <a:t>http://</a:t>
+            </a:r>
+            <a:r>
+              <a:rPr lang="en-US" dirty="0" err="1" smtClean="0"/>
+              <a:t>www.jetbrains.com</a:t>
+            </a:r>
+            <a:r>
+              <a:rPr lang="en-US" dirty="0" smtClean="0"/>
+              <a:t>/idea/features/open_api_plugin_manager.html#link2</a:t>
+            </a:r>
+            <a:endParaRPr lang="en-US" dirty="0"/>
+          </a:p>
+        </p:txBody>
+      </p:sp>
+      <p:sp>
+        <p:nvSpPr>
+          <p:cNvPr id="4" name="Slide Number Placeholder 3"/>
+          <p:cNvSpPr>
+            <a:spLocks noGrp="1"/>
+          </p:cNvSpPr>
+          <p:nvPr>
+            <p:ph type="sldNum" sz="quarter" idx="10"/>
+          </p:nvPr>
+        </p:nvSpPr>
+        <p:spPr/>
+        <p:txBody>
+          <a:bodyPr/>
+          <a:lstStyle/>
+          <a:p>
+            <a:fld id="{4FA87827-956D-2D4E-9772-6863DC7B302B}" type="slidenum">
+              <a:rPr lang="en-US" smtClean="0"/>
+              <a:t>14</a:t>
+            </a:fld>
+            <a:endParaRPr lang="en-US"/>
+          </a:p>
+        </p:txBody>
+      </p:sp>
+    </p:spTree>
+    <p:extLst>
+      <p:ext uri="{BB962C8B-B14F-4D97-AF65-F5344CB8AC3E}">
+        <p14:creationId xmlns:p14="http://schemas.microsoft.com/office/powerpoint/2010/main" val="784366533"/>
+      </p:ext>
+    </p:extLst>
+  </p:cSld>
+  <p:clrMapOvr>
+    <a:masterClrMapping/>
+  </p:clrMapOvr>
+</p:notes>
 </file>
 
 <file path=ppt/slideLayouts/slideLayout1.xml><?xml version="1.0" encoding="utf-8"?>
@@ -293,7 +1000,7 @@
           <a:p>
             <a:fld id="{903CF105-E729-A944-8550-FE8B359D2D68}" type="datetimeFigureOut">
               <a:rPr lang="en-US" smtClean="0"/>
-              <a:t>12/13/11</a:t>
+              <a:t>12/21/11</a:t>
             </a:fld>
             <a:endParaRPr lang="en-US"/>
           </a:p>
@@ -463,7 +1170,7 @@
           <a:p>
             <a:fld id="{903CF105-E729-A944-8550-FE8B359D2D68}" type="datetimeFigureOut">
               <a:rPr lang="en-US" smtClean="0"/>
-              <a:t>12/13/11</a:t>
+              <a:t>12/21/11</a:t>
             </a:fld>
             <a:endParaRPr lang="en-US"/>
           </a:p>
@@ -643,7 +1350,7 @@
           <a:p>
             <a:fld id="{903CF105-E729-A944-8550-FE8B359D2D68}" type="datetimeFigureOut">
               <a:rPr lang="en-US" smtClean="0"/>
-              <a:t>12/13/11</a:t>
+              <a:t>12/21/11</a:t>
             </a:fld>
             <a:endParaRPr lang="en-US"/>
           </a:p>
@@ -813,7 +1520,7 @@
           <a:p>
             <a:fld id="{903CF105-E729-A944-8550-FE8B359D2D68}" type="datetimeFigureOut">
               <a:rPr lang="en-US" smtClean="0"/>
-              <a:t>12/13/11</a:t>
+              <a:t>12/21/11</a:t>
             </a:fld>
             <a:endParaRPr lang="en-US"/>
           </a:p>
@@ -1059,7 +1766,7 @@
           <a:p>
             <a:fld id="{903CF105-E729-A944-8550-FE8B359D2D68}" type="datetimeFigureOut">
               <a:rPr lang="en-US" smtClean="0"/>
-              <a:t>12/13/11</a:t>
+              <a:t>12/21/11</a:t>
             </a:fld>
             <a:endParaRPr lang="en-US"/>
           </a:p>
@@ -1347,7 +2054,7 @@
           <a:p>
             <a:fld id="{903CF105-E729-A944-8550-FE8B359D2D68}" type="datetimeFigureOut">
               <a:rPr lang="en-US" smtClean="0"/>
-              <a:t>12/13/11</a:t>
+              <a:t>12/21/11</a:t>
             </a:fld>
             <a:endParaRPr lang="en-US"/>
           </a:p>
@@ -1769,7 +2476,7 @@
           <a:p>
             <a:fld id="{903CF105-E729-A944-8550-FE8B359D2D68}" type="datetimeFigureOut">
               <a:rPr lang="en-US" smtClean="0"/>
-              <a:t>12/13/11</a:t>
+              <a:t>12/21/11</a:t>
             </a:fld>
             <a:endParaRPr lang="en-US"/>
           </a:p>
@@ -1887,7 +2594,7 @@
           <a:p>
             <a:fld id="{903CF105-E729-A944-8550-FE8B359D2D68}" type="datetimeFigureOut">
               <a:rPr lang="en-US" smtClean="0"/>
-              <a:t>12/13/11</a:t>
+              <a:t>12/21/11</a:t>
             </a:fld>
             <a:endParaRPr lang="en-US"/>
           </a:p>
@@ -1982,7 +2689,7 @@
           <a:p>
             <a:fld id="{903CF105-E729-A944-8550-FE8B359D2D68}" type="datetimeFigureOut">
               <a:rPr lang="en-US" smtClean="0"/>
-              <a:t>12/13/11</a:t>
+              <a:t>12/21/11</a:t>
             </a:fld>
             <a:endParaRPr lang="en-US"/>
           </a:p>
@@ -2259,7 +2966,7 @@
           <a:p>
             <a:fld id="{903CF105-E729-A944-8550-FE8B359D2D68}" type="datetimeFigureOut">
               <a:rPr lang="en-US" smtClean="0"/>
-              <a:t>12/13/11</a:t>
+              <a:t>12/21/11</a:t>
             </a:fld>
             <a:endParaRPr lang="en-US"/>
           </a:p>
@@ -2512,7 +3219,7 @@
           <a:p>
             <a:fld id="{903CF105-E729-A944-8550-FE8B359D2D68}" type="datetimeFigureOut">
               <a:rPr lang="en-US" smtClean="0"/>
-              <a:t>12/13/11</a:t>
+              <a:t>12/21/11</a:t>
             </a:fld>
             <a:endParaRPr lang="en-US"/>
           </a:p>
@@ -2725,7 +3432,7 @@
           <a:p>
             <a:fld id="{903CF105-E729-A944-8550-FE8B359D2D68}" type="datetimeFigureOut">
               <a:rPr lang="en-US" smtClean="0"/>
-              <a:t>12/13/11</a:t>
+              <a:t>12/21/11</a:t>
             </a:fld>
             <a:endParaRPr lang="en-US"/>
           </a:p>
@@ -3167,6 +3874,1254 @@
 </p:sld>
 </file>
 
+<file path=ppt/slides/slide10.xml><?xml version="1.0" encoding="utf-8"?>
+<p:sld xmlns:a="http://schemas.openxmlformats.org/drawingml/2006/main" xmlns:r="http://schemas.openxmlformats.org/officeDocument/2006/relationships" xmlns:p="http://schemas.openxmlformats.org/presentationml/2006/main">
+  <p:cSld>
+    <p:spTree>
+      <p:nvGrpSpPr>
+        <p:cNvPr id="1" name=""/>
+        <p:cNvGrpSpPr/>
+        <p:nvPr/>
+      </p:nvGrpSpPr>
+      <p:grpSpPr>
+        <a:xfrm>
+          <a:off x="0" y="0"/>
+          <a:ext cx="0" cy="0"/>
+          <a:chOff x="0" y="0"/>
+          <a:chExt cx="0" cy="0"/>
+        </a:xfrm>
+      </p:grpSpPr>
+      <p:sp>
+        <p:nvSpPr>
+          <p:cNvPr id="2" name="Title 1"/>
+          <p:cNvSpPr>
+            <a:spLocks noGrp="1"/>
+          </p:cNvSpPr>
+          <p:nvPr>
+            <p:ph type="title"/>
+          </p:nvPr>
+        </p:nvSpPr>
+        <p:spPr/>
+        <p:txBody>
+          <a:bodyPr/>
+          <a:lstStyle/>
+          <a:p>
+            <a:r>
+              <a:rPr lang="en-US" dirty="0" smtClean="0"/>
+              <a:t>Psi parser</a:t>
+            </a:r>
+            <a:endParaRPr lang="en-US" dirty="0"/>
+          </a:p>
+        </p:txBody>
+      </p:sp>
+      <p:sp>
+        <p:nvSpPr>
+          <p:cNvPr id="3" name="Content Placeholder 2"/>
+          <p:cNvSpPr>
+            <a:spLocks noGrp="1"/>
+          </p:cNvSpPr>
+          <p:nvPr>
+            <p:ph idx="1"/>
+          </p:nvPr>
+        </p:nvSpPr>
+        <p:spPr/>
+        <p:txBody>
+          <a:bodyPr>
+            <a:normAutofit fontScale="77500" lnSpcReduction="20000"/>
+          </a:bodyPr>
+          <a:lstStyle/>
+          <a:p>
+            <a:r>
+              <a:rPr lang="en-US" dirty="0" smtClean="0"/>
+              <a:t>Try the grammar kit</a:t>
+            </a:r>
+          </a:p>
+          <a:p>
+            <a:r>
+              <a:rPr lang="en-US" dirty="0" smtClean="0"/>
+              <a:t>The </a:t>
+            </a:r>
+            <a:r>
+              <a:rPr lang="en-US" dirty="0" err="1"/>
+              <a:t>Clojure</a:t>
+            </a:r>
+            <a:r>
+              <a:rPr lang="en-US" dirty="0"/>
+              <a:t> parser is probably the simplest and smallest of all the </a:t>
+            </a:r>
+            <a:r>
+              <a:rPr lang="en-US" dirty="0" smtClean="0"/>
+              <a:t>custom language </a:t>
+            </a:r>
+            <a:r>
+              <a:rPr lang="en-US" dirty="0"/>
+              <a:t>plugins that are maintained by </a:t>
+            </a:r>
+            <a:r>
+              <a:rPr lang="en-US" dirty="0" smtClean="0"/>
+              <a:t>us</a:t>
+            </a:r>
+          </a:p>
+          <a:p>
+            <a:r>
+              <a:rPr lang="en-US" dirty="0"/>
+              <a:t>No, IDEA currently does not have a ready solution for using generated </a:t>
+            </a:r>
+            <a:r>
+              <a:rPr lang="en-US" dirty="0" smtClean="0"/>
+              <a:t>parsers. The </a:t>
+            </a:r>
+            <a:r>
+              <a:rPr lang="en-US" b="1" dirty="0"/>
+              <a:t>typical approach </a:t>
+            </a:r>
+            <a:r>
+              <a:rPr lang="en-US" dirty="0"/>
+              <a:t>when writing parsers in IDEA is to create a method </a:t>
+            </a:r>
+            <a:r>
+              <a:rPr lang="en-US" dirty="0" err="1"/>
+              <a:t>parseSmth</a:t>
+            </a:r>
+            <a:r>
+              <a:rPr lang="en-US" dirty="0"/>
+              <a:t>(</a:t>
+            </a:r>
+            <a:r>
+              <a:rPr lang="en-US" dirty="0" smtClean="0"/>
+              <a:t>). for </a:t>
+            </a:r>
+            <a:r>
+              <a:rPr lang="en-US" dirty="0"/>
+              <a:t>each rule in the grammar, and implement the rule in terms of </a:t>
+            </a:r>
+            <a:r>
+              <a:rPr lang="en-US" dirty="0" err="1" smtClean="0"/>
+              <a:t>PsiBuilder</a:t>
+            </a:r>
+            <a:r>
+              <a:rPr lang="en-US" dirty="0" smtClean="0"/>
+              <a:t> markers.</a:t>
+            </a:r>
+          </a:p>
+          <a:p>
+            <a:r>
+              <a:rPr lang="en-US" dirty="0"/>
+              <a:t>write </a:t>
+            </a:r>
+            <a:r>
+              <a:rPr lang="en-US" dirty="0" err="1"/>
+              <a:t>lexer</a:t>
+            </a:r>
+            <a:r>
+              <a:rPr lang="en-US" dirty="0"/>
+              <a:t> and parser manually (</a:t>
+            </a:r>
+            <a:r>
+              <a:rPr lang="en-US" dirty="0" err="1"/>
+              <a:t>lexer</a:t>
+            </a:r>
+            <a:r>
+              <a:rPr lang="en-US" dirty="0"/>
+              <a:t> is </a:t>
+            </a:r>
+            <a:r>
+              <a:rPr lang="en-US" dirty="0" err="1"/>
+              <a:t>jflex</a:t>
+            </a:r>
+            <a:r>
+              <a:rPr lang="en-US" dirty="0"/>
+              <a:t>-generated and parser is completely by hand) since you have to continue your parsing whatever user types in</a:t>
+            </a:r>
+            <a:r>
+              <a:rPr lang="en-US" dirty="0" smtClean="0"/>
+              <a:t>.</a:t>
+            </a:r>
+          </a:p>
+          <a:p>
+            <a:r>
+              <a:rPr lang="en-US" dirty="0"/>
+              <a:t>Language construction never been easy, it doesn't matter if you do it </a:t>
+            </a:r>
+            <a:r>
+              <a:rPr lang="en-US" dirty="0" smtClean="0"/>
+              <a:t>by</a:t>
+            </a:r>
+            <a:r>
+              <a:rPr lang="en-US" dirty="0"/>
+              <a:t>  hand or by </a:t>
+            </a:r>
+            <a:r>
+              <a:rPr lang="en-US" dirty="0" err="1"/>
+              <a:t>Antlr</a:t>
+            </a:r>
+            <a:endParaRPr lang="en-US" dirty="0"/>
+          </a:p>
+        </p:txBody>
+      </p:sp>
+    </p:spTree>
+    <p:extLst>
+      <p:ext uri="{BB962C8B-B14F-4D97-AF65-F5344CB8AC3E}">
+        <p14:creationId xmlns:p14="http://schemas.microsoft.com/office/powerpoint/2010/main" val="3862011816"/>
+      </p:ext>
+    </p:extLst>
+  </p:cSld>
+  <p:clrMapOvr>
+    <a:masterClrMapping/>
+  </p:clrMapOvr>
+</p:sld>
+</file>
+
+<file path=ppt/slides/slide11.xml><?xml version="1.0" encoding="utf-8"?>
+<p:sld xmlns:a="http://schemas.openxmlformats.org/drawingml/2006/main" xmlns:r="http://schemas.openxmlformats.org/officeDocument/2006/relationships" xmlns:p="http://schemas.openxmlformats.org/presentationml/2006/main">
+  <p:cSld>
+    <p:spTree>
+      <p:nvGrpSpPr>
+        <p:cNvPr id="1" name=""/>
+        <p:cNvGrpSpPr/>
+        <p:nvPr/>
+      </p:nvGrpSpPr>
+      <p:grpSpPr>
+        <a:xfrm>
+          <a:off x="0" y="0"/>
+          <a:ext cx="0" cy="0"/>
+          <a:chOff x="0" y="0"/>
+          <a:chExt cx="0" cy="0"/>
+        </a:xfrm>
+      </p:grpSpPr>
+      <p:sp>
+        <p:nvSpPr>
+          <p:cNvPr id="2" name="Title 1"/>
+          <p:cNvSpPr>
+            <a:spLocks noGrp="1"/>
+          </p:cNvSpPr>
+          <p:nvPr>
+            <p:ph type="title"/>
+          </p:nvPr>
+        </p:nvSpPr>
+        <p:spPr/>
+        <p:txBody>
+          <a:bodyPr/>
+          <a:lstStyle/>
+          <a:p>
+            <a:endParaRPr lang="en-US"/>
+          </a:p>
+        </p:txBody>
+      </p:sp>
+      <p:sp>
+        <p:nvSpPr>
+          <p:cNvPr id="3" name="Content Placeholder 2"/>
+          <p:cNvSpPr>
+            <a:spLocks noGrp="1"/>
+          </p:cNvSpPr>
+          <p:nvPr>
+            <p:ph idx="1"/>
+          </p:nvPr>
+        </p:nvSpPr>
+        <p:spPr/>
+        <p:txBody>
+          <a:bodyPr/>
+          <a:lstStyle/>
+          <a:p>
+            <a:r>
+              <a:rPr lang="en-US" dirty="0" smtClean="0"/>
+              <a:t> </a:t>
+            </a:r>
+            <a:endParaRPr lang="en-US" dirty="0"/>
+          </a:p>
+        </p:txBody>
+      </p:sp>
+      <p:pic>
+        <p:nvPicPr>
+          <p:cNvPr id="4" name="Picture 3"/>
+          <p:cNvPicPr>
+            <a:picLocks noChangeAspect="1"/>
+          </p:cNvPicPr>
+          <p:nvPr/>
+        </p:nvPicPr>
+        <p:blipFill>
+          <a:blip r:embed="rId2"/>
+          <a:stretch>
+            <a:fillRect/>
+          </a:stretch>
+        </p:blipFill>
+        <p:spPr>
+          <a:xfrm>
+            <a:off x="114300" y="1612900"/>
+            <a:ext cx="8915400" cy="3632200"/>
+          </a:xfrm>
+          <a:prstGeom prst="rect">
+            <a:avLst/>
+          </a:prstGeom>
+        </p:spPr>
+      </p:pic>
+    </p:spTree>
+    <p:extLst>
+      <p:ext uri="{BB962C8B-B14F-4D97-AF65-F5344CB8AC3E}">
+        <p14:creationId xmlns:p14="http://schemas.microsoft.com/office/powerpoint/2010/main" val="3134491857"/>
+      </p:ext>
+    </p:extLst>
+  </p:cSld>
+  <p:clrMapOvr>
+    <a:masterClrMapping/>
+  </p:clrMapOvr>
+</p:sld>
+</file>
+
+<file path=ppt/slides/slide12.xml><?xml version="1.0" encoding="utf-8"?>
+<p:sld xmlns:a="http://schemas.openxmlformats.org/drawingml/2006/main" xmlns:r="http://schemas.openxmlformats.org/officeDocument/2006/relationships" xmlns:p="http://schemas.openxmlformats.org/presentationml/2006/main">
+  <p:cSld>
+    <p:spTree>
+      <p:nvGrpSpPr>
+        <p:cNvPr id="1" name=""/>
+        <p:cNvGrpSpPr/>
+        <p:nvPr/>
+      </p:nvGrpSpPr>
+      <p:grpSpPr>
+        <a:xfrm>
+          <a:off x="0" y="0"/>
+          <a:ext cx="0" cy="0"/>
+          <a:chOff x="0" y="0"/>
+          <a:chExt cx="0" cy="0"/>
+        </a:xfrm>
+      </p:grpSpPr>
+      <p:sp>
+        <p:nvSpPr>
+          <p:cNvPr id="2" name="Title 1"/>
+          <p:cNvSpPr>
+            <a:spLocks noGrp="1"/>
+          </p:cNvSpPr>
+          <p:nvPr>
+            <p:ph type="title"/>
+          </p:nvPr>
+        </p:nvSpPr>
+        <p:spPr/>
+        <p:txBody>
+          <a:bodyPr/>
+          <a:lstStyle/>
+          <a:p>
+            <a:r>
+              <a:rPr lang="en-US" dirty="0"/>
+              <a:t>Recursive descent parser</a:t>
+            </a:r>
+          </a:p>
+        </p:txBody>
+      </p:sp>
+      <p:sp>
+        <p:nvSpPr>
+          <p:cNvPr id="3" name="Content Placeholder 2"/>
+          <p:cNvSpPr>
+            <a:spLocks noGrp="1"/>
+          </p:cNvSpPr>
+          <p:nvPr>
+            <p:ph idx="1"/>
+          </p:nvPr>
+        </p:nvSpPr>
+        <p:spPr/>
+        <p:txBody>
+          <a:bodyPr/>
+          <a:lstStyle/>
+          <a:p>
+            <a:r>
+              <a:rPr lang="en-US"/>
+              <a:t>kind of top-down parser built from a set of mutually-recursive procedures</a:t>
+            </a:r>
+            <a:endParaRPr lang="en-US" dirty="0"/>
+          </a:p>
+        </p:txBody>
+      </p:sp>
+    </p:spTree>
+    <p:extLst>
+      <p:ext uri="{BB962C8B-B14F-4D97-AF65-F5344CB8AC3E}">
+        <p14:creationId xmlns:p14="http://schemas.microsoft.com/office/powerpoint/2010/main" val="1704516617"/>
+      </p:ext>
+    </p:extLst>
+  </p:cSld>
+  <p:clrMapOvr>
+    <a:masterClrMapping/>
+  </p:clrMapOvr>
+</p:sld>
+</file>
+
+<file path=ppt/slides/slide13.xml><?xml version="1.0" encoding="utf-8"?>
+<p:sld xmlns:a="http://schemas.openxmlformats.org/drawingml/2006/main" xmlns:r="http://schemas.openxmlformats.org/officeDocument/2006/relationships" xmlns:p="http://schemas.openxmlformats.org/presentationml/2006/main">
+  <p:cSld>
+    <p:spTree>
+      <p:nvGrpSpPr>
+        <p:cNvPr id="1" name=""/>
+        <p:cNvGrpSpPr/>
+        <p:nvPr/>
+      </p:nvGrpSpPr>
+      <p:grpSpPr>
+        <a:xfrm>
+          <a:off x="0" y="0"/>
+          <a:ext cx="0" cy="0"/>
+          <a:chOff x="0" y="0"/>
+          <a:chExt cx="0" cy="0"/>
+        </a:xfrm>
+      </p:grpSpPr>
+      <p:sp>
+        <p:nvSpPr>
+          <p:cNvPr id="2" name="Title 1"/>
+          <p:cNvSpPr>
+            <a:spLocks noGrp="1"/>
+          </p:cNvSpPr>
+          <p:nvPr>
+            <p:ph type="title"/>
+          </p:nvPr>
+        </p:nvSpPr>
+        <p:spPr/>
+        <p:txBody>
+          <a:bodyPr/>
+          <a:lstStyle/>
+          <a:p>
+            <a:endParaRPr lang="en-US"/>
+          </a:p>
+        </p:txBody>
+      </p:sp>
+      <p:sp>
+        <p:nvSpPr>
+          <p:cNvPr id="3" name="Content Placeholder 2"/>
+          <p:cNvSpPr>
+            <a:spLocks noGrp="1"/>
+          </p:cNvSpPr>
+          <p:nvPr>
+            <p:ph idx="1"/>
+          </p:nvPr>
+        </p:nvSpPr>
+        <p:spPr/>
+        <p:txBody>
+          <a:bodyPr/>
+          <a:lstStyle/>
+          <a:p>
+            <a:endParaRPr lang="en-US"/>
+          </a:p>
+        </p:txBody>
+      </p:sp>
+    </p:spTree>
+    <p:extLst>
+      <p:ext uri="{BB962C8B-B14F-4D97-AF65-F5344CB8AC3E}">
+        <p14:creationId xmlns:p14="http://schemas.microsoft.com/office/powerpoint/2010/main" val="2865957318"/>
+      </p:ext>
+    </p:extLst>
+  </p:cSld>
+  <p:clrMapOvr>
+    <a:masterClrMapping/>
+  </p:clrMapOvr>
+</p:sld>
+</file>
+
+<file path=ppt/slides/slide14.xml><?xml version="1.0" encoding="utf-8"?>
+<p:sld xmlns:a="http://schemas.openxmlformats.org/drawingml/2006/main" xmlns:r="http://schemas.openxmlformats.org/officeDocument/2006/relationships" xmlns:p="http://schemas.openxmlformats.org/presentationml/2006/main">
+  <p:cSld>
+    <p:spTree>
+      <p:nvGrpSpPr>
+        <p:cNvPr id="1" name=""/>
+        <p:cNvGrpSpPr/>
+        <p:nvPr/>
+      </p:nvGrpSpPr>
+      <p:grpSpPr>
+        <a:xfrm>
+          <a:off x="0" y="0"/>
+          <a:ext cx="0" cy="0"/>
+          <a:chOff x="0" y="0"/>
+          <a:chExt cx="0" cy="0"/>
+        </a:xfrm>
+      </p:grpSpPr>
+      <p:sp>
+        <p:nvSpPr>
+          <p:cNvPr id="2" name="Title 1"/>
+          <p:cNvSpPr>
+            <a:spLocks noGrp="1"/>
+          </p:cNvSpPr>
+          <p:nvPr>
+            <p:ph type="title"/>
+          </p:nvPr>
+        </p:nvSpPr>
+        <p:spPr/>
+        <p:txBody>
+          <a:bodyPr/>
+          <a:lstStyle/>
+          <a:p>
+            <a:r>
+              <a:rPr lang="en-US" dirty="0" smtClean="0"/>
+              <a:t>Custom Language: R</a:t>
+            </a:r>
+            <a:endParaRPr lang="en-US" dirty="0"/>
+          </a:p>
+        </p:txBody>
+      </p:sp>
+      <p:sp>
+        <p:nvSpPr>
+          <p:cNvPr id="3" name="Content Placeholder 2"/>
+          <p:cNvSpPr>
+            <a:spLocks noGrp="1"/>
+          </p:cNvSpPr>
+          <p:nvPr>
+            <p:ph idx="1"/>
+          </p:nvPr>
+        </p:nvSpPr>
+        <p:spPr/>
+        <p:txBody>
+          <a:bodyPr/>
+          <a:lstStyle/>
+          <a:p>
+            <a:r>
+              <a:rPr lang="en-US" dirty="0" smtClean="0"/>
+              <a:t> </a:t>
+            </a:r>
+            <a:endParaRPr lang="en-US" dirty="0"/>
+          </a:p>
+        </p:txBody>
+      </p:sp>
+      <p:pic>
+        <p:nvPicPr>
+          <p:cNvPr id="4" name="Picture 3"/>
+          <p:cNvPicPr>
+            <a:picLocks noChangeAspect="1"/>
+          </p:cNvPicPr>
+          <p:nvPr/>
+        </p:nvPicPr>
+        <p:blipFill>
+          <a:blip r:embed="rId3"/>
+          <a:stretch>
+            <a:fillRect/>
+          </a:stretch>
+        </p:blipFill>
+        <p:spPr>
+          <a:xfrm>
+            <a:off x="0" y="2522644"/>
+            <a:ext cx="9144000" cy="3404056"/>
+          </a:xfrm>
+          <a:prstGeom prst="rect">
+            <a:avLst/>
+          </a:prstGeom>
+        </p:spPr>
+      </p:pic>
+    </p:spTree>
+    <p:extLst>
+      <p:ext uri="{BB962C8B-B14F-4D97-AF65-F5344CB8AC3E}">
+        <p14:creationId xmlns:p14="http://schemas.microsoft.com/office/powerpoint/2010/main" val="355850265"/>
+      </p:ext>
+    </p:extLst>
+  </p:cSld>
+  <p:clrMapOvr>
+    <a:masterClrMapping/>
+  </p:clrMapOvr>
+</p:sld>
+</file>
+
+<file path=ppt/slides/slide15.xml><?xml version="1.0" encoding="utf-8"?>
+<p:sld xmlns:a="http://schemas.openxmlformats.org/drawingml/2006/main" xmlns:r="http://schemas.openxmlformats.org/officeDocument/2006/relationships" xmlns:p="http://schemas.openxmlformats.org/presentationml/2006/main">
+  <p:cSld>
+    <p:spTree>
+      <p:nvGrpSpPr>
+        <p:cNvPr id="1" name=""/>
+        <p:cNvGrpSpPr/>
+        <p:nvPr/>
+      </p:nvGrpSpPr>
+      <p:grpSpPr>
+        <a:xfrm>
+          <a:off x="0" y="0"/>
+          <a:ext cx="0" cy="0"/>
+          <a:chOff x="0" y="0"/>
+          <a:chExt cx="0" cy="0"/>
+        </a:xfrm>
+      </p:grpSpPr>
+      <p:sp>
+        <p:nvSpPr>
+          <p:cNvPr id="2" name="Title 1"/>
+          <p:cNvSpPr>
+            <a:spLocks noGrp="1"/>
+          </p:cNvSpPr>
+          <p:nvPr>
+            <p:ph type="title"/>
+          </p:nvPr>
+        </p:nvSpPr>
+        <p:spPr/>
+        <p:txBody>
+          <a:bodyPr/>
+          <a:lstStyle/>
+          <a:p>
+            <a:r>
+              <a:rPr lang="en-US" dirty="0" smtClean="0"/>
+              <a:t>Language Injection</a:t>
+            </a:r>
+            <a:endParaRPr lang="en-US" dirty="0"/>
+          </a:p>
+        </p:txBody>
+      </p:sp>
+      <p:sp>
+        <p:nvSpPr>
+          <p:cNvPr id="3" name="Content Placeholder 2"/>
+          <p:cNvSpPr>
+            <a:spLocks noGrp="1"/>
+          </p:cNvSpPr>
+          <p:nvPr>
+            <p:ph idx="1"/>
+          </p:nvPr>
+        </p:nvSpPr>
+        <p:spPr/>
+        <p:txBody>
+          <a:bodyPr/>
+          <a:lstStyle/>
+          <a:p>
+            <a:r>
+              <a:rPr lang="en-US" dirty="0" smtClean="0"/>
+              <a:t> </a:t>
+            </a:r>
+            <a:endParaRPr lang="en-US" dirty="0"/>
+          </a:p>
+        </p:txBody>
+      </p:sp>
+      <p:pic>
+        <p:nvPicPr>
+          <p:cNvPr id="4" name="Picture 3"/>
+          <p:cNvPicPr>
+            <a:picLocks noChangeAspect="1"/>
+          </p:cNvPicPr>
+          <p:nvPr/>
+        </p:nvPicPr>
+        <p:blipFill>
+          <a:blip r:embed="rId2"/>
+          <a:stretch>
+            <a:fillRect/>
+          </a:stretch>
+        </p:blipFill>
+        <p:spPr>
+          <a:xfrm>
+            <a:off x="0" y="1600200"/>
+            <a:ext cx="9144000" cy="2178252"/>
+          </a:xfrm>
+          <a:prstGeom prst="rect">
+            <a:avLst/>
+          </a:prstGeom>
+        </p:spPr>
+      </p:pic>
+    </p:spTree>
+    <p:extLst>
+      <p:ext uri="{BB962C8B-B14F-4D97-AF65-F5344CB8AC3E}">
+        <p14:creationId xmlns:p14="http://schemas.microsoft.com/office/powerpoint/2010/main" val="1280713537"/>
+      </p:ext>
+    </p:extLst>
+  </p:cSld>
+  <p:clrMapOvr>
+    <a:masterClrMapping/>
+  </p:clrMapOvr>
+</p:sld>
+</file>
+
+<file path=ppt/slides/slide16.xml><?xml version="1.0" encoding="utf-8"?>
+<p:sld xmlns:a="http://schemas.openxmlformats.org/drawingml/2006/main" xmlns:r="http://schemas.openxmlformats.org/officeDocument/2006/relationships" xmlns:p="http://schemas.openxmlformats.org/presentationml/2006/main">
+  <p:cSld>
+    <p:spTree>
+      <p:nvGrpSpPr>
+        <p:cNvPr id="1" name=""/>
+        <p:cNvGrpSpPr/>
+        <p:nvPr/>
+      </p:nvGrpSpPr>
+      <p:grpSpPr>
+        <a:xfrm>
+          <a:off x="0" y="0"/>
+          <a:ext cx="0" cy="0"/>
+          <a:chOff x="0" y="0"/>
+          <a:chExt cx="0" cy="0"/>
+        </a:xfrm>
+      </p:grpSpPr>
+      <p:sp>
+        <p:nvSpPr>
+          <p:cNvPr id="2" name="Title 1"/>
+          <p:cNvSpPr>
+            <a:spLocks noGrp="1"/>
+          </p:cNvSpPr>
+          <p:nvPr>
+            <p:ph type="title"/>
+          </p:nvPr>
+        </p:nvSpPr>
+        <p:spPr/>
+        <p:txBody>
+          <a:bodyPr/>
+          <a:lstStyle/>
+          <a:p>
+            <a:r>
+              <a:rPr lang="en-US" dirty="0" smtClean="0"/>
+              <a:t>Bash plugin for </a:t>
+            </a:r>
+            <a:r>
+              <a:rPr lang="en-US" dirty="0" err="1" smtClean="0"/>
+              <a:t>Intellij</a:t>
+            </a:r>
+            <a:endParaRPr lang="en-US" dirty="0"/>
+          </a:p>
+        </p:txBody>
+      </p:sp>
+      <p:sp>
+        <p:nvSpPr>
+          <p:cNvPr id="3" name="Content Placeholder 2"/>
+          <p:cNvSpPr>
+            <a:spLocks noGrp="1"/>
+          </p:cNvSpPr>
+          <p:nvPr>
+            <p:ph idx="1"/>
+          </p:nvPr>
+        </p:nvSpPr>
+        <p:spPr/>
+        <p:txBody>
+          <a:bodyPr>
+            <a:normAutofit/>
+          </a:bodyPr>
+          <a:lstStyle/>
+          <a:p>
+            <a:r>
+              <a:rPr lang="en-US" sz="2000" dirty="0" smtClean="0"/>
+              <a:t>Well done: http</a:t>
+            </a:r>
+            <a:r>
+              <a:rPr lang="en-US" sz="2000" dirty="0"/>
+              <a:t>://</a:t>
+            </a:r>
+            <a:r>
+              <a:rPr lang="en-US" sz="2000" dirty="0" err="1"/>
+              <a:t>www.ansorg-it.com</a:t>
+            </a:r>
+            <a:r>
+              <a:rPr lang="en-US" sz="2000" dirty="0"/>
+              <a:t>/en/</a:t>
+            </a:r>
+            <a:r>
+              <a:rPr lang="en-US" sz="2000" dirty="0" err="1"/>
+              <a:t>products_bashsupport.html</a:t>
+            </a:r>
+            <a:endParaRPr lang="en-US" sz="2000" dirty="0"/>
+          </a:p>
+        </p:txBody>
+      </p:sp>
+      <p:pic>
+        <p:nvPicPr>
+          <p:cNvPr id="4" name="Picture 3"/>
+          <p:cNvPicPr>
+            <a:picLocks noChangeAspect="1"/>
+          </p:cNvPicPr>
+          <p:nvPr/>
+        </p:nvPicPr>
+        <p:blipFill>
+          <a:blip r:embed="rId2"/>
+          <a:stretch>
+            <a:fillRect/>
+          </a:stretch>
+        </p:blipFill>
+        <p:spPr>
+          <a:xfrm>
+            <a:off x="2491814" y="2244845"/>
+            <a:ext cx="4019521" cy="4497706"/>
+          </a:xfrm>
+          <a:prstGeom prst="rect">
+            <a:avLst/>
+          </a:prstGeom>
+        </p:spPr>
+      </p:pic>
+    </p:spTree>
+    <p:extLst>
+      <p:ext uri="{BB962C8B-B14F-4D97-AF65-F5344CB8AC3E}">
+        <p14:creationId xmlns:p14="http://schemas.microsoft.com/office/powerpoint/2010/main" val="3242194243"/>
+      </p:ext>
+    </p:extLst>
+  </p:cSld>
+  <p:clrMapOvr>
+    <a:masterClrMapping/>
+  </p:clrMapOvr>
+</p:sld>
+</file>
+
+<file path=ppt/slides/slide17.xml><?xml version="1.0" encoding="utf-8"?>
+<p:sld xmlns:a="http://schemas.openxmlformats.org/drawingml/2006/main" xmlns:r="http://schemas.openxmlformats.org/officeDocument/2006/relationships" xmlns:p="http://schemas.openxmlformats.org/presentationml/2006/main">
+  <p:cSld>
+    <p:spTree>
+      <p:nvGrpSpPr>
+        <p:cNvPr id="1" name=""/>
+        <p:cNvGrpSpPr/>
+        <p:nvPr/>
+      </p:nvGrpSpPr>
+      <p:grpSpPr>
+        <a:xfrm>
+          <a:off x="0" y="0"/>
+          <a:ext cx="0" cy="0"/>
+          <a:chOff x="0" y="0"/>
+          <a:chExt cx="0" cy="0"/>
+        </a:xfrm>
+      </p:grpSpPr>
+      <p:sp>
+        <p:nvSpPr>
+          <p:cNvPr id="2" name="Title 1"/>
+          <p:cNvSpPr>
+            <a:spLocks noGrp="1"/>
+          </p:cNvSpPr>
+          <p:nvPr>
+            <p:ph type="title"/>
+          </p:nvPr>
+        </p:nvSpPr>
+        <p:spPr/>
+        <p:txBody>
+          <a:bodyPr/>
+          <a:lstStyle/>
+          <a:p>
+            <a:r>
+              <a:rPr lang="en-US" dirty="0" smtClean="0"/>
+              <a:t>R-Daemon</a:t>
+            </a:r>
+            <a:endParaRPr lang="en-US" dirty="0"/>
+          </a:p>
+        </p:txBody>
+      </p:sp>
+      <p:sp>
+        <p:nvSpPr>
+          <p:cNvPr id="3" name="Content Placeholder 2"/>
+          <p:cNvSpPr>
+            <a:spLocks noGrp="1"/>
+          </p:cNvSpPr>
+          <p:nvPr>
+            <p:ph idx="1"/>
+          </p:nvPr>
+        </p:nvSpPr>
+        <p:spPr/>
+        <p:txBody>
+          <a:bodyPr>
+            <a:normAutofit fontScale="62500" lnSpcReduction="20000"/>
+          </a:bodyPr>
+          <a:lstStyle/>
+          <a:p>
+            <a:r>
+              <a:rPr lang="en-US" dirty="0" smtClean="0"/>
+              <a:t>R Session has almost complete implementation for console, objects, </a:t>
+            </a:r>
+            <a:r>
+              <a:rPr lang="en-US" dirty="0" err="1" smtClean="0"/>
+              <a:t>etc</a:t>
+            </a:r>
+            <a:endParaRPr lang="en-US" dirty="0" smtClean="0"/>
+          </a:p>
+          <a:p>
+            <a:r>
+              <a:rPr lang="en-US" dirty="0" err="1" smtClean="0"/>
+              <a:t>TextMate</a:t>
+            </a:r>
+            <a:r>
+              <a:rPr lang="en-US" dirty="0" smtClean="0"/>
+              <a:t> </a:t>
+            </a:r>
+            <a:r>
+              <a:rPr lang="en-US" dirty="0" smtClean="0">
+                <a:hlinkClick r:id="rId2"/>
+              </a:rPr>
+              <a:t>bundle</a:t>
+            </a:r>
+            <a:endParaRPr lang="en-US" dirty="0" smtClean="0"/>
+          </a:p>
+          <a:p>
+            <a:pPr lvl="1"/>
+            <a:r>
+              <a:rPr lang="en-US" dirty="0" smtClean="0"/>
+              <a:t>Start R in special mode that reads all input from file and writes all output to another one which then somehow imported into </a:t>
+            </a:r>
+            <a:r>
+              <a:rPr lang="en-US" dirty="0" err="1" smtClean="0"/>
+              <a:t>textmate</a:t>
+            </a:r>
+            <a:endParaRPr lang="en-US" dirty="0" smtClean="0"/>
+          </a:p>
+          <a:p>
+            <a:r>
+              <a:rPr lang="en-US" dirty="0"/>
+              <a:t>I </a:t>
+            </a:r>
+            <a:r>
+              <a:rPr lang="en-US" dirty="0">
+                <a:hlinkClick r:id="rId3"/>
+              </a:rPr>
+              <a:t>think </a:t>
+            </a:r>
+            <a:r>
+              <a:rPr lang="en-US" dirty="0" err="1"/>
+              <a:t>FindWindow</a:t>
+            </a:r>
+            <a:r>
+              <a:rPr lang="en-US" dirty="0"/>
+              <a:t> and </a:t>
+            </a:r>
+            <a:r>
+              <a:rPr lang="en-US" dirty="0" err="1"/>
+              <a:t>SendMessage</a:t>
+            </a:r>
+            <a:r>
+              <a:rPr lang="en-US" dirty="0"/>
+              <a:t> are the functions you want to use, in general</a:t>
+            </a:r>
+            <a:r>
+              <a:rPr lang="en-US" dirty="0" smtClean="0"/>
+              <a:t>.</a:t>
+            </a:r>
+          </a:p>
+          <a:p>
+            <a:r>
+              <a:rPr lang="en-US" dirty="0" smtClean="0"/>
+              <a:t>Use the </a:t>
+            </a:r>
+            <a:r>
+              <a:rPr lang="en-US" dirty="0" smtClean="0">
+                <a:hlinkClick r:id="rId4"/>
+              </a:rPr>
+              <a:t>clipboard</a:t>
+            </a:r>
+            <a:endParaRPr lang="en-US" dirty="0" smtClean="0"/>
+          </a:p>
+          <a:p>
+            <a:r>
+              <a:rPr lang="en-US" dirty="0" err="1" smtClean="0">
+                <a:hlinkClick r:id="rId5"/>
+              </a:rPr>
+              <a:t>Tinn</a:t>
+            </a:r>
+            <a:r>
+              <a:rPr lang="en-US" dirty="0">
+                <a:hlinkClick r:id="rId5"/>
+              </a:rPr>
+              <a:t>-R</a:t>
+            </a:r>
+            <a:r>
+              <a:rPr lang="en-US" dirty="0"/>
+              <a:t>: It also pops up additional menu and toolbar when it detects </a:t>
+            </a:r>
+            <a:r>
+              <a:rPr lang="en-US" dirty="0" err="1"/>
+              <a:t>Rgui</a:t>
+            </a:r>
+            <a:r>
+              <a:rPr lang="en-US" dirty="0"/>
+              <a:t> running on the same computer. These </a:t>
+            </a:r>
+            <a:r>
+              <a:rPr lang="en-US" dirty="0" err="1"/>
+              <a:t>addons</a:t>
+            </a:r>
+            <a:r>
+              <a:rPr lang="en-US" dirty="0"/>
+              <a:t> interact with the R console and allow to submit code in part or in whole and to control R directly</a:t>
+            </a:r>
+            <a:r>
+              <a:rPr lang="en-US" dirty="0" smtClean="0"/>
+              <a:t>. </a:t>
+            </a:r>
+            <a:endParaRPr lang="en-US" dirty="0"/>
+          </a:p>
+          <a:p>
+            <a:pPr lvl="1"/>
+            <a:r>
+              <a:rPr lang="en-US" dirty="0" smtClean="0"/>
+              <a:t>It seems to have some </a:t>
+            </a:r>
+            <a:r>
+              <a:rPr lang="en-US" dirty="0" smtClean="0">
+                <a:hlinkClick r:id="rId6"/>
+              </a:rPr>
+              <a:t>limitations</a:t>
+            </a:r>
+            <a:endParaRPr lang="en-US" dirty="0" smtClean="0"/>
+          </a:p>
+          <a:p>
+            <a:r>
+              <a:rPr lang="en-US" dirty="0" smtClean="0"/>
+              <a:t>Maybe DOM is a </a:t>
+            </a:r>
+            <a:r>
+              <a:rPr lang="en-US" dirty="0" smtClean="0">
+                <a:hlinkClick r:id="rId7"/>
+              </a:rPr>
+              <a:t>solution</a:t>
+            </a:r>
+            <a:r>
+              <a:rPr lang="en-US" dirty="0" smtClean="0"/>
+              <a:t>: </a:t>
+            </a:r>
+            <a:r>
+              <a:rPr lang="en-US" dirty="0" err="1" smtClean="0"/>
+              <a:t>rdom</a:t>
+            </a:r>
+            <a:r>
+              <a:rPr lang="en-US" dirty="0"/>
+              <a:t>, </a:t>
+            </a:r>
+            <a:r>
+              <a:rPr lang="en-US" dirty="0" err="1" smtClean="0"/>
+              <a:t>RDCOMClient</a:t>
+            </a:r>
+            <a:endParaRPr lang="en-US" dirty="0" smtClean="0"/>
+          </a:p>
+          <a:p>
+            <a:r>
+              <a:rPr lang="en-US" dirty="0" smtClean="0"/>
+              <a:t>Or </a:t>
+            </a:r>
+            <a:r>
+              <a:rPr lang="en-US" dirty="0" smtClean="0">
+                <a:hlinkClick r:id="rId8"/>
+              </a:rPr>
+              <a:t>white</a:t>
+            </a:r>
+            <a:r>
+              <a:rPr lang="en-US" dirty="0" smtClean="0"/>
+              <a:t> </a:t>
+            </a:r>
+          </a:p>
+          <a:p>
+            <a:r>
+              <a:rPr lang="en-US" dirty="0" smtClean="0"/>
+              <a:t>Or most promising, we could try to use the </a:t>
+            </a:r>
+            <a:r>
+              <a:rPr lang="en-US" dirty="0" smtClean="0">
+                <a:hlinkClick r:id="rId9"/>
+              </a:rPr>
+              <a:t>windows API</a:t>
+            </a:r>
+            <a:r>
+              <a:rPr lang="en-US" dirty="0" smtClean="0"/>
+              <a:t> via VBScript or C#</a:t>
+            </a:r>
+            <a:endParaRPr lang="en-US" dirty="0"/>
+          </a:p>
+        </p:txBody>
+      </p:sp>
+    </p:spTree>
+    <p:extLst>
+      <p:ext uri="{BB962C8B-B14F-4D97-AF65-F5344CB8AC3E}">
+        <p14:creationId xmlns:p14="http://schemas.microsoft.com/office/powerpoint/2010/main" val="2563764221"/>
+      </p:ext>
+    </p:extLst>
+  </p:cSld>
+  <p:clrMapOvr>
+    <a:masterClrMapping/>
+  </p:clrMapOvr>
+</p:sld>
+</file>
+
+<file path=ppt/slides/slide18.xml><?xml version="1.0" encoding="utf-8"?>
+<p:sld xmlns:a="http://schemas.openxmlformats.org/drawingml/2006/main" xmlns:r="http://schemas.openxmlformats.org/officeDocument/2006/relationships" xmlns:p="http://schemas.openxmlformats.org/presentationml/2006/main">
+  <p:cSld>
+    <p:spTree>
+      <p:nvGrpSpPr>
+        <p:cNvPr id="1" name=""/>
+        <p:cNvGrpSpPr/>
+        <p:nvPr/>
+      </p:nvGrpSpPr>
+      <p:grpSpPr>
+        <a:xfrm>
+          <a:off x="0" y="0"/>
+          <a:ext cx="0" cy="0"/>
+          <a:chOff x="0" y="0"/>
+          <a:chExt cx="0" cy="0"/>
+        </a:xfrm>
+      </p:grpSpPr>
+      <p:sp>
+        <p:nvSpPr>
+          <p:cNvPr id="2" name="Title 1"/>
+          <p:cNvSpPr>
+            <a:spLocks noGrp="1"/>
+          </p:cNvSpPr>
+          <p:nvPr>
+            <p:ph type="title"/>
+          </p:nvPr>
+        </p:nvSpPr>
+        <p:spPr/>
+        <p:txBody>
+          <a:bodyPr/>
+          <a:lstStyle/>
+          <a:p>
+            <a:r>
+              <a:rPr lang="en-US" dirty="0" smtClean="0"/>
+              <a:t>R Console for Idea</a:t>
+            </a:r>
+            <a:endParaRPr lang="en-US" dirty="0"/>
+          </a:p>
+        </p:txBody>
+      </p:sp>
+      <p:sp>
+        <p:nvSpPr>
+          <p:cNvPr id="3" name="Content Placeholder 2"/>
+          <p:cNvSpPr>
+            <a:spLocks noGrp="1"/>
+          </p:cNvSpPr>
+          <p:nvPr>
+            <p:ph idx="1"/>
+          </p:nvPr>
+        </p:nvSpPr>
+        <p:spPr/>
+        <p:txBody>
+          <a:bodyPr/>
+          <a:lstStyle/>
+          <a:p>
+            <a:r>
+              <a:rPr lang="en-US" dirty="0" smtClean="0"/>
+              <a:t>Use </a:t>
+            </a:r>
+            <a:r>
+              <a:rPr lang="en-US" dirty="0" err="1" smtClean="0"/>
+              <a:t>RSession</a:t>
+            </a:r>
+            <a:r>
+              <a:rPr lang="en-US" dirty="0" smtClean="0"/>
+              <a:t> </a:t>
+            </a:r>
+            <a:r>
+              <a:rPr lang="en-US" dirty="0" smtClean="0">
+                <a:hlinkClick r:id="rId2"/>
+              </a:rPr>
+              <a:t>solution</a:t>
+            </a:r>
+            <a:endParaRPr lang="en-US" dirty="0"/>
+          </a:p>
+        </p:txBody>
+      </p:sp>
+    </p:spTree>
+    <p:extLst>
+      <p:ext uri="{BB962C8B-B14F-4D97-AF65-F5344CB8AC3E}">
+        <p14:creationId xmlns:p14="http://schemas.microsoft.com/office/powerpoint/2010/main" val="1475125988"/>
+      </p:ext>
+    </p:extLst>
+  </p:cSld>
+  <p:clrMapOvr>
+    <a:masterClrMapping/>
+  </p:clrMapOvr>
+</p:sld>
+</file>
+
+<file path=ppt/slides/slide19.xml><?xml version="1.0" encoding="utf-8"?>
+<p:sld xmlns:a="http://schemas.openxmlformats.org/drawingml/2006/main" xmlns:r="http://schemas.openxmlformats.org/officeDocument/2006/relationships" xmlns:p="http://schemas.openxmlformats.org/presentationml/2006/main">
+  <p:cSld>
+    <p:spTree>
+      <p:nvGrpSpPr>
+        <p:cNvPr id="1" name=""/>
+        <p:cNvGrpSpPr/>
+        <p:nvPr/>
+      </p:nvGrpSpPr>
+      <p:grpSpPr>
+        <a:xfrm>
+          <a:off x="0" y="0"/>
+          <a:ext cx="0" cy="0"/>
+          <a:chOff x="0" y="0"/>
+          <a:chExt cx="0" cy="0"/>
+        </a:xfrm>
+      </p:grpSpPr>
+      <p:sp>
+        <p:nvSpPr>
+          <p:cNvPr id="2" name="Title 1"/>
+          <p:cNvSpPr>
+            <a:spLocks noGrp="1"/>
+          </p:cNvSpPr>
+          <p:nvPr>
+            <p:ph type="title"/>
+          </p:nvPr>
+        </p:nvSpPr>
+        <p:spPr/>
+        <p:txBody>
+          <a:bodyPr/>
+          <a:lstStyle/>
+          <a:p>
+            <a:r>
+              <a:rPr lang="en-US" dirty="0" err="1" smtClean="0">
+                <a:hlinkClick r:id="rId2"/>
+              </a:rPr>
+              <a:t>Tinn</a:t>
+            </a:r>
+            <a:r>
+              <a:rPr lang="en-US" dirty="0" smtClean="0">
+                <a:hlinkClick r:id="rId2"/>
+              </a:rPr>
+              <a:t>-R</a:t>
+            </a:r>
+            <a:endParaRPr lang="en-US" dirty="0"/>
+          </a:p>
+        </p:txBody>
+      </p:sp>
+      <p:sp>
+        <p:nvSpPr>
+          <p:cNvPr id="3" name="Content Placeholder 2"/>
+          <p:cNvSpPr>
+            <a:spLocks noGrp="1"/>
+          </p:cNvSpPr>
+          <p:nvPr>
+            <p:ph idx="1"/>
+          </p:nvPr>
+        </p:nvSpPr>
+        <p:spPr/>
+        <p:txBody>
+          <a:bodyPr>
+            <a:normAutofit/>
+          </a:bodyPr>
+          <a:lstStyle/>
+          <a:p>
+            <a:r>
+              <a:rPr lang="en-US" dirty="0" smtClean="0"/>
+              <a:t>Allows for </a:t>
+            </a:r>
+            <a:r>
+              <a:rPr lang="en-US" dirty="0" err="1" smtClean="0"/>
+              <a:t>Rgui</a:t>
+            </a:r>
+            <a:r>
+              <a:rPr lang="en-US" dirty="0" smtClean="0"/>
+              <a:t> interaction to evaluate line or selection</a:t>
+            </a:r>
+          </a:p>
+          <a:p>
+            <a:pPr lvl="1"/>
+            <a:r>
+              <a:rPr lang="en-US" dirty="0"/>
+              <a:t>including list variables or objects</a:t>
+            </a:r>
+            <a:r>
+              <a:rPr lang="en-US" dirty="0" smtClean="0"/>
+              <a:t>, clearing </a:t>
+            </a:r>
+            <a:r>
+              <a:rPr lang="en-US" dirty="0"/>
+              <a:t>console, even stopping the current process.</a:t>
+            </a:r>
+            <a:endParaRPr lang="en-US" dirty="0" smtClean="0"/>
+          </a:p>
+          <a:p>
+            <a:r>
+              <a:rPr lang="en-US" dirty="0" smtClean="0"/>
+              <a:t>Code formatter</a:t>
+            </a:r>
+          </a:p>
+          <a:p>
+            <a:r>
+              <a:rPr lang="en-US" dirty="0" smtClean="0"/>
+              <a:t>Bracket matching &amp; checking</a:t>
+            </a:r>
+          </a:p>
+          <a:p>
+            <a:r>
+              <a:rPr lang="en-US" dirty="0" smtClean="0"/>
+              <a:t>Commenting uncommenting</a:t>
+            </a:r>
+            <a:endParaRPr lang="en-US" dirty="0"/>
+          </a:p>
+        </p:txBody>
+      </p:sp>
+    </p:spTree>
+    <p:extLst>
+      <p:ext uri="{BB962C8B-B14F-4D97-AF65-F5344CB8AC3E}">
+        <p14:creationId xmlns:p14="http://schemas.microsoft.com/office/powerpoint/2010/main" val="2449672567"/>
+      </p:ext>
+    </p:extLst>
+  </p:cSld>
+  <p:clrMapOvr>
+    <a:masterClrMapping/>
+  </p:clrMapOvr>
+</p:sld>
+</file>
+
 <file path=ppt/slides/slide2.xml><?xml version="1.0" encoding="utf-8"?>
 <p:sld xmlns:a="http://schemas.openxmlformats.org/drawingml/2006/main" xmlns:r="http://schemas.openxmlformats.org/officeDocument/2006/relationships" xmlns:p="http://schemas.openxmlformats.org/presentationml/2006/main">
   <p:cSld>
@@ -3446,14 +5401,20 @@
             <p:ph type="title"/>
           </p:nvPr>
         </p:nvSpPr>
-        <p:spPr/>
-        <p:txBody>
-          <a:bodyPr/>
-          <a:lstStyle/>
-          <a:p>
-            <a:r>
-              <a:rPr lang="en-US" dirty="0" smtClean="0"/>
-              <a:t>Roadmap (coming soon)</a:t>
+        <p:spPr>
+          <a:xfrm>
+            <a:off x="290421" y="292722"/>
+            <a:ext cx="8229600" cy="1143000"/>
+          </a:xfrm>
+        </p:spPr>
+        <p:txBody>
+          <a:bodyPr/>
+          <a:lstStyle/>
+          <a:p>
+            <a:pPr algn="l"/>
+            <a:r>
+              <a:rPr lang="en-US" dirty="0" err="1" smtClean="0"/>
+              <a:t>PsiParser</a:t>
             </a:r>
             <a:endParaRPr lang="en-US" dirty="0"/>
           </a:p>
@@ -3476,46 +5437,40 @@
           <a:p>
             <a:r>
               <a:rPr lang="en-US" dirty="0" smtClean="0"/>
-              <a:t>Live Templates</a:t>
-            </a:r>
-          </a:p>
-          <a:p>
-            <a:r>
-              <a:rPr lang="en-US" dirty="0" err="1" smtClean="0"/>
-              <a:t>Quickfixes</a:t>
-            </a:r>
-            <a:r>
-              <a:rPr lang="en-US" dirty="0" smtClean="0"/>
-              <a:t> for common problems</a:t>
-            </a:r>
-          </a:p>
-          <a:p>
-            <a:pPr lvl="1"/>
-            <a:r>
-              <a:rPr lang="en-US" dirty="0" smtClean="0"/>
-              <a:t>Incorrect subset</a:t>
-            </a:r>
-          </a:p>
-          <a:p>
-            <a:r>
-              <a:rPr lang="en-US" dirty="0" smtClean="0"/>
-              <a:t>Folding</a:t>
-            </a:r>
-          </a:p>
-          <a:p>
-            <a:pPr lvl="1"/>
-            <a:r>
-              <a:rPr lang="en-US" dirty="0" err="1"/>
-              <a:t>ArcFoldingBuilder</a:t>
+              <a:t> </a:t>
             </a:r>
             <a:endParaRPr lang="en-US" dirty="0"/>
           </a:p>
         </p:txBody>
       </p:sp>
+      <p:pic>
+        <p:nvPicPr>
+          <p:cNvPr id="4" name="Picture 3"/>
+          <p:cNvPicPr>
+            <a:picLocks noChangeAspect="1"/>
+          </p:cNvPicPr>
+          <p:nvPr/>
+        </p:nvPicPr>
+        <p:blipFill>
+          <a:blip r:embed="rId3"/>
+          <a:stretch>
+            <a:fillRect/>
+          </a:stretch>
+        </p:blipFill>
+        <p:spPr>
+          <a:xfrm>
+            <a:off x="2335338" y="0"/>
+            <a:ext cx="6693477" cy="6858000"/>
+          </a:xfrm>
+          <a:prstGeom prst="rect">
+            <a:avLst/>
+          </a:prstGeom>
+        </p:spPr>
+      </p:pic>
     </p:spTree>
     <p:extLst>
       <p:ext uri="{BB962C8B-B14F-4D97-AF65-F5344CB8AC3E}">
-        <p14:creationId xmlns:p14="http://schemas.microsoft.com/office/powerpoint/2010/main" val="3335867933"/>
+        <p14:creationId xmlns:p14="http://schemas.microsoft.com/office/powerpoint/2010/main" val="168756254"/>
       </p:ext>
     </p:extLst>
   </p:cSld>
@@ -3559,7 +5514,7 @@
           <a:p>
             <a:r>
               <a:rPr lang="en-US" dirty="0" smtClean="0"/>
-              <a:t>Roadmap (later)</a:t>
+              <a:t>Roadmap (coming soon)</a:t>
             </a:r>
             <a:endParaRPr lang="en-US" dirty="0"/>
           </a:p>
@@ -3582,63 +5537,38 @@
           <a:p>
             <a:r>
               <a:rPr lang="en-US" dirty="0" smtClean="0"/>
-              <a:t>quick </a:t>
-            </a:r>
-            <a:r>
-              <a:rPr lang="en-US" dirty="0"/>
-              <a:t>navigation to variable </a:t>
-            </a:r>
-            <a:r>
-              <a:rPr lang="en-US" dirty="0" smtClean="0"/>
-              <a:t>definitions</a:t>
+              <a:t>Live Templates</a:t>
+            </a:r>
+          </a:p>
+          <a:p>
+            <a:r>
+              <a:rPr lang="en-US" dirty="0" err="1" smtClean="0"/>
+              <a:t>Quickfixes</a:t>
+            </a:r>
+            <a:r>
+              <a:rPr lang="en-US" dirty="0" smtClean="0"/>
+              <a:t> for common problems</a:t>
             </a:r>
           </a:p>
           <a:p>
             <a:pPr lvl="1"/>
             <a:r>
               <a:rPr lang="en-US" dirty="0" smtClean="0"/>
-              <a:t>(excellent) Example</a:t>
-            </a:r>
-            <a:r>
-              <a:rPr lang="en-US" dirty="0"/>
-              <a:t>: </a:t>
-            </a:r>
-            <a:r>
-              <a:rPr lang="en-US" dirty="0" err="1" smtClean="0"/>
-              <a:t>ArcChooser</a:t>
-            </a:r>
-            <a:endParaRPr lang="en-US" dirty="0"/>
-          </a:p>
-          <a:p>
-            <a:r>
-              <a:rPr lang="en-US" dirty="0" smtClean="0"/>
-              <a:t>Push to R also for windows</a:t>
+              <a:t>Incorrect subset</a:t>
+            </a:r>
+          </a:p>
+          <a:p>
+            <a:r>
+              <a:rPr lang="en-US" dirty="0" smtClean="0"/>
+              <a:t>Folding</a:t>
             </a:r>
           </a:p>
           <a:p>
             <a:pPr lvl="1"/>
             <a:r>
-              <a:rPr lang="en-US" dirty="0"/>
-              <a:t>Example? </a:t>
-            </a:r>
-            <a:r>
-              <a:rPr lang="en-US" dirty="0" err="1" smtClean="0"/>
-              <a:t>Arc:ReplToolWindow</a:t>
-            </a:r>
-            <a:endParaRPr lang="en-US" dirty="0" smtClean="0"/>
-          </a:p>
-          <a:p>
-            <a:r>
-              <a:rPr lang="en-US" dirty="0" err="1" smtClean="0"/>
-              <a:t>ColorSettingsPage</a:t>
-            </a:r>
-            <a:r>
-              <a:rPr lang="en-US" dirty="0" smtClean="0"/>
-              <a:t> (see Bash implementation)</a:t>
-            </a:r>
-            <a:endParaRPr lang="en-US" dirty="0"/>
-          </a:p>
-          <a:p>
+              <a:rPr lang="en-US" dirty="0" err="1"/>
+              <a:t>ArcFoldingBuilder</a:t>
+            </a:r>
             <a:endParaRPr lang="en-US" dirty="0"/>
           </a:p>
         </p:txBody>
@@ -3646,7 +5576,7 @@
     </p:spTree>
     <p:extLst>
       <p:ext uri="{BB962C8B-B14F-4D97-AF65-F5344CB8AC3E}">
-        <p14:creationId xmlns:p14="http://schemas.microsoft.com/office/powerpoint/2010/main" val="2970968390"/>
+        <p14:creationId xmlns:p14="http://schemas.microsoft.com/office/powerpoint/2010/main" val="3335867933"/>
       </p:ext>
     </p:extLst>
   </p:cSld>
@@ -3690,6 +5620,153 @@
           <a:p>
             <a:r>
               <a:rPr lang="en-US" dirty="0" smtClean="0"/>
+              <a:t>Roadmap (later)</a:t>
+            </a:r>
+            <a:endParaRPr lang="en-US" dirty="0"/>
+          </a:p>
+        </p:txBody>
+      </p:sp>
+      <p:sp>
+        <p:nvSpPr>
+          <p:cNvPr id="3" name="Content Placeholder 2"/>
+          <p:cNvSpPr>
+            <a:spLocks noGrp="1"/>
+          </p:cNvSpPr>
+          <p:nvPr>
+            <p:ph idx="1"/>
+          </p:nvPr>
+        </p:nvSpPr>
+        <p:spPr/>
+        <p:txBody>
+          <a:bodyPr/>
+          <a:lstStyle/>
+          <a:p>
+            <a:r>
+              <a:rPr lang="en-US" dirty="0" smtClean="0"/>
+              <a:t>quick </a:t>
+            </a:r>
+            <a:r>
+              <a:rPr lang="en-US" dirty="0"/>
+              <a:t>navigation to variable </a:t>
+            </a:r>
+            <a:r>
+              <a:rPr lang="en-US" dirty="0" smtClean="0"/>
+              <a:t>definitions</a:t>
+            </a:r>
+          </a:p>
+          <a:p>
+            <a:pPr lvl="1"/>
+            <a:r>
+              <a:rPr lang="en-US" dirty="0" smtClean="0"/>
+              <a:t>(excellent) Example</a:t>
+            </a:r>
+            <a:r>
+              <a:rPr lang="en-US" dirty="0"/>
+              <a:t>: </a:t>
+            </a:r>
+            <a:r>
+              <a:rPr lang="en-US" dirty="0" err="1" smtClean="0"/>
+              <a:t>ArcChooser</a:t>
+            </a:r>
+            <a:endParaRPr lang="en-US" dirty="0"/>
+          </a:p>
+          <a:p>
+            <a:r>
+              <a:rPr lang="en-US" dirty="0" smtClean="0"/>
+              <a:t>Push to R also for windows</a:t>
+            </a:r>
+          </a:p>
+          <a:p>
+            <a:pPr lvl="1"/>
+            <a:r>
+              <a:rPr lang="en-US" dirty="0"/>
+              <a:t>Example? </a:t>
+            </a:r>
+            <a:r>
+              <a:rPr lang="en-US" dirty="0" err="1" smtClean="0"/>
+              <a:t>Arc:ReplToolWindow</a:t>
+            </a:r>
+            <a:endParaRPr lang="en-US" dirty="0" smtClean="0"/>
+          </a:p>
+          <a:p>
+            <a:r>
+              <a:rPr lang="en-US" dirty="0" err="1" smtClean="0"/>
+              <a:t>ColorSettingsPage</a:t>
+            </a:r>
+            <a:r>
+              <a:rPr lang="en-US" dirty="0" smtClean="0"/>
+              <a:t> (see Bash implementation</a:t>
+            </a:r>
+            <a:r>
+              <a:rPr lang="en-US" dirty="0" smtClean="0"/>
+              <a:t>)</a:t>
+            </a:r>
+          </a:p>
+          <a:p>
+            <a:r>
+              <a:rPr lang="en-US" dirty="0" smtClean="0"/>
+              <a:t>Show </a:t>
+            </a:r>
+            <a:r>
+              <a:rPr lang="en-US" dirty="0" smtClean="0">
+                <a:hlinkClick r:id="rId2"/>
+              </a:rPr>
+              <a:t>parameter info</a:t>
+            </a:r>
+            <a:endParaRPr lang="en-US" dirty="0"/>
+          </a:p>
+          <a:p>
+            <a:endParaRPr lang="en-US" dirty="0"/>
+          </a:p>
+        </p:txBody>
+      </p:sp>
+    </p:spTree>
+    <p:extLst>
+      <p:ext uri="{BB962C8B-B14F-4D97-AF65-F5344CB8AC3E}">
+        <p14:creationId xmlns:p14="http://schemas.microsoft.com/office/powerpoint/2010/main" val="2970968390"/>
+      </p:ext>
+    </p:extLst>
+  </p:cSld>
+  <p:clrMapOvr>
+    <a:masterClrMapping/>
+  </p:clrMapOvr>
+</p:sld>
+</file>
+
+<file path=ppt/slides/slide7.xml><?xml version="1.0" encoding="utf-8"?>
+<p:sld xmlns:a="http://schemas.openxmlformats.org/drawingml/2006/main" xmlns:r="http://schemas.openxmlformats.org/officeDocument/2006/relationships" xmlns:p="http://schemas.openxmlformats.org/presentationml/2006/main">
+  <p:cSld>
+    <p:spTree>
+      <p:nvGrpSpPr>
+        <p:cNvPr id="1" name=""/>
+        <p:cNvGrpSpPr/>
+        <p:nvPr/>
+      </p:nvGrpSpPr>
+      <p:grpSpPr>
+        <a:xfrm>
+          <a:off x="0" y="0"/>
+          <a:ext cx="0" cy="0"/>
+          <a:chOff x="0" y="0"/>
+          <a:chExt cx="0" cy="0"/>
+        </a:xfrm>
+      </p:grpSpPr>
+      <p:sp>
+        <p:nvSpPr>
+          <p:cNvPr id="2" name="Title 1"/>
+          <p:cNvSpPr>
+            <a:spLocks noGrp="1"/>
+          </p:cNvSpPr>
+          <p:nvPr>
+            <p:ph type="title"/>
+          </p:nvPr>
+        </p:nvSpPr>
+        <p:spPr/>
+        <p:txBody>
+          <a:bodyPr/>
+          <a:lstStyle/>
+          <a:p>
+            <a:r>
+              <a:rPr lang="en-US" dirty="0" smtClean="0"/>
               <a:t>Roadmap (far future)</a:t>
             </a:r>
             <a:endParaRPr lang="en-US" dirty="0"/>
@@ -3741,14 +5818,259 @@
               <a:rPr lang="en-US" dirty="0" smtClean="0"/>
               <a:t> to access R session</a:t>
             </a:r>
+          </a:p>
+          <a:p>
+            <a:r>
+              <a:rPr lang="en-US" dirty="0" smtClean="0"/>
+              <a:t>Provide intentions for </a:t>
+            </a:r>
+            <a:r>
+              <a:rPr lang="en-US" dirty="0" smtClean="0">
+                <a:hlinkClick r:id="rId2"/>
+              </a:rPr>
+              <a:t>ggplot</a:t>
+            </a:r>
+            <a:endParaRPr lang="en-US" dirty="0" smtClean="0"/>
+          </a:p>
+          <a:p>
+            <a:r>
+              <a:rPr lang="en-US" dirty="0" smtClean="0"/>
+              <a:t>Add path completion relative to </a:t>
+            </a:r>
+            <a:r>
+              <a:rPr lang="en-US" dirty="0" err="1" smtClean="0"/>
+              <a:t>getwd</a:t>
+            </a:r>
+            <a:r>
+              <a:rPr lang="en-US" dirty="0" smtClean="0"/>
+              <a:t>() (see </a:t>
+            </a:r>
+            <a:r>
+              <a:rPr lang="en-US" dirty="0" smtClean="0">
+                <a:hlinkClick r:id="rId3"/>
+              </a:rPr>
+              <a:t>bash plugin</a:t>
+            </a:r>
             <a:endParaRPr lang="en-US" dirty="0"/>
           </a:p>
         </p:txBody>
       </p:sp>
+      <p:pic>
+        <p:nvPicPr>
+          <p:cNvPr id="4" name="Picture 3"/>
+          <p:cNvPicPr>
+            <a:picLocks noChangeAspect="1"/>
+          </p:cNvPicPr>
+          <p:nvPr/>
+        </p:nvPicPr>
+        <p:blipFill>
+          <a:blip r:embed="rId4"/>
+          <a:stretch>
+            <a:fillRect/>
+          </a:stretch>
+        </p:blipFill>
+        <p:spPr>
+          <a:xfrm>
+            <a:off x="4528701" y="4508035"/>
+            <a:ext cx="3226219" cy="1702727"/>
+          </a:xfrm>
+          <a:prstGeom prst="rect">
+            <a:avLst/>
+          </a:prstGeom>
+        </p:spPr>
+      </p:pic>
     </p:spTree>
     <p:extLst>
       <p:ext uri="{BB962C8B-B14F-4D97-AF65-F5344CB8AC3E}">
         <p14:creationId xmlns:p14="http://schemas.microsoft.com/office/powerpoint/2010/main" val="2262727866"/>
+      </p:ext>
+    </p:extLst>
+  </p:cSld>
+  <p:clrMapOvr>
+    <a:masterClrMapping/>
+  </p:clrMapOvr>
+</p:sld>
+</file>
+
+<file path=ppt/slides/slide8.xml><?xml version="1.0" encoding="utf-8"?>
+<p:sld xmlns:a="http://schemas.openxmlformats.org/drawingml/2006/main" xmlns:r="http://schemas.openxmlformats.org/officeDocument/2006/relationships" xmlns:p="http://schemas.openxmlformats.org/presentationml/2006/main">
+  <p:cSld>
+    <p:spTree>
+      <p:nvGrpSpPr>
+        <p:cNvPr id="1" name=""/>
+        <p:cNvGrpSpPr/>
+        <p:nvPr/>
+      </p:nvGrpSpPr>
+      <p:grpSpPr>
+        <a:xfrm>
+          <a:off x="0" y="0"/>
+          <a:ext cx="0" cy="0"/>
+          <a:chOff x="0" y="0"/>
+          <a:chExt cx="0" cy="0"/>
+        </a:xfrm>
+      </p:grpSpPr>
+      <p:sp>
+        <p:nvSpPr>
+          <p:cNvPr id="2" name="Title 1"/>
+          <p:cNvSpPr>
+            <a:spLocks noGrp="1"/>
+          </p:cNvSpPr>
+          <p:nvPr>
+            <p:ph type="title"/>
+          </p:nvPr>
+        </p:nvSpPr>
+        <p:spPr/>
+        <p:txBody>
+          <a:bodyPr/>
+          <a:lstStyle/>
+          <a:p>
+            <a:r>
+              <a:rPr lang="en-US" dirty="0" smtClean="0"/>
+              <a:t>Parser package for R</a:t>
+            </a:r>
+            <a:endParaRPr lang="en-US" dirty="0"/>
+          </a:p>
+        </p:txBody>
+      </p:sp>
+      <p:sp>
+        <p:nvSpPr>
+          <p:cNvPr id="3" name="Content Placeholder 2"/>
+          <p:cNvSpPr>
+            <a:spLocks noGrp="1"/>
+          </p:cNvSpPr>
+          <p:nvPr>
+            <p:ph idx="1"/>
+          </p:nvPr>
+        </p:nvSpPr>
+        <p:spPr/>
+        <p:txBody>
+          <a:bodyPr/>
+          <a:lstStyle/>
+          <a:p>
+            <a:r>
+              <a:rPr lang="en-US" dirty="0" smtClean="0"/>
+              <a:t>To compile </a:t>
+            </a:r>
+            <a:r>
+              <a:rPr lang="en-US" smtClean="0"/>
+              <a:t>the c-sources </a:t>
+            </a:r>
+            <a:endParaRPr lang="en-US" dirty="0"/>
+          </a:p>
+        </p:txBody>
+      </p:sp>
+      <p:pic>
+        <p:nvPicPr>
+          <p:cNvPr id="4" name="Picture 3"/>
+          <p:cNvPicPr>
+            <a:picLocks noChangeAspect="1"/>
+          </p:cNvPicPr>
+          <p:nvPr/>
+        </p:nvPicPr>
+        <p:blipFill>
+          <a:blip r:embed="rId2"/>
+          <a:stretch>
+            <a:fillRect/>
+          </a:stretch>
+        </p:blipFill>
+        <p:spPr>
+          <a:xfrm>
+            <a:off x="213316" y="5116832"/>
+            <a:ext cx="8191500" cy="1473200"/>
+          </a:xfrm>
+          <a:prstGeom prst="rect">
+            <a:avLst/>
+          </a:prstGeom>
+        </p:spPr>
+      </p:pic>
+    </p:spTree>
+    <p:extLst>
+      <p:ext uri="{BB962C8B-B14F-4D97-AF65-F5344CB8AC3E}">
+        <p14:creationId xmlns:p14="http://schemas.microsoft.com/office/powerpoint/2010/main" val="1182295772"/>
+      </p:ext>
+    </p:extLst>
+  </p:cSld>
+  <p:clrMapOvr>
+    <a:masterClrMapping/>
+  </p:clrMapOvr>
+</p:sld>
+</file>
+
+<file path=ppt/slides/slide9.xml><?xml version="1.0" encoding="utf-8"?>
+<p:sld xmlns:a="http://schemas.openxmlformats.org/drawingml/2006/main" xmlns:r="http://schemas.openxmlformats.org/officeDocument/2006/relationships" xmlns:p="http://schemas.openxmlformats.org/presentationml/2006/main">
+  <p:cSld>
+    <p:spTree>
+      <p:nvGrpSpPr>
+        <p:cNvPr id="1" name=""/>
+        <p:cNvGrpSpPr/>
+        <p:nvPr/>
+      </p:nvGrpSpPr>
+      <p:grpSpPr>
+        <a:xfrm>
+          <a:off x="0" y="0"/>
+          <a:ext cx="0" cy="0"/>
+          <a:chOff x="0" y="0"/>
+          <a:chExt cx="0" cy="0"/>
+        </a:xfrm>
+      </p:grpSpPr>
+      <p:sp>
+        <p:nvSpPr>
+          <p:cNvPr id="2" name="Title 1"/>
+          <p:cNvSpPr>
+            <a:spLocks noGrp="1"/>
+          </p:cNvSpPr>
+          <p:nvPr>
+            <p:ph type="title"/>
+          </p:nvPr>
+        </p:nvSpPr>
+        <p:spPr/>
+        <p:txBody>
+          <a:bodyPr/>
+          <a:lstStyle/>
+          <a:p>
+            <a:r>
+              <a:rPr lang="en-US" dirty="0" smtClean="0"/>
+              <a:t>R grammar</a:t>
+            </a:r>
+            <a:endParaRPr lang="en-US" dirty="0"/>
+          </a:p>
+        </p:txBody>
+      </p:sp>
+      <p:sp>
+        <p:nvSpPr>
+          <p:cNvPr id="3" name="Content Placeholder 2"/>
+          <p:cNvSpPr>
+            <a:spLocks noGrp="1"/>
+          </p:cNvSpPr>
+          <p:nvPr>
+            <p:ph idx="1"/>
+          </p:nvPr>
+        </p:nvSpPr>
+        <p:spPr/>
+        <p:txBody>
+          <a:bodyPr/>
+          <a:lstStyle/>
+          <a:p>
+            <a:r>
+              <a:rPr lang="en-US" dirty="0" smtClean="0"/>
+              <a:t>According to parser </a:t>
+            </a:r>
+            <a:r>
+              <a:rPr lang="en-US" dirty="0" err="1" smtClean="0"/>
+              <a:t>docu</a:t>
+            </a:r>
+            <a:r>
+              <a:rPr lang="en-US" dirty="0" smtClean="0"/>
+              <a:t>: created using bison</a:t>
+            </a:r>
+            <a:endParaRPr lang="en-US" dirty="0"/>
+          </a:p>
+        </p:txBody>
+      </p:sp>
+    </p:spTree>
+    <p:extLst>
+      <p:ext uri="{BB962C8B-B14F-4D97-AF65-F5344CB8AC3E}">
+        <p14:creationId xmlns:p14="http://schemas.microsoft.com/office/powerpoint/2010/main" val="2283564327"/>
       </p:ext>
     </p:extLst>
   </p:cSld>
@@ -4076,4 +6398,324 @@
   </a:objectDefaults>
   <a:extraClrSchemeLst/>
 </a:theme>
+</file>
+
+<file path=ppt/theme/theme2.xml><?xml version="1.0" encoding="utf-8"?>
+<a:theme xmlns:a="http://schemas.openxmlformats.org/drawingml/2006/main" name="Office Theme">
+  <a:themeElements>
+    <a:clrScheme name="Office">
+      <a:dk1>
+        <a:sysClr val="windowText" lastClr="000000"/>
+      </a:dk1>
+      <a:lt1>
+        <a:sysClr val="window" lastClr="FFFFFF"/>
+      </a:lt1>
+      <a:dk2>
+        <a:srgbClr val="1F497D"/>
+      </a:dk2>
+      <a:lt2>
+        <a:srgbClr val="EEECE1"/>
+      </a:lt2>
+      <a:accent1>
+        <a:srgbClr val="4F81BD"/>
+      </a:accent1>
+      <a:accent2>
+        <a:srgbClr val="C0504D"/>
+      </a:accent2>
+      <a:accent3>
+        <a:srgbClr val="9BBB59"/>
+      </a:accent3>
+      <a:accent4>
+        <a:srgbClr val="8064A2"/>
+      </a:accent4>
+      <a:accent5>
+        <a:srgbClr val="4BACC6"/>
+      </a:accent5>
+      <a:accent6>
+        <a:srgbClr val="F79646"/>
+      </a:accent6>
+      <a:hlink>
+        <a:srgbClr val="0000FF"/>
+      </a:hlink>
+      <a:folHlink>
+        <a:srgbClr val="800080"/>
+      </a:folHlink>
+    </a:clrScheme>
+    <a:fontScheme name="Office">
+      <a:majorFont>
+        <a:latin typeface="Calibri"/>
+        <a:ea typeface=""/>
+        <a:cs typeface=""/>
+        <a:font script="Jpan" typeface="ＭＳ Ｐゴシック"/>
+        <a:font script="Hang" typeface="맑은 고딕"/>
+        <a:font script="Hans" typeface="宋体"/>
+        <a:font script="Hant" typeface="新細明體"/>
+        <a:font script="Arab" typeface="Times New Roman"/>
+        <a:font script="Hebr" typeface="Times New Roman"/>
+        <a:font script="Thai" typeface="Angsana New"/>
+        <a:font script="Ethi" typeface="Nyala"/>
+        <a:font script="Beng" typeface="Vrinda"/>
+        <a:font script="Gujr" typeface="Shruti"/>
+        <a:font script="Khmr" typeface="MoolBoran"/>
+        <a:font script="Knda" typeface="Tunga"/>
+        <a:font script="Guru" typeface="Raavi"/>
+        <a:font script="Cans" typeface="Euphemia"/>
+        <a:font script="Cher" typeface="Plantagenet Cherokee"/>
+        <a:font script="Yiii" typeface="Microsoft Yi Baiti"/>
+        <a:font script="Tibt" typeface="Microsoft Himalaya"/>
+        <a:font script="Thaa" typeface="MV Boli"/>
+        <a:font script="Deva" typeface="Mangal"/>
+        <a:font script="Telu" typeface="Gautami"/>
+        <a:font script="Taml" typeface="Latha"/>
+        <a:font script="Syrc" typeface="Estrangelo Edessa"/>
+        <a:font script="Orya" typeface="Kalinga"/>
+        <a:font script="Mlym" typeface="Kartika"/>
+        <a:font script="Laoo" typeface="DokChampa"/>
+        <a:font script="Sinh" typeface="Iskoola Pota"/>
+        <a:font script="Mong" typeface="Mongolian Baiti"/>
+        <a:font script="Viet" typeface="Times New Roman"/>
+        <a:font script="Uigh" typeface="Microsoft Uighur"/>
+        <a:font script="Geor" typeface="Sylfaen"/>
+      </a:majorFont>
+      <a:minorFont>
+        <a:latin typeface="Calibri"/>
+        <a:ea typeface=""/>
+        <a:cs typeface=""/>
+        <a:font script="Jpan" typeface="ＭＳ Ｐゴシック"/>
+        <a:font script="Hang" typeface="맑은 고딕"/>
+        <a:font script="Hans" typeface="宋体"/>
+        <a:font script="Hant" typeface="新細明體"/>
+        <a:font script="Arab" typeface="Arial"/>
+        <a:font script="Hebr" typeface="Arial"/>
+        <a:font script="Thai" typeface="Cordia New"/>
+        <a:font script="Ethi" typeface="Nyala"/>
+        <a:font script="Beng" typeface="Vrinda"/>
+        <a:font script="Gujr" typeface="Shruti"/>
+        <a:font script="Khmr" typeface="DaunPenh"/>
+        <a:font script="Knda" typeface="Tunga"/>
+        <a:font script="Guru" typeface="Raavi"/>
+        <a:font script="Cans" typeface="Euphemia"/>
+        <a:font script="Cher" typeface="Plantagenet Cherokee"/>
+        <a:font script="Yiii" typeface="Microsoft Yi Baiti"/>
+        <a:font script="Tibt" typeface="Microsoft Himalaya"/>
+        <a:font script="Thaa" typeface="MV Boli"/>
+        <a:font script="Deva" typeface="Mangal"/>
+        <a:font script="Telu" typeface="Gautami"/>
+        <a:font script="Taml" typeface="Latha"/>
+        <a:font script="Syrc" typeface="Estrangelo Edessa"/>
+        <a:font script="Orya" typeface="Kalinga"/>
+        <a:font script="Mlym" typeface="Kartika"/>
+        <a:font script="Laoo" typeface="DokChampa"/>
+        <a:font script="Sinh" typeface="Iskoola Pota"/>
+        <a:font script="Mong" typeface="Mongolian Baiti"/>
+        <a:font script="Viet" typeface="Arial"/>
+        <a:font script="Uigh" typeface="Microsoft Uighur"/>
+        <a:font script="Geor" typeface="Sylfaen"/>
+      </a:minorFont>
+    </a:fontScheme>
+    <a:fmtScheme name="Office">
+      <a:fillStyleLst>
+        <a:solidFill>
+          <a:schemeClr val="phClr"/>
+        </a:solidFill>
+        <a:gradFill rotWithShape="1">
+          <a:gsLst>
+            <a:gs pos="0">
+              <a:schemeClr val="phClr">
+                <a:tint val="50000"/>
+                <a:satMod val="300000"/>
+              </a:schemeClr>
+            </a:gs>
+            <a:gs pos="35000">
+              <a:schemeClr val="phClr">
+                <a:tint val="37000"/>
+                <a:satMod val="300000"/>
+              </a:schemeClr>
+            </a:gs>
+            <a:gs pos="100000">
+              <a:schemeClr val="phClr">
+                <a:tint val="15000"/>
+                <a:satMod val="350000"/>
+              </a:schemeClr>
+            </a:gs>
+          </a:gsLst>
+          <a:lin ang="16200000" scaled="1"/>
+        </a:gradFill>
+        <a:gradFill rotWithShape="1">
+          <a:gsLst>
+            <a:gs pos="0">
+              <a:schemeClr val="phClr">
+                <a:tint val="100000"/>
+                <a:shade val="100000"/>
+                <a:satMod val="130000"/>
+              </a:schemeClr>
+            </a:gs>
+            <a:gs pos="100000">
+              <a:schemeClr val="phClr">
+                <a:tint val="50000"/>
+                <a:shade val="100000"/>
+                <a:satMod val="350000"/>
+              </a:schemeClr>
+            </a:gs>
+          </a:gsLst>
+          <a:lin ang="16200000" scaled="0"/>
+        </a:gradFill>
+      </a:fillStyleLst>
+      <a:lnStyleLst>
+        <a:ln w="9525" cap="flat" cmpd="sng" algn="ctr">
+          <a:solidFill>
+            <a:schemeClr val="phClr">
+              <a:shade val="95000"/>
+              <a:satMod val="105000"/>
+            </a:schemeClr>
+          </a:solidFill>
+          <a:prstDash val="solid"/>
+        </a:ln>
+        <a:ln w="25400" cap="flat" cmpd="sng" algn="ctr">
+          <a:solidFill>
+            <a:schemeClr val="phClr"/>
+          </a:solidFill>
+          <a:prstDash val="solid"/>
+        </a:ln>
+        <a:ln w="38100" cap="flat" cmpd="sng" algn="ctr">
+          <a:solidFill>
+            <a:schemeClr val="phClr"/>
+          </a:solidFill>
+          <a:prstDash val="solid"/>
+        </a:ln>
+      </a:lnStyleLst>
+      <a:effectStyleLst>
+        <a:effectStyle>
+          <a:effectLst>
+            <a:outerShdw blurRad="40000" dist="20000" dir="5400000" rotWithShape="0">
+              <a:srgbClr val="000000">
+                <a:alpha val="38000"/>
+              </a:srgbClr>
+            </a:outerShdw>
+          </a:effectLst>
+        </a:effectStyle>
+        <a:effectStyle>
+          <a:effectLst>
+            <a:outerShdw blurRad="40000" dist="23000" dir="5400000" rotWithShape="0">
+              <a:srgbClr val="000000">
+                <a:alpha val="35000"/>
+              </a:srgbClr>
+            </a:outerShdw>
+          </a:effectLst>
+        </a:effectStyle>
+        <a:effectStyle>
+          <a:effectLst>
+            <a:outerShdw blurRad="40000" dist="23000" dir="5400000" rotWithShape="0">
+              <a:srgbClr val="000000">
+                <a:alpha val="35000"/>
+              </a:srgbClr>
+            </a:outerShdw>
+          </a:effectLst>
+          <a:scene3d>
+            <a:camera prst="orthographicFront">
+              <a:rot lat="0" lon="0" rev="0"/>
+            </a:camera>
+            <a:lightRig rig="threePt" dir="t">
+              <a:rot lat="0" lon="0" rev="1200000"/>
+            </a:lightRig>
+          </a:scene3d>
+          <a:sp3d>
+            <a:bevelT w="63500" h="25400"/>
+          </a:sp3d>
+        </a:effectStyle>
+      </a:effectStyleLst>
+      <a:bgFillStyleLst>
+        <a:solidFill>
+          <a:schemeClr val="phClr"/>
+        </a:solidFill>
+        <a:gradFill rotWithShape="1">
+          <a:gsLst>
+            <a:gs pos="0">
+              <a:schemeClr val="phClr">
+                <a:tint val="40000"/>
+                <a:satMod val="350000"/>
+              </a:schemeClr>
+            </a:gs>
+            <a:gs pos="40000">
+              <a:schemeClr val="phClr">
+                <a:tint val="45000"/>
+                <a:shade val="99000"/>
+                <a:satMod val="350000"/>
+              </a:schemeClr>
+            </a:gs>
+            <a:gs pos="100000">
+              <a:schemeClr val="phClr">
+                <a:shade val="20000"/>
+                <a:satMod val="255000"/>
+              </a:schemeClr>
+            </a:gs>
+          </a:gsLst>
+          <a:path path="circle">
+            <a:fillToRect l="50000" t="-80000" r="50000" b="180000"/>
+          </a:path>
+        </a:gradFill>
+        <a:gradFill rotWithShape="1">
+          <a:gsLst>
+            <a:gs pos="0">
+              <a:schemeClr val="phClr">
+                <a:tint val="80000"/>
+                <a:satMod val="300000"/>
+              </a:schemeClr>
+            </a:gs>
+            <a:gs pos="100000">
+              <a:schemeClr val="phClr">
+                <a:shade val="30000"/>
+                <a:satMod val="200000"/>
+              </a:schemeClr>
+            </a:gs>
+          </a:gsLst>
+          <a:path path="circle">
+            <a:fillToRect l="50000" t="50000" r="50000" b="50000"/>
+          </a:path>
+        </a:gradFill>
+      </a:bgFillStyleLst>
+    </a:fmtScheme>
+  </a:themeElements>
+  <a:objectDefaults>
+    <a:spDef>
+      <a:spPr/>
+      <a:bodyPr/>
+      <a:lstStyle/>
+      <a:style>
+        <a:lnRef idx="1">
+          <a:schemeClr val="accent1"/>
+        </a:lnRef>
+        <a:fillRef idx="3">
+          <a:schemeClr val="accent1"/>
+        </a:fillRef>
+        <a:effectRef idx="2">
+          <a:schemeClr val="accent1"/>
+        </a:effectRef>
+        <a:fontRef idx="minor">
+          <a:schemeClr val="lt1"/>
+        </a:fontRef>
+      </a:style>
+    </a:spDef>
+    <a:lnDef>
+      <a:spPr/>
+      <a:bodyPr/>
+      <a:lstStyle/>
+      <a:style>
+        <a:lnRef idx="2">
+          <a:schemeClr val="accent1"/>
+        </a:lnRef>
+        <a:fillRef idx="0">
+          <a:schemeClr val="accent1"/>
+        </a:fillRef>
+        <a:effectRef idx="1">
+          <a:schemeClr val="accent1"/>
+        </a:effectRef>
+        <a:fontRef idx="minor">
+          <a:schemeClr val="tx1"/>
+        </a:fontRef>
+      </a:style>
+    </a:lnDef>
+  </a:objectDefaults>
+  <a:extraClrSchemeLst/>
+</a:theme>
 </file>
</xml_diff>

<commit_message>
started antlr-based parser using GrammarKit
</commit_message>
<xml_diff>
--- a/R4Intellij.pptx
+++ b/R4Intellij.pptx
@@ -5,28 +5,30 @@
     <p:sldMasterId id="2147483648" r:id="rId1"/>
   </p:sldMasterIdLst>
   <p:notesMasterIdLst>
-    <p:notesMasterId r:id="rId21"/>
+    <p:notesMasterId r:id="rId23"/>
   </p:notesMasterIdLst>
   <p:sldIdLst>
     <p:sldId id="256" r:id="rId2"/>
-    <p:sldId id="257" r:id="rId3"/>
-    <p:sldId id="258" r:id="rId4"/>
-    <p:sldId id="272" r:id="rId5"/>
-    <p:sldId id="259" r:id="rId6"/>
-    <p:sldId id="260" r:id="rId7"/>
-    <p:sldId id="261" r:id="rId8"/>
+    <p:sldId id="259" r:id="rId3"/>
+    <p:sldId id="260" r:id="rId4"/>
+    <p:sldId id="261" r:id="rId5"/>
+    <p:sldId id="277" r:id="rId6"/>
+    <p:sldId id="258" r:id="rId7"/>
+    <p:sldId id="275" r:id="rId8"/>
     <p:sldId id="262" r:id="rId9"/>
-    <p:sldId id="263" r:id="rId10"/>
-    <p:sldId id="264" r:id="rId11"/>
+    <p:sldId id="264" r:id="rId10"/>
+    <p:sldId id="272" r:id="rId11"/>
     <p:sldId id="265" r:id="rId12"/>
     <p:sldId id="266" r:id="rId13"/>
     <p:sldId id="269" r:id="rId14"/>
-    <p:sldId id="268" r:id="rId15"/>
-    <p:sldId id="267" r:id="rId16"/>
-    <p:sldId id="274" r:id="rId17"/>
-    <p:sldId id="271" r:id="rId18"/>
-    <p:sldId id="270" r:id="rId19"/>
-    <p:sldId id="273" r:id="rId20"/>
+    <p:sldId id="276" r:id="rId15"/>
+    <p:sldId id="268" r:id="rId16"/>
+    <p:sldId id="267" r:id="rId17"/>
+    <p:sldId id="274" r:id="rId18"/>
+    <p:sldId id="271" r:id="rId19"/>
+    <p:sldId id="270" r:id="rId20"/>
+    <p:sldId id="273" r:id="rId21"/>
+    <p:sldId id="278" r:id="rId22"/>
   </p:sldIdLst>
   <p:sldSz cx="9144000" cy="6858000" type="screen4x3"/>
   <p:notesSz cx="6858000" cy="9144000"/>
@@ -133,20 +135,25 @@
             <p14:sldId id="256"/>
           </p14:sldIdLst>
         </p14:section>
-        <p14:section name="Developer Notes" id="{94DA6817-C3E6-6E46-84C3-EF347EEFF33D}">
+        <p14:section name="Roadmap" id="{94DA6817-C3E6-6E46-84C3-EF347EEFF33D}">
           <p14:sldIdLst>
-            <p14:sldId id="257"/>
-            <p14:sldId id="258"/>
-            <p14:sldId id="272"/>
             <p14:sldId id="259"/>
             <p14:sldId id="260"/>
             <p14:sldId id="261"/>
+          </p14:sldIdLst>
+        </p14:section>
+        <p14:section name="Parser" id="{9DFED1F8-1305-DA43-B21A-B5DE2D4AC8E8}">
+          <p14:sldIdLst>
+            <p14:sldId id="277"/>
+            <p14:sldId id="258"/>
+            <p14:sldId id="275"/>
             <p14:sldId id="262"/>
-            <p14:sldId id="263"/>
             <p14:sldId id="264"/>
+            <p14:sldId id="272"/>
             <p14:sldId id="265"/>
             <p14:sldId id="266"/>
             <p14:sldId id="269"/>
+            <p14:sldId id="276"/>
           </p14:sldIdLst>
         </p14:section>
         <p14:section name="Feature Overview" id="{8B615B06-FCEC-9144-A445-B2B6278F12C6}">
@@ -165,6 +172,7 @@
         <p14:section name="Competitors" id="{3935CF84-C3EE-B94E-8CCA-1495280B1747}">
           <p14:sldIdLst>
             <p14:sldId id="273"/>
+            <p14:sldId id="278"/>
           </p14:sldIdLst>
         </p14:section>
       </p14:sectionLst>
@@ -573,15 +581,30 @@
             </a:r>
             <a:r>
               <a:rPr lang="en-US" dirty="0" err="1" smtClean="0"/>
-              <a:t>www.jetbrains.com</a:t>
-            </a:r>
-            <a:r>
-              <a:rPr lang="en-US" dirty="0" smtClean="0"/>
-              <a:t>/idea/plugins/</a:t>
+              <a:t>de.wikipedia.org</a:t>
+            </a:r>
+            <a:r>
+              <a:rPr lang="en-US" dirty="0" smtClean="0"/>
+              <a:t>/wiki/LL-</a:t>
             </a:r>
             <a:r>
               <a:rPr lang="en-US" dirty="0" err="1" smtClean="0"/>
-              <a:t>PsiBuilder.gif</a:t>
+              <a:t>Parsevr</a:t>
+            </a:r>
+            <a:endParaRPr lang="en-US" dirty="0" smtClean="0"/>
+          </a:p>
+          <a:p>
+            <a:r>
+              <a:rPr lang="en-US" dirty="0" smtClean="0"/>
+              <a:t>http://</a:t>
+            </a:r>
+            <a:r>
+              <a:rPr lang="en-US" dirty="0" err="1" smtClean="0"/>
+              <a:t>de.wikipedia.org</a:t>
+            </a:r>
+            <a:r>
+              <a:rPr lang="en-US" dirty="0" smtClean="0"/>
+              <a:t>/wiki/LL(k)-Grammatik</a:t>
             </a:r>
             <a:endParaRPr lang="en-US" dirty="0"/>
           </a:p>
@@ -604,7 +627,7 @@
           <a:p>
             <a:fld id="{4FA87827-956D-2D4E-9772-6863DC7B302B}" type="slidenum">
               <a:rPr lang="en-US" smtClean="0"/>
-              <a:t>4</a:t>
+              <a:t>7</a:t>
             </a:fld>
             <a:endParaRPr lang="en-US"/>
           </a:p>
@@ -613,7 +636,7 @@
     </p:spTree>
     <p:extLst>
       <p:ext uri="{BB962C8B-B14F-4D97-AF65-F5344CB8AC3E}">
-        <p14:creationId xmlns:p14="http://schemas.microsoft.com/office/powerpoint/2010/main" val="2630468623"/>
+        <p14:creationId xmlns:p14="http://schemas.microsoft.com/office/powerpoint/2010/main" val="2248504603"/>
       </p:ext>
     </p:extLst>
   </p:cSld>
@@ -673,17 +696,17 @@
             </a:r>
             <a:r>
               <a:rPr lang="en-US" dirty="0" err="1" smtClean="0"/>
-              <a:t>en.wikipedia.org</a:t>
-            </a:r>
-            <a:r>
-              <a:rPr lang="en-US" dirty="0" smtClean="0"/>
-              <a:t>/wiki/</a:t>
-            </a:r>
-            <a:r>
-              <a:rPr lang="en-US" smtClean="0"/>
-              <a:t>Recursive_descent_parser</a:t>
-            </a:r>
-            <a:endParaRPr lang="en-US"/>
+              <a:t>www.jetbrains.com</a:t>
+            </a:r>
+            <a:r>
+              <a:rPr lang="en-US" dirty="0" smtClean="0"/>
+              <a:t>/idea/plugins/</a:t>
+            </a:r>
+            <a:r>
+              <a:rPr lang="en-US" dirty="0" err="1" smtClean="0"/>
+              <a:t>PsiBuilder.gif</a:t>
+            </a:r>
+            <a:endParaRPr lang="en-US" dirty="0"/>
           </a:p>
         </p:txBody>
       </p:sp>
@@ -704,7 +727,7 @@
           <a:p>
             <a:fld id="{4FA87827-956D-2D4E-9772-6863DC7B302B}" type="slidenum">
               <a:rPr lang="en-US" smtClean="0"/>
-              <a:t>12</a:t>
+              <a:t>10</a:t>
             </a:fld>
             <a:endParaRPr lang="en-US"/>
           </a:p>
@@ -713,7 +736,7 @@
     </p:spTree>
     <p:extLst>
       <p:ext uri="{BB962C8B-B14F-4D97-AF65-F5344CB8AC3E}">
-        <p14:creationId xmlns:p14="http://schemas.microsoft.com/office/powerpoint/2010/main" val="476068197"/>
+        <p14:creationId xmlns:p14="http://schemas.microsoft.com/office/powerpoint/2010/main" val="2630468623"/>
       </p:ext>
     </p:extLst>
   </p:cSld>
@@ -773,6 +796,106 @@
             </a:r>
             <a:r>
               <a:rPr lang="en-US" dirty="0" err="1" smtClean="0"/>
+              <a:t>en.wikipedia.org</a:t>
+            </a:r>
+            <a:r>
+              <a:rPr lang="en-US" dirty="0" smtClean="0"/>
+              <a:t>/wiki/</a:t>
+            </a:r>
+            <a:r>
+              <a:rPr lang="en-US" smtClean="0"/>
+              <a:t>Recursive_descent_parser</a:t>
+            </a:r>
+            <a:endParaRPr lang="en-US"/>
+          </a:p>
+        </p:txBody>
+      </p:sp>
+      <p:sp>
+        <p:nvSpPr>
+          <p:cNvPr id="4" name="Slide Number Placeholder 3"/>
+          <p:cNvSpPr>
+            <a:spLocks noGrp="1"/>
+          </p:cNvSpPr>
+          <p:nvPr>
+            <p:ph type="sldNum" sz="quarter" idx="10"/>
+          </p:nvPr>
+        </p:nvSpPr>
+        <p:spPr/>
+        <p:txBody>
+          <a:bodyPr/>
+          <a:lstStyle/>
+          <a:p>
+            <a:fld id="{4FA87827-956D-2D4E-9772-6863DC7B302B}" type="slidenum">
+              <a:rPr lang="en-US" smtClean="0"/>
+              <a:t>12</a:t>
+            </a:fld>
+            <a:endParaRPr lang="en-US"/>
+          </a:p>
+        </p:txBody>
+      </p:sp>
+    </p:spTree>
+    <p:extLst>
+      <p:ext uri="{BB962C8B-B14F-4D97-AF65-F5344CB8AC3E}">
+        <p14:creationId xmlns:p14="http://schemas.microsoft.com/office/powerpoint/2010/main" val="476068197"/>
+      </p:ext>
+    </p:extLst>
+  </p:cSld>
+  <p:clrMapOvr>
+    <a:masterClrMapping/>
+  </p:clrMapOvr>
+</p:notes>
+</file>
+
+<file path=ppt/notesSlides/notesSlide4.xml><?xml version="1.0" encoding="utf-8"?>
+<p:notes xmlns:a="http://schemas.openxmlformats.org/drawingml/2006/main" xmlns:r="http://schemas.openxmlformats.org/officeDocument/2006/relationships" xmlns:p="http://schemas.openxmlformats.org/presentationml/2006/main">
+  <p:cSld>
+    <p:spTree>
+      <p:nvGrpSpPr>
+        <p:cNvPr id="1" name=""/>
+        <p:cNvGrpSpPr/>
+        <p:nvPr/>
+      </p:nvGrpSpPr>
+      <p:grpSpPr>
+        <a:xfrm>
+          <a:off x="0" y="0"/>
+          <a:ext cx="0" cy="0"/>
+          <a:chOff x="0" y="0"/>
+          <a:chExt cx="0" cy="0"/>
+        </a:xfrm>
+      </p:grpSpPr>
+      <p:sp>
+        <p:nvSpPr>
+          <p:cNvPr id="2" name="Slide Image Placeholder 1"/>
+          <p:cNvSpPr>
+            <a:spLocks noGrp="1" noRot="1" noChangeAspect="1"/>
+          </p:cNvSpPr>
+          <p:nvPr>
+            <p:ph type="sldImg"/>
+          </p:nvPr>
+        </p:nvSpPr>
+        <p:spPr/>
+      </p:sp>
+      <p:sp>
+        <p:nvSpPr>
+          <p:cNvPr id="3" name="Notes Placeholder 2"/>
+          <p:cNvSpPr>
+            <a:spLocks noGrp="1"/>
+          </p:cNvSpPr>
+          <p:nvPr>
+            <p:ph type="body" idx="1"/>
+          </p:nvPr>
+        </p:nvSpPr>
+        <p:spPr/>
+        <p:txBody>
+          <a:bodyPr/>
+          <a:lstStyle/>
+          <a:p>
+            <a:r>
+              <a:rPr lang="en-US" dirty="0" smtClean="0"/>
+              <a:t>http://</a:t>
+            </a:r>
+            <a:r>
+              <a:rPr lang="en-US" dirty="0" err="1" smtClean="0"/>
               <a:t>www.jetbrains.com</a:t>
             </a:r>
             <a:r>
@@ -800,7 +923,7 @@
           <a:p>
             <a:fld id="{4FA87827-956D-2D4E-9772-6863DC7B302B}" type="slidenum">
               <a:rPr lang="en-US" smtClean="0"/>
-              <a:t>14</a:t>
+              <a:t>15</a:t>
             </a:fld>
             <a:endParaRPr lang="en-US"/>
           </a:p>
@@ -3847,7 +3970,15 @@
           <a:p>
             <a:r>
               <a:rPr lang="en-US" dirty="0" smtClean="0"/>
-              <a:t>Integration R with </a:t>
+              <a:t>Integration </a:t>
+            </a:r>
+            <a:r>
+              <a:rPr lang="en-US" dirty="0" smtClean="0"/>
+              <a:t>of R </a:t>
+            </a:r>
+            <a:r>
+              <a:rPr lang="en-US" dirty="0" smtClean="0"/>
+              <a:t>with </a:t>
             </a:r>
             <a:r>
               <a:rPr lang="en-US" dirty="0" err="1" smtClean="0"/>
@@ -3901,168 +4032,53 @@
             <p:ph type="title"/>
           </p:nvPr>
         </p:nvSpPr>
-        <p:spPr/>
-        <p:txBody>
-          <a:bodyPr/>
-          <a:lstStyle/>
-          <a:p>
-            <a:r>
-              <a:rPr lang="en-US" dirty="0" smtClean="0"/>
-              <a:t>Psi parser</a:t>
+        <p:spPr>
+          <a:xfrm>
+            <a:off x="102633" y="292722"/>
+            <a:ext cx="8417388" cy="1143000"/>
+          </a:xfrm>
+        </p:spPr>
+        <p:txBody>
+          <a:bodyPr/>
+          <a:lstStyle/>
+          <a:p>
+            <a:pPr algn="l"/>
+            <a:r>
+              <a:rPr lang="en-US" dirty="0" err="1" smtClean="0"/>
+              <a:t>PsiParser</a:t>
             </a:r>
             <a:endParaRPr lang="en-US" dirty="0"/>
           </a:p>
         </p:txBody>
       </p:sp>
-      <p:sp>
-        <p:nvSpPr>
-          <p:cNvPr id="3" name="Content Placeholder 2"/>
-          <p:cNvSpPr>
-            <a:spLocks noGrp="1"/>
-          </p:cNvSpPr>
-          <p:nvPr>
-            <p:ph idx="1"/>
-          </p:nvPr>
-        </p:nvSpPr>
-        <p:spPr/>
-        <p:txBody>
-          <a:bodyPr>
-            <a:normAutofit fontScale="77500" lnSpcReduction="20000"/>
-          </a:bodyPr>
-          <a:lstStyle/>
-          <a:p>
-            <a:r>
-              <a:rPr lang="en-US" dirty="0" smtClean="0"/>
-              <a:t>Try the grammar kit</a:t>
-            </a:r>
-          </a:p>
-          <a:p>
-            <a:r>
-              <a:rPr lang="en-US" dirty="0" smtClean="0"/>
-              <a:t>The </a:t>
-            </a:r>
-            <a:r>
-              <a:rPr lang="en-US" dirty="0" err="1"/>
-              <a:t>Clojure</a:t>
-            </a:r>
-            <a:r>
-              <a:rPr lang="en-US" dirty="0"/>
-              <a:t> parser is probably the simplest and smallest of all the </a:t>
-            </a:r>
-            <a:r>
-              <a:rPr lang="en-US" dirty="0" smtClean="0"/>
-              <a:t>custom language </a:t>
-            </a:r>
-            <a:r>
-              <a:rPr lang="en-US" dirty="0"/>
-              <a:t>plugins that are maintained by </a:t>
-            </a:r>
-            <a:r>
-              <a:rPr lang="en-US" dirty="0" smtClean="0"/>
-              <a:t>us</a:t>
-            </a:r>
-          </a:p>
-          <a:p>
-            <a:r>
-              <a:rPr lang="en-US" dirty="0"/>
-              <a:t>No, IDEA currently does not have a ready solution for using generated </a:t>
-            </a:r>
-            <a:r>
-              <a:rPr lang="en-US" dirty="0" smtClean="0"/>
-              <a:t>parsers. The </a:t>
-            </a:r>
-            <a:r>
-              <a:rPr lang="en-US" b="1" dirty="0"/>
-              <a:t>typical approach </a:t>
-            </a:r>
-            <a:r>
-              <a:rPr lang="en-US" dirty="0"/>
-              <a:t>when writing parsers in IDEA is to create a method </a:t>
-            </a:r>
-            <a:r>
-              <a:rPr lang="en-US" dirty="0" err="1"/>
-              <a:t>parseSmth</a:t>
-            </a:r>
-            <a:r>
-              <a:rPr lang="en-US" dirty="0"/>
-              <a:t>(</a:t>
-            </a:r>
-            <a:r>
-              <a:rPr lang="en-US" dirty="0" smtClean="0"/>
-              <a:t>). for </a:t>
-            </a:r>
-            <a:r>
-              <a:rPr lang="en-US" dirty="0"/>
-              <a:t>each rule in the grammar, and implement the rule in terms of </a:t>
-            </a:r>
-            <a:r>
-              <a:rPr lang="en-US" dirty="0" err="1" smtClean="0"/>
-              <a:t>PsiBuilder</a:t>
-            </a:r>
-            <a:r>
-              <a:rPr lang="en-US" dirty="0" smtClean="0"/>
-              <a:t> markers.</a:t>
-            </a:r>
-          </a:p>
-          <a:p>
-            <a:r>
-              <a:rPr lang="en-US" dirty="0"/>
-              <a:t>write </a:t>
-            </a:r>
-            <a:r>
-              <a:rPr lang="en-US" dirty="0" err="1"/>
-              <a:t>lexer</a:t>
-            </a:r>
-            <a:r>
-              <a:rPr lang="en-US" dirty="0"/>
-              <a:t> and parser manually (</a:t>
-            </a:r>
-            <a:r>
-              <a:rPr lang="en-US" dirty="0" err="1"/>
-              <a:t>lexer</a:t>
-            </a:r>
-            <a:r>
-              <a:rPr lang="en-US" dirty="0"/>
-              <a:t> is </a:t>
-            </a:r>
-            <a:r>
-              <a:rPr lang="en-US" dirty="0" err="1"/>
-              <a:t>jflex</a:t>
-            </a:r>
-            <a:r>
-              <a:rPr lang="en-US" dirty="0"/>
-              <a:t>-generated and parser is completely by hand) since you have to continue your parsing whatever user types in</a:t>
-            </a:r>
-            <a:r>
-              <a:rPr lang="en-US" dirty="0" smtClean="0"/>
-              <a:t>.</a:t>
-            </a:r>
-          </a:p>
-          <a:p>
-            <a:r>
-              <a:rPr lang="en-US" dirty="0"/>
-              <a:t>Language construction never been easy, it doesn't matter if you do it </a:t>
-            </a:r>
-            <a:r>
-              <a:rPr lang="en-US" dirty="0" smtClean="0"/>
-              <a:t>by</a:t>
-            </a:r>
-            <a:r>
-              <a:rPr lang="en-US" dirty="0"/>
-              <a:t>  hand or by </a:t>
-            </a:r>
-            <a:r>
-              <a:rPr lang="en-US" dirty="0" err="1"/>
-              <a:t>Antlr</a:t>
-            </a:r>
-            <a:endParaRPr lang="en-US" dirty="0"/>
-          </a:p>
-        </p:txBody>
-      </p:sp>
+      <p:pic>
+        <p:nvPicPr>
+          <p:cNvPr id="4" name="Picture 3"/>
+          <p:cNvPicPr>
+            <a:picLocks noChangeAspect="1"/>
+          </p:cNvPicPr>
+          <p:nvPr/>
+        </p:nvPicPr>
+        <p:blipFill>
+          <a:blip r:embed="rId3"/>
+          <a:stretch>
+            <a:fillRect/>
+          </a:stretch>
+        </p:blipFill>
+        <p:spPr>
+          <a:xfrm>
+            <a:off x="2335338" y="0"/>
+            <a:ext cx="6693477" cy="6858000"/>
+          </a:xfrm>
+          <a:prstGeom prst="rect">
+            <a:avLst/>
+          </a:prstGeom>
+        </p:spPr>
+      </p:pic>
     </p:spTree>
     <p:extLst>
       <p:ext uri="{BB962C8B-B14F-4D97-AF65-F5344CB8AC3E}">
-        <p14:creationId xmlns:p14="http://schemas.microsoft.com/office/powerpoint/2010/main" val="3862011816"/>
+        <p14:creationId xmlns:p14="http://schemas.microsoft.com/office/powerpoint/2010/main" val="168756254"/>
       </p:ext>
     </p:extLst>
   </p:cSld>
@@ -4275,7 +4291,15 @@
           <a:bodyPr/>
           <a:lstStyle/>
           <a:p>
-            <a:endParaRPr lang="en-US"/>
+            <a:r>
+              <a:rPr lang="en-US" dirty="0" err="1" smtClean="0"/>
+              <a:t>GrammarKit</a:t>
+            </a:r>
+            <a:r>
+              <a:rPr lang="en-US" dirty="0" smtClean="0"/>
+              <a:t> Notes</a:t>
+            </a:r>
+            <a:endParaRPr lang="en-US" dirty="0"/>
           </a:p>
         </p:txBody>
       </p:sp>
@@ -4291,10 +4315,79 @@
         </p:nvSpPr>
         <p:spPr/>
         <p:txBody>
-          <a:bodyPr/>
-          <a:lstStyle/>
-          <a:p>
-            <a:endParaRPr lang="en-US"/>
+          <a:bodyPr>
+            <a:normAutofit lnSpcReduction="10000"/>
+          </a:bodyPr>
+          <a:lstStyle/>
+          <a:p>
+            <a:r>
+              <a:rPr lang="en-US" dirty="0" smtClean="0"/>
+              <a:t>All used special characters must be named in the token-section of the grammar header</a:t>
+            </a:r>
+          </a:p>
+          <a:p>
+            <a:pPr lvl="1"/>
+            <a:r>
+              <a:rPr lang="en-US" dirty="0" smtClean="0"/>
+              <a:t>Other tokens will be picked up on the fly from the grammar rules (e.g. string, number, id in the </a:t>
+            </a:r>
+            <a:r>
+              <a:rPr lang="en-US" dirty="0" err="1" smtClean="0"/>
+              <a:t>bnf</a:t>
+            </a:r>
+            <a:r>
+              <a:rPr lang="en-US" dirty="0" smtClean="0"/>
+              <a:t>-example)</a:t>
+            </a:r>
+          </a:p>
+          <a:p>
+            <a:pPr lvl="1"/>
+            <a:r>
+              <a:rPr lang="en-US" dirty="0" smtClean="0"/>
+              <a:t>They will be translated </a:t>
+            </a:r>
+            <a:r>
+              <a:rPr lang="en-US" dirty="0"/>
+              <a:t>into </a:t>
+            </a:r>
+            <a:r>
+              <a:rPr lang="en-US" dirty="0" err="1" smtClean="0"/>
+              <a:t>RTokenTypes</a:t>
+            </a:r>
+            <a:r>
+              <a:rPr lang="en-US" dirty="0" smtClean="0"/>
+              <a:t> (</a:t>
+            </a:r>
+            <a:r>
+              <a:rPr lang="en-US" dirty="0" smtClean="0">
+                <a:sym typeface="Wingdings"/>
+              </a:rPr>
+              <a:t></a:t>
+            </a:r>
+            <a:r>
+              <a:rPr lang="en-US" dirty="0" err="1" smtClean="0"/>
+              <a:t>Rtypes</a:t>
+            </a:r>
+            <a:r>
+              <a:rPr lang="en-US" dirty="0" smtClean="0"/>
+              <a:t>)</a:t>
+            </a:r>
+          </a:p>
+          <a:p>
+            <a:pPr lvl="1"/>
+            <a:r>
+              <a:rPr lang="en-US" dirty="0" smtClean="0"/>
+              <a:t>They must be produced by the </a:t>
+            </a:r>
+            <a:r>
+              <a:rPr lang="en-US" dirty="0" err="1" smtClean="0"/>
+              <a:t>Lexer</a:t>
+            </a:r>
+            <a:r>
+              <a:rPr lang="en-US" dirty="0" smtClean="0"/>
+              <a:t>! (And just those, as other tokens will be ignored by the generated parser)</a:t>
+            </a:r>
+            <a:endParaRPr lang="en-US" dirty="0"/>
           </a:p>
         </p:txBody>
       </p:sp>
@@ -4312,6 +4405,78 @@
 </file>
 
 <file path=ppt/slides/slide14.xml><?xml version="1.0" encoding="utf-8"?>
+<p:sld xmlns:a="http://schemas.openxmlformats.org/drawingml/2006/main" xmlns:r="http://schemas.openxmlformats.org/officeDocument/2006/relationships" xmlns:p="http://schemas.openxmlformats.org/presentationml/2006/main">
+  <p:cSld>
+    <p:spTree>
+      <p:nvGrpSpPr>
+        <p:cNvPr id="1" name=""/>
+        <p:cNvGrpSpPr/>
+        <p:nvPr/>
+      </p:nvGrpSpPr>
+      <p:grpSpPr>
+        <a:xfrm>
+          <a:off x="0" y="0"/>
+          <a:ext cx="0" cy="0"/>
+          <a:chOff x="0" y="0"/>
+          <a:chExt cx="0" cy="0"/>
+        </a:xfrm>
+      </p:grpSpPr>
+      <p:sp>
+        <p:nvSpPr>
+          <p:cNvPr id="2" name="Title 1"/>
+          <p:cNvSpPr>
+            <a:spLocks noGrp="1"/>
+          </p:cNvSpPr>
+          <p:nvPr>
+            <p:ph type="title"/>
+          </p:nvPr>
+        </p:nvSpPr>
+        <p:spPr/>
+        <p:txBody>
+          <a:bodyPr/>
+          <a:lstStyle/>
+          <a:p>
+            <a:r>
+              <a:rPr lang="en-US" dirty="0" smtClean="0"/>
+              <a:t>ANTLR notes</a:t>
+            </a:r>
+            <a:endParaRPr lang="en-US" dirty="0"/>
+          </a:p>
+        </p:txBody>
+      </p:sp>
+      <p:sp>
+        <p:nvSpPr>
+          <p:cNvPr id="3" name="Content Placeholder 2"/>
+          <p:cNvSpPr>
+            <a:spLocks noGrp="1"/>
+          </p:cNvSpPr>
+          <p:nvPr>
+            <p:ph idx="1"/>
+          </p:nvPr>
+        </p:nvSpPr>
+        <p:spPr/>
+        <p:txBody>
+          <a:bodyPr/>
+          <a:lstStyle/>
+          <a:p>
+            <a:endParaRPr lang="en-US"/>
+          </a:p>
+        </p:txBody>
+      </p:sp>
+    </p:spTree>
+    <p:extLst>
+      <p:ext uri="{BB962C8B-B14F-4D97-AF65-F5344CB8AC3E}">
+        <p14:creationId xmlns:p14="http://schemas.microsoft.com/office/powerpoint/2010/main" val="3457731727"/>
+      </p:ext>
+    </p:extLst>
+  </p:cSld>
+  <p:clrMapOvr>
+    <a:masterClrMapping/>
+  </p:clrMapOvr>
+</p:sld>
+</file>
+
+<file path=ppt/slides/slide15.xml><?xml version="1.0" encoding="utf-8"?>
 <p:sld xmlns:a="http://schemas.openxmlformats.org/drawingml/2006/main" xmlns:r="http://schemas.openxmlformats.org/officeDocument/2006/relationships" xmlns:p="http://schemas.openxmlformats.org/presentationml/2006/main">
   <p:cSld>
     <p:spTree>
@@ -4411,7 +4576,7 @@
 </p:sld>
 </file>
 
-<file path=ppt/slides/slide15.xml><?xml version="1.0" encoding="utf-8"?>
+<file path=ppt/slides/slide16.xml><?xml version="1.0" encoding="utf-8"?>
 <p:sld xmlns:a="http://schemas.openxmlformats.org/drawingml/2006/main" xmlns:r="http://schemas.openxmlformats.org/officeDocument/2006/relationships" xmlns:p="http://schemas.openxmlformats.org/presentationml/2006/main">
   <p:cSld>
     <p:spTree>
@@ -4511,7 +4676,7 @@
 </p:sld>
 </file>
 
-<file path=ppt/slides/slide16.xml><?xml version="1.0" encoding="utf-8"?>
+<file path=ppt/slides/slide17.xml><?xml version="1.0" encoding="utf-8"?>
 <p:sld xmlns:a="http://schemas.openxmlformats.org/drawingml/2006/main" xmlns:r="http://schemas.openxmlformats.org/officeDocument/2006/relationships" xmlns:p="http://schemas.openxmlformats.org/presentationml/2006/main">
   <p:cSld>
     <p:spTree>
@@ -4633,277 +4798,6 @@
 </p:sld>
 </file>
 
-<file path=ppt/slides/slide17.xml><?xml version="1.0" encoding="utf-8"?>
-<p:sld xmlns:a="http://schemas.openxmlformats.org/drawingml/2006/main" xmlns:r="http://schemas.openxmlformats.org/officeDocument/2006/relationships" xmlns:p="http://schemas.openxmlformats.org/presentationml/2006/main">
-  <p:cSld>
-    <p:spTree>
-      <p:nvGrpSpPr>
-        <p:cNvPr id="1" name=""/>
-        <p:cNvGrpSpPr/>
-        <p:nvPr/>
-      </p:nvGrpSpPr>
-      <p:grpSpPr>
-        <a:xfrm>
-          <a:off x="0" y="0"/>
-          <a:ext cx="0" cy="0"/>
-          <a:chOff x="0" y="0"/>
-          <a:chExt cx="0" cy="0"/>
-        </a:xfrm>
-      </p:grpSpPr>
-      <p:sp>
-        <p:nvSpPr>
-          <p:cNvPr id="2" name="Title 1"/>
-          <p:cNvSpPr>
-            <a:spLocks noGrp="1"/>
-          </p:cNvSpPr>
-          <p:nvPr>
-            <p:ph type="title"/>
-          </p:nvPr>
-        </p:nvSpPr>
-        <p:spPr/>
-        <p:txBody>
-          <a:bodyPr/>
-          <a:lstStyle/>
-          <a:p>
-            <a:r>
-              <a:rPr lang="en-US" dirty="0" smtClean="0"/>
-              <a:t>R-Daemon</a:t>
-            </a:r>
-            <a:endParaRPr lang="en-US" dirty="0"/>
-          </a:p>
-        </p:txBody>
-      </p:sp>
-      <p:sp>
-        <p:nvSpPr>
-          <p:cNvPr id="3" name="Content Placeholder 2"/>
-          <p:cNvSpPr>
-            <a:spLocks noGrp="1"/>
-          </p:cNvSpPr>
-          <p:nvPr>
-            <p:ph idx="1"/>
-          </p:nvPr>
-        </p:nvSpPr>
-        <p:spPr/>
-        <p:txBody>
-          <a:bodyPr>
-            <a:normAutofit fontScale="62500" lnSpcReduction="20000"/>
-          </a:bodyPr>
-          <a:lstStyle/>
-          <a:p>
-            <a:r>
-              <a:rPr lang="en-US" dirty="0" smtClean="0"/>
-              <a:t>R Session has almost complete implementation for console, objects, </a:t>
-            </a:r>
-            <a:r>
-              <a:rPr lang="en-US" dirty="0" err="1" smtClean="0"/>
-              <a:t>etc</a:t>
-            </a:r>
-            <a:endParaRPr lang="en-US" dirty="0" smtClean="0"/>
-          </a:p>
-          <a:p>
-            <a:r>
-              <a:rPr lang="en-US" dirty="0" err="1" smtClean="0"/>
-              <a:t>TextMate</a:t>
-            </a:r>
-            <a:r>
-              <a:rPr lang="en-US" dirty="0" smtClean="0"/>
-              <a:t> </a:t>
-            </a:r>
-            <a:r>
-              <a:rPr lang="en-US" dirty="0" smtClean="0">
-                <a:hlinkClick r:id="rId2"/>
-              </a:rPr>
-              <a:t>bundle</a:t>
-            </a:r>
-            <a:endParaRPr lang="en-US" dirty="0" smtClean="0"/>
-          </a:p>
-          <a:p>
-            <a:pPr lvl="1"/>
-            <a:r>
-              <a:rPr lang="en-US" dirty="0" smtClean="0"/>
-              <a:t>Start R in special mode that reads all input from file and writes all output to another one which then somehow imported into </a:t>
-            </a:r>
-            <a:r>
-              <a:rPr lang="en-US" dirty="0" err="1" smtClean="0"/>
-              <a:t>textmate</a:t>
-            </a:r>
-            <a:endParaRPr lang="en-US" dirty="0" smtClean="0"/>
-          </a:p>
-          <a:p>
-            <a:r>
-              <a:rPr lang="en-US" dirty="0"/>
-              <a:t>I </a:t>
-            </a:r>
-            <a:r>
-              <a:rPr lang="en-US" dirty="0">
-                <a:hlinkClick r:id="rId3"/>
-              </a:rPr>
-              <a:t>think </a:t>
-            </a:r>
-            <a:r>
-              <a:rPr lang="en-US" dirty="0" err="1"/>
-              <a:t>FindWindow</a:t>
-            </a:r>
-            <a:r>
-              <a:rPr lang="en-US" dirty="0"/>
-              <a:t> and </a:t>
-            </a:r>
-            <a:r>
-              <a:rPr lang="en-US" dirty="0" err="1"/>
-              <a:t>SendMessage</a:t>
-            </a:r>
-            <a:r>
-              <a:rPr lang="en-US" dirty="0"/>
-              <a:t> are the functions you want to use, in general</a:t>
-            </a:r>
-            <a:r>
-              <a:rPr lang="en-US" dirty="0" smtClean="0"/>
-              <a:t>.</a:t>
-            </a:r>
-          </a:p>
-          <a:p>
-            <a:r>
-              <a:rPr lang="en-US" dirty="0" smtClean="0"/>
-              <a:t>Use the </a:t>
-            </a:r>
-            <a:r>
-              <a:rPr lang="en-US" dirty="0" smtClean="0">
-                <a:hlinkClick r:id="rId4"/>
-              </a:rPr>
-              <a:t>clipboard</a:t>
-            </a:r>
-            <a:endParaRPr lang="en-US" dirty="0" smtClean="0"/>
-          </a:p>
-          <a:p>
-            <a:r>
-              <a:rPr lang="en-US" dirty="0" err="1" smtClean="0">
-                <a:hlinkClick r:id="rId5"/>
-              </a:rPr>
-              <a:t>Tinn</a:t>
-            </a:r>
-            <a:r>
-              <a:rPr lang="en-US" dirty="0">
-                <a:hlinkClick r:id="rId5"/>
-              </a:rPr>
-              <a:t>-R</a:t>
-            </a:r>
-            <a:r>
-              <a:rPr lang="en-US" dirty="0"/>
-              <a:t>: It also pops up additional menu and toolbar when it detects </a:t>
-            </a:r>
-            <a:r>
-              <a:rPr lang="en-US" dirty="0" err="1"/>
-              <a:t>Rgui</a:t>
-            </a:r>
-            <a:r>
-              <a:rPr lang="en-US" dirty="0"/>
-              <a:t> running on the same computer. These </a:t>
-            </a:r>
-            <a:r>
-              <a:rPr lang="en-US" dirty="0" err="1"/>
-              <a:t>addons</a:t>
-            </a:r>
-            <a:r>
-              <a:rPr lang="en-US" dirty="0"/>
-              <a:t> interact with the R console and allow to submit code in part or in whole and to control R directly</a:t>
-            </a:r>
-            <a:r>
-              <a:rPr lang="en-US" dirty="0" smtClean="0"/>
-              <a:t>. </a:t>
-            </a:r>
-            <a:endParaRPr lang="en-US" dirty="0"/>
-          </a:p>
-          <a:p>
-            <a:pPr lvl="1"/>
-            <a:r>
-              <a:rPr lang="en-US" dirty="0" smtClean="0"/>
-              <a:t>It seems to have some </a:t>
-            </a:r>
-            <a:r>
-              <a:rPr lang="en-US" dirty="0" smtClean="0">
-                <a:hlinkClick r:id="rId6"/>
-              </a:rPr>
-              <a:t>limitations</a:t>
-            </a:r>
-            <a:endParaRPr lang="en-US" dirty="0" smtClean="0"/>
-          </a:p>
-          <a:p>
-            <a:r>
-              <a:rPr lang="en-US" dirty="0" smtClean="0"/>
-              <a:t>Maybe DOM is a </a:t>
-            </a:r>
-            <a:r>
-              <a:rPr lang="en-US" dirty="0" smtClean="0">
-                <a:hlinkClick r:id="rId7"/>
-              </a:rPr>
-              <a:t>solution</a:t>
-            </a:r>
-            <a:r>
-              <a:rPr lang="en-US" dirty="0" smtClean="0"/>
-              <a:t>: </a:t>
-            </a:r>
-            <a:r>
-              <a:rPr lang="en-US" dirty="0" err="1" smtClean="0"/>
-              <a:t>rdom</a:t>
-            </a:r>
-            <a:r>
-              <a:rPr lang="en-US" dirty="0"/>
-              <a:t>, </a:t>
-            </a:r>
-            <a:r>
-              <a:rPr lang="en-US" dirty="0" err="1" smtClean="0"/>
-              <a:t>RDCOMClient</a:t>
-            </a:r>
-            <a:endParaRPr lang="en-US" dirty="0" smtClean="0"/>
-          </a:p>
-          <a:p>
-            <a:r>
-              <a:rPr lang="en-US" dirty="0" smtClean="0"/>
-              <a:t>Or </a:t>
-            </a:r>
-            <a:r>
-              <a:rPr lang="en-US" dirty="0" smtClean="0">
-                <a:hlinkClick r:id="rId8"/>
-              </a:rPr>
-              <a:t>white</a:t>
-            </a:r>
-            <a:r>
-              <a:rPr lang="en-US" dirty="0" smtClean="0"/>
-              <a:t> </a:t>
-            </a:r>
-          </a:p>
-          <a:p>
-            <a:r>
-              <a:rPr lang="en-US" dirty="0" smtClean="0"/>
-              <a:t>Or most promising, we could try to use the </a:t>
-            </a:r>
-            <a:r>
-              <a:rPr lang="en-US" dirty="0" smtClean="0">
-                <a:hlinkClick r:id="rId9"/>
-              </a:rPr>
-              <a:t>windows API</a:t>
-            </a:r>
-            <a:r>
-              <a:rPr lang="en-US" dirty="0" smtClean="0"/>
-              <a:t> via VBScript or C#</a:t>
-            </a:r>
-            <a:endParaRPr lang="en-US" dirty="0"/>
-          </a:p>
-        </p:txBody>
-      </p:sp>
-    </p:spTree>
-    <p:extLst>
-      <p:ext uri="{BB962C8B-B14F-4D97-AF65-F5344CB8AC3E}">
-        <p14:creationId xmlns:p14="http://schemas.microsoft.com/office/powerpoint/2010/main" val="2563764221"/>
-      </p:ext>
-    </p:extLst>
-  </p:cSld>
-  <p:clrMapOvr>
-    <a:masterClrMapping/>
-  </p:clrMapOvr>
-</p:sld>
-</file>
-
 <file path=ppt/slides/slide18.xml><?xml version="1.0" encoding="utf-8"?>
 <p:sld xmlns:a="http://schemas.openxmlformats.org/drawingml/2006/main" xmlns:r="http://schemas.openxmlformats.org/officeDocument/2006/relationships" xmlns:p="http://schemas.openxmlformats.org/presentationml/2006/main">
   <p:cSld>
@@ -4933,12 +4827,14 @@
         </p:nvSpPr>
         <p:spPr/>
         <p:txBody>
-          <a:bodyPr/>
-          <a:lstStyle/>
-          <a:p>
-            <a:r>
-              <a:rPr lang="en-US" dirty="0" smtClean="0"/>
-              <a:t>R Console for Idea</a:t>
+          <a:bodyPr>
+            <a:normAutofit fontScale="90000"/>
+          </a:bodyPr>
+          <a:lstStyle/>
+          <a:p>
+            <a:r>
+              <a:rPr lang="en-US" dirty="0" smtClean="0"/>
+              <a:t>Options for code snippet evaluation</a:t>
             </a:r>
             <a:endParaRPr lang="en-US" dirty="0"/>
           </a:p>
@@ -4956,16 +4852,25 @@
         </p:nvSpPr>
         <p:spPr/>
         <p:txBody>
-          <a:bodyPr/>
-          <a:lstStyle/>
-          <a:p>
-            <a:r>
-              <a:rPr lang="en-US" dirty="0" smtClean="0"/>
-              <a:t>Use </a:t>
+          <a:bodyPr>
+            <a:normAutofit fontScale="62500" lnSpcReduction="20000"/>
+          </a:bodyPr>
+          <a:lstStyle/>
+          <a:p>
+            <a:r>
+              <a:rPr lang="en-US" dirty="0" smtClean="0"/>
+              <a:t>R Session has almost complete implementation for console, objects, </a:t>
             </a:r>
             <a:r>
               <a:rPr lang="en-US" dirty="0" err="1" smtClean="0"/>
-              <a:t>RSession</a:t>
+              <a:t>etc</a:t>
+            </a:r>
+            <a:endParaRPr lang="en-US" dirty="0" smtClean="0"/>
+          </a:p>
+          <a:p>
+            <a:r>
+              <a:rPr lang="en-US" dirty="0" err="1" smtClean="0"/>
+              <a:t>TextMate</a:t>
             </a:r>
             <a:r>
               <a:rPr lang="en-US" dirty="0" smtClean="0"/>
@@ -4975,7 +4880,179 @@
               <a:rPr lang="en-US" dirty="0" smtClean="0">
                 <a:hlinkClick r:id="rId2"/>
               </a:rPr>
+              <a:t>bundle</a:t>
+            </a:r>
+            <a:endParaRPr lang="en-US" dirty="0" smtClean="0"/>
+          </a:p>
+          <a:p>
+            <a:pPr lvl="1"/>
+            <a:r>
+              <a:rPr lang="en-US" dirty="0" smtClean="0"/>
+              <a:t>Start R in special mode that reads all input from file and writes all output to another one which then somehow imported into </a:t>
+            </a:r>
+            <a:r>
+              <a:rPr lang="en-US" dirty="0" err="1" smtClean="0"/>
+              <a:t>textmate</a:t>
+            </a:r>
+            <a:endParaRPr lang="en-US" dirty="0" smtClean="0"/>
+          </a:p>
+          <a:p>
+            <a:r>
+              <a:rPr lang="en-US" dirty="0"/>
+              <a:t>I </a:t>
+            </a:r>
+            <a:r>
+              <a:rPr lang="en-US" dirty="0">
+                <a:hlinkClick r:id="rId3"/>
+              </a:rPr>
+              <a:t>think </a:t>
+            </a:r>
+            <a:r>
+              <a:rPr lang="en-US" dirty="0" err="1"/>
+              <a:t>FindWindow</a:t>
+            </a:r>
+            <a:r>
+              <a:rPr lang="en-US" dirty="0"/>
+              <a:t> and </a:t>
+            </a:r>
+            <a:r>
+              <a:rPr lang="en-US" dirty="0" err="1"/>
+              <a:t>SendMessage</a:t>
+            </a:r>
+            <a:r>
+              <a:rPr lang="en-US" dirty="0"/>
+              <a:t> are the functions you want to use, in general</a:t>
+            </a:r>
+            <a:r>
+              <a:rPr lang="en-US" dirty="0" smtClean="0"/>
+              <a:t>.</a:t>
+            </a:r>
+          </a:p>
+          <a:p>
+            <a:r>
+              <a:rPr lang="en-US" dirty="0" smtClean="0"/>
+              <a:t>Use the </a:t>
+            </a:r>
+            <a:r>
+              <a:rPr lang="en-US" dirty="0" smtClean="0">
+                <a:hlinkClick r:id="rId4"/>
+              </a:rPr>
+              <a:t>clipboard</a:t>
+            </a:r>
+            <a:endParaRPr lang="en-US" dirty="0" smtClean="0"/>
+          </a:p>
+          <a:p>
+            <a:r>
+              <a:rPr lang="en-US" dirty="0" err="1" smtClean="0">
+                <a:hlinkClick r:id="rId5"/>
+              </a:rPr>
+              <a:t>Tinn</a:t>
+            </a:r>
+            <a:r>
+              <a:rPr lang="en-US" dirty="0">
+                <a:hlinkClick r:id="rId5"/>
+              </a:rPr>
+              <a:t>-R</a:t>
+            </a:r>
+            <a:r>
+              <a:rPr lang="en-US" dirty="0"/>
+              <a:t>: It also pops up additional menu and toolbar when it detects </a:t>
+            </a:r>
+            <a:r>
+              <a:rPr lang="en-US" dirty="0" err="1"/>
+              <a:t>Rgui</a:t>
+            </a:r>
+            <a:r>
+              <a:rPr lang="en-US" dirty="0"/>
+              <a:t> running on the same computer. These </a:t>
+            </a:r>
+            <a:r>
+              <a:rPr lang="en-US" dirty="0" err="1"/>
+              <a:t>addons</a:t>
+            </a:r>
+            <a:r>
+              <a:rPr lang="en-US" dirty="0"/>
+              <a:t> interact with the R console and allow to submit code in part or in whole and to control R directly</a:t>
+            </a:r>
+            <a:r>
+              <a:rPr lang="en-US" dirty="0" smtClean="0"/>
+              <a:t>. </a:t>
+            </a:r>
+            <a:endParaRPr lang="en-US" dirty="0"/>
+          </a:p>
+          <a:p>
+            <a:pPr lvl="1"/>
+            <a:r>
+              <a:rPr lang="en-US" dirty="0" smtClean="0"/>
+              <a:t>It seems to have some </a:t>
+            </a:r>
+            <a:r>
+              <a:rPr lang="en-US" dirty="0" smtClean="0">
+                <a:hlinkClick r:id="rId6"/>
+              </a:rPr>
+              <a:t>limitations</a:t>
+            </a:r>
+            <a:endParaRPr lang="en-US" dirty="0" smtClean="0"/>
+          </a:p>
+          <a:p>
+            <a:r>
+              <a:rPr lang="en-US" dirty="0" smtClean="0"/>
+              <a:t>Maybe DOM is a </a:t>
+            </a:r>
+            <a:r>
+              <a:rPr lang="en-US" dirty="0" smtClean="0">
+                <a:hlinkClick r:id="rId7"/>
+              </a:rPr>
               <a:t>solution</a:t>
+            </a:r>
+            <a:r>
+              <a:rPr lang="en-US" dirty="0" smtClean="0"/>
+              <a:t>: </a:t>
+            </a:r>
+            <a:r>
+              <a:rPr lang="en-US" dirty="0" err="1" smtClean="0"/>
+              <a:t>rdom</a:t>
+            </a:r>
+            <a:r>
+              <a:rPr lang="en-US" dirty="0"/>
+              <a:t>, </a:t>
+            </a:r>
+            <a:r>
+              <a:rPr lang="en-US" dirty="0" err="1" smtClean="0"/>
+              <a:t>RDCOMClient</a:t>
+            </a:r>
+            <a:endParaRPr lang="en-US" dirty="0" smtClean="0"/>
+          </a:p>
+          <a:p>
+            <a:r>
+              <a:rPr lang="en-US" dirty="0" smtClean="0"/>
+              <a:t>Or </a:t>
+            </a:r>
+            <a:r>
+              <a:rPr lang="en-US" dirty="0" smtClean="0">
+                <a:hlinkClick r:id="rId8"/>
+              </a:rPr>
+              <a:t>white</a:t>
+            </a:r>
+            <a:r>
+              <a:rPr lang="en-US" dirty="0" smtClean="0"/>
+              <a:t> </a:t>
+            </a:r>
+          </a:p>
+          <a:p>
+            <a:r>
+              <a:rPr lang="en-US" dirty="0" smtClean="0"/>
+              <a:t>Or most promising, we could try to use the </a:t>
+            </a:r>
+            <a:r>
+              <a:rPr lang="en-US" dirty="0" smtClean="0">
+                <a:hlinkClick r:id="rId9"/>
+              </a:rPr>
+              <a:t>windows API</a:t>
+            </a:r>
+            <a:r>
+              <a:rPr lang="en-US" dirty="0" smtClean="0"/>
+              <a:t> via VBScript or C#</a:t>
             </a:r>
             <a:endParaRPr lang="en-US" dirty="0"/>
           </a:p>
@@ -4984,7 +5061,7 @@
     </p:spTree>
     <p:extLst>
       <p:ext uri="{BB962C8B-B14F-4D97-AF65-F5344CB8AC3E}">
-        <p14:creationId xmlns:p14="http://schemas.microsoft.com/office/powerpoint/2010/main" val="1475125988"/>
+        <p14:creationId xmlns:p14="http://schemas.microsoft.com/office/powerpoint/2010/main" val="2563764221"/>
       </p:ext>
     </p:extLst>
   </p:cSld>
@@ -5027,83 +5104,56 @@
           <a:lstStyle/>
           <a:p>
             <a:r>
-              <a:rPr lang="en-US" dirty="0" err="1" smtClean="0">
-                <a:hlinkClick r:id="rId2"/>
-              </a:rPr>
-              <a:t>Tinn</a:t>
+              <a:rPr lang="en-US" dirty="0" smtClean="0"/>
+              <a:t>R Console for Idea</a:t>
+            </a:r>
+            <a:endParaRPr lang="en-US" dirty="0"/>
+          </a:p>
+        </p:txBody>
+      </p:sp>
+      <p:sp>
+        <p:nvSpPr>
+          <p:cNvPr id="3" name="Content Placeholder 2"/>
+          <p:cNvSpPr>
+            <a:spLocks noGrp="1"/>
+          </p:cNvSpPr>
+          <p:nvPr>
+            <p:ph idx="1"/>
+          </p:nvPr>
+        </p:nvSpPr>
+        <p:spPr/>
+        <p:txBody>
+          <a:bodyPr/>
+          <a:lstStyle/>
+          <a:p>
+            <a:r>
+              <a:rPr lang="en-US" dirty="0" smtClean="0"/>
+              <a:t>Use </a:t>
+            </a:r>
+            <a:r>
+              <a:rPr lang="en-US" dirty="0" err="1" smtClean="0"/>
+              <a:t>RSession</a:t>
+            </a:r>
+            <a:r>
+              <a:rPr lang="en-US" dirty="0" smtClean="0"/>
+              <a:t> </a:t>
             </a:r>
             <a:r>
               <a:rPr lang="en-US" dirty="0" smtClean="0">
                 <a:hlinkClick r:id="rId2"/>
               </a:rPr>
-              <a:t>-R</a:t>
-            </a:r>
-            <a:endParaRPr lang="en-US" dirty="0"/>
-          </a:p>
-        </p:txBody>
-      </p:sp>
-      <p:sp>
-        <p:nvSpPr>
-          <p:cNvPr id="3" name="Content Placeholder 2"/>
-          <p:cNvSpPr>
-            <a:spLocks noGrp="1"/>
-          </p:cNvSpPr>
-          <p:nvPr>
-            <p:ph idx="1"/>
-          </p:nvPr>
-        </p:nvSpPr>
-        <p:spPr/>
-        <p:txBody>
-          <a:bodyPr>
-            <a:normAutofit/>
-          </a:bodyPr>
-          <a:lstStyle/>
-          <a:p>
-            <a:r>
-              <a:rPr lang="en-US" dirty="0" smtClean="0"/>
-              <a:t>Allows for </a:t>
+              <a:t>solution</a:t>
+            </a:r>
+            <a:endParaRPr lang="en-US" dirty="0" smtClean="0"/>
+          </a:p>
+          <a:p>
+            <a:r>
+              <a:rPr lang="en-US" dirty="0" smtClean="0"/>
+              <a:t>Learn from </a:t>
             </a:r>
             <a:r>
               <a:rPr lang="en-US" dirty="0" err="1" smtClean="0"/>
-              <a:t>Rgui</a:t>
-            </a:r>
-            <a:r>
-              <a:rPr lang="en-US" dirty="0" smtClean="0"/>
-              <a:t> interaction to evaluate line or selection</a:t>
-            </a:r>
-          </a:p>
-          <a:p>
-            <a:pPr lvl="1"/>
-            <a:r>
-              <a:rPr lang="en-US" dirty="0"/>
-              <a:t>including list variables or objects</a:t>
-            </a:r>
-            <a:r>
-              <a:rPr lang="en-US" dirty="0" smtClean="0"/>
-              <a:t>, clearing </a:t>
-            </a:r>
-            <a:r>
-              <a:rPr lang="en-US" dirty="0"/>
-              <a:t>console, even stopping the current process.</a:t>
-            </a:r>
-            <a:endParaRPr lang="en-US" dirty="0" smtClean="0"/>
-          </a:p>
-          <a:p>
-            <a:r>
-              <a:rPr lang="en-US" dirty="0" smtClean="0"/>
-              <a:t>Code formatter</a:t>
-            </a:r>
-          </a:p>
-          <a:p>
-            <a:r>
-              <a:rPr lang="en-US" dirty="0" smtClean="0"/>
-              <a:t>Bracket matching &amp; checking</a:t>
-            </a:r>
-          </a:p>
-          <a:p>
-            <a:r>
-              <a:rPr lang="en-US" dirty="0" smtClean="0"/>
-              <a:t>Commenting uncommenting</a:t>
+              <a:t>TinnR</a:t>
             </a:r>
             <a:endParaRPr lang="en-US" dirty="0"/>
           </a:p>
@@ -5112,7 +5162,7 @@
     </p:spTree>
     <p:extLst>
       <p:ext uri="{BB962C8B-B14F-4D97-AF65-F5344CB8AC3E}">
-        <p14:creationId xmlns:p14="http://schemas.microsoft.com/office/powerpoint/2010/main" val="2449672567"/>
+        <p14:creationId xmlns:p14="http://schemas.microsoft.com/office/powerpoint/2010/main" val="1475125988"/>
       </p:ext>
     </p:extLst>
   </p:cSld>
@@ -5155,61 +5205,61 @@
           <a:lstStyle/>
           <a:p>
             <a:r>
+              <a:rPr lang="en-US" dirty="0" smtClean="0"/>
+              <a:t>Roadmap (coming soon)</a:t>
+            </a:r>
+            <a:endParaRPr lang="en-US" dirty="0"/>
+          </a:p>
+        </p:txBody>
+      </p:sp>
+      <p:sp>
+        <p:nvSpPr>
+          <p:cNvPr id="3" name="Content Placeholder 2"/>
+          <p:cNvSpPr>
+            <a:spLocks noGrp="1"/>
+          </p:cNvSpPr>
+          <p:nvPr>
+            <p:ph idx="1"/>
+          </p:nvPr>
+        </p:nvSpPr>
+        <p:spPr/>
+        <p:txBody>
+          <a:bodyPr/>
+          <a:lstStyle/>
+          <a:p>
+            <a:r>
+              <a:rPr lang="en-US" dirty="0" smtClean="0"/>
+              <a:t>Live Templates</a:t>
+            </a:r>
+          </a:p>
+          <a:p>
+            <a:r>
               <a:rPr lang="en-US" dirty="0" err="1" smtClean="0"/>
-              <a:t>Lexer</a:t>
-            </a:r>
-            <a:endParaRPr lang="en-US" dirty="0"/>
-          </a:p>
-        </p:txBody>
-      </p:sp>
-      <p:sp>
-        <p:nvSpPr>
-          <p:cNvPr id="3" name="Content Placeholder 2"/>
-          <p:cNvSpPr>
-            <a:spLocks noGrp="1"/>
-          </p:cNvSpPr>
-          <p:nvPr>
-            <p:ph idx="1"/>
-          </p:nvPr>
-        </p:nvSpPr>
-        <p:spPr/>
-        <p:txBody>
-          <a:bodyPr/>
-          <a:lstStyle/>
-          <a:p>
-            <a:r>
-              <a:rPr lang="en-US" dirty="0" smtClean="0"/>
-              <a:t>Just as the </a:t>
-            </a:r>
-            <a:r>
-              <a:rPr lang="en-US" dirty="0" err="1" smtClean="0"/>
-              <a:t>lexer</a:t>
-            </a:r>
-            <a:r>
-              <a:rPr lang="en-US" dirty="0" smtClean="0"/>
-              <a:t> is a source code spelling checker, the parser is a grammar checker</a:t>
-            </a:r>
-          </a:p>
-          <a:p>
-            <a:r>
-              <a:rPr lang="en-US" dirty="0" smtClean="0"/>
-              <a:t>A utility such as </a:t>
-            </a:r>
-            <a:r>
-              <a:rPr lang="en-US" dirty="0" err="1" smtClean="0"/>
-              <a:t>JFlex</a:t>
-            </a:r>
-            <a:r>
-              <a:rPr lang="en-US" dirty="0" smtClean="0"/>
-              <a:t> builds a </a:t>
-            </a:r>
-            <a:r>
-              <a:rPr lang="en-US" dirty="0" err="1" smtClean="0"/>
-              <a:t>lexer</a:t>
-            </a:r>
-            <a:r>
-              <a:rPr lang="en-US" smtClean="0"/>
-              <a:t> from a specification file the programmer writes to define the 'words' (lexical tokens) in the desired language</a:t>
+              <a:t>Quickfixes</a:t>
+            </a:r>
+            <a:r>
+              <a:rPr lang="en-US" dirty="0" smtClean="0"/>
+              <a:t> for common problems</a:t>
+            </a:r>
+          </a:p>
+          <a:p>
+            <a:pPr lvl="1"/>
+            <a:r>
+              <a:rPr lang="en-US" dirty="0" smtClean="0"/>
+              <a:t>Incorrect subset</a:t>
+            </a:r>
+          </a:p>
+          <a:p>
+            <a:r>
+              <a:rPr lang="en-US" dirty="0" smtClean="0"/>
+              <a:t>Folding</a:t>
+            </a:r>
+          </a:p>
+          <a:p>
+            <a:pPr lvl="1"/>
+            <a:r>
+              <a:rPr lang="en-US" dirty="0" err="1"/>
+              <a:t>ArcFoldingBuilder</a:t>
             </a:r>
             <a:endParaRPr lang="en-US" dirty="0"/>
           </a:p>
@@ -5218,7 +5268,207 @@
     </p:spTree>
     <p:extLst>
       <p:ext uri="{BB962C8B-B14F-4D97-AF65-F5344CB8AC3E}">
-        <p14:creationId xmlns:p14="http://schemas.microsoft.com/office/powerpoint/2010/main" val="124239499"/>
+        <p14:creationId xmlns:p14="http://schemas.microsoft.com/office/powerpoint/2010/main" val="3335867933"/>
+      </p:ext>
+    </p:extLst>
+  </p:cSld>
+  <p:clrMapOvr>
+    <a:masterClrMapping/>
+  </p:clrMapOvr>
+</p:sld>
+</file>
+
+<file path=ppt/slides/slide20.xml><?xml version="1.0" encoding="utf-8"?>
+<p:sld xmlns:a="http://schemas.openxmlformats.org/drawingml/2006/main" xmlns:r="http://schemas.openxmlformats.org/officeDocument/2006/relationships" xmlns:p="http://schemas.openxmlformats.org/presentationml/2006/main">
+  <p:cSld>
+    <p:spTree>
+      <p:nvGrpSpPr>
+        <p:cNvPr id="1" name=""/>
+        <p:cNvGrpSpPr/>
+        <p:nvPr/>
+      </p:nvGrpSpPr>
+      <p:grpSpPr>
+        <a:xfrm>
+          <a:off x="0" y="0"/>
+          <a:ext cx="0" cy="0"/>
+          <a:chOff x="0" y="0"/>
+          <a:chExt cx="0" cy="0"/>
+        </a:xfrm>
+      </p:grpSpPr>
+      <p:sp>
+        <p:nvSpPr>
+          <p:cNvPr id="2" name="Title 1"/>
+          <p:cNvSpPr>
+            <a:spLocks noGrp="1"/>
+          </p:cNvSpPr>
+          <p:nvPr>
+            <p:ph type="title"/>
+          </p:nvPr>
+        </p:nvSpPr>
+        <p:spPr/>
+        <p:txBody>
+          <a:bodyPr/>
+          <a:lstStyle/>
+          <a:p>
+            <a:r>
+              <a:rPr lang="en-US" dirty="0" err="1" smtClean="0">
+                <a:hlinkClick r:id="rId2"/>
+              </a:rPr>
+              <a:t>Tinn</a:t>
+            </a:r>
+            <a:r>
+              <a:rPr lang="en-US" dirty="0" smtClean="0">
+                <a:hlinkClick r:id="rId2"/>
+              </a:rPr>
+              <a:t>-R</a:t>
+            </a:r>
+            <a:endParaRPr lang="en-US" dirty="0"/>
+          </a:p>
+        </p:txBody>
+      </p:sp>
+      <p:sp>
+        <p:nvSpPr>
+          <p:cNvPr id="3" name="Content Placeholder 2"/>
+          <p:cNvSpPr>
+            <a:spLocks noGrp="1"/>
+          </p:cNvSpPr>
+          <p:nvPr>
+            <p:ph idx="1"/>
+          </p:nvPr>
+        </p:nvSpPr>
+        <p:spPr/>
+        <p:txBody>
+          <a:bodyPr>
+            <a:normAutofit/>
+          </a:bodyPr>
+          <a:lstStyle/>
+          <a:p>
+            <a:r>
+              <a:rPr lang="en-US" dirty="0" smtClean="0"/>
+              <a:t>Allows for </a:t>
+            </a:r>
+            <a:r>
+              <a:rPr lang="en-US" dirty="0" err="1" smtClean="0"/>
+              <a:t>Rgui</a:t>
+            </a:r>
+            <a:r>
+              <a:rPr lang="en-US" dirty="0" smtClean="0"/>
+              <a:t> interaction to evaluate line or selection</a:t>
+            </a:r>
+          </a:p>
+          <a:p>
+            <a:pPr lvl="1"/>
+            <a:r>
+              <a:rPr lang="en-US" dirty="0"/>
+              <a:t>including list variables or objects</a:t>
+            </a:r>
+            <a:r>
+              <a:rPr lang="en-US" dirty="0" smtClean="0"/>
+              <a:t>, clearing </a:t>
+            </a:r>
+            <a:r>
+              <a:rPr lang="en-US" dirty="0"/>
+              <a:t>console, even stopping the current process.</a:t>
+            </a:r>
+            <a:endParaRPr lang="en-US" dirty="0" smtClean="0"/>
+          </a:p>
+          <a:p>
+            <a:r>
+              <a:rPr lang="en-US" dirty="0" smtClean="0"/>
+              <a:t>Code formatter</a:t>
+            </a:r>
+          </a:p>
+          <a:p>
+            <a:r>
+              <a:rPr lang="en-US" dirty="0" smtClean="0"/>
+              <a:t>Bracket matching &amp; checking</a:t>
+            </a:r>
+          </a:p>
+          <a:p>
+            <a:r>
+              <a:rPr lang="en-US" dirty="0" smtClean="0"/>
+              <a:t>Commenting uncommenting</a:t>
+            </a:r>
+            <a:endParaRPr lang="en-US" dirty="0"/>
+          </a:p>
+        </p:txBody>
+      </p:sp>
+    </p:spTree>
+    <p:extLst>
+      <p:ext uri="{BB962C8B-B14F-4D97-AF65-F5344CB8AC3E}">
+        <p14:creationId xmlns:p14="http://schemas.microsoft.com/office/powerpoint/2010/main" val="2449672567"/>
+      </p:ext>
+    </p:extLst>
+  </p:cSld>
+  <p:clrMapOvr>
+    <a:masterClrMapping/>
+  </p:clrMapOvr>
+</p:sld>
+</file>
+
+<file path=ppt/slides/slide21.xml><?xml version="1.0" encoding="utf-8"?>
+<p:sld xmlns:a="http://schemas.openxmlformats.org/drawingml/2006/main" xmlns:r="http://schemas.openxmlformats.org/officeDocument/2006/relationships" xmlns:p="http://schemas.openxmlformats.org/presentationml/2006/main">
+  <p:cSld>
+    <p:spTree>
+      <p:nvGrpSpPr>
+        <p:cNvPr id="1" name=""/>
+        <p:cNvGrpSpPr/>
+        <p:nvPr/>
+      </p:nvGrpSpPr>
+      <p:grpSpPr>
+        <a:xfrm>
+          <a:off x="0" y="0"/>
+          <a:ext cx="0" cy="0"/>
+          <a:chOff x="0" y="0"/>
+          <a:chExt cx="0" cy="0"/>
+        </a:xfrm>
+      </p:grpSpPr>
+      <p:sp>
+        <p:nvSpPr>
+          <p:cNvPr id="2" name="Title 1"/>
+          <p:cNvSpPr>
+            <a:spLocks noGrp="1"/>
+          </p:cNvSpPr>
+          <p:nvPr>
+            <p:ph type="title"/>
+          </p:nvPr>
+        </p:nvSpPr>
+        <p:spPr/>
+        <p:txBody>
+          <a:bodyPr/>
+          <a:lstStyle/>
+          <a:p>
+            <a:r>
+              <a:rPr lang="en-US" dirty="0" err="1" smtClean="0"/>
+              <a:t>RStudio</a:t>
+            </a:r>
+            <a:endParaRPr lang="en-US" dirty="0"/>
+          </a:p>
+        </p:txBody>
+      </p:sp>
+      <p:sp>
+        <p:nvSpPr>
+          <p:cNvPr id="3" name="Content Placeholder 2"/>
+          <p:cNvSpPr>
+            <a:spLocks noGrp="1"/>
+          </p:cNvSpPr>
+          <p:nvPr>
+            <p:ph idx="1"/>
+          </p:nvPr>
+        </p:nvSpPr>
+        <p:spPr/>
+        <p:txBody>
+          <a:bodyPr/>
+          <a:lstStyle/>
+          <a:p>
+            <a:endParaRPr lang="en-US"/>
+          </a:p>
+        </p:txBody>
+      </p:sp>
+    </p:spTree>
+    <p:extLst>
+      <p:ext uri="{BB962C8B-B14F-4D97-AF65-F5344CB8AC3E}">
+        <p14:creationId xmlns:p14="http://schemas.microsoft.com/office/powerpoint/2010/main" val="3579938131"/>
       </p:ext>
     </p:extLst>
   </p:cSld>
@@ -5262,364 +5512,6 @@
           <a:p>
             <a:r>
               <a:rPr lang="en-US" dirty="0" smtClean="0"/>
-              <a:t>Parser</a:t>
-            </a:r>
-            <a:endParaRPr lang="en-US" dirty="0"/>
-          </a:p>
-        </p:txBody>
-      </p:sp>
-      <p:sp>
-        <p:nvSpPr>
-          <p:cNvPr id="3" name="Content Placeholder 2"/>
-          <p:cNvSpPr>
-            <a:spLocks noGrp="1"/>
-          </p:cNvSpPr>
-          <p:nvPr>
-            <p:ph idx="1"/>
-          </p:nvPr>
-        </p:nvSpPr>
-        <p:spPr/>
-        <p:txBody>
-          <a:bodyPr>
-            <a:normAutofit fontScale="85000" lnSpcReduction="10000"/>
-          </a:bodyPr>
-          <a:lstStyle/>
-          <a:p>
-            <a:r>
-              <a:rPr lang="en-US" dirty="0"/>
-              <a:t>The parser works by setting pairs of markers (</a:t>
-            </a:r>
-            <a:r>
-              <a:rPr lang="en-US" dirty="0" err="1"/>
-              <a:t>PsiBuilder.Marker</a:t>
-            </a:r>
-            <a:r>
-              <a:rPr lang="en-US" dirty="0"/>
-              <a:t> instances) within the stream of tokens received from the </a:t>
-            </a:r>
-            <a:r>
-              <a:rPr lang="en-US" dirty="0" err="1"/>
-              <a:t>lexer</a:t>
-            </a:r>
-            <a:r>
-              <a:rPr lang="en-US" dirty="0"/>
-              <a:t>. Each pair of markers defines the range of </a:t>
-            </a:r>
-            <a:r>
-              <a:rPr lang="en-US" dirty="0" err="1"/>
-              <a:t>lexer</a:t>
-            </a:r>
-            <a:r>
-              <a:rPr lang="en-US" dirty="0"/>
-              <a:t> tokens for a single node in the AST tree. If a pair of markers is nested in another pair (starts after its start and ends before its end), it becomes the child node of the outer pair</a:t>
-            </a:r>
-            <a:r>
-              <a:rPr lang="en-US" dirty="0" smtClean="0"/>
-              <a:t>.</a:t>
-            </a:r>
-          </a:p>
-          <a:p>
-            <a:r>
-              <a:rPr lang="en-US" dirty="0"/>
-              <a:t>The element type for the marker pair (and for the AST node created from it) is specified when the end marker is set (by a call to </a:t>
-            </a:r>
-            <a:r>
-              <a:rPr lang="en-US" dirty="0" err="1"/>
-              <a:t>PsiBuilder.Marker.done</a:t>
-            </a:r>
-            <a:r>
-              <a:rPr lang="en-US" dirty="0"/>
-              <a:t>()</a:t>
-            </a:r>
-            <a:r>
-              <a:rPr lang="en-US" dirty="0" smtClean="0"/>
-              <a:t>)</a:t>
-            </a:r>
-          </a:p>
-          <a:p>
-            <a:r>
-              <a:rPr lang="en-US" dirty="0" err="1" smtClean="0"/>
-              <a:t>BashElementTypes</a:t>
-            </a:r>
-            <a:r>
-              <a:rPr lang="en-US" dirty="0" smtClean="0"/>
-              <a:t> </a:t>
-            </a:r>
-            <a:r>
-              <a:rPr lang="en-US" dirty="0" err="1" smtClean="0"/>
-              <a:t>vs</a:t>
-            </a:r>
-            <a:r>
-              <a:rPr lang="en-US" dirty="0" smtClean="0"/>
-              <a:t> </a:t>
-            </a:r>
-            <a:r>
-              <a:rPr lang="en-US" smtClean="0"/>
-              <a:t>BashTokenTypes</a:t>
-            </a:r>
-            <a:endParaRPr lang="en-US" dirty="0"/>
-          </a:p>
-        </p:txBody>
-      </p:sp>
-    </p:spTree>
-    <p:extLst>
-      <p:ext uri="{BB962C8B-B14F-4D97-AF65-F5344CB8AC3E}">
-        <p14:creationId xmlns:p14="http://schemas.microsoft.com/office/powerpoint/2010/main" val="362419930"/>
-      </p:ext>
-    </p:extLst>
-  </p:cSld>
-  <p:clrMapOvr>
-    <a:masterClrMapping/>
-  </p:clrMapOvr>
-</p:sld>
-</file>
-
-<file path=ppt/slides/slide4.xml><?xml version="1.0" encoding="utf-8"?>
-<p:sld xmlns:a="http://schemas.openxmlformats.org/drawingml/2006/main" xmlns:r="http://schemas.openxmlformats.org/officeDocument/2006/relationships" xmlns:p="http://schemas.openxmlformats.org/presentationml/2006/main">
-  <p:cSld>
-    <p:spTree>
-      <p:nvGrpSpPr>
-        <p:cNvPr id="1" name=""/>
-        <p:cNvGrpSpPr/>
-        <p:nvPr/>
-      </p:nvGrpSpPr>
-      <p:grpSpPr>
-        <a:xfrm>
-          <a:off x="0" y="0"/>
-          <a:ext cx="0" cy="0"/>
-          <a:chOff x="0" y="0"/>
-          <a:chExt cx="0" cy="0"/>
-        </a:xfrm>
-      </p:grpSpPr>
-      <p:sp>
-        <p:nvSpPr>
-          <p:cNvPr id="2" name="Title 1"/>
-          <p:cNvSpPr>
-            <a:spLocks noGrp="1"/>
-          </p:cNvSpPr>
-          <p:nvPr>
-            <p:ph type="title"/>
-          </p:nvPr>
-        </p:nvSpPr>
-        <p:spPr>
-          <a:xfrm>
-            <a:off x="290421" y="292722"/>
-            <a:ext cx="8229600" cy="1143000"/>
-          </a:xfrm>
-        </p:spPr>
-        <p:txBody>
-          <a:bodyPr/>
-          <a:lstStyle/>
-          <a:p>
-            <a:pPr algn="l"/>
-            <a:r>
-              <a:rPr lang="en-US" dirty="0" err="1" smtClean="0"/>
-              <a:t>PsiParser</a:t>
-            </a:r>
-            <a:endParaRPr lang="en-US" dirty="0"/>
-          </a:p>
-        </p:txBody>
-      </p:sp>
-      <p:sp>
-        <p:nvSpPr>
-          <p:cNvPr id="3" name="Content Placeholder 2"/>
-          <p:cNvSpPr>
-            <a:spLocks noGrp="1"/>
-          </p:cNvSpPr>
-          <p:nvPr>
-            <p:ph idx="1"/>
-          </p:nvPr>
-        </p:nvSpPr>
-        <p:spPr/>
-        <p:txBody>
-          <a:bodyPr/>
-          <a:lstStyle/>
-          <a:p>
-            <a:r>
-              <a:rPr lang="en-US" dirty="0" smtClean="0"/>
-              <a:t> </a:t>
-            </a:r>
-            <a:endParaRPr lang="en-US" dirty="0"/>
-          </a:p>
-        </p:txBody>
-      </p:sp>
-      <p:pic>
-        <p:nvPicPr>
-          <p:cNvPr id="4" name="Picture 3"/>
-          <p:cNvPicPr>
-            <a:picLocks noChangeAspect="1"/>
-          </p:cNvPicPr>
-          <p:nvPr/>
-        </p:nvPicPr>
-        <p:blipFill>
-          <a:blip r:embed="rId3"/>
-          <a:stretch>
-            <a:fillRect/>
-          </a:stretch>
-        </p:blipFill>
-        <p:spPr>
-          <a:xfrm>
-            <a:off x="2335338" y="0"/>
-            <a:ext cx="6693477" cy="6858000"/>
-          </a:xfrm>
-          <a:prstGeom prst="rect">
-            <a:avLst/>
-          </a:prstGeom>
-        </p:spPr>
-      </p:pic>
-    </p:spTree>
-    <p:extLst>
-      <p:ext uri="{BB962C8B-B14F-4D97-AF65-F5344CB8AC3E}">
-        <p14:creationId xmlns:p14="http://schemas.microsoft.com/office/powerpoint/2010/main" val="168756254"/>
-      </p:ext>
-    </p:extLst>
-  </p:cSld>
-  <p:clrMapOvr>
-    <a:masterClrMapping/>
-  </p:clrMapOvr>
-</p:sld>
-</file>
-
-<file path=ppt/slides/slide5.xml><?xml version="1.0" encoding="utf-8"?>
-<p:sld xmlns:a="http://schemas.openxmlformats.org/drawingml/2006/main" xmlns:r="http://schemas.openxmlformats.org/officeDocument/2006/relationships" xmlns:p="http://schemas.openxmlformats.org/presentationml/2006/main">
-  <p:cSld>
-    <p:spTree>
-      <p:nvGrpSpPr>
-        <p:cNvPr id="1" name=""/>
-        <p:cNvGrpSpPr/>
-        <p:nvPr/>
-      </p:nvGrpSpPr>
-      <p:grpSpPr>
-        <a:xfrm>
-          <a:off x="0" y="0"/>
-          <a:ext cx="0" cy="0"/>
-          <a:chOff x="0" y="0"/>
-          <a:chExt cx="0" cy="0"/>
-        </a:xfrm>
-      </p:grpSpPr>
-      <p:sp>
-        <p:nvSpPr>
-          <p:cNvPr id="2" name="Title 1"/>
-          <p:cNvSpPr>
-            <a:spLocks noGrp="1"/>
-          </p:cNvSpPr>
-          <p:nvPr>
-            <p:ph type="title"/>
-          </p:nvPr>
-        </p:nvSpPr>
-        <p:spPr/>
-        <p:txBody>
-          <a:bodyPr/>
-          <a:lstStyle/>
-          <a:p>
-            <a:r>
-              <a:rPr lang="en-US" dirty="0" smtClean="0"/>
-              <a:t>Roadmap (coming soon)</a:t>
-            </a:r>
-            <a:endParaRPr lang="en-US" dirty="0"/>
-          </a:p>
-        </p:txBody>
-      </p:sp>
-      <p:sp>
-        <p:nvSpPr>
-          <p:cNvPr id="3" name="Content Placeholder 2"/>
-          <p:cNvSpPr>
-            <a:spLocks noGrp="1"/>
-          </p:cNvSpPr>
-          <p:nvPr>
-            <p:ph idx="1"/>
-          </p:nvPr>
-        </p:nvSpPr>
-        <p:spPr/>
-        <p:txBody>
-          <a:bodyPr/>
-          <a:lstStyle/>
-          <a:p>
-            <a:r>
-              <a:rPr lang="en-US" dirty="0" smtClean="0"/>
-              <a:t>Live Templates</a:t>
-            </a:r>
-          </a:p>
-          <a:p>
-            <a:r>
-              <a:rPr lang="en-US" dirty="0" err="1" smtClean="0"/>
-              <a:t>Quickfixes</a:t>
-            </a:r>
-            <a:r>
-              <a:rPr lang="en-US" dirty="0" smtClean="0"/>
-              <a:t> for common problems</a:t>
-            </a:r>
-          </a:p>
-          <a:p>
-            <a:pPr lvl="1"/>
-            <a:r>
-              <a:rPr lang="en-US" dirty="0" smtClean="0"/>
-              <a:t>Incorrect subset</a:t>
-            </a:r>
-          </a:p>
-          <a:p>
-            <a:r>
-              <a:rPr lang="en-US" dirty="0" smtClean="0"/>
-              <a:t>Folding</a:t>
-            </a:r>
-          </a:p>
-          <a:p>
-            <a:pPr lvl="1"/>
-            <a:r>
-              <a:rPr lang="en-US" dirty="0" err="1"/>
-              <a:t>ArcFoldingBuilder</a:t>
-            </a:r>
-            <a:endParaRPr lang="en-US" dirty="0"/>
-          </a:p>
-        </p:txBody>
-      </p:sp>
-    </p:spTree>
-    <p:extLst>
-      <p:ext uri="{BB962C8B-B14F-4D97-AF65-F5344CB8AC3E}">
-        <p14:creationId xmlns:p14="http://schemas.microsoft.com/office/powerpoint/2010/main" val="3335867933"/>
-      </p:ext>
-    </p:extLst>
-  </p:cSld>
-  <p:clrMapOvr>
-    <a:masterClrMapping/>
-  </p:clrMapOvr>
-</p:sld>
-</file>
-
-<file path=ppt/slides/slide6.xml><?xml version="1.0" encoding="utf-8"?>
-<p:sld xmlns:a="http://schemas.openxmlformats.org/drawingml/2006/main" xmlns:r="http://schemas.openxmlformats.org/officeDocument/2006/relationships" xmlns:p="http://schemas.openxmlformats.org/presentationml/2006/main">
-  <p:cSld>
-    <p:spTree>
-      <p:nvGrpSpPr>
-        <p:cNvPr id="1" name=""/>
-        <p:cNvGrpSpPr/>
-        <p:nvPr/>
-      </p:nvGrpSpPr>
-      <p:grpSpPr>
-        <a:xfrm>
-          <a:off x="0" y="0"/>
-          <a:ext cx="0" cy="0"/>
-          <a:chOff x="0" y="0"/>
-          <a:chExt cx="0" cy="0"/>
-        </a:xfrm>
-      </p:grpSpPr>
-      <p:sp>
-        <p:nvSpPr>
-          <p:cNvPr id="2" name="Title 1"/>
-          <p:cNvSpPr>
-            <a:spLocks noGrp="1"/>
-          </p:cNvSpPr>
-          <p:nvPr>
-            <p:ph type="title"/>
-          </p:nvPr>
-        </p:nvSpPr>
-        <p:spPr/>
-        <p:txBody>
-          <a:bodyPr/>
-          <a:lstStyle/>
-          <a:p>
-            <a:r>
-              <a:rPr lang="en-US" dirty="0" smtClean="0"/>
               <a:t>Roadmap (later)</a:t>
             </a:r>
             <a:endParaRPr lang="en-US" dirty="0"/>
@@ -5733,7 +5625,7 @@
 </p:sld>
 </file>
 
-<file path=ppt/slides/slide7.xml><?xml version="1.0" encoding="utf-8"?>
+<file path=ppt/slides/slide4.xml><?xml version="1.0" encoding="utf-8"?>
 <p:sld xmlns:a="http://schemas.openxmlformats.org/drawingml/2006/main" xmlns:r="http://schemas.openxmlformats.org/officeDocument/2006/relationships" xmlns:p="http://schemas.openxmlformats.org/presentationml/2006/main">
   <p:cSld>
     <p:spTree>
@@ -5892,6 +5784,858 @@
 </p:sld>
 </file>
 
+<file path=ppt/slides/slide5.xml><?xml version="1.0" encoding="utf-8"?>
+<p:sld xmlns:a="http://schemas.openxmlformats.org/drawingml/2006/main" xmlns:r="http://schemas.openxmlformats.org/officeDocument/2006/relationships" xmlns:p="http://schemas.openxmlformats.org/presentationml/2006/main">
+  <p:cSld>
+    <p:spTree>
+      <p:nvGrpSpPr>
+        <p:cNvPr id="1" name=""/>
+        <p:cNvGrpSpPr/>
+        <p:nvPr/>
+      </p:nvGrpSpPr>
+      <p:grpSpPr>
+        <a:xfrm>
+          <a:off x="0" y="0"/>
+          <a:ext cx="0" cy="0"/>
+          <a:chOff x="0" y="0"/>
+          <a:chExt cx="0" cy="0"/>
+        </a:xfrm>
+      </p:grpSpPr>
+      <p:sp>
+        <p:nvSpPr>
+          <p:cNvPr id="2" name="Title 1"/>
+          <p:cNvSpPr>
+            <a:spLocks noGrp="1"/>
+          </p:cNvSpPr>
+          <p:nvPr>
+            <p:ph type="title"/>
+          </p:nvPr>
+        </p:nvSpPr>
+        <p:spPr/>
+        <p:txBody>
+          <a:bodyPr/>
+          <a:lstStyle/>
+          <a:p>
+            <a:r>
+              <a:rPr lang="en-US" dirty="0" err="1" smtClean="0"/>
+              <a:t>Lexer</a:t>
+            </a:r>
+            <a:endParaRPr lang="en-US" dirty="0"/>
+          </a:p>
+        </p:txBody>
+      </p:sp>
+      <p:sp>
+        <p:nvSpPr>
+          <p:cNvPr id="3" name="Content Placeholder 2"/>
+          <p:cNvSpPr>
+            <a:spLocks noGrp="1"/>
+          </p:cNvSpPr>
+          <p:nvPr>
+            <p:ph idx="1"/>
+          </p:nvPr>
+        </p:nvSpPr>
+        <p:spPr/>
+        <p:txBody>
+          <a:bodyPr/>
+          <a:lstStyle/>
+          <a:p>
+            <a:r>
+              <a:rPr lang="en-US" dirty="0" smtClean="0"/>
+              <a:t>Just as the </a:t>
+            </a:r>
+            <a:r>
+              <a:rPr lang="en-US" dirty="0" err="1" smtClean="0"/>
+              <a:t>lexer</a:t>
+            </a:r>
+            <a:r>
+              <a:rPr lang="en-US" dirty="0" smtClean="0"/>
+              <a:t> is a source code spelling checker, the parser is a grammar checker</a:t>
+            </a:r>
+          </a:p>
+          <a:p>
+            <a:r>
+              <a:rPr lang="en-US" dirty="0" smtClean="0"/>
+              <a:t>A utility such as </a:t>
+            </a:r>
+            <a:r>
+              <a:rPr lang="en-US" dirty="0" err="1" smtClean="0"/>
+              <a:t>JFlex</a:t>
+            </a:r>
+            <a:r>
+              <a:rPr lang="en-US" dirty="0" smtClean="0"/>
+              <a:t> builds a </a:t>
+            </a:r>
+            <a:r>
+              <a:rPr lang="en-US" dirty="0" err="1" smtClean="0"/>
+              <a:t>lexer</a:t>
+            </a:r>
+            <a:r>
+              <a:rPr lang="en-US" smtClean="0"/>
+              <a:t> from a specification file the programmer writes to define the 'words' (lexical tokens) in the desired language</a:t>
+            </a:r>
+            <a:endParaRPr lang="en-US" dirty="0"/>
+          </a:p>
+        </p:txBody>
+      </p:sp>
+    </p:spTree>
+    <p:extLst>
+      <p:ext uri="{BB962C8B-B14F-4D97-AF65-F5344CB8AC3E}">
+        <p14:creationId xmlns:p14="http://schemas.microsoft.com/office/powerpoint/2010/main" val="3371460341"/>
+      </p:ext>
+    </p:extLst>
+  </p:cSld>
+  <p:clrMapOvr>
+    <a:masterClrMapping/>
+  </p:clrMapOvr>
+</p:sld>
+</file>
+
+<file path=ppt/slides/slide6.xml><?xml version="1.0" encoding="utf-8"?>
+<p:sld xmlns:a="http://schemas.openxmlformats.org/drawingml/2006/main" xmlns:r="http://schemas.openxmlformats.org/officeDocument/2006/relationships" xmlns:p="http://schemas.openxmlformats.org/presentationml/2006/main">
+  <p:cSld>
+    <p:spTree>
+      <p:nvGrpSpPr>
+        <p:cNvPr id="1" name=""/>
+        <p:cNvGrpSpPr/>
+        <p:nvPr/>
+      </p:nvGrpSpPr>
+      <p:grpSpPr>
+        <a:xfrm>
+          <a:off x="0" y="0"/>
+          <a:ext cx="0" cy="0"/>
+          <a:chOff x="0" y="0"/>
+          <a:chExt cx="0" cy="0"/>
+        </a:xfrm>
+      </p:grpSpPr>
+      <p:sp>
+        <p:nvSpPr>
+          <p:cNvPr id="2" name="Title 1"/>
+          <p:cNvSpPr>
+            <a:spLocks noGrp="1"/>
+          </p:cNvSpPr>
+          <p:nvPr>
+            <p:ph type="title"/>
+          </p:nvPr>
+        </p:nvSpPr>
+        <p:spPr/>
+        <p:txBody>
+          <a:bodyPr/>
+          <a:lstStyle/>
+          <a:p>
+            <a:r>
+              <a:rPr lang="en-US" dirty="0" smtClean="0"/>
+              <a:t>Parser</a:t>
+            </a:r>
+            <a:endParaRPr lang="en-US" dirty="0"/>
+          </a:p>
+        </p:txBody>
+      </p:sp>
+      <p:sp>
+        <p:nvSpPr>
+          <p:cNvPr id="3" name="Content Placeholder 2"/>
+          <p:cNvSpPr>
+            <a:spLocks noGrp="1"/>
+          </p:cNvSpPr>
+          <p:nvPr>
+            <p:ph idx="1"/>
+          </p:nvPr>
+        </p:nvSpPr>
+        <p:spPr/>
+        <p:txBody>
+          <a:bodyPr>
+            <a:normAutofit fontScale="85000" lnSpcReduction="10000"/>
+          </a:bodyPr>
+          <a:lstStyle/>
+          <a:p>
+            <a:r>
+              <a:rPr lang="en-US" dirty="0"/>
+              <a:t>The parser works by setting pairs of markers (</a:t>
+            </a:r>
+            <a:r>
+              <a:rPr lang="en-US" dirty="0" err="1"/>
+              <a:t>PsiBuilder.Marker</a:t>
+            </a:r>
+            <a:r>
+              <a:rPr lang="en-US" dirty="0"/>
+              <a:t> instances) within the stream of tokens received from the </a:t>
+            </a:r>
+            <a:r>
+              <a:rPr lang="en-US" dirty="0" err="1"/>
+              <a:t>lexer</a:t>
+            </a:r>
+            <a:r>
+              <a:rPr lang="en-US" dirty="0"/>
+              <a:t>. Each pair of markers defines the range of </a:t>
+            </a:r>
+            <a:r>
+              <a:rPr lang="en-US" dirty="0" err="1"/>
+              <a:t>lexer</a:t>
+            </a:r>
+            <a:r>
+              <a:rPr lang="en-US" dirty="0"/>
+              <a:t> tokens for a single node in the AST tree. If a pair of markers is nested in another pair (starts after its start and ends before its end), it becomes the child node of the outer pair</a:t>
+            </a:r>
+            <a:r>
+              <a:rPr lang="en-US" dirty="0" smtClean="0"/>
+              <a:t>.</a:t>
+            </a:r>
+          </a:p>
+          <a:p>
+            <a:r>
+              <a:rPr lang="en-US" dirty="0"/>
+              <a:t>The element type for the marker pair (and for the AST node created from it) is specified when the end marker is set (by a call to </a:t>
+            </a:r>
+            <a:r>
+              <a:rPr lang="en-US" dirty="0" err="1"/>
+              <a:t>PsiBuilder.Marker.done</a:t>
+            </a:r>
+            <a:r>
+              <a:rPr lang="en-US" dirty="0"/>
+              <a:t>()</a:t>
+            </a:r>
+            <a:r>
+              <a:rPr lang="en-US" dirty="0" smtClean="0"/>
+              <a:t>)</a:t>
+            </a:r>
+          </a:p>
+          <a:p>
+            <a:r>
+              <a:rPr lang="en-US" dirty="0" err="1" smtClean="0"/>
+              <a:t>BashElementTypes</a:t>
+            </a:r>
+            <a:r>
+              <a:rPr lang="en-US" dirty="0" smtClean="0"/>
+              <a:t> </a:t>
+            </a:r>
+            <a:r>
+              <a:rPr lang="en-US" dirty="0" err="1" smtClean="0"/>
+              <a:t>vs</a:t>
+            </a:r>
+            <a:r>
+              <a:rPr lang="en-US" dirty="0" smtClean="0"/>
+              <a:t> </a:t>
+            </a:r>
+            <a:r>
+              <a:rPr lang="en-US" smtClean="0"/>
+              <a:t>BashTokenTypes</a:t>
+            </a:r>
+            <a:endParaRPr lang="en-US" dirty="0"/>
+          </a:p>
+        </p:txBody>
+      </p:sp>
+    </p:spTree>
+    <p:extLst>
+      <p:ext uri="{BB962C8B-B14F-4D97-AF65-F5344CB8AC3E}">
+        <p14:creationId xmlns:p14="http://schemas.microsoft.com/office/powerpoint/2010/main" val="362419930"/>
+      </p:ext>
+    </p:extLst>
+  </p:cSld>
+  <p:clrMapOvr>
+    <a:masterClrMapping/>
+  </p:clrMapOvr>
+</p:sld>
+</file>
+
+<file path=ppt/slides/slide7.xml><?xml version="1.0" encoding="utf-8"?>
+<p:sld xmlns:a="http://schemas.openxmlformats.org/drawingml/2006/main" xmlns:r="http://schemas.openxmlformats.org/officeDocument/2006/relationships" xmlns:p="http://schemas.openxmlformats.org/presentationml/2006/main">
+  <p:cSld>
+    <p:spTree>
+      <p:nvGrpSpPr>
+        <p:cNvPr id="1" name=""/>
+        <p:cNvGrpSpPr/>
+        <p:nvPr/>
+      </p:nvGrpSpPr>
+      <p:grpSpPr>
+        <a:xfrm>
+          <a:off x="0" y="0"/>
+          <a:ext cx="0" cy="0"/>
+          <a:chOff x="0" y="0"/>
+          <a:chExt cx="0" cy="0"/>
+        </a:xfrm>
+      </p:grpSpPr>
+      <p:sp>
+        <p:nvSpPr>
+          <p:cNvPr id="2" name="Title 1"/>
+          <p:cNvSpPr>
+            <a:spLocks noGrp="1"/>
+          </p:cNvSpPr>
+          <p:nvPr>
+            <p:ph type="title"/>
+          </p:nvPr>
+        </p:nvSpPr>
+        <p:spPr/>
+        <p:txBody>
+          <a:bodyPr/>
+          <a:lstStyle/>
+          <a:p>
+            <a:r>
+              <a:rPr lang="en-US" dirty="0" smtClean="0"/>
+              <a:t>Parser Basics: LL-Parser</a:t>
+            </a:r>
+            <a:endParaRPr lang="en-US" dirty="0"/>
+          </a:p>
+        </p:txBody>
+      </p:sp>
+      <p:sp>
+        <p:nvSpPr>
+          <p:cNvPr id="3" name="Content Placeholder 2"/>
+          <p:cNvSpPr>
+            <a:spLocks noGrp="1"/>
+          </p:cNvSpPr>
+          <p:nvPr>
+            <p:ph idx="1"/>
+          </p:nvPr>
+        </p:nvSpPr>
+        <p:spPr/>
+        <p:txBody>
+          <a:bodyPr>
+            <a:normAutofit fontScale="77500" lnSpcReduction="20000"/>
+          </a:bodyPr>
+          <a:lstStyle/>
+          <a:p>
+            <a:r>
+              <a:rPr lang="en-US" dirty="0" err="1"/>
+              <a:t>Ein</a:t>
+            </a:r>
+            <a:r>
+              <a:rPr lang="en-US" dirty="0"/>
+              <a:t> LL-Parser </a:t>
+            </a:r>
+            <a:r>
+              <a:rPr lang="en-US" dirty="0" err="1"/>
+              <a:t>heißt</a:t>
+            </a:r>
+            <a:r>
+              <a:rPr lang="en-US" dirty="0"/>
+              <a:t> LL(k)-Parser, </a:t>
+            </a:r>
+            <a:r>
+              <a:rPr lang="en-US" dirty="0" err="1"/>
+              <a:t>wenn</a:t>
+            </a:r>
+            <a:r>
+              <a:rPr lang="en-US" dirty="0"/>
+              <a:t> </a:t>
+            </a:r>
+            <a:r>
+              <a:rPr lang="en-US" dirty="0" err="1"/>
+              <a:t>er</a:t>
+            </a:r>
+            <a:r>
+              <a:rPr lang="en-US" dirty="0"/>
+              <a:t> </a:t>
+            </a:r>
+            <a:r>
+              <a:rPr lang="en-US" dirty="0" err="1"/>
+              <a:t>während</a:t>
+            </a:r>
+            <a:r>
+              <a:rPr lang="en-US" dirty="0"/>
+              <a:t> des </a:t>
+            </a:r>
+            <a:r>
+              <a:rPr lang="en-US" dirty="0" err="1"/>
+              <a:t>Parsens</a:t>
+            </a:r>
+            <a:r>
+              <a:rPr lang="en-US" dirty="0"/>
+              <a:t> k Tokens </a:t>
+            </a:r>
+            <a:r>
+              <a:rPr lang="en-US" dirty="0" err="1"/>
+              <a:t>vorausschauen</a:t>
+            </a:r>
+            <a:r>
+              <a:rPr lang="en-US" dirty="0"/>
+              <a:t> </a:t>
+            </a:r>
+            <a:r>
+              <a:rPr lang="en-US" dirty="0" err="1"/>
+              <a:t>kann</a:t>
+            </a:r>
+            <a:r>
+              <a:rPr lang="en-US" dirty="0"/>
+              <a:t> und </a:t>
+            </a:r>
+            <a:r>
+              <a:rPr lang="en-US" dirty="0" err="1"/>
+              <a:t>im</a:t>
+            </a:r>
+            <a:r>
+              <a:rPr lang="en-US" dirty="0"/>
+              <a:t> </a:t>
+            </a:r>
+            <a:r>
+              <a:rPr lang="en-US" dirty="0" err="1"/>
+              <a:t>Gegensatz</a:t>
+            </a:r>
+            <a:r>
+              <a:rPr lang="en-US" dirty="0"/>
+              <a:t> </a:t>
+            </a:r>
+            <a:r>
+              <a:rPr lang="en-US" dirty="0" err="1"/>
+              <a:t>zum</a:t>
+            </a:r>
+            <a:r>
+              <a:rPr lang="en-US" dirty="0"/>
+              <a:t> LF-Parser den </a:t>
+            </a:r>
+            <a:r>
+              <a:rPr lang="en-US" dirty="0" err="1"/>
+              <a:t>Kellerinhalt</a:t>
+            </a:r>
+            <a:r>
+              <a:rPr lang="en-US" dirty="0"/>
+              <a:t> </a:t>
+            </a:r>
+            <a:r>
+              <a:rPr lang="en-US" dirty="0" err="1"/>
+              <a:t>benutzt</a:t>
+            </a:r>
+            <a:r>
+              <a:rPr lang="en-US" dirty="0"/>
+              <a:t>. k </a:t>
+            </a:r>
+            <a:r>
+              <a:rPr lang="en-US" dirty="0" err="1"/>
+              <a:t>wird</a:t>
+            </a:r>
+            <a:r>
+              <a:rPr lang="en-US" dirty="0"/>
+              <a:t> </a:t>
+            </a:r>
+            <a:r>
+              <a:rPr lang="en-US" dirty="0" err="1"/>
+              <a:t>dabei</a:t>
+            </a:r>
+            <a:r>
+              <a:rPr lang="en-US" dirty="0"/>
+              <a:t> </a:t>
+            </a:r>
+            <a:r>
+              <a:rPr lang="en-US" dirty="0" err="1"/>
+              <a:t>als</a:t>
+            </a:r>
+            <a:r>
+              <a:rPr lang="en-US" dirty="0"/>
+              <a:t> </a:t>
+            </a:r>
+            <a:r>
+              <a:rPr lang="en-US" dirty="0" err="1"/>
+              <a:t>Lookahead</a:t>
+            </a:r>
+            <a:r>
+              <a:rPr lang="en-US" dirty="0"/>
+              <a:t> </a:t>
+            </a:r>
+            <a:r>
+              <a:rPr lang="en-US" dirty="0" err="1" smtClean="0"/>
+              <a:t>bezeichnet</a:t>
+            </a:r>
+            <a:endParaRPr lang="en-US" dirty="0" smtClean="0"/>
+          </a:p>
+          <a:p>
+            <a:r>
+              <a:rPr lang="en-US" dirty="0" err="1"/>
+              <a:t>Obwohl</a:t>
+            </a:r>
+            <a:r>
+              <a:rPr lang="en-US" dirty="0"/>
+              <a:t> die LL(k)-</a:t>
+            </a:r>
+            <a:r>
+              <a:rPr lang="en-US" dirty="0" err="1"/>
+              <a:t>Grammatiken</a:t>
+            </a:r>
+            <a:r>
+              <a:rPr lang="en-US" dirty="0"/>
+              <a:t> </a:t>
+            </a:r>
+            <a:r>
+              <a:rPr lang="en-US" dirty="0" err="1"/>
+              <a:t>relativ</a:t>
+            </a:r>
+            <a:r>
+              <a:rPr lang="en-US" dirty="0"/>
+              <a:t> </a:t>
+            </a:r>
+            <a:r>
+              <a:rPr lang="en-US" dirty="0" err="1"/>
+              <a:t>eingeschränkt</a:t>
+            </a:r>
+            <a:r>
+              <a:rPr lang="en-US" dirty="0"/>
+              <a:t> </a:t>
+            </a:r>
+            <a:r>
+              <a:rPr lang="en-US" dirty="0" err="1"/>
+              <a:t>sind</a:t>
+            </a:r>
+            <a:r>
+              <a:rPr lang="en-US" dirty="0"/>
+              <a:t>, </a:t>
+            </a:r>
+            <a:r>
+              <a:rPr lang="en-US" dirty="0" err="1"/>
+              <a:t>werden</a:t>
+            </a:r>
+            <a:r>
+              <a:rPr lang="en-US" dirty="0"/>
+              <a:t> LL(k)-Parser oft </a:t>
+            </a:r>
+            <a:r>
+              <a:rPr lang="en-US" dirty="0" err="1"/>
+              <a:t>benutzt</a:t>
+            </a:r>
+            <a:r>
+              <a:rPr lang="en-US" dirty="0"/>
+              <a:t>. Die </a:t>
+            </a:r>
+            <a:r>
+              <a:rPr lang="en-US" dirty="0" err="1"/>
+              <a:t>Entscheidung</a:t>
+            </a:r>
+            <a:r>
+              <a:rPr lang="en-US" dirty="0"/>
+              <a:t>, </a:t>
+            </a:r>
+            <a:r>
+              <a:rPr lang="en-US" dirty="0" err="1"/>
+              <a:t>nach</a:t>
+            </a:r>
+            <a:r>
+              <a:rPr lang="en-US" dirty="0"/>
+              <a:t> </a:t>
+            </a:r>
+            <a:r>
+              <a:rPr lang="en-US" dirty="0" err="1"/>
+              <a:t>welcher</a:t>
+            </a:r>
+            <a:r>
+              <a:rPr lang="en-US" dirty="0"/>
+              <a:t> Regel </a:t>
+            </a:r>
+            <a:r>
+              <a:rPr lang="en-US" dirty="0" err="1"/>
+              <a:t>expandiert</a:t>
+            </a:r>
+            <a:r>
+              <a:rPr lang="en-US" dirty="0"/>
+              <a:t> </a:t>
+            </a:r>
+            <a:r>
+              <a:rPr lang="en-US" dirty="0" err="1"/>
+              <a:t>wird</a:t>
+            </a:r>
+            <a:r>
+              <a:rPr lang="en-US" dirty="0"/>
+              <a:t>, </a:t>
+            </a:r>
+            <a:r>
+              <a:rPr lang="en-US" dirty="0" err="1"/>
+              <a:t>kann</a:t>
+            </a:r>
+            <a:r>
+              <a:rPr lang="en-US" dirty="0"/>
+              <a:t> </a:t>
+            </a:r>
+            <a:r>
+              <a:rPr lang="en-US" dirty="0" err="1"/>
+              <a:t>allein</a:t>
+            </a:r>
+            <a:r>
+              <a:rPr lang="en-US" dirty="0"/>
+              <a:t> </a:t>
+            </a:r>
+            <a:r>
+              <a:rPr lang="en-US" dirty="0" err="1"/>
+              <a:t>durch</a:t>
+            </a:r>
+            <a:r>
+              <a:rPr lang="en-US" dirty="0"/>
+              <a:t> </a:t>
+            </a:r>
+            <a:r>
+              <a:rPr lang="en-US" dirty="0" err="1"/>
+              <a:t>Analyse</a:t>
+            </a:r>
+            <a:r>
+              <a:rPr lang="en-US" dirty="0"/>
+              <a:t> des </a:t>
+            </a:r>
+            <a:r>
+              <a:rPr lang="en-US" dirty="0" err="1"/>
+              <a:t>Lookahead</a:t>
+            </a:r>
+            <a:r>
+              <a:rPr lang="en-US" dirty="0"/>
+              <a:t> </a:t>
+            </a:r>
+            <a:r>
+              <a:rPr lang="en-US" dirty="0" err="1"/>
+              <a:t>getroffen</a:t>
+            </a:r>
+            <a:r>
+              <a:rPr lang="en-US" dirty="0"/>
+              <a:t> </a:t>
+            </a:r>
+            <a:r>
+              <a:rPr lang="en-US" dirty="0" err="1"/>
+              <a:t>werden</a:t>
+            </a:r>
+            <a:r>
+              <a:rPr lang="en-US" dirty="0"/>
+              <a:t>. </a:t>
+            </a:r>
+            <a:r>
+              <a:rPr lang="en-US" dirty="0" err="1"/>
+              <a:t>Eine</a:t>
+            </a:r>
+            <a:r>
+              <a:rPr lang="en-US" dirty="0"/>
+              <a:t> </a:t>
+            </a:r>
+            <a:r>
+              <a:rPr lang="en-US" dirty="0" err="1"/>
+              <a:t>einfache</a:t>
+            </a:r>
+            <a:r>
+              <a:rPr lang="en-US" dirty="0"/>
+              <a:t> </a:t>
+            </a:r>
+            <a:r>
+              <a:rPr lang="en-US" dirty="0" err="1"/>
+              <a:t>Möglichkeit</a:t>
+            </a:r>
+            <a:r>
+              <a:rPr lang="en-US" dirty="0"/>
+              <a:t> </a:t>
+            </a:r>
+            <a:r>
+              <a:rPr lang="en-US" dirty="0" err="1"/>
+              <a:t>zur</a:t>
+            </a:r>
+            <a:r>
+              <a:rPr lang="en-US" dirty="0"/>
+              <a:t> </a:t>
+            </a:r>
+            <a:r>
+              <a:rPr lang="en-US" dirty="0" err="1"/>
+              <a:t>Implementierung</a:t>
+            </a:r>
+            <a:r>
+              <a:rPr lang="en-US" dirty="0"/>
+              <a:t> </a:t>
+            </a:r>
+            <a:r>
+              <a:rPr lang="en-US" dirty="0" err="1"/>
+              <a:t>dieser</a:t>
+            </a:r>
+            <a:r>
+              <a:rPr lang="en-US" dirty="0"/>
+              <a:t> </a:t>
+            </a:r>
+            <a:r>
+              <a:rPr lang="en-US" dirty="0" err="1"/>
+              <a:t>Parsertechnik</a:t>
+            </a:r>
+            <a:r>
+              <a:rPr lang="en-US" dirty="0"/>
+              <a:t> </a:t>
+            </a:r>
+            <a:r>
+              <a:rPr lang="en-US" dirty="0" err="1"/>
+              <a:t>bietet</a:t>
+            </a:r>
+            <a:r>
+              <a:rPr lang="en-US" dirty="0"/>
+              <a:t> die </a:t>
+            </a:r>
+            <a:r>
+              <a:rPr lang="en-US" dirty="0" err="1"/>
+              <a:t>Methode</a:t>
+            </a:r>
+            <a:r>
+              <a:rPr lang="en-US" dirty="0"/>
+              <a:t> des </a:t>
+            </a:r>
+            <a:r>
+              <a:rPr lang="en-US" dirty="0" err="1"/>
+              <a:t>rekursiven</a:t>
+            </a:r>
+            <a:r>
+              <a:rPr lang="en-US" dirty="0"/>
+              <a:t> </a:t>
+            </a:r>
+            <a:r>
+              <a:rPr lang="en-US" dirty="0" err="1" smtClean="0"/>
+              <a:t>Abstiegs</a:t>
+            </a:r>
+            <a:endParaRPr lang="en-US" dirty="0" smtClean="0"/>
+          </a:p>
+          <a:p>
+            <a:r>
+              <a:rPr lang="en-US" dirty="0" err="1"/>
+              <a:t>Eine</a:t>
+            </a:r>
+            <a:r>
+              <a:rPr lang="en-US" dirty="0"/>
+              <a:t> </a:t>
+            </a:r>
+            <a:r>
+              <a:rPr lang="en-US" dirty="0" err="1"/>
+              <a:t>kontextfreie</a:t>
+            </a:r>
+            <a:r>
+              <a:rPr lang="en-US" dirty="0"/>
+              <a:t> Grammatik </a:t>
+            </a:r>
+            <a:r>
+              <a:rPr lang="en-US" dirty="0" err="1"/>
+              <a:t>heißt</a:t>
+            </a:r>
+            <a:r>
+              <a:rPr lang="en-US" dirty="0"/>
+              <a:t> </a:t>
+            </a:r>
+            <a:r>
+              <a:rPr lang="en-US" b="1" dirty="0"/>
+              <a:t>LL(k)-Grammatik </a:t>
+            </a:r>
+            <a:r>
+              <a:rPr lang="en-US" dirty="0" err="1"/>
+              <a:t>für</a:t>
+            </a:r>
+            <a:r>
+              <a:rPr lang="en-US" dirty="0"/>
+              <a:t> </a:t>
+            </a:r>
+            <a:r>
+              <a:rPr lang="en-US" dirty="0" err="1"/>
+              <a:t>eine</a:t>
+            </a:r>
+            <a:r>
+              <a:rPr lang="en-US" dirty="0"/>
+              <a:t> </a:t>
+            </a:r>
+            <a:r>
+              <a:rPr lang="en-US" dirty="0" err="1"/>
+              <a:t>natürliche</a:t>
+            </a:r>
+            <a:r>
+              <a:rPr lang="en-US" dirty="0"/>
+              <a:t> </a:t>
+            </a:r>
+            <a:r>
+              <a:rPr lang="en-US" dirty="0" err="1"/>
+              <a:t>Zahl</a:t>
+            </a:r>
+            <a:r>
+              <a:rPr lang="en-US" dirty="0"/>
+              <a:t> k, </a:t>
+            </a:r>
+            <a:r>
+              <a:rPr lang="en-US" dirty="0" err="1"/>
+              <a:t>wenn</a:t>
+            </a:r>
+            <a:r>
+              <a:rPr lang="en-US" dirty="0"/>
+              <a:t> </a:t>
+            </a:r>
+            <a:r>
+              <a:rPr lang="en-US" dirty="0" err="1"/>
+              <a:t>jeder</a:t>
+            </a:r>
+            <a:r>
+              <a:rPr lang="en-US" dirty="0"/>
+              <a:t> </a:t>
+            </a:r>
+            <a:r>
+              <a:rPr lang="en-US" dirty="0" err="1"/>
+              <a:t>Ableitungsschritt</a:t>
+            </a:r>
+            <a:r>
+              <a:rPr lang="en-US" dirty="0"/>
+              <a:t> </a:t>
+            </a:r>
+            <a:r>
+              <a:rPr lang="en-US" dirty="0" err="1"/>
+              <a:t>eindeutig</a:t>
+            </a:r>
+            <a:r>
+              <a:rPr lang="en-US" dirty="0"/>
+              <a:t> </a:t>
+            </a:r>
+            <a:r>
+              <a:rPr lang="en-US" dirty="0" err="1"/>
+              <a:t>durch</a:t>
+            </a:r>
+            <a:r>
+              <a:rPr lang="en-US" dirty="0"/>
+              <a:t> die </a:t>
+            </a:r>
+            <a:r>
+              <a:rPr lang="en-US" dirty="0" err="1"/>
+              <a:t>nächsten</a:t>
+            </a:r>
+            <a:r>
+              <a:rPr lang="en-US" dirty="0"/>
+              <a:t> k </a:t>
+            </a:r>
+            <a:r>
+              <a:rPr lang="en-US" dirty="0" err="1"/>
+              <a:t>Symbole</a:t>
+            </a:r>
+            <a:r>
+              <a:rPr lang="en-US" dirty="0"/>
+              <a:t> der </a:t>
+            </a:r>
+            <a:r>
+              <a:rPr lang="en-US" dirty="0" err="1"/>
+              <a:t>Eingabe</a:t>
+            </a:r>
+            <a:r>
+              <a:rPr lang="en-US" dirty="0"/>
+              <a:t> (</a:t>
+            </a:r>
+            <a:r>
+              <a:rPr lang="en-US" dirty="0" err="1"/>
+              <a:t>Lookahead</a:t>
+            </a:r>
+            <a:r>
+              <a:rPr lang="en-US" dirty="0"/>
+              <a:t>) </a:t>
+            </a:r>
+            <a:r>
+              <a:rPr lang="en-US" dirty="0" err="1"/>
+              <a:t>bestimmt</a:t>
+            </a:r>
+            <a:r>
+              <a:rPr lang="en-US" dirty="0"/>
+              <a:t> </a:t>
+            </a:r>
+            <a:r>
+              <a:rPr lang="en-US" dirty="0" err="1"/>
+              <a:t>ist</a:t>
+            </a:r>
+            <a:endParaRPr lang="en-US" dirty="0"/>
+          </a:p>
+        </p:txBody>
+      </p:sp>
+    </p:spTree>
+    <p:extLst>
+      <p:ext uri="{BB962C8B-B14F-4D97-AF65-F5344CB8AC3E}">
+        <p14:creationId xmlns:p14="http://schemas.microsoft.com/office/powerpoint/2010/main" val="1604575585"/>
+      </p:ext>
+    </p:extLst>
+  </p:cSld>
+  <p:clrMapOvr>
+    <a:masterClrMapping/>
+  </p:clrMapOvr>
+</p:sld>
+</file>
+
 <file path=ppt/slides/slide8.xml><?xml version="1.0" encoding="utf-8"?>
 <p:sld xmlns:a="http://schemas.openxmlformats.org/drawingml/2006/main" xmlns:r="http://schemas.openxmlformats.org/officeDocument/2006/relationships" xmlns:p="http://schemas.openxmlformats.org/presentationml/2006/main">
   <p:cSld>
@@ -5949,11 +6693,27 @@
           <a:p>
             <a:r>
               <a:rPr lang="en-US" dirty="0" smtClean="0"/>
-              <a:t>To compile </a:t>
-            </a:r>
-            <a:r>
-              <a:rPr lang="en-US" smtClean="0"/>
-              <a:t>the c-sources </a:t>
+              <a:t>Uses almost identical version of R grammar</a:t>
+            </a:r>
+          </a:p>
+          <a:p>
+            <a:r>
+              <a:rPr lang="en-US" dirty="0"/>
+              <a:t>According to parser </a:t>
+            </a:r>
+            <a:r>
+              <a:rPr lang="en-US" dirty="0" err="1"/>
+              <a:t>docu</a:t>
+            </a:r>
+            <a:r>
+              <a:rPr lang="en-US" dirty="0"/>
+              <a:t>: created using bison</a:t>
+            </a:r>
+          </a:p>
+          <a:p>
+            <a:r>
+              <a:rPr lang="en-US" dirty="0" smtClean="0"/>
+              <a:t>Source file creates c-parser</a:t>
             </a:r>
             <a:endParaRPr lang="en-US" dirty="0"/>
           </a:p>
@@ -6030,7 +6790,7 @@
           <a:p>
             <a:r>
               <a:rPr lang="en-US" dirty="0" smtClean="0"/>
-              <a:t>R grammar</a:t>
+              <a:t>Psi parser</a:t>
             </a:r>
             <a:endParaRPr lang="en-US" dirty="0"/>
           </a:p>
@@ -6048,20 +6808,134 @@
         </p:nvSpPr>
         <p:spPr/>
         <p:txBody>
-          <a:bodyPr/>
-          <a:lstStyle/>
-          <a:p>
-            <a:r>
-              <a:rPr lang="en-US" dirty="0" smtClean="0"/>
-              <a:t>According to parser </a:t>
+          <a:bodyPr>
+            <a:normAutofit fontScale="77500" lnSpcReduction="20000"/>
+          </a:bodyPr>
+          <a:lstStyle/>
+          <a:p>
+            <a:r>
+              <a:rPr lang="en-US" dirty="0" smtClean="0"/>
+              <a:t>Try the grammar kit</a:t>
+            </a:r>
+          </a:p>
+          <a:p>
+            <a:r>
+              <a:rPr lang="en-US" dirty="0" smtClean="0"/>
+              <a:t>The </a:t>
+            </a:r>
+            <a:r>
+              <a:rPr lang="en-US" dirty="0" err="1"/>
+              <a:t>Clojure</a:t>
+            </a:r>
+            <a:r>
+              <a:rPr lang="en-US" dirty="0"/>
+              <a:t> parser is probably the simplest and smallest of all the </a:t>
+            </a:r>
+            <a:r>
+              <a:rPr lang="en-US" dirty="0" smtClean="0"/>
+              <a:t>custom language </a:t>
+            </a:r>
+            <a:r>
+              <a:rPr lang="en-US" dirty="0"/>
+              <a:t>plugins that are maintained by </a:t>
+            </a:r>
+            <a:r>
+              <a:rPr lang="en-US" dirty="0" smtClean="0"/>
+              <a:t>us</a:t>
+            </a:r>
+          </a:p>
+          <a:p>
+            <a:r>
+              <a:rPr lang="en-US" dirty="0"/>
+              <a:t>No, IDEA currently does not have a ready solution for using generated </a:t>
+            </a:r>
+            <a:r>
+              <a:rPr lang="en-US" dirty="0" smtClean="0"/>
+              <a:t>parsers. The </a:t>
+            </a:r>
+            <a:r>
+              <a:rPr lang="en-US" b="1" dirty="0"/>
+              <a:t>typical approach </a:t>
+            </a:r>
+            <a:r>
+              <a:rPr lang="en-US" dirty="0"/>
+              <a:t>when writing parsers in IDEA is to create a method </a:t>
+            </a:r>
+            <a:r>
+              <a:rPr lang="en-US" dirty="0" err="1"/>
+              <a:t>parseSmth</a:t>
+            </a:r>
+            <a:r>
+              <a:rPr lang="en-US" dirty="0"/>
+              <a:t>(</a:t>
+            </a:r>
+            <a:r>
+              <a:rPr lang="en-US" dirty="0" smtClean="0"/>
+              <a:t>). for </a:t>
+            </a:r>
+            <a:r>
+              <a:rPr lang="en-US" dirty="0"/>
+              <a:t>each rule in the grammar, and implement the rule in terms of </a:t>
             </a:r>
             <a:r>
               <a:rPr lang="en-US" dirty="0" err="1" smtClean="0"/>
-              <a:t>docu</a:t>
-            </a:r>
-            <a:r>
-              <a:rPr lang="en-US" dirty="0" smtClean="0"/>
-              <a:t>: created using bison</a:t>
+              <a:t>PsiBuilder</a:t>
+            </a:r>
+            <a:r>
+              <a:rPr lang="en-US" dirty="0" smtClean="0"/>
+              <a:t> markers.</a:t>
+            </a:r>
+          </a:p>
+          <a:p>
+            <a:r>
+              <a:rPr lang="en-US" dirty="0"/>
+              <a:t>write </a:t>
+            </a:r>
+            <a:r>
+              <a:rPr lang="en-US" dirty="0" err="1"/>
+              <a:t>lexer</a:t>
+            </a:r>
+            <a:r>
+              <a:rPr lang="en-US" dirty="0"/>
+              <a:t> and parser manually (</a:t>
+            </a:r>
+            <a:r>
+              <a:rPr lang="en-US" dirty="0" err="1"/>
+              <a:t>lexer</a:t>
+            </a:r>
+            <a:r>
+              <a:rPr lang="en-US" dirty="0"/>
+              <a:t> is </a:t>
+            </a:r>
+            <a:r>
+              <a:rPr lang="en-US" dirty="0" err="1"/>
+              <a:t>jflex</a:t>
+            </a:r>
+            <a:r>
+              <a:rPr lang="en-US" dirty="0"/>
+              <a:t>-generated and parser is completely by hand) since you have to continue your parsing whatever user types in</a:t>
+            </a:r>
+            <a:r>
+              <a:rPr lang="en-US" dirty="0" smtClean="0"/>
+              <a:t>.</a:t>
+            </a:r>
+          </a:p>
+          <a:p>
+            <a:r>
+              <a:rPr lang="en-US" dirty="0"/>
+              <a:t>Language construction never been easy, it doesn't matter if you do it </a:t>
+            </a:r>
+            <a:r>
+              <a:rPr lang="en-US" dirty="0" smtClean="0"/>
+              <a:t>by</a:t>
+            </a:r>
+            <a:r>
+              <a:rPr lang="en-US" dirty="0"/>
+              <a:t>  hand or by </a:t>
+            </a:r>
+            <a:r>
+              <a:rPr lang="en-US" dirty="0" err="1"/>
+              <a:t>Antlr</a:t>
             </a:r>
             <a:endParaRPr lang="en-US" dirty="0"/>
           </a:p>
@@ -6070,7 +6944,7 @@
     </p:spTree>
     <p:extLst>
       <p:ext uri="{BB962C8B-B14F-4D97-AF65-F5344CB8AC3E}">
-        <p14:creationId xmlns:p14="http://schemas.microsoft.com/office/powerpoint/2010/main" val="2283564327"/>
+        <p14:creationId xmlns:p14="http://schemas.microsoft.com/office/powerpoint/2010/main" val="3862011816"/>
       </p:ext>
     </p:extLst>
   </p:cSld>

</xml_diff>

<commit_message>
remove left recursiveness in argument lists
</commit_message>
<xml_diff>
--- a/R4Intellij.pptx
+++ b/R4Intellij.pptx
@@ -5,7 +5,7 @@
     <p:sldMasterId id="2147483648" r:id="rId1"/>
   </p:sldMasterIdLst>
   <p:notesMasterIdLst>
-    <p:notesMasterId r:id="rId23"/>
+    <p:notesMasterId r:id="rId24"/>
   </p:notesMasterIdLst>
   <p:sldIdLst>
     <p:sldId id="256" r:id="rId2"/>
@@ -22,13 +22,14 @@
     <p:sldId id="266" r:id="rId13"/>
     <p:sldId id="269" r:id="rId14"/>
     <p:sldId id="276" r:id="rId15"/>
-    <p:sldId id="268" r:id="rId16"/>
-    <p:sldId id="267" r:id="rId17"/>
-    <p:sldId id="274" r:id="rId18"/>
-    <p:sldId id="271" r:id="rId19"/>
-    <p:sldId id="270" r:id="rId20"/>
-    <p:sldId id="273" r:id="rId21"/>
-    <p:sldId id="278" r:id="rId22"/>
+    <p:sldId id="279" r:id="rId16"/>
+    <p:sldId id="268" r:id="rId17"/>
+    <p:sldId id="267" r:id="rId18"/>
+    <p:sldId id="274" r:id="rId19"/>
+    <p:sldId id="271" r:id="rId20"/>
+    <p:sldId id="270" r:id="rId21"/>
+    <p:sldId id="273" r:id="rId22"/>
+    <p:sldId id="278" r:id="rId23"/>
   </p:sldIdLst>
   <p:sldSz cx="9144000" cy="6858000" type="screen4x3"/>
   <p:notesSz cx="6858000" cy="9144000"/>
@@ -154,6 +155,7 @@
             <p14:sldId id="266"/>
             <p14:sldId id="269"/>
             <p14:sldId id="276"/>
+            <p14:sldId id="279"/>
           </p14:sldIdLst>
         </p14:section>
         <p14:section name="Feature Overview" id="{8B615B06-FCEC-9144-A445-B2B6278F12C6}">
@@ -263,7 +265,7 @@
           <a:p>
             <a:fld id="{87682158-AFB6-1044-826E-FEC32920DECA}" type="datetimeFigureOut">
               <a:rPr lang="en-US" smtClean="0"/>
-              <a:t>12/21/11</a:t>
+              <a:t>1/5/12</a:t>
             </a:fld>
             <a:endParaRPr lang="en-US"/>
           </a:p>
@@ -923,7 +925,7 @@
           <a:p>
             <a:fld id="{4FA87827-956D-2D4E-9772-6863DC7B302B}" type="slidenum">
               <a:rPr lang="en-US" smtClean="0"/>
-              <a:t>15</a:t>
+              <a:t>16</a:t>
             </a:fld>
             <a:endParaRPr lang="en-US"/>
           </a:p>
@@ -1123,7 +1125,7 @@
           <a:p>
             <a:fld id="{903CF105-E729-A944-8550-FE8B359D2D68}" type="datetimeFigureOut">
               <a:rPr lang="en-US" smtClean="0"/>
-              <a:t>12/21/11</a:t>
+              <a:t>1/5/12</a:t>
             </a:fld>
             <a:endParaRPr lang="en-US"/>
           </a:p>
@@ -1293,7 +1295,7 @@
           <a:p>
             <a:fld id="{903CF105-E729-A944-8550-FE8B359D2D68}" type="datetimeFigureOut">
               <a:rPr lang="en-US" smtClean="0"/>
-              <a:t>12/21/11</a:t>
+              <a:t>1/5/12</a:t>
             </a:fld>
             <a:endParaRPr lang="en-US"/>
           </a:p>
@@ -1473,7 +1475,7 @@
           <a:p>
             <a:fld id="{903CF105-E729-A944-8550-FE8B359D2D68}" type="datetimeFigureOut">
               <a:rPr lang="en-US" smtClean="0"/>
-              <a:t>12/21/11</a:t>
+              <a:t>1/5/12</a:t>
             </a:fld>
             <a:endParaRPr lang="en-US"/>
           </a:p>
@@ -1643,7 +1645,7 @@
           <a:p>
             <a:fld id="{903CF105-E729-A944-8550-FE8B359D2D68}" type="datetimeFigureOut">
               <a:rPr lang="en-US" smtClean="0"/>
-              <a:t>12/21/11</a:t>
+              <a:t>1/5/12</a:t>
             </a:fld>
             <a:endParaRPr lang="en-US"/>
           </a:p>
@@ -1889,7 +1891,7 @@
           <a:p>
             <a:fld id="{903CF105-E729-A944-8550-FE8B359D2D68}" type="datetimeFigureOut">
               <a:rPr lang="en-US" smtClean="0"/>
-              <a:t>12/21/11</a:t>
+              <a:t>1/5/12</a:t>
             </a:fld>
             <a:endParaRPr lang="en-US"/>
           </a:p>
@@ -2177,7 +2179,7 @@
           <a:p>
             <a:fld id="{903CF105-E729-A944-8550-FE8B359D2D68}" type="datetimeFigureOut">
               <a:rPr lang="en-US" smtClean="0"/>
-              <a:t>12/21/11</a:t>
+              <a:t>1/5/12</a:t>
             </a:fld>
             <a:endParaRPr lang="en-US"/>
           </a:p>
@@ -2599,7 +2601,7 @@
           <a:p>
             <a:fld id="{903CF105-E729-A944-8550-FE8B359D2D68}" type="datetimeFigureOut">
               <a:rPr lang="en-US" smtClean="0"/>
-              <a:t>12/21/11</a:t>
+              <a:t>1/5/12</a:t>
             </a:fld>
             <a:endParaRPr lang="en-US"/>
           </a:p>
@@ -2717,7 +2719,7 @@
           <a:p>
             <a:fld id="{903CF105-E729-A944-8550-FE8B359D2D68}" type="datetimeFigureOut">
               <a:rPr lang="en-US" smtClean="0"/>
-              <a:t>12/21/11</a:t>
+              <a:t>1/5/12</a:t>
             </a:fld>
             <a:endParaRPr lang="en-US"/>
           </a:p>
@@ -2812,7 +2814,7 @@
           <a:p>
             <a:fld id="{903CF105-E729-A944-8550-FE8B359D2D68}" type="datetimeFigureOut">
               <a:rPr lang="en-US" smtClean="0"/>
-              <a:t>12/21/11</a:t>
+              <a:t>1/5/12</a:t>
             </a:fld>
             <a:endParaRPr lang="en-US"/>
           </a:p>
@@ -3089,7 +3091,7 @@
           <a:p>
             <a:fld id="{903CF105-E729-A944-8550-FE8B359D2D68}" type="datetimeFigureOut">
               <a:rPr lang="en-US" smtClean="0"/>
-              <a:t>12/21/11</a:t>
+              <a:t>1/5/12</a:t>
             </a:fld>
             <a:endParaRPr lang="en-US"/>
           </a:p>
@@ -3342,7 +3344,7 @@
           <a:p>
             <a:fld id="{903CF105-E729-A944-8550-FE8B359D2D68}" type="datetimeFigureOut">
               <a:rPr lang="en-US" smtClean="0"/>
-              <a:t>12/21/11</a:t>
+              <a:t>1/5/12</a:t>
             </a:fld>
             <a:endParaRPr lang="en-US"/>
           </a:p>
@@ -3555,7 +3557,7 @@
           <a:p>
             <a:fld id="{903CF105-E729-A944-8550-FE8B359D2D68}" type="datetimeFigureOut">
               <a:rPr lang="en-US" smtClean="0"/>
-              <a:t>12/21/11</a:t>
+              <a:t>1/5/12</a:t>
             </a:fld>
             <a:endParaRPr lang="en-US"/>
           </a:p>
@@ -3970,15 +3972,7 @@
           <a:p>
             <a:r>
               <a:rPr lang="en-US" dirty="0" smtClean="0"/>
-              <a:t>Integration </a:t>
-            </a:r>
-            <a:r>
-              <a:rPr lang="en-US" dirty="0" smtClean="0"/>
-              <a:t>of R </a:t>
-            </a:r>
-            <a:r>
-              <a:rPr lang="en-US" dirty="0" smtClean="0"/>
-              <a:t>with </a:t>
+              <a:t>Integration of R with </a:t>
             </a:r>
             <a:r>
               <a:rPr lang="en-US" dirty="0" err="1" smtClean="0"/>
@@ -4459,7 +4453,7 @@
           <a:bodyPr/>
           <a:lstStyle/>
           <a:p>
-            <a:endParaRPr lang="en-US"/>
+            <a:endParaRPr lang="en-US" dirty="0"/>
           </a:p>
         </p:txBody>
       </p:sp>
@@ -4477,6 +4471,114 @@
 </file>
 
 <file path=ppt/slides/slide15.xml><?xml version="1.0" encoding="utf-8"?>
+<p:sld xmlns:a="http://schemas.openxmlformats.org/drawingml/2006/main" xmlns:r="http://schemas.openxmlformats.org/officeDocument/2006/relationships" xmlns:p="http://schemas.openxmlformats.org/presentationml/2006/main">
+  <p:cSld>
+    <p:spTree>
+      <p:nvGrpSpPr>
+        <p:cNvPr id="1" name=""/>
+        <p:cNvGrpSpPr/>
+        <p:nvPr/>
+      </p:nvGrpSpPr>
+      <p:grpSpPr>
+        <a:xfrm>
+          <a:off x="0" y="0"/>
+          <a:ext cx="0" cy="0"/>
+          <a:chOff x="0" y="0"/>
+          <a:chExt cx="0" cy="0"/>
+        </a:xfrm>
+      </p:grpSpPr>
+      <p:sp>
+        <p:nvSpPr>
+          <p:cNvPr id="2" name="Title 1"/>
+          <p:cNvSpPr>
+            <a:spLocks noGrp="1"/>
+          </p:cNvSpPr>
+          <p:nvPr>
+            <p:ph type="title"/>
+          </p:nvPr>
+        </p:nvSpPr>
+        <p:spPr/>
+        <p:txBody>
+          <a:bodyPr/>
+          <a:lstStyle/>
+          <a:p>
+            <a:r>
+              <a:rPr lang="en-US" dirty="0" smtClean="0"/>
+              <a:t>PEG	</a:t>
+            </a:r>
+            <a:endParaRPr lang="en-US" dirty="0"/>
+          </a:p>
+        </p:txBody>
+      </p:sp>
+      <p:sp>
+        <p:nvSpPr>
+          <p:cNvPr id="3" name="Content Placeholder 2"/>
+          <p:cNvSpPr>
+            <a:spLocks noGrp="1"/>
+          </p:cNvSpPr>
+          <p:nvPr>
+            <p:ph idx="1"/>
+          </p:nvPr>
+        </p:nvSpPr>
+        <p:spPr/>
+        <p:txBody>
+          <a:bodyPr/>
+          <a:lstStyle/>
+          <a:p>
+            <a:r>
+              <a:rPr lang="en-US" dirty="0"/>
+              <a:t>Indirect left-recursion is when a rule R calls a rule R′ which then calls R (where R and R′ are distinct rules). Indirect left-recursion adds a number of </a:t>
+            </a:r>
+            <a:r>
+              <a:rPr lang="en-US" dirty="0" smtClean="0"/>
+              <a:t>challenges</a:t>
+            </a:r>
+          </a:p>
+          <a:p>
+            <a:r>
+              <a:rPr lang="en-US" dirty="0"/>
+              <a:t>Direct Left-Recursive Parsing Expression </a:t>
+            </a:r>
+            <a:r>
+              <a:rPr lang="en-US" dirty="0" smtClean="0"/>
+              <a:t>Grammars </a:t>
+            </a:r>
+            <a:r>
+              <a:rPr lang="en-US" dirty="0" smtClean="0">
+                <a:sym typeface="Wingdings"/>
+              </a:rPr>
+              <a:t> PEGs can be </a:t>
+            </a:r>
+            <a:r>
+              <a:rPr lang="en-US" smtClean="0">
+                <a:sym typeface="Wingdings"/>
+              </a:rPr>
+              <a:t>(indirect) left</a:t>
+            </a:r>
+            <a:r>
+              <a:rPr lang="en-US" dirty="0" smtClean="0">
+                <a:sym typeface="Wingdings"/>
+              </a:rPr>
+              <a:t>-recursive</a:t>
+            </a:r>
+            <a:endParaRPr lang="en-US" dirty="0"/>
+          </a:p>
+        </p:txBody>
+      </p:sp>
+    </p:spTree>
+    <p:extLst>
+      <p:ext uri="{BB962C8B-B14F-4D97-AF65-F5344CB8AC3E}">
+        <p14:creationId xmlns:p14="http://schemas.microsoft.com/office/powerpoint/2010/main" val="4256183476"/>
+      </p:ext>
+    </p:extLst>
+  </p:cSld>
+  <p:clrMapOvr>
+    <a:masterClrMapping/>
+  </p:clrMapOvr>
+</p:sld>
+</file>
+
+<file path=ppt/slides/slide16.xml><?xml version="1.0" encoding="utf-8"?>
 <p:sld xmlns:a="http://schemas.openxmlformats.org/drawingml/2006/main" xmlns:r="http://schemas.openxmlformats.org/officeDocument/2006/relationships" xmlns:p="http://schemas.openxmlformats.org/presentationml/2006/main">
   <p:cSld>
     <p:spTree>
@@ -4576,7 +4678,7 @@
 </p:sld>
 </file>
 
-<file path=ppt/slides/slide16.xml><?xml version="1.0" encoding="utf-8"?>
+<file path=ppt/slides/slide17.xml><?xml version="1.0" encoding="utf-8"?>
 <p:sld xmlns:a="http://schemas.openxmlformats.org/drawingml/2006/main" xmlns:r="http://schemas.openxmlformats.org/officeDocument/2006/relationships" xmlns:p="http://schemas.openxmlformats.org/presentationml/2006/main">
   <p:cSld>
     <p:spTree>
@@ -4676,7 +4778,7 @@
 </p:sld>
 </file>
 
-<file path=ppt/slides/slide17.xml><?xml version="1.0" encoding="utf-8"?>
+<file path=ppt/slides/slide18.xml><?xml version="1.0" encoding="utf-8"?>
 <p:sld xmlns:a="http://schemas.openxmlformats.org/drawingml/2006/main" xmlns:r="http://schemas.openxmlformats.org/officeDocument/2006/relationships" xmlns:p="http://schemas.openxmlformats.org/presentationml/2006/main">
   <p:cSld>
     <p:spTree>
@@ -4798,279 +4900,6 @@
 </p:sld>
 </file>
 
-<file path=ppt/slides/slide18.xml><?xml version="1.0" encoding="utf-8"?>
-<p:sld xmlns:a="http://schemas.openxmlformats.org/drawingml/2006/main" xmlns:r="http://schemas.openxmlformats.org/officeDocument/2006/relationships" xmlns:p="http://schemas.openxmlformats.org/presentationml/2006/main">
-  <p:cSld>
-    <p:spTree>
-      <p:nvGrpSpPr>
-        <p:cNvPr id="1" name=""/>
-        <p:cNvGrpSpPr/>
-        <p:nvPr/>
-      </p:nvGrpSpPr>
-      <p:grpSpPr>
-        <a:xfrm>
-          <a:off x="0" y="0"/>
-          <a:ext cx="0" cy="0"/>
-          <a:chOff x="0" y="0"/>
-          <a:chExt cx="0" cy="0"/>
-        </a:xfrm>
-      </p:grpSpPr>
-      <p:sp>
-        <p:nvSpPr>
-          <p:cNvPr id="2" name="Title 1"/>
-          <p:cNvSpPr>
-            <a:spLocks noGrp="1"/>
-          </p:cNvSpPr>
-          <p:nvPr>
-            <p:ph type="title"/>
-          </p:nvPr>
-        </p:nvSpPr>
-        <p:spPr/>
-        <p:txBody>
-          <a:bodyPr>
-            <a:normAutofit fontScale="90000"/>
-          </a:bodyPr>
-          <a:lstStyle/>
-          <a:p>
-            <a:r>
-              <a:rPr lang="en-US" dirty="0" smtClean="0"/>
-              <a:t>Options for code snippet evaluation</a:t>
-            </a:r>
-            <a:endParaRPr lang="en-US" dirty="0"/>
-          </a:p>
-        </p:txBody>
-      </p:sp>
-      <p:sp>
-        <p:nvSpPr>
-          <p:cNvPr id="3" name="Content Placeholder 2"/>
-          <p:cNvSpPr>
-            <a:spLocks noGrp="1"/>
-          </p:cNvSpPr>
-          <p:nvPr>
-            <p:ph idx="1"/>
-          </p:nvPr>
-        </p:nvSpPr>
-        <p:spPr/>
-        <p:txBody>
-          <a:bodyPr>
-            <a:normAutofit fontScale="62500" lnSpcReduction="20000"/>
-          </a:bodyPr>
-          <a:lstStyle/>
-          <a:p>
-            <a:r>
-              <a:rPr lang="en-US" dirty="0" smtClean="0"/>
-              <a:t>R Session has almost complete implementation for console, objects, </a:t>
-            </a:r>
-            <a:r>
-              <a:rPr lang="en-US" dirty="0" err="1" smtClean="0"/>
-              <a:t>etc</a:t>
-            </a:r>
-            <a:endParaRPr lang="en-US" dirty="0" smtClean="0"/>
-          </a:p>
-          <a:p>
-            <a:r>
-              <a:rPr lang="en-US" dirty="0" err="1" smtClean="0"/>
-              <a:t>TextMate</a:t>
-            </a:r>
-            <a:r>
-              <a:rPr lang="en-US" dirty="0" smtClean="0"/>
-              <a:t> </a:t>
-            </a:r>
-            <a:r>
-              <a:rPr lang="en-US" dirty="0" smtClean="0">
-                <a:hlinkClick r:id="rId2"/>
-              </a:rPr>
-              <a:t>bundle</a:t>
-            </a:r>
-            <a:endParaRPr lang="en-US" dirty="0" smtClean="0"/>
-          </a:p>
-          <a:p>
-            <a:pPr lvl="1"/>
-            <a:r>
-              <a:rPr lang="en-US" dirty="0" smtClean="0"/>
-              <a:t>Start R in special mode that reads all input from file and writes all output to another one which then somehow imported into </a:t>
-            </a:r>
-            <a:r>
-              <a:rPr lang="en-US" dirty="0" err="1" smtClean="0"/>
-              <a:t>textmate</a:t>
-            </a:r>
-            <a:endParaRPr lang="en-US" dirty="0" smtClean="0"/>
-          </a:p>
-          <a:p>
-            <a:r>
-              <a:rPr lang="en-US" dirty="0"/>
-              <a:t>I </a:t>
-            </a:r>
-            <a:r>
-              <a:rPr lang="en-US" dirty="0">
-                <a:hlinkClick r:id="rId3"/>
-              </a:rPr>
-              <a:t>think </a:t>
-            </a:r>
-            <a:r>
-              <a:rPr lang="en-US" dirty="0" err="1"/>
-              <a:t>FindWindow</a:t>
-            </a:r>
-            <a:r>
-              <a:rPr lang="en-US" dirty="0"/>
-              <a:t> and </a:t>
-            </a:r>
-            <a:r>
-              <a:rPr lang="en-US" dirty="0" err="1"/>
-              <a:t>SendMessage</a:t>
-            </a:r>
-            <a:r>
-              <a:rPr lang="en-US" dirty="0"/>
-              <a:t> are the functions you want to use, in general</a:t>
-            </a:r>
-            <a:r>
-              <a:rPr lang="en-US" dirty="0" smtClean="0"/>
-              <a:t>.</a:t>
-            </a:r>
-          </a:p>
-          <a:p>
-            <a:r>
-              <a:rPr lang="en-US" dirty="0" smtClean="0"/>
-              <a:t>Use the </a:t>
-            </a:r>
-            <a:r>
-              <a:rPr lang="en-US" dirty="0" smtClean="0">
-                <a:hlinkClick r:id="rId4"/>
-              </a:rPr>
-              <a:t>clipboard</a:t>
-            </a:r>
-            <a:endParaRPr lang="en-US" dirty="0" smtClean="0"/>
-          </a:p>
-          <a:p>
-            <a:r>
-              <a:rPr lang="en-US" dirty="0" err="1" smtClean="0">
-                <a:hlinkClick r:id="rId5"/>
-              </a:rPr>
-              <a:t>Tinn</a:t>
-            </a:r>
-            <a:r>
-              <a:rPr lang="en-US" dirty="0">
-                <a:hlinkClick r:id="rId5"/>
-              </a:rPr>
-              <a:t>-R</a:t>
-            </a:r>
-            <a:r>
-              <a:rPr lang="en-US" dirty="0"/>
-              <a:t>: It also pops up additional menu and toolbar when it detects </a:t>
-            </a:r>
-            <a:r>
-              <a:rPr lang="en-US" dirty="0" err="1"/>
-              <a:t>Rgui</a:t>
-            </a:r>
-            <a:r>
-              <a:rPr lang="en-US" dirty="0"/>
-              <a:t> running on the same computer. These </a:t>
-            </a:r>
-            <a:r>
-              <a:rPr lang="en-US" dirty="0" err="1"/>
-              <a:t>addons</a:t>
-            </a:r>
-            <a:r>
-              <a:rPr lang="en-US" dirty="0"/>
-              <a:t> interact with the R console and allow to submit code in part or in whole and to control R directly</a:t>
-            </a:r>
-            <a:r>
-              <a:rPr lang="en-US" dirty="0" smtClean="0"/>
-              <a:t>. </a:t>
-            </a:r>
-            <a:endParaRPr lang="en-US" dirty="0"/>
-          </a:p>
-          <a:p>
-            <a:pPr lvl="1"/>
-            <a:r>
-              <a:rPr lang="en-US" dirty="0" smtClean="0"/>
-              <a:t>It seems to have some </a:t>
-            </a:r>
-            <a:r>
-              <a:rPr lang="en-US" dirty="0" smtClean="0">
-                <a:hlinkClick r:id="rId6"/>
-              </a:rPr>
-              <a:t>limitations</a:t>
-            </a:r>
-            <a:endParaRPr lang="en-US" dirty="0" smtClean="0"/>
-          </a:p>
-          <a:p>
-            <a:r>
-              <a:rPr lang="en-US" dirty="0" smtClean="0"/>
-              <a:t>Maybe DOM is a </a:t>
-            </a:r>
-            <a:r>
-              <a:rPr lang="en-US" dirty="0" smtClean="0">
-                <a:hlinkClick r:id="rId7"/>
-              </a:rPr>
-              <a:t>solution</a:t>
-            </a:r>
-            <a:r>
-              <a:rPr lang="en-US" dirty="0" smtClean="0"/>
-              <a:t>: </a:t>
-            </a:r>
-            <a:r>
-              <a:rPr lang="en-US" dirty="0" err="1" smtClean="0"/>
-              <a:t>rdom</a:t>
-            </a:r>
-            <a:r>
-              <a:rPr lang="en-US" dirty="0"/>
-              <a:t>, </a:t>
-            </a:r>
-            <a:r>
-              <a:rPr lang="en-US" dirty="0" err="1" smtClean="0"/>
-              <a:t>RDCOMClient</a:t>
-            </a:r>
-            <a:endParaRPr lang="en-US" dirty="0" smtClean="0"/>
-          </a:p>
-          <a:p>
-            <a:r>
-              <a:rPr lang="en-US" dirty="0" smtClean="0"/>
-              <a:t>Or </a:t>
-            </a:r>
-            <a:r>
-              <a:rPr lang="en-US" dirty="0" smtClean="0">
-                <a:hlinkClick r:id="rId8"/>
-              </a:rPr>
-              <a:t>white</a:t>
-            </a:r>
-            <a:r>
-              <a:rPr lang="en-US" dirty="0" smtClean="0"/>
-              <a:t> </a:t>
-            </a:r>
-          </a:p>
-          <a:p>
-            <a:r>
-              <a:rPr lang="en-US" dirty="0" smtClean="0"/>
-              <a:t>Or most promising, we could try to use the </a:t>
-            </a:r>
-            <a:r>
-              <a:rPr lang="en-US" dirty="0" smtClean="0">
-                <a:hlinkClick r:id="rId9"/>
-              </a:rPr>
-              <a:t>windows API</a:t>
-            </a:r>
-            <a:r>
-              <a:rPr lang="en-US" dirty="0" smtClean="0"/>
-              <a:t> via VBScript or C#</a:t>
-            </a:r>
-            <a:endParaRPr lang="en-US" dirty="0"/>
-          </a:p>
-        </p:txBody>
-      </p:sp>
-    </p:spTree>
-    <p:extLst>
-      <p:ext uri="{BB962C8B-B14F-4D97-AF65-F5344CB8AC3E}">
-        <p14:creationId xmlns:p14="http://schemas.microsoft.com/office/powerpoint/2010/main" val="2563764221"/>
-      </p:ext>
-    </p:extLst>
-  </p:cSld>
-  <p:clrMapOvr>
-    <a:masterClrMapping/>
-  </p:clrMapOvr>
-</p:sld>
-</file>
-
 <file path=ppt/slides/slide19.xml><?xml version="1.0" encoding="utf-8"?>
 <p:sld xmlns:a="http://schemas.openxmlformats.org/drawingml/2006/main" xmlns:r="http://schemas.openxmlformats.org/officeDocument/2006/relationships" xmlns:p="http://schemas.openxmlformats.org/presentationml/2006/main">
   <p:cSld>
@@ -5100,12 +4929,14 @@
         </p:nvSpPr>
         <p:spPr/>
         <p:txBody>
-          <a:bodyPr/>
-          <a:lstStyle/>
-          <a:p>
-            <a:r>
-              <a:rPr lang="en-US" dirty="0" smtClean="0"/>
-              <a:t>R Console for Idea</a:t>
+          <a:bodyPr>
+            <a:normAutofit fontScale="90000"/>
+          </a:bodyPr>
+          <a:lstStyle/>
+          <a:p>
+            <a:r>
+              <a:rPr lang="en-US" dirty="0" smtClean="0"/>
+              <a:t>Options for code snippet evaluation</a:t>
             </a:r>
             <a:endParaRPr lang="en-US" dirty="0"/>
           </a:p>
@@ -5123,16 +4954,25 @@
         </p:nvSpPr>
         <p:spPr/>
         <p:txBody>
-          <a:bodyPr/>
-          <a:lstStyle/>
-          <a:p>
-            <a:r>
-              <a:rPr lang="en-US" dirty="0" smtClean="0"/>
-              <a:t>Use </a:t>
+          <a:bodyPr>
+            <a:normAutofit fontScale="62500" lnSpcReduction="20000"/>
+          </a:bodyPr>
+          <a:lstStyle/>
+          <a:p>
+            <a:r>
+              <a:rPr lang="en-US" dirty="0" smtClean="0"/>
+              <a:t>R Session has almost complete implementation for console, objects, </a:t>
             </a:r>
             <a:r>
               <a:rPr lang="en-US" dirty="0" err="1" smtClean="0"/>
-              <a:t>RSession</a:t>
+              <a:t>etc</a:t>
+            </a:r>
+            <a:endParaRPr lang="en-US" dirty="0" smtClean="0"/>
+          </a:p>
+          <a:p>
+            <a:r>
+              <a:rPr lang="en-US" dirty="0" err="1" smtClean="0"/>
+              <a:t>TextMate</a:t>
             </a:r>
             <a:r>
               <a:rPr lang="en-US" dirty="0" smtClean="0"/>
@@ -5142,18 +4982,179 @@
               <a:rPr lang="en-US" dirty="0" smtClean="0">
                 <a:hlinkClick r:id="rId2"/>
               </a:rPr>
+              <a:t>bundle</a:t>
+            </a:r>
+            <a:endParaRPr lang="en-US" dirty="0" smtClean="0"/>
+          </a:p>
+          <a:p>
+            <a:pPr lvl="1"/>
+            <a:r>
+              <a:rPr lang="en-US" dirty="0" smtClean="0"/>
+              <a:t>Start R in special mode that reads all input from file and writes all output to another one which then somehow imported into </a:t>
+            </a:r>
+            <a:r>
+              <a:rPr lang="en-US" dirty="0" err="1" smtClean="0"/>
+              <a:t>textmate</a:t>
+            </a:r>
+            <a:endParaRPr lang="en-US" dirty="0" smtClean="0"/>
+          </a:p>
+          <a:p>
+            <a:r>
+              <a:rPr lang="en-US" dirty="0"/>
+              <a:t>I </a:t>
+            </a:r>
+            <a:r>
+              <a:rPr lang="en-US" dirty="0">
+                <a:hlinkClick r:id="rId3"/>
+              </a:rPr>
+              <a:t>think </a:t>
+            </a:r>
+            <a:r>
+              <a:rPr lang="en-US" dirty="0" err="1"/>
+              <a:t>FindWindow</a:t>
+            </a:r>
+            <a:r>
+              <a:rPr lang="en-US" dirty="0"/>
+              <a:t> and </a:t>
+            </a:r>
+            <a:r>
+              <a:rPr lang="en-US" dirty="0" err="1"/>
+              <a:t>SendMessage</a:t>
+            </a:r>
+            <a:r>
+              <a:rPr lang="en-US" dirty="0"/>
+              <a:t> are the functions you want to use, in general</a:t>
+            </a:r>
+            <a:r>
+              <a:rPr lang="en-US" dirty="0" smtClean="0"/>
+              <a:t>.</a:t>
+            </a:r>
+          </a:p>
+          <a:p>
+            <a:r>
+              <a:rPr lang="en-US" dirty="0" smtClean="0"/>
+              <a:t>Use the </a:t>
+            </a:r>
+            <a:r>
+              <a:rPr lang="en-US" dirty="0" smtClean="0">
+                <a:hlinkClick r:id="rId4"/>
+              </a:rPr>
+              <a:t>clipboard</a:t>
+            </a:r>
+            <a:endParaRPr lang="en-US" dirty="0" smtClean="0"/>
+          </a:p>
+          <a:p>
+            <a:r>
+              <a:rPr lang="en-US" dirty="0" err="1" smtClean="0">
+                <a:hlinkClick r:id="rId5"/>
+              </a:rPr>
+              <a:t>Tinn</a:t>
+            </a:r>
+            <a:r>
+              <a:rPr lang="en-US" dirty="0">
+                <a:hlinkClick r:id="rId5"/>
+              </a:rPr>
+              <a:t>-R</a:t>
+            </a:r>
+            <a:r>
+              <a:rPr lang="en-US" dirty="0"/>
+              <a:t>: It also pops up additional menu and toolbar when it detects </a:t>
+            </a:r>
+            <a:r>
+              <a:rPr lang="en-US" dirty="0" err="1"/>
+              <a:t>Rgui</a:t>
+            </a:r>
+            <a:r>
+              <a:rPr lang="en-US" dirty="0"/>
+              <a:t> running on the same computer. These </a:t>
+            </a:r>
+            <a:r>
+              <a:rPr lang="en-US" dirty="0" err="1"/>
+              <a:t>addons</a:t>
+            </a:r>
+            <a:r>
+              <a:rPr lang="en-US" dirty="0"/>
+              <a:t> interact with the R console and allow to submit code in part or in whole and to control R directly</a:t>
+            </a:r>
+            <a:r>
+              <a:rPr lang="en-US" dirty="0" smtClean="0"/>
+              <a:t>. </a:t>
+            </a:r>
+            <a:endParaRPr lang="en-US" dirty="0"/>
+          </a:p>
+          <a:p>
+            <a:pPr lvl="1"/>
+            <a:r>
+              <a:rPr lang="en-US" dirty="0" smtClean="0"/>
+              <a:t>It seems to have some </a:t>
+            </a:r>
+            <a:r>
+              <a:rPr lang="en-US" dirty="0" smtClean="0">
+                <a:hlinkClick r:id="rId6"/>
+              </a:rPr>
+              <a:t>limitations</a:t>
+            </a:r>
+            <a:endParaRPr lang="en-US" dirty="0" smtClean="0"/>
+          </a:p>
+          <a:p>
+            <a:r>
+              <a:rPr lang="en-US" dirty="0" smtClean="0"/>
+              <a:t>Maybe DOM is a </a:t>
+            </a:r>
+            <a:r>
+              <a:rPr lang="en-US" dirty="0" smtClean="0">
+                <a:hlinkClick r:id="rId7"/>
+              </a:rPr>
               <a:t>solution</a:t>
             </a:r>
+            <a:r>
+              <a:rPr lang="en-US" dirty="0" smtClean="0"/>
+              <a:t>: </a:t>
+            </a:r>
+            <a:r>
+              <a:rPr lang="en-US" dirty="0" err="1" smtClean="0"/>
+              <a:t>rdom</a:t>
+            </a:r>
+            <a:r>
+              <a:rPr lang="en-US" dirty="0"/>
+              <a:t>, </a:t>
+            </a:r>
+            <a:r>
+              <a:rPr lang="en-US" dirty="0" err="1" smtClean="0"/>
+              <a:t>RDCOMClient</a:t>
+            </a:r>
             <a:endParaRPr lang="en-US" dirty="0" smtClean="0"/>
           </a:p>
           <a:p>
             <a:r>
               <a:rPr lang="en-US" dirty="0" smtClean="0"/>
-              <a:t>Learn from </a:t>
-            </a:r>
-            <a:r>
-              <a:rPr lang="en-US" dirty="0" err="1" smtClean="0"/>
-              <a:t>TinnR</a:t>
+              <a:t>Or </a:t>
+            </a:r>
+            <a:r>
+              <a:rPr lang="en-US" dirty="0" smtClean="0">
+                <a:hlinkClick r:id="rId8"/>
+              </a:rPr>
+              <a:t>white</a:t>
+            </a:r>
+            <a:r>
+              <a:rPr lang="en-US" dirty="0" smtClean="0"/>
+              <a:t> </a:t>
+            </a:r>
+          </a:p>
+          <a:p>
+            <a:r>
+              <a:rPr lang="en-US" dirty="0" smtClean="0"/>
+              <a:t>Or most promising, we could try to use the </a:t>
+            </a:r>
+            <a:r>
+              <a:rPr lang="en-US" dirty="0" smtClean="0">
+                <a:hlinkClick r:id="rId9"/>
+              </a:rPr>
+              <a:t>windows API</a:t>
+            </a:r>
+            <a:r>
+              <a:rPr lang="en-US" dirty="0" smtClean="0"/>
+              <a:t> via VBScript or C#</a:t>
             </a:r>
             <a:endParaRPr lang="en-US" dirty="0"/>
           </a:p>
@@ -5162,7 +5163,7 @@
     </p:spTree>
     <p:extLst>
       <p:ext uri="{BB962C8B-B14F-4D97-AF65-F5344CB8AC3E}">
-        <p14:creationId xmlns:p14="http://schemas.microsoft.com/office/powerpoint/2010/main" val="1475125988"/>
+        <p14:creationId xmlns:p14="http://schemas.microsoft.com/office/powerpoint/2010/main" val="2563764221"/>
       </p:ext>
     </p:extLst>
   </p:cSld>
@@ -5311,6 +5312,107 @@
           <a:lstStyle/>
           <a:p>
             <a:r>
+              <a:rPr lang="en-US" dirty="0" smtClean="0"/>
+              <a:t>R Console for Idea</a:t>
+            </a:r>
+            <a:endParaRPr lang="en-US" dirty="0"/>
+          </a:p>
+        </p:txBody>
+      </p:sp>
+      <p:sp>
+        <p:nvSpPr>
+          <p:cNvPr id="3" name="Content Placeholder 2"/>
+          <p:cNvSpPr>
+            <a:spLocks noGrp="1"/>
+          </p:cNvSpPr>
+          <p:nvPr>
+            <p:ph idx="1"/>
+          </p:nvPr>
+        </p:nvSpPr>
+        <p:spPr/>
+        <p:txBody>
+          <a:bodyPr/>
+          <a:lstStyle/>
+          <a:p>
+            <a:r>
+              <a:rPr lang="en-US" dirty="0" smtClean="0"/>
+              <a:t>Use </a:t>
+            </a:r>
+            <a:r>
+              <a:rPr lang="en-US" dirty="0" err="1" smtClean="0"/>
+              <a:t>RSession</a:t>
+            </a:r>
+            <a:r>
+              <a:rPr lang="en-US" dirty="0" smtClean="0"/>
+              <a:t> </a:t>
+            </a:r>
+            <a:r>
+              <a:rPr lang="en-US" dirty="0" smtClean="0">
+                <a:hlinkClick r:id="rId2"/>
+              </a:rPr>
+              <a:t>solution</a:t>
+            </a:r>
+            <a:endParaRPr lang="en-US" dirty="0" smtClean="0"/>
+          </a:p>
+          <a:p>
+            <a:r>
+              <a:rPr lang="en-US" dirty="0" smtClean="0"/>
+              <a:t>Learn from </a:t>
+            </a:r>
+            <a:r>
+              <a:rPr lang="en-US" dirty="0" err="1" smtClean="0"/>
+              <a:t>TinnR</a:t>
+            </a:r>
+            <a:endParaRPr lang="en-US" dirty="0"/>
+          </a:p>
+        </p:txBody>
+      </p:sp>
+    </p:spTree>
+    <p:extLst>
+      <p:ext uri="{BB962C8B-B14F-4D97-AF65-F5344CB8AC3E}">
+        <p14:creationId xmlns:p14="http://schemas.microsoft.com/office/powerpoint/2010/main" val="1475125988"/>
+      </p:ext>
+    </p:extLst>
+  </p:cSld>
+  <p:clrMapOvr>
+    <a:masterClrMapping/>
+  </p:clrMapOvr>
+</p:sld>
+</file>
+
+<file path=ppt/slides/slide21.xml><?xml version="1.0" encoding="utf-8"?>
+<p:sld xmlns:a="http://schemas.openxmlformats.org/drawingml/2006/main" xmlns:r="http://schemas.openxmlformats.org/officeDocument/2006/relationships" xmlns:p="http://schemas.openxmlformats.org/presentationml/2006/main">
+  <p:cSld>
+    <p:spTree>
+      <p:nvGrpSpPr>
+        <p:cNvPr id="1" name=""/>
+        <p:cNvGrpSpPr/>
+        <p:nvPr/>
+      </p:nvGrpSpPr>
+      <p:grpSpPr>
+        <a:xfrm>
+          <a:off x="0" y="0"/>
+          <a:ext cx="0" cy="0"/>
+          <a:chOff x="0" y="0"/>
+          <a:chExt cx="0" cy="0"/>
+        </a:xfrm>
+      </p:grpSpPr>
+      <p:sp>
+        <p:nvSpPr>
+          <p:cNvPr id="2" name="Title 1"/>
+          <p:cNvSpPr>
+            <a:spLocks noGrp="1"/>
+          </p:cNvSpPr>
+          <p:nvPr>
+            <p:ph type="title"/>
+          </p:nvPr>
+        </p:nvSpPr>
+        <p:spPr/>
+        <p:txBody>
+          <a:bodyPr/>
+          <a:lstStyle/>
+          <a:p>
+            <a:r>
               <a:rPr lang="en-US" dirty="0" err="1" smtClean="0">
                 <a:hlinkClick r:id="rId2"/>
               </a:rPr>
@@ -5406,7 +5508,7 @@
 </p:sld>
 </file>
 
-<file path=ppt/slides/slide21.xml><?xml version="1.0" encoding="utf-8"?>
+<file path=ppt/slides/slide22.xml><?xml version="1.0" encoding="utf-8"?>
 <p:sld xmlns:a="http://schemas.openxmlformats.org/drawingml/2006/main" xmlns:r="http://schemas.openxmlformats.org/officeDocument/2006/relationships" xmlns:p="http://schemas.openxmlformats.org/presentationml/2006/main">
   <p:cSld>
     <p:spTree>
@@ -5587,11 +5689,7 @@
             </a:r>
             <a:r>
               <a:rPr lang="en-US" dirty="0" smtClean="0"/>
-              <a:t> (see Bash implementation</a:t>
-            </a:r>
-            <a:r>
-              <a:rPr lang="en-US" dirty="0" smtClean="0"/>
-              <a:t>)</a:t>
+              <a:t> (see Bash implementation)</a:t>
             </a:r>
           </a:p>
           <a:p>

</xml_diff>

<commit_message>
changed lexer to reveal linebreaks
</commit_message>
<xml_diff>
--- a/R4Intellij.pptx
+++ b/R4Intellij.pptx
@@ -5,7 +5,7 @@
     <p:sldMasterId id="2147483648" r:id="rId1"/>
   </p:sldMasterIdLst>
   <p:notesMasterIdLst>
-    <p:notesMasterId r:id="rId24"/>
+    <p:notesMasterId r:id="rId25"/>
   </p:notesMasterIdLst>
   <p:sldIdLst>
     <p:sldId id="256" r:id="rId2"/>
@@ -30,6 +30,7 @@
     <p:sldId id="270" r:id="rId21"/>
     <p:sldId id="273" r:id="rId22"/>
     <p:sldId id="278" r:id="rId23"/>
+    <p:sldId id="280" r:id="rId24"/>
   </p:sldIdLst>
   <p:sldSz cx="9144000" cy="6858000" type="screen4x3"/>
   <p:notesSz cx="6858000" cy="9144000"/>
@@ -175,6 +176,7 @@
           <p14:sldIdLst>
             <p14:sldId id="273"/>
             <p14:sldId id="278"/>
+            <p14:sldId id="280"/>
           </p14:sldIdLst>
         </p14:section>
       </p14:sectionLst>
@@ -4453,6 +4455,22 @@
           <a:bodyPr/>
           <a:lstStyle/>
           <a:p>
+            <a:r>
+              <a:rPr lang="en-US" dirty="0" smtClean="0"/>
+              <a:t>ANTLR </a:t>
+            </a:r>
+            <a:r>
+              <a:rPr lang="en-US" dirty="0"/>
+              <a:t>imposes the convention that </a:t>
+            </a:r>
+            <a:r>
+              <a:rPr lang="en-US" dirty="0" err="1"/>
+              <a:t>lexer</a:t>
+            </a:r>
+            <a:r>
+              <a:rPr lang="en-US" dirty="0"/>
+              <a:t> rules start with an uppercase letter and parser rules with a lowercase letter</a:t>
+            </a:r>
             <a:endParaRPr lang="en-US" dirty="0"/>
           </a:p>
         </p:txBody>
@@ -4522,7 +4540,9 @@
         </p:nvSpPr>
         <p:spPr/>
         <p:txBody>
-          <a:bodyPr/>
+          <a:bodyPr>
+            <a:normAutofit fontScale="92500" lnSpcReduction="10000"/>
+          </a:bodyPr>
           <a:lstStyle/>
           <a:p>
             <a:r>
@@ -4547,19 +4567,28 @@
               <a:rPr lang="en-US" dirty="0" smtClean="0">
                 <a:sym typeface="Wingdings"/>
               </a:rPr>
-              <a:t> PEGs can be </a:t>
-            </a:r>
-            <a:r>
-              <a:rPr lang="en-US" smtClean="0">
+              <a:t> PEGs can be (indirect) left-recursive</a:t>
+            </a:r>
+          </a:p>
+          <a:p>
+            <a:pPr lvl="1"/>
+            <a:r>
+              <a:rPr lang="en-US" dirty="0" err="1" smtClean="0">
                 <a:sym typeface="Wingdings"/>
               </a:rPr>
-              <a:t>(indirect) left</a:t>
+              <a:t>Warth</a:t>
             </a:r>
             <a:r>
               <a:rPr lang="en-US" dirty="0" smtClean="0">
                 <a:sym typeface="Wingdings"/>
               </a:rPr>
-              <a:t>-recursive</a:t>
+              <a:t> idea </a:t>
+            </a:r>
+            <a:r>
+              <a:rPr lang="en-US" dirty="0">
+                <a:sym typeface="Wingdings"/>
+              </a:rPr>
+              <a:t>for packrat parsers: In essence, the parser turns from (recursive) top-down in normal operation to (iterative) bottom-up when left-recursion is detected</a:t>
             </a:r>
             <a:endParaRPr lang="en-US" dirty="0"/>
           </a:p>
@@ -5259,8 +5288,30 @@
           <a:p>
             <a:pPr lvl="1"/>
             <a:r>
-              <a:rPr lang="en-US" dirty="0" err="1"/>
+              <a:rPr lang="en-US" dirty="0" err="1" smtClean="0"/>
               <a:t>ArcFoldingBuilder</a:t>
+            </a:r>
+            <a:endParaRPr lang="en-US" dirty="0" smtClean="0"/>
+          </a:p>
+          <a:p>
+            <a:r>
+              <a:rPr lang="en-US" dirty="0" smtClean="0"/>
+              <a:t>More complete unit test collection</a:t>
+            </a:r>
+          </a:p>
+          <a:p>
+            <a:pPr lvl="1"/>
+            <a:r>
+              <a:rPr lang="en-US" dirty="0" smtClean="0"/>
+              <a:t>See </a:t>
+            </a:r>
+            <a:r>
+              <a:rPr lang="en-US" dirty="0" err="1" smtClean="0"/>
+              <a:t>GrammarKit</a:t>
+            </a:r>
+            <a:r>
+              <a:rPr lang="en-US" dirty="0" smtClean="0"/>
+              <a:t> examples</a:t>
             </a:r>
             <a:endParaRPr lang="en-US" dirty="0"/>
           </a:p>
@@ -5571,6 +5622,74 @@
     <p:extLst>
       <p:ext uri="{BB962C8B-B14F-4D97-AF65-F5344CB8AC3E}">
         <p14:creationId xmlns:p14="http://schemas.microsoft.com/office/powerpoint/2010/main" val="3579938131"/>
+      </p:ext>
+    </p:extLst>
+  </p:cSld>
+  <p:clrMapOvr>
+    <a:masterClrMapping/>
+  </p:clrMapOvr>
+</p:sld>
+</file>
+
+<file path=ppt/slides/slide23.xml><?xml version="1.0" encoding="utf-8"?>
+<p:sld xmlns:a="http://schemas.openxmlformats.org/drawingml/2006/main" xmlns:r="http://schemas.openxmlformats.org/officeDocument/2006/relationships" xmlns:p="http://schemas.openxmlformats.org/presentationml/2006/main">
+  <p:cSld>
+    <p:spTree>
+      <p:nvGrpSpPr>
+        <p:cNvPr id="1" name=""/>
+        <p:cNvGrpSpPr/>
+        <p:nvPr/>
+      </p:nvGrpSpPr>
+      <p:grpSpPr>
+        <a:xfrm>
+          <a:off x="0" y="0"/>
+          <a:ext cx="0" cy="0"/>
+          <a:chOff x="0" y="0"/>
+          <a:chExt cx="0" cy="0"/>
+        </a:xfrm>
+      </p:grpSpPr>
+      <p:sp>
+        <p:nvSpPr>
+          <p:cNvPr id="2" name="Title 1"/>
+          <p:cNvSpPr>
+            <a:spLocks noGrp="1"/>
+          </p:cNvSpPr>
+          <p:nvPr>
+            <p:ph type="title"/>
+          </p:nvPr>
+        </p:nvSpPr>
+        <p:spPr/>
+        <p:txBody>
+          <a:bodyPr/>
+          <a:lstStyle/>
+          <a:p>
+            <a:endParaRPr lang="en-US"/>
+          </a:p>
+        </p:txBody>
+      </p:sp>
+      <p:pic>
+        <p:nvPicPr>
+          <p:cNvPr id="4" name="Content Placeholder 3"/>
+          <p:cNvPicPr>
+            <a:picLocks noGrp="1" noChangeAspect="1"/>
+          </p:cNvPicPr>
+          <p:nvPr>
+            <p:ph idx="1"/>
+          </p:nvPr>
+        </p:nvPicPr>
+        <p:blipFill>
+          <a:blip r:embed="rId2"/>
+          <a:srcRect l="-25482" r="-25482"/>
+          <a:stretch>
+            <a:fillRect/>
+          </a:stretch>
+        </p:blipFill>
+        <p:spPr/>
+      </p:pic>
+    </p:spTree>
+    <p:extLst>
+      <p:ext uri="{BB962C8B-B14F-4D97-AF65-F5344CB8AC3E}">
+        <p14:creationId xmlns:p14="http://schemas.microsoft.com/office/powerpoint/2010/main" val="1633920838"/>
       </p:ext>
     </p:extLst>
   </p:cSld>

</xml_diff>

<commit_message>
implemented function def folding; cleaned up parser classes
</commit_message>
<xml_diff>
--- a/R4Intellij.pptx
+++ b/R4Intellij.pptx
@@ -5,32 +5,33 @@
     <p:sldMasterId id="2147483648" r:id="rId1"/>
   </p:sldMasterIdLst>
   <p:notesMasterIdLst>
-    <p:notesMasterId r:id="rId25"/>
+    <p:notesMasterId r:id="rId26"/>
   </p:notesMasterIdLst>
   <p:sldIdLst>
     <p:sldId id="256" r:id="rId2"/>
-    <p:sldId id="259" r:id="rId3"/>
-    <p:sldId id="260" r:id="rId4"/>
-    <p:sldId id="261" r:id="rId5"/>
-    <p:sldId id="277" r:id="rId6"/>
-    <p:sldId id="258" r:id="rId7"/>
-    <p:sldId id="275" r:id="rId8"/>
-    <p:sldId id="262" r:id="rId9"/>
-    <p:sldId id="264" r:id="rId10"/>
-    <p:sldId id="272" r:id="rId11"/>
-    <p:sldId id="265" r:id="rId12"/>
-    <p:sldId id="266" r:id="rId13"/>
-    <p:sldId id="269" r:id="rId14"/>
-    <p:sldId id="276" r:id="rId15"/>
-    <p:sldId id="279" r:id="rId16"/>
-    <p:sldId id="268" r:id="rId17"/>
-    <p:sldId id="267" r:id="rId18"/>
-    <p:sldId id="274" r:id="rId19"/>
-    <p:sldId id="271" r:id="rId20"/>
-    <p:sldId id="270" r:id="rId21"/>
-    <p:sldId id="273" r:id="rId22"/>
-    <p:sldId id="278" r:id="rId23"/>
-    <p:sldId id="280" r:id="rId24"/>
+    <p:sldId id="281" r:id="rId3"/>
+    <p:sldId id="259" r:id="rId4"/>
+    <p:sldId id="260" r:id="rId5"/>
+    <p:sldId id="261" r:id="rId6"/>
+    <p:sldId id="277" r:id="rId7"/>
+    <p:sldId id="258" r:id="rId8"/>
+    <p:sldId id="275" r:id="rId9"/>
+    <p:sldId id="262" r:id="rId10"/>
+    <p:sldId id="264" r:id="rId11"/>
+    <p:sldId id="272" r:id="rId12"/>
+    <p:sldId id="265" r:id="rId13"/>
+    <p:sldId id="266" r:id="rId14"/>
+    <p:sldId id="269" r:id="rId15"/>
+    <p:sldId id="276" r:id="rId16"/>
+    <p:sldId id="279" r:id="rId17"/>
+    <p:sldId id="268" r:id="rId18"/>
+    <p:sldId id="267" r:id="rId19"/>
+    <p:sldId id="274" r:id="rId20"/>
+    <p:sldId id="271" r:id="rId21"/>
+    <p:sldId id="270" r:id="rId22"/>
+    <p:sldId id="273" r:id="rId23"/>
+    <p:sldId id="278" r:id="rId24"/>
+    <p:sldId id="280" r:id="rId25"/>
   </p:sldIdLst>
   <p:sldSz cx="9144000" cy="6858000" type="screen4x3"/>
   <p:notesSz cx="6858000" cy="9144000"/>
@@ -137,6 +138,11 @@
             <p14:sldId id="256"/>
           </p14:sldIdLst>
         </p14:section>
+        <p14:section name="Changelog" id="{7CC1A45F-6BB7-AE4F-9344-0C84E4E2767F}">
+          <p14:sldIdLst>
+            <p14:sldId id="281"/>
+          </p14:sldIdLst>
+        </p14:section>
         <p14:section name="Roadmap" id="{94DA6817-C3E6-6E46-84C3-EF347EEFF33D}">
           <p14:sldIdLst>
             <p14:sldId id="259"/>
@@ -267,7 +273,7 @@
           <a:p>
             <a:fld id="{87682158-AFB6-1044-826E-FEC32920DECA}" type="datetimeFigureOut">
               <a:rPr lang="en-US" smtClean="0"/>
-              <a:t>1/5/12</a:t>
+              <a:t>1/8/12</a:t>
             </a:fld>
             <a:endParaRPr lang="en-US"/>
           </a:p>
@@ -631,7 +637,7 @@
           <a:p>
             <a:fld id="{4FA87827-956D-2D4E-9772-6863DC7B302B}" type="slidenum">
               <a:rPr lang="en-US" smtClean="0"/>
-              <a:t>7</a:t>
+              <a:t>8</a:t>
             </a:fld>
             <a:endParaRPr lang="en-US"/>
           </a:p>
@@ -731,7 +737,7 @@
           <a:p>
             <a:fld id="{4FA87827-956D-2D4E-9772-6863DC7B302B}" type="slidenum">
               <a:rPr lang="en-US" smtClean="0"/>
-              <a:t>10</a:t>
+              <a:t>11</a:t>
             </a:fld>
             <a:endParaRPr lang="en-US"/>
           </a:p>
@@ -831,7 +837,7 @@
           <a:p>
             <a:fld id="{4FA87827-956D-2D4E-9772-6863DC7B302B}" type="slidenum">
               <a:rPr lang="en-US" smtClean="0"/>
-              <a:t>12</a:t>
+              <a:t>13</a:t>
             </a:fld>
             <a:endParaRPr lang="en-US"/>
           </a:p>
@@ -927,7 +933,7 @@
           <a:p>
             <a:fld id="{4FA87827-956D-2D4E-9772-6863DC7B302B}" type="slidenum">
               <a:rPr lang="en-US" smtClean="0"/>
-              <a:t>16</a:t>
+              <a:t>17</a:t>
             </a:fld>
             <a:endParaRPr lang="en-US"/>
           </a:p>
@@ -1127,7 +1133,7 @@
           <a:p>
             <a:fld id="{903CF105-E729-A944-8550-FE8B359D2D68}" type="datetimeFigureOut">
               <a:rPr lang="en-US" smtClean="0"/>
-              <a:t>1/5/12</a:t>
+              <a:t>1/8/12</a:t>
             </a:fld>
             <a:endParaRPr lang="en-US"/>
           </a:p>
@@ -1297,7 +1303,7 @@
           <a:p>
             <a:fld id="{903CF105-E729-A944-8550-FE8B359D2D68}" type="datetimeFigureOut">
               <a:rPr lang="en-US" smtClean="0"/>
-              <a:t>1/5/12</a:t>
+              <a:t>1/8/12</a:t>
             </a:fld>
             <a:endParaRPr lang="en-US"/>
           </a:p>
@@ -1477,7 +1483,7 @@
           <a:p>
             <a:fld id="{903CF105-E729-A944-8550-FE8B359D2D68}" type="datetimeFigureOut">
               <a:rPr lang="en-US" smtClean="0"/>
-              <a:t>1/5/12</a:t>
+              <a:t>1/8/12</a:t>
             </a:fld>
             <a:endParaRPr lang="en-US"/>
           </a:p>
@@ -1647,7 +1653,7 @@
           <a:p>
             <a:fld id="{903CF105-E729-A944-8550-FE8B359D2D68}" type="datetimeFigureOut">
               <a:rPr lang="en-US" smtClean="0"/>
-              <a:t>1/5/12</a:t>
+              <a:t>1/8/12</a:t>
             </a:fld>
             <a:endParaRPr lang="en-US"/>
           </a:p>
@@ -1893,7 +1899,7 @@
           <a:p>
             <a:fld id="{903CF105-E729-A944-8550-FE8B359D2D68}" type="datetimeFigureOut">
               <a:rPr lang="en-US" smtClean="0"/>
-              <a:t>1/5/12</a:t>
+              <a:t>1/8/12</a:t>
             </a:fld>
             <a:endParaRPr lang="en-US"/>
           </a:p>
@@ -2181,7 +2187,7 @@
           <a:p>
             <a:fld id="{903CF105-E729-A944-8550-FE8B359D2D68}" type="datetimeFigureOut">
               <a:rPr lang="en-US" smtClean="0"/>
-              <a:t>1/5/12</a:t>
+              <a:t>1/8/12</a:t>
             </a:fld>
             <a:endParaRPr lang="en-US"/>
           </a:p>
@@ -2603,7 +2609,7 @@
           <a:p>
             <a:fld id="{903CF105-E729-A944-8550-FE8B359D2D68}" type="datetimeFigureOut">
               <a:rPr lang="en-US" smtClean="0"/>
-              <a:t>1/5/12</a:t>
+              <a:t>1/8/12</a:t>
             </a:fld>
             <a:endParaRPr lang="en-US"/>
           </a:p>
@@ -2721,7 +2727,7 @@
           <a:p>
             <a:fld id="{903CF105-E729-A944-8550-FE8B359D2D68}" type="datetimeFigureOut">
               <a:rPr lang="en-US" smtClean="0"/>
-              <a:t>1/5/12</a:t>
+              <a:t>1/8/12</a:t>
             </a:fld>
             <a:endParaRPr lang="en-US"/>
           </a:p>
@@ -2816,7 +2822,7 @@
           <a:p>
             <a:fld id="{903CF105-E729-A944-8550-FE8B359D2D68}" type="datetimeFigureOut">
               <a:rPr lang="en-US" smtClean="0"/>
-              <a:t>1/5/12</a:t>
+              <a:t>1/8/12</a:t>
             </a:fld>
             <a:endParaRPr lang="en-US"/>
           </a:p>
@@ -3093,7 +3099,7 @@
           <a:p>
             <a:fld id="{903CF105-E729-A944-8550-FE8B359D2D68}" type="datetimeFigureOut">
               <a:rPr lang="en-US" smtClean="0"/>
-              <a:t>1/5/12</a:t>
+              <a:t>1/8/12</a:t>
             </a:fld>
             <a:endParaRPr lang="en-US"/>
           </a:p>
@@ -3346,7 +3352,7 @@
           <a:p>
             <a:fld id="{903CF105-E729-A944-8550-FE8B359D2D68}" type="datetimeFigureOut">
               <a:rPr lang="en-US" smtClean="0"/>
-              <a:t>1/5/12</a:t>
+              <a:t>1/8/12</a:t>
             </a:fld>
             <a:endParaRPr lang="en-US"/>
           </a:p>
@@ -3559,7 +3565,7 @@
           <a:p>
             <a:fld id="{903CF105-E729-A944-8550-FE8B359D2D68}" type="datetimeFigureOut">
               <a:rPr lang="en-US" smtClean="0"/>
-              <a:t>1/5/12</a:t>
+              <a:t>1/8/12</a:t>
             </a:fld>
             <a:endParaRPr lang="en-US"/>
           </a:p>
@@ -4028,6 +4034,204 @@
             <p:ph type="title"/>
           </p:nvPr>
         </p:nvSpPr>
+        <p:spPr/>
+        <p:txBody>
+          <a:bodyPr/>
+          <a:lstStyle/>
+          <a:p>
+            <a:r>
+              <a:rPr lang="en-US" dirty="0" smtClean="0"/>
+              <a:t>Psi parser</a:t>
+            </a:r>
+            <a:endParaRPr lang="en-US" dirty="0"/>
+          </a:p>
+        </p:txBody>
+      </p:sp>
+      <p:sp>
+        <p:nvSpPr>
+          <p:cNvPr id="3" name="Content Placeholder 2"/>
+          <p:cNvSpPr>
+            <a:spLocks noGrp="1"/>
+          </p:cNvSpPr>
+          <p:nvPr>
+            <p:ph idx="1"/>
+          </p:nvPr>
+        </p:nvSpPr>
+        <p:spPr/>
+        <p:txBody>
+          <a:bodyPr>
+            <a:normAutofit fontScale="77500" lnSpcReduction="20000"/>
+          </a:bodyPr>
+          <a:lstStyle/>
+          <a:p>
+            <a:r>
+              <a:rPr lang="en-US" dirty="0" smtClean="0"/>
+              <a:t>Try the grammar kit</a:t>
+            </a:r>
+          </a:p>
+          <a:p>
+            <a:r>
+              <a:rPr lang="en-US" dirty="0" smtClean="0"/>
+              <a:t>The </a:t>
+            </a:r>
+            <a:r>
+              <a:rPr lang="en-US" dirty="0" err="1"/>
+              <a:t>Clojure</a:t>
+            </a:r>
+            <a:r>
+              <a:rPr lang="en-US" dirty="0"/>
+              <a:t> parser is probably the simplest and smallest of all the </a:t>
+            </a:r>
+            <a:r>
+              <a:rPr lang="en-US" dirty="0" smtClean="0"/>
+              <a:t>custom language </a:t>
+            </a:r>
+            <a:r>
+              <a:rPr lang="en-US" dirty="0"/>
+              <a:t>plugins that are maintained by </a:t>
+            </a:r>
+            <a:r>
+              <a:rPr lang="en-US" dirty="0" smtClean="0"/>
+              <a:t>us</a:t>
+            </a:r>
+          </a:p>
+          <a:p>
+            <a:r>
+              <a:rPr lang="en-US" dirty="0"/>
+              <a:t>No, IDEA currently does not have a ready solution for using generated </a:t>
+            </a:r>
+            <a:r>
+              <a:rPr lang="en-US" dirty="0" smtClean="0"/>
+              <a:t>parsers. The </a:t>
+            </a:r>
+            <a:r>
+              <a:rPr lang="en-US" b="1" dirty="0"/>
+              <a:t>typical approach </a:t>
+            </a:r>
+            <a:r>
+              <a:rPr lang="en-US" dirty="0"/>
+              <a:t>when writing parsers in IDEA is to create a method </a:t>
+            </a:r>
+            <a:r>
+              <a:rPr lang="en-US" dirty="0" err="1"/>
+              <a:t>parseSmth</a:t>
+            </a:r>
+            <a:r>
+              <a:rPr lang="en-US" dirty="0"/>
+              <a:t>(</a:t>
+            </a:r>
+            <a:r>
+              <a:rPr lang="en-US" dirty="0" smtClean="0"/>
+              <a:t>). for </a:t>
+            </a:r>
+            <a:r>
+              <a:rPr lang="en-US" dirty="0"/>
+              <a:t>each rule in the grammar, and implement the rule in terms of </a:t>
+            </a:r>
+            <a:r>
+              <a:rPr lang="en-US" dirty="0" err="1" smtClean="0"/>
+              <a:t>PsiBuilder</a:t>
+            </a:r>
+            <a:r>
+              <a:rPr lang="en-US" dirty="0" smtClean="0"/>
+              <a:t> markers.</a:t>
+            </a:r>
+          </a:p>
+          <a:p>
+            <a:r>
+              <a:rPr lang="en-US" dirty="0"/>
+              <a:t>write </a:t>
+            </a:r>
+            <a:r>
+              <a:rPr lang="en-US" dirty="0" err="1"/>
+              <a:t>lexer</a:t>
+            </a:r>
+            <a:r>
+              <a:rPr lang="en-US" dirty="0"/>
+              <a:t> and parser manually (</a:t>
+            </a:r>
+            <a:r>
+              <a:rPr lang="en-US" dirty="0" err="1"/>
+              <a:t>lexer</a:t>
+            </a:r>
+            <a:r>
+              <a:rPr lang="en-US" dirty="0"/>
+              <a:t> is </a:t>
+            </a:r>
+            <a:r>
+              <a:rPr lang="en-US" dirty="0" err="1"/>
+              <a:t>jflex</a:t>
+            </a:r>
+            <a:r>
+              <a:rPr lang="en-US" dirty="0"/>
+              <a:t>-generated and parser is completely by hand) since you have to continue your parsing whatever user types in</a:t>
+            </a:r>
+            <a:r>
+              <a:rPr lang="en-US" dirty="0" smtClean="0"/>
+              <a:t>.</a:t>
+            </a:r>
+          </a:p>
+          <a:p>
+            <a:r>
+              <a:rPr lang="en-US" dirty="0"/>
+              <a:t>Language construction never been easy, it doesn't matter if you do it </a:t>
+            </a:r>
+            <a:r>
+              <a:rPr lang="en-US" dirty="0" smtClean="0"/>
+              <a:t>by</a:t>
+            </a:r>
+            <a:r>
+              <a:rPr lang="en-US" dirty="0"/>
+              <a:t>  hand or by </a:t>
+            </a:r>
+            <a:r>
+              <a:rPr lang="en-US" dirty="0" err="1"/>
+              <a:t>Antlr</a:t>
+            </a:r>
+            <a:endParaRPr lang="en-US" dirty="0"/>
+          </a:p>
+        </p:txBody>
+      </p:sp>
+    </p:spTree>
+    <p:extLst>
+      <p:ext uri="{BB962C8B-B14F-4D97-AF65-F5344CB8AC3E}">
+        <p14:creationId xmlns:p14="http://schemas.microsoft.com/office/powerpoint/2010/main" val="3862011816"/>
+      </p:ext>
+    </p:extLst>
+  </p:cSld>
+  <p:clrMapOvr>
+    <a:masterClrMapping/>
+  </p:clrMapOvr>
+</p:sld>
+</file>
+
+<file path=ppt/slides/slide11.xml><?xml version="1.0" encoding="utf-8"?>
+<p:sld xmlns:a="http://schemas.openxmlformats.org/drawingml/2006/main" xmlns:r="http://schemas.openxmlformats.org/officeDocument/2006/relationships" xmlns:p="http://schemas.openxmlformats.org/presentationml/2006/main">
+  <p:cSld>
+    <p:spTree>
+      <p:nvGrpSpPr>
+        <p:cNvPr id="1" name=""/>
+        <p:cNvGrpSpPr/>
+        <p:nvPr/>
+      </p:nvGrpSpPr>
+      <p:grpSpPr>
+        <a:xfrm>
+          <a:off x="0" y="0"/>
+          <a:ext cx="0" cy="0"/>
+          <a:chOff x="0" y="0"/>
+          <a:chExt cx="0" cy="0"/>
+        </a:xfrm>
+      </p:grpSpPr>
+      <p:sp>
+        <p:nvSpPr>
+          <p:cNvPr id="2" name="Title 1"/>
+          <p:cNvSpPr>
+            <a:spLocks noGrp="1"/>
+          </p:cNvSpPr>
+          <p:nvPr>
+            <p:ph type="title"/>
+          </p:nvPr>
+        </p:nvSpPr>
         <p:spPr>
           <a:xfrm>
             <a:off x="102633" y="292722"/>
@@ -4084,7 +4288,7 @@
 </p:sld>
 </file>
 
-<file path=ppt/slides/slide11.xml><?xml version="1.0" encoding="utf-8"?>
+<file path=ppt/slides/slide12.xml><?xml version="1.0" encoding="utf-8"?>
 <p:sld xmlns:a="http://schemas.openxmlformats.org/drawingml/2006/main" xmlns:r="http://schemas.openxmlformats.org/officeDocument/2006/relationships" xmlns:p="http://schemas.openxmlformats.org/presentationml/2006/main">
   <p:cSld>
     <p:spTree>
@@ -4180,81 +4384,6 @@
 </p:sld>
 </file>
 
-<file path=ppt/slides/slide12.xml><?xml version="1.0" encoding="utf-8"?>
-<p:sld xmlns:a="http://schemas.openxmlformats.org/drawingml/2006/main" xmlns:r="http://schemas.openxmlformats.org/officeDocument/2006/relationships" xmlns:p="http://schemas.openxmlformats.org/presentationml/2006/main">
-  <p:cSld>
-    <p:spTree>
-      <p:nvGrpSpPr>
-        <p:cNvPr id="1" name=""/>
-        <p:cNvGrpSpPr/>
-        <p:nvPr/>
-      </p:nvGrpSpPr>
-      <p:grpSpPr>
-        <a:xfrm>
-          <a:off x="0" y="0"/>
-          <a:ext cx="0" cy="0"/>
-          <a:chOff x="0" y="0"/>
-          <a:chExt cx="0" cy="0"/>
-        </a:xfrm>
-      </p:grpSpPr>
-      <p:sp>
-        <p:nvSpPr>
-          <p:cNvPr id="2" name="Title 1"/>
-          <p:cNvSpPr>
-            <a:spLocks noGrp="1"/>
-          </p:cNvSpPr>
-          <p:nvPr>
-            <p:ph type="title"/>
-          </p:nvPr>
-        </p:nvSpPr>
-        <p:spPr/>
-        <p:txBody>
-          <a:bodyPr/>
-          <a:lstStyle/>
-          <a:p>
-            <a:r>
-              <a:rPr lang="en-US" dirty="0"/>
-              <a:t>Recursive descent parser</a:t>
-            </a:r>
-          </a:p>
-        </p:txBody>
-      </p:sp>
-      <p:sp>
-        <p:nvSpPr>
-          <p:cNvPr id="3" name="Content Placeholder 2"/>
-          <p:cNvSpPr>
-            <a:spLocks noGrp="1"/>
-          </p:cNvSpPr>
-          <p:nvPr>
-            <p:ph idx="1"/>
-          </p:nvPr>
-        </p:nvSpPr>
-        <p:spPr/>
-        <p:txBody>
-          <a:bodyPr/>
-          <a:lstStyle/>
-          <a:p>
-            <a:r>
-              <a:rPr lang="en-US"/>
-              <a:t>kind of top-down parser built from a set of mutually-recursive procedures</a:t>
-            </a:r>
-            <a:endParaRPr lang="en-US" dirty="0"/>
-          </a:p>
-        </p:txBody>
-      </p:sp>
-    </p:spTree>
-    <p:extLst>
-      <p:ext uri="{BB962C8B-B14F-4D97-AF65-F5344CB8AC3E}">
-        <p14:creationId xmlns:p14="http://schemas.microsoft.com/office/powerpoint/2010/main" val="1704516617"/>
-      </p:ext>
-    </p:extLst>
-  </p:cSld>
-  <p:clrMapOvr>
-    <a:masterClrMapping/>
-  </p:clrMapOvr>
-</p:sld>
-</file>
-
 <file path=ppt/slides/slide13.xml><?xml version="1.0" encoding="utf-8"?>
 <p:sld xmlns:a="http://schemas.openxmlformats.org/drawingml/2006/main" xmlns:r="http://schemas.openxmlformats.org/officeDocument/2006/relationships" xmlns:p="http://schemas.openxmlformats.org/presentationml/2006/main">
   <p:cSld>
@@ -4288,14 +4417,9 @@
           <a:lstStyle/>
           <a:p>
             <a:r>
-              <a:rPr lang="en-US" dirty="0" err="1" smtClean="0"/>
-              <a:t>GrammarKit</a:t>
-            </a:r>
-            <a:r>
-              <a:rPr lang="en-US" dirty="0" smtClean="0"/>
-              <a:t> Notes</a:t>
-            </a:r>
-            <a:endParaRPr lang="en-US" dirty="0"/>
+              <a:rPr lang="en-US" dirty="0"/>
+              <a:t>Recursive descent parser</a:t>
+            </a:r>
           </a:p>
         </p:txBody>
       </p:sp>
@@ -4311,77 +4435,12 @@
         </p:nvSpPr>
         <p:spPr/>
         <p:txBody>
-          <a:bodyPr>
-            <a:normAutofit lnSpcReduction="10000"/>
-          </a:bodyPr>
-          <a:lstStyle/>
-          <a:p>
-            <a:r>
-              <a:rPr lang="en-US" dirty="0" smtClean="0"/>
-              <a:t>All used special characters must be named in the token-section of the grammar header</a:t>
-            </a:r>
-          </a:p>
-          <a:p>
-            <a:pPr lvl="1"/>
-            <a:r>
-              <a:rPr lang="en-US" dirty="0" smtClean="0"/>
-              <a:t>Other tokens will be picked up on the fly from the grammar rules (e.g. string, number, id in the </a:t>
-            </a:r>
-            <a:r>
-              <a:rPr lang="en-US" dirty="0" err="1" smtClean="0"/>
-              <a:t>bnf</a:t>
-            </a:r>
-            <a:r>
-              <a:rPr lang="en-US" dirty="0" smtClean="0"/>
-              <a:t>-example)</a:t>
-            </a:r>
-          </a:p>
-          <a:p>
-            <a:pPr lvl="1"/>
-            <a:r>
-              <a:rPr lang="en-US" dirty="0" smtClean="0"/>
-              <a:t>They will be translated </a:t>
-            </a:r>
-            <a:r>
-              <a:rPr lang="en-US" dirty="0"/>
-              <a:t>into </a:t>
-            </a:r>
-            <a:r>
-              <a:rPr lang="en-US" dirty="0" err="1" smtClean="0"/>
-              <a:t>RTokenTypes</a:t>
-            </a:r>
-            <a:r>
-              <a:rPr lang="en-US" dirty="0" smtClean="0"/>
-              <a:t> (</a:t>
-            </a:r>
-            <a:r>
-              <a:rPr lang="en-US" dirty="0" smtClean="0">
-                <a:sym typeface="Wingdings"/>
-              </a:rPr>
-              <a:t></a:t>
-            </a:r>
-            <a:r>
-              <a:rPr lang="en-US" dirty="0" err="1" smtClean="0"/>
-              <a:t>Rtypes</a:t>
-            </a:r>
-            <a:r>
-              <a:rPr lang="en-US" dirty="0" smtClean="0"/>
-              <a:t>)</a:t>
-            </a:r>
-          </a:p>
-          <a:p>
-            <a:pPr lvl="1"/>
-            <a:r>
-              <a:rPr lang="en-US" dirty="0" smtClean="0"/>
-              <a:t>They must be produced by the </a:t>
-            </a:r>
-            <a:r>
-              <a:rPr lang="en-US" dirty="0" err="1" smtClean="0"/>
-              <a:t>Lexer</a:t>
-            </a:r>
-            <a:r>
-              <a:rPr lang="en-US" dirty="0" smtClean="0"/>
-              <a:t>! (And just those, as other tokens will be ignored by the generated parser)</a:t>
+          <a:bodyPr/>
+          <a:lstStyle/>
+          <a:p>
+            <a:r>
+              <a:rPr lang="en-US"/>
+              <a:t>kind of top-down parser built from a set of mutually-recursive procedures</a:t>
             </a:r>
             <a:endParaRPr lang="en-US" dirty="0"/>
           </a:p>
@@ -4390,7 +4449,7 @@
     </p:spTree>
     <p:extLst>
       <p:ext uri="{BB962C8B-B14F-4D97-AF65-F5344CB8AC3E}">
-        <p14:creationId xmlns:p14="http://schemas.microsoft.com/office/powerpoint/2010/main" val="2865957318"/>
+        <p14:creationId xmlns:p14="http://schemas.microsoft.com/office/powerpoint/2010/main" val="1704516617"/>
       </p:ext>
     </p:extLst>
   </p:cSld>
@@ -4433,8 +4492,12 @@
           <a:lstStyle/>
           <a:p>
             <a:r>
-              <a:rPr lang="en-US" dirty="0" smtClean="0"/>
-              <a:t>ANTLR notes</a:t>
+              <a:rPr lang="en-US" dirty="0" err="1" smtClean="0"/>
+              <a:t>GrammarKit</a:t>
+            </a:r>
+            <a:r>
+              <a:rPr lang="en-US" dirty="0" smtClean="0"/>
+              <a:t> Notes</a:t>
             </a:r>
             <a:endParaRPr lang="en-US" dirty="0"/>
           </a:p>
@@ -4452,24 +4515,77 @@
         </p:nvSpPr>
         <p:spPr/>
         <p:txBody>
-          <a:bodyPr/>
-          <a:lstStyle/>
-          <a:p>
-            <a:r>
-              <a:rPr lang="en-US" dirty="0" smtClean="0"/>
-              <a:t>ANTLR </a:t>
-            </a:r>
-            <a:r>
-              <a:rPr lang="en-US" dirty="0"/>
-              <a:t>imposes the convention that </a:t>
-            </a:r>
-            <a:r>
-              <a:rPr lang="en-US" dirty="0" err="1"/>
-              <a:t>lexer</a:t>
-            </a:r>
-            <a:r>
-              <a:rPr lang="en-US" dirty="0"/>
-              <a:t> rules start with an uppercase letter and parser rules with a lowercase letter</a:t>
+          <a:bodyPr>
+            <a:normAutofit lnSpcReduction="10000"/>
+          </a:bodyPr>
+          <a:lstStyle/>
+          <a:p>
+            <a:r>
+              <a:rPr lang="en-US" dirty="0" smtClean="0"/>
+              <a:t>All used special characters must be named in the token-section of the grammar header</a:t>
+            </a:r>
+          </a:p>
+          <a:p>
+            <a:pPr lvl="1"/>
+            <a:r>
+              <a:rPr lang="en-US" dirty="0" smtClean="0"/>
+              <a:t>Other tokens will be picked up on the fly from the grammar rules (e.g. string, number, id in the </a:t>
+            </a:r>
+            <a:r>
+              <a:rPr lang="en-US" dirty="0" err="1" smtClean="0"/>
+              <a:t>bnf</a:t>
+            </a:r>
+            <a:r>
+              <a:rPr lang="en-US" dirty="0" smtClean="0"/>
+              <a:t>-example)</a:t>
+            </a:r>
+          </a:p>
+          <a:p>
+            <a:pPr lvl="1"/>
+            <a:r>
+              <a:rPr lang="en-US" dirty="0" smtClean="0"/>
+              <a:t>They will be translated </a:t>
+            </a:r>
+            <a:r>
+              <a:rPr lang="en-US" dirty="0"/>
+              <a:t>into </a:t>
+            </a:r>
+            <a:r>
+              <a:rPr lang="en-US" dirty="0" err="1" smtClean="0"/>
+              <a:t>RTokenTypes</a:t>
+            </a:r>
+            <a:r>
+              <a:rPr lang="en-US" dirty="0" smtClean="0"/>
+              <a:t> (</a:t>
+            </a:r>
+            <a:r>
+              <a:rPr lang="en-US" dirty="0" smtClean="0">
+                <a:sym typeface="Wingdings"/>
+              </a:rPr>
+              <a:t></a:t>
+            </a:r>
+            <a:r>
+              <a:rPr lang="en-US" dirty="0" err="1" smtClean="0"/>
+              <a:t>Rtypes</a:t>
+            </a:r>
+            <a:r>
+              <a:rPr lang="en-US" dirty="0" smtClean="0"/>
+              <a:t>)</a:t>
+            </a:r>
+          </a:p>
+          <a:p>
+            <a:pPr lvl="1"/>
+            <a:r>
+              <a:rPr lang="en-US" dirty="0" smtClean="0"/>
+              <a:t>They must be produced by the </a:t>
+            </a:r>
+            <a:r>
+              <a:rPr lang="en-US" dirty="0" err="1" smtClean="0"/>
+              <a:t>Lexer</a:t>
+            </a:r>
+            <a:r>
+              <a:rPr lang="en-US" dirty="0" smtClean="0"/>
+              <a:t>! (And just those, as other tokens will be ignored by the generated parser)</a:t>
             </a:r>
             <a:endParaRPr lang="en-US" dirty="0"/>
           </a:p>
@@ -4478,7 +4594,7 @@
     </p:spTree>
     <p:extLst>
       <p:ext uri="{BB962C8B-B14F-4D97-AF65-F5344CB8AC3E}">
-        <p14:creationId xmlns:p14="http://schemas.microsoft.com/office/powerpoint/2010/main" val="3457731727"/>
+        <p14:creationId xmlns:p14="http://schemas.microsoft.com/office/powerpoint/2010/main" val="2865957318"/>
       </p:ext>
     </p:extLst>
   </p:cSld>
@@ -4522,6 +4638,93 @@
           <a:p>
             <a:r>
               <a:rPr lang="en-US" dirty="0" smtClean="0"/>
+              <a:t>ANTLR notes</a:t>
+            </a:r>
+            <a:endParaRPr lang="en-US" dirty="0"/>
+          </a:p>
+        </p:txBody>
+      </p:sp>
+      <p:sp>
+        <p:nvSpPr>
+          <p:cNvPr id="3" name="Content Placeholder 2"/>
+          <p:cNvSpPr>
+            <a:spLocks noGrp="1"/>
+          </p:cNvSpPr>
+          <p:nvPr>
+            <p:ph idx="1"/>
+          </p:nvPr>
+        </p:nvSpPr>
+        <p:spPr/>
+        <p:txBody>
+          <a:bodyPr/>
+          <a:lstStyle/>
+          <a:p>
+            <a:r>
+              <a:rPr lang="en-US" dirty="0" smtClean="0"/>
+              <a:t>ANTLR </a:t>
+            </a:r>
+            <a:r>
+              <a:rPr lang="en-US" dirty="0"/>
+              <a:t>imposes the convention that </a:t>
+            </a:r>
+            <a:r>
+              <a:rPr lang="en-US" dirty="0" err="1"/>
+              <a:t>lexer</a:t>
+            </a:r>
+            <a:r>
+              <a:rPr lang="en-US" dirty="0"/>
+              <a:t> rules start with an uppercase letter and parser rules with a lowercase letter</a:t>
+            </a:r>
+          </a:p>
+        </p:txBody>
+      </p:sp>
+    </p:spTree>
+    <p:extLst>
+      <p:ext uri="{BB962C8B-B14F-4D97-AF65-F5344CB8AC3E}">
+        <p14:creationId xmlns:p14="http://schemas.microsoft.com/office/powerpoint/2010/main" val="3457731727"/>
+      </p:ext>
+    </p:extLst>
+  </p:cSld>
+  <p:clrMapOvr>
+    <a:masterClrMapping/>
+  </p:clrMapOvr>
+</p:sld>
+</file>
+
+<file path=ppt/slides/slide16.xml><?xml version="1.0" encoding="utf-8"?>
+<p:sld xmlns:a="http://schemas.openxmlformats.org/drawingml/2006/main" xmlns:r="http://schemas.openxmlformats.org/officeDocument/2006/relationships" xmlns:p="http://schemas.openxmlformats.org/presentationml/2006/main">
+  <p:cSld>
+    <p:spTree>
+      <p:nvGrpSpPr>
+        <p:cNvPr id="1" name=""/>
+        <p:cNvGrpSpPr/>
+        <p:nvPr/>
+      </p:nvGrpSpPr>
+      <p:grpSpPr>
+        <a:xfrm>
+          <a:off x="0" y="0"/>
+          <a:ext cx="0" cy="0"/>
+          <a:chOff x="0" y="0"/>
+          <a:chExt cx="0" cy="0"/>
+        </a:xfrm>
+      </p:grpSpPr>
+      <p:sp>
+        <p:nvSpPr>
+          <p:cNvPr id="2" name="Title 1"/>
+          <p:cNvSpPr>
+            <a:spLocks noGrp="1"/>
+          </p:cNvSpPr>
+          <p:nvPr>
+            <p:ph type="title"/>
+          </p:nvPr>
+        </p:nvSpPr>
+        <p:spPr/>
+        <p:txBody>
+          <a:bodyPr/>
+          <a:lstStyle/>
+          <a:p>
+            <a:r>
+              <a:rPr lang="en-US" dirty="0" smtClean="0"/>
               <a:t>PEG	</a:t>
             </a:r>
             <a:endParaRPr lang="en-US" dirty="0"/>
@@ -4607,7 +4810,7 @@
 </p:sld>
 </file>
 
-<file path=ppt/slides/slide16.xml><?xml version="1.0" encoding="utf-8"?>
+<file path=ppt/slides/slide17.xml><?xml version="1.0" encoding="utf-8"?>
 <p:sld xmlns:a="http://schemas.openxmlformats.org/drawingml/2006/main" xmlns:r="http://schemas.openxmlformats.org/officeDocument/2006/relationships" xmlns:p="http://schemas.openxmlformats.org/presentationml/2006/main">
   <p:cSld>
     <p:spTree>
@@ -4707,7 +4910,7 @@
 </p:sld>
 </file>
 
-<file path=ppt/slides/slide17.xml><?xml version="1.0" encoding="utf-8"?>
+<file path=ppt/slides/slide18.xml><?xml version="1.0" encoding="utf-8"?>
 <p:sld xmlns:a="http://schemas.openxmlformats.org/drawingml/2006/main" xmlns:r="http://schemas.openxmlformats.org/officeDocument/2006/relationships" xmlns:p="http://schemas.openxmlformats.org/presentationml/2006/main">
   <p:cSld>
     <p:spTree>
@@ -4807,7 +5010,7 @@
 </p:sld>
 </file>
 
-<file path=ppt/slides/slide18.xml><?xml version="1.0" encoding="utf-8"?>
+<file path=ppt/slides/slide19.xml><?xml version="1.0" encoding="utf-8"?>
 <p:sld xmlns:a="http://schemas.openxmlformats.org/drawingml/2006/main" xmlns:r="http://schemas.openxmlformats.org/officeDocument/2006/relationships" xmlns:p="http://schemas.openxmlformats.org/presentationml/2006/main">
   <p:cSld>
     <p:spTree>
@@ -4929,279 +5132,6 @@
 </p:sld>
 </file>
 
-<file path=ppt/slides/slide19.xml><?xml version="1.0" encoding="utf-8"?>
-<p:sld xmlns:a="http://schemas.openxmlformats.org/drawingml/2006/main" xmlns:r="http://schemas.openxmlformats.org/officeDocument/2006/relationships" xmlns:p="http://schemas.openxmlformats.org/presentationml/2006/main">
-  <p:cSld>
-    <p:spTree>
-      <p:nvGrpSpPr>
-        <p:cNvPr id="1" name=""/>
-        <p:cNvGrpSpPr/>
-        <p:nvPr/>
-      </p:nvGrpSpPr>
-      <p:grpSpPr>
-        <a:xfrm>
-          <a:off x="0" y="0"/>
-          <a:ext cx="0" cy="0"/>
-          <a:chOff x="0" y="0"/>
-          <a:chExt cx="0" cy="0"/>
-        </a:xfrm>
-      </p:grpSpPr>
-      <p:sp>
-        <p:nvSpPr>
-          <p:cNvPr id="2" name="Title 1"/>
-          <p:cNvSpPr>
-            <a:spLocks noGrp="1"/>
-          </p:cNvSpPr>
-          <p:nvPr>
-            <p:ph type="title"/>
-          </p:nvPr>
-        </p:nvSpPr>
-        <p:spPr/>
-        <p:txBody>
-          <a:bodyPr>
-            <a:normAutofit fontScale="90000"/>
-          </a:bodyPr>
-          <a:lstStyle/>
-          <a:p>
-            <a:r>
-              <a:rPr lang="en-US" dirty="0" smtClean="0"/>
-              <a:t>Options for code snippet evaluation</a:t>
-            </a:r>
-            <a:endParaRPr lang="en-US" dirty="0"/>
-          </a:p>
-        </p:txBody>
-      </p:sp>
-      <p:sp>
-        <p:nvSpPr>
-          <p:cNvPr id="3" name="Content Placeholder 2"/>
-          <p:cNvSpPr>
-            <a:spLocks noGrp="1"/>
-          </p:cNvSpPr>
-          <p:nvPr>
-            <p:ph idx="1"/>
-          </p:nvPr>
-        </p:nvSpPr>
-        <p:spPr/>
-        <p:txBody>
-          <a:bodyPr>
-            <a:normAutofit fontScale="62500" lnSpcReduction="20000"/>
-          </a:bodyPr>
-          <a:lstStyle/>
-          <a:p>
-            <a:r>
-              <a:rPr lang="en-US" dirty="0" smtClean="0"/>
-              <a:t>R Session has almost complete implementation for console, objects, </a:t>
-            </a:r>
-            <a:r>
-              <a:rPr lang="en-US" dirty="0" err="1" smtClean="0"/>
-              <a:t>etc</a:t>
-            </a:r>
-            <a:endParaRPr lang="en-US" dirty="0" smtClean="0"/>
-          </a:p>
-          <a:p>
-            <a:r>
-              <a:rPr lang="en-US" dirty="0" err="1" smtClean="0"/>
-              <a:t>TextMate</a:t>
-            </a:r>
-            <a:r>
-              <a:rPr lang="en-US" dirty="0" smtClean="0"/>
-              <a:t> </a:t>
-            </a:r>
-            <a:r>
-              <a:rPr lang="en-US" dirty="0" smtClean="0">
-                <a:hlinkClick r:id="rId2"/>
-              </a:rPr>
-              <a:t>bundle</a:t>
-            </a:r>
-            <a:endParaRPr lang="en-US" dirty="0" smtClean="0"/>
-          </a:p>
-          <a:p>
-            <a:pPr lvl="1"/>
-            <a:r>
-              <a:rPr lang="en-US" dirty="0" smtClean="0"/>
-              <a:t>Start R in special mode that reads all input from file and writes all output to another one which then somehow imported into </a:t>
-            </a:r>
-            <a:r>
-              <a:rPr lang="en-US" dirty="0" err="1" smtClean="0"/>
-              <a:t>textmate</a:t>
-            </a:r>
-            <a:endParaRPr lang="en-US" dirty="0" smtClean="0"/>
-          </a:p>
-          <a:p>
-            <a:r>
-              <a:rPr lang="en-US" dirty="0"/>
-              <a:t>I </a:t>
-            </a:r>
-            <a:r>
-              <a:rPr lang="en-US" dirty="0">
-                <a:hlinkClick r:id="rId3"/>
-              </a:rPr>
-              <a:t>think </a:t>
-            </a:r>
-            <a:r>
-              <a:rPr lang="en-US" dirty="0" err="1"/>
-              <a:t>FindWindow</a:t>
-            </a:r>
-            <a:r>
-              <a:rPr lang="en-US" dirty="0"/>
-              <a:t> and </a:t>
-            </a:r>
-            <a:r>
-              <a:rPr lang="en-US" dirty="0" err="1"/>
-              <a:t>SendMessage</a:t>
-            </a:r>
-            <a:r>
-              <a:rPr lang="en-US" dirty="0"/>
-              <a:t> are the functions you want to use, in general</a:t>
-            </a:r>
-            <a:r>
-              <a:rPr lang="en-US" dirty="0" smtClean="0"/>
-              <a:t>.</a:t>
-            </a:r>
-          </a:p>
-          <a:p>
-            <a:r>
-              <a:rPr lang="en-US" dirty="0" smtClean="0"/>
-              <a:t>Use the </a:t>
-            </a:r>
-            <a:r>
-              <a:rPr lang="en-US" dirty="0" smtClean="0">
-                <a:hlinkClick r:id="rId4"/>
-              </a:rPr>
-              <a:t>clipboard</a:t>
-            </a:r>
-            <a:endParaRPr lang="en-US" dirty="0" smtClean="0"/>
-          </a:p>
-          <a:p>
-            <a:r>
-              <a:rPr lang="en-US" dirty="0" err="1" smtClean="0">
-                <a:hlinkClick r:id="rId5"/>
-              </a:rPr>
-              <a:t>Tinn</a:t>
-            </a:r>
-            <a:r>
-              <a:rPr lang="en-US" dirty="0">
-                <a:hlinkClick r:id="rId5"/>
-              </a:rPr>
-              <a:t>-R</a:t>
-            </a:r>
-            <a:r>
-              <a:rPr lang="en-US" dirty="0"/>
-              <a:t>: It also pops up additional menu and toolbar when it detects </a:t>
-            </a:r>
-            <a:r>
-              <a:rPr lang="en-US" dirty="0" err="1"/>
-              <a:t>Rgui</a:t>
-            </a:r>
-            <a:r>
-              <a:rPr lang="en-US" dirty="0"/>
-              <a:t> running on the same computer. These </a:t>
-            </a:r>
-            <a:r>
-              <a:rPr lang="en-US" dirty="0" err="1"/>
-              <a:t>addons</a:t>
-            </a:r>
-            <a:r>
-              <a:rPr lang="en-US" dirty="0"/>
-              <a:t> interact with the R console and allow to submit code in part or in whole and to control R directly</a:t>
-            </a:r>
-            <a:r>
-              <a:rPr lang="en-US" dirty="0" smtClean="0"/>
-              <a:t>. </a:t>
-            </a:r>
-            <a:endParaRPr lang="en-US" dirty="0"/>
-          </a:p>
-          <a:p>
-            <a:pPr lvl="1"/>
-            <a:r>
-              <a:rPr lang="en-US" dirty="0" smtClean="0"/>
-              <a:t>It seems to have some </a:t>
-            </a:r>
-            <a:r>
-              <a:rPr lang="en-US" dirty="0" smtClean="0">
-                <a:hlinkClick r:id="rId6"/>
-              </a:rPr>
-              <a:t>limitations</a:t>
-            </a:r>
-            <a:endParaRPr lang="en-US" dirty="0" smtClean="0"/>
-          </a:p>
-          <a:p>
-            <a:r>
-              <a:rPr lang="en-US" dirty="0" smtClean="0"/>
-              <a:t>Maybe DOM is a </a:t>
-            </a:r>
-            <a:r>
-              <a:rPr lang="en-US" dirty="0" smtClean="0">
-                <a:hlinkClick r:id="rId7"/>
-              </a:rPr>
-              <a:t>solution</a:t>
-            </a:r>
-            <a:r>
-              <a:rPr lang="en-US" dirty="0" smtClean="0"/>
-              <a:t>: </a:t>
-            </a:r>
-            <a:r>
-              <a:rPr lang="en-US" dirty="0" err="1" smtClean="0"/>
-              <a:t>rdom</a:t>
-            </a:r>
-            <a:r>
-              <a:rPr lang="en-US" dirty="0"/>
-              <a:t>, </a:t>
-            </a:r>
-            <a:r>
-              <a:rPr lang="en-US" dirty="0" err="1" smtClean="0"/>
-              <a:t>RDCOMClient</a:t>
-            </a:r>
-            <a:endParaRPr lang="en-US" dirty="0" smtClean="0"/>
-          </a:p>
-          <a:p>
-            <a:r>
-              <a:rPr lang="en-US" dirty="0" smtClean="0"/>
-              <a:t>Or </a:t>
-            </a:r>
-            <a:r>
-              <a:rPr lang="en-US" dirty="0" smtClean="0">
-                <a:hlinkClick r:id="rId8"/>
-              </a:rPr>
-              <a:t>white</a:t>
-            </a:r>
-            <a:r>
-              <a:rPr lang="en-US" dirty="0" smtClean="0"/>
-              <a:t> </a:t>
-            </a:r>
-          </a:p>
-          <a:p>
-            <a:r>
-              <a:rPr lang="en-US" dirty="0" smtClean="0"/>
-              <a:t>Or most promising, we could try to use the </a:t>
-            </a:r>
-            <a:r>
-              <a:rPr lang="en-US" dirty="0" smtClean="0">
-                <a:hlinkClick r:id="rId9"/>
-              </a:rPr>
-              <a:t>windows API</a:t>
-            </a:r>
-            <a:r>
-              <a:rPr lang="en-US" dirty="0" smtClean="0"/>
-              <a:t> via VBScript or C#</a:t>
-            </a:r>
-            <a:endParaRPr lang="en-US" dirty="0"/>
-          </a:p>
-        </p:txBody>
-      </p:sp>
-    </p:spTree>
-    <p:extLst>
-      <p:ext uri="{BB962C8B-B14F-4D97-AF65-F5344CB8AC3E}">
-        <p14:creationId xmlns:p14="http://schemas.microsoft.com/office/powerpoint/2010/main" val="2563764221"/>
-      </p:ext>
-    </p:extLst>
-  </p:cSld>
-  <p:clrMapOvr>
-    <a:masterClrMapping/>
-  </p:clrMapOvr>
-</p:sld>
-</file>
-
 <file path=ppt/slides/slide2.xml><?xml version="1.0" encoding="utf-8"?>
 <p:sld xmlns:a="http://schemas.openxmlformats.org/drawingml/2006/main" xmlns:r="http://schemas.openxmlformats.org/officeDocument/2006/relationships" xmlns:p="http://schemas.openxmlformats.org/presentationml/2006/main">
   <p:cSld>
@@ -5236,7 +5166,7 @@
           <a:p>
             <a:r>
               <a:rPr lang="en-US" dirty="0" smtClean="0"/>
-              <a:t>Roadmap (coming soon)</a:t>
+              <a:t>v0.5</a:t>
             </a:r>
             <a:endParaRPr lang="en-US" dirty="0"/>
           </a:p>
@@ -5259,59 +5189,21 @@
           <a:p>
             <a:r>
               <a:rPr lang="en-US" dirty="0" smtClean="0"/>
-              <a:t>Live Templates</a:t>
-            </a:r>
-          </a:p>
-          <a:p>
+              <a:t>R Parser that allows for basic error highlighting</a:t>
+            </a:r>
+          </a:p>
+          <a:p>
+            <a:r>
+              <a:rPr lang="en-US" dirty="0" smtClean="0"/>
+              <a:t>Code Folding for function </a:t>
+            </a:r>
             <a:r>
               <a:rPr lang="en-US" dirty="0" err="1" smtClean="0"/>
-              <a:t>Quickfixes</a:t>
-            </a:r>
-            <a:r>
-              <a:rPr lang="en-US" dirty="0" smtClean="0"/>
-              <a:t> for common problems</a:t>
-            </a:r>
-          </a:p>
-          <a:p>
-            <a:pPr lvl="1"/>
-            <a:r>
-              <a:rPr lang="en-US" dirty="0" smtClean="0"/>
-              <a:t>Incorrect subset</a:t>
-            </a:r>
-          </a:p>
-          <a:p>
-            <a:r>
-              <a:rPr lang="en-US" dirty="0" smtClean="0"/>
-              <a:t>Folding</a:t>
-            </a:r>
-          </a:p>
-          <a:p>
-            <a:pPr lvl="1"/>
-            <a:r>
-              <a:rPr lang="en-US" dirty="0" err="1" smtClean="0"/>
-              <a:t>ArcFoldingBuilder</a:t>
-            </a:r>
-            <a:endParaRPr lang="en-US" dirty="0" smtClean="0"/>
-          </a:p>
-          <a:p>
-            <a:r>
-              <a:rPr lang="en-US" dirty="0" smtClean="0"/>
-              <a:t>More complete unit test collection</a:t>
-            </a:r>
-          </a:p>
-          <a:p>
-            <a:pPr lvl="1"/>
-            <a:r>
-              <a:rPr lang="en-US" dirty="0" smtClean="0"/>
-              <a:t>See </a:t>
-            </a:r>
-            <a:r>
-              <a:rPr lang="en-US" dirty="0" err="1" smtClean="0"/>
-              <a:t>GrammarKit</a:t>
-            </a:r>
-            <a:r>
-              <a:rPr lang="en-US" dirty="0" smtClean="0"/>
-              <a:t> examples</a:t>
+              <a:t>defitions</a:t>
+            </a:r>
+            <a:r>
+              <a:rPr lang="en-US" dirty="0" smtClean="0"/>
+              <a:t> </a:t>
             </a:r>
             <a:endParaRPr lang="en-US" dirty="0"/>
           </a:p>
@@ -5320,7 +5212,7 @@
     </p:spTree>
     <p:extLst>
       <p:ext uri="{BB962C8B-B14F-4D97-AF65-F5344CB8AC3E}">
-        <p14:creationId xmlns:p14="http://schemas.microsoft.com/office/powerpoint/2010/main" val="3335867933"/>
+        <p14:creationId xmlns:p14="http://schemas.microsoft.com/office/powerpoint/2010/main" val="1953636889"/>
       </p:ext>
     </p:extLst>
   </p:cSld>
@@ -5359,12 +5251,14 @@
         </p:nvSpPr>
         <p:spPr/>
         <p:txBody>
-          <a:bodyPr/>
-          <a:lstStyle/>
-          <a:p>
-            <a:r>
-              <a:rPr lang="en-US" dirty="0" smtClean="0"/>
-              <a:t>R Console for Idea</a:t>
+          <a:bodyPr>
+            <a:normAutofit fontScale="90000"/>
+          </a:bodyPr>
+          <a:lstStyle/>
+          <a:p>
+            <a:r>
+              <a:rPr lang="en-US" dirty="0" smtClean="0"/>
+              <a:t>Options for code snippet evaluation</a:t>
             </a:r>
             <a:endParaRPr lang="en-US" dirty="0"/>
           </a:p>
@@ -5382,16 +5276,25 @@
         </p:nvSpPr>
         <p:spPr/>
         <p:txBody>
-          <a:bodyPr/>
-          <a:lstStyle/>
-          <a:p>
-            <a:r>
-              <a:rPr lang="en-US" dirty="0" smtClean="0"/>
-              <a:t>Use </a:t>
+          <a:bodyPr>
+            <a:normAutofit fontScale="62500" lnSpcReduction="20000"/>
+          </a:bodyPr>
+          <a:lstStyle/>
+          <a:p>
+            <a:r>
+              <a:rPr lang="en-US" dirty="0" smtClean="0"/>
+              <a:t>R Session has almost complete implementation for console, objects, </a:t>
             </a:r>
             <a:r>
               <a:rPr lang="en-US" dirty="0" err="1" smtClean="0"/>
-              <a:t>RSession</a:t>
+              <a:t>etc</a:t>
+            </a:r>
+            <a:endParaRPr lang="en-US" dirty="0" smtClean="0"/>
+          </a:p>
+          <a:p>
+            <a:r>
+              <a:rPr lang="en-US" dirty="0" err="1" smtClean="0"/>
+              <a:t>TextMate</a:t>
             </a:r>
             <a:r>
               <a:rPr lang="en-US" dirty="0" smtClean="0"/>
@@ -5401,18 +5304,179 @@
               <a:rPr lang="en-US" dirty="0" smtClean="0">
                 <a:hlinkClick r:id="rId2"/>
               </a:rPr>
+              <a:t>bundle</a:t>
+            </a:r>
+            <a:endParaRPr lang="en-US" dirty="0" smtClean="0"/>
+          </a:p>
+          <a:p>
+            <a:pPr lvl="1"/>
+            <a:r>
+              <a:rPr lang="en-US" dirty="0" smtClean="0"/>
+              <a:t>Start R in special mode that reads all input from file and writes all output to another one which then somehow imported into </a:t>
+            </a:r>
+            <a:r>
+              <a:rPr lang="en-US" dirty="0" err="1" smtClean="0"/>
+              <a:t>textmate</a:t>
+            </a:r>
+            <a:endParaRPr lang="en-US" dirty="0" smtClean="0"/>
+          </a:p>
+          <a:p>
+            <a:r>
+              <a:rPr lang="en-US" dirty="0"/>
+              <a:t>I </a:t>
+            </a:r>
+            <a:r>
+              <a:rPr lang="en-US" dirty="0">
+                <a:hlinkClick r:id="rId3"/>
+              </a:rPr>
+              <a:t>think </a:t>
+            </a:r>
+            <a:r>
+              <a:rPr lang="en-US" dirty="0" err="1"/>
+              <a:t>FindWindow</a:t>
+            </a:r>
+            <a:r>
+              <a:rPr lang="en-US" dirty="0"/>
+              <a:t> and </a:t>
+            </a:r>
+            <a:r>
+              <a:rPr lang="en-US" dirty="0" err="1"/>
+              <a:t>SendMessage</a:t>
+            </a:r>
+            <a:r>
+              <a:rPr lang="en-US" dirty="0"/>
+              <a:t> are the functions you want to use, in general</a:t>
+            </a:r>
+            <a:r>
+              <a:rPr lang="en-US" dirty="0" smtClean="0"/>
+              <a:t>.</a:t>
+            </a:r>
+          </a:p>
+          <a:p>
+            <a:r>
+              <a:rPr lang="en-US" dirty="0" smtClean="0"/>
+              <a:t>Use the </a:t>
+            </a:r>
+            <a:r>
+              <a:rPr lang="en-US" dirty="0" smtClean="0">
+                <a:hlinkClick r:id="rId4"/>
+              </a:rPr>
+              <a:t>clipboard</a:t>
+            </a:r>
+            <a:endParaRPr lang="en-US" dirty="0" smtClean="0"/>
+          </a:p>
+          <a:p>
+            <a:r>
+              <a:rPr lang="en-US" dirty="0" err="1" smtClean="0">
+                <a:hlinkClick r:id="rId5"/>
+              </a:rPr>
+              <a:t>Tinn</a:t>
+            </a:r>
+            <a:r>
+              <a:rPr lang="en-US" dirty="0">
+                <a:hlinkClick r:id="rId5"/>
+              </a:rPr>
+              <a:t>-R</a:t>
+            </a:r>
+            <a:r>
+              <a:rPr lang="en-US" dirty="0"/>
+              <a:t>: It also pops up additional menu and toolbar when it detects </a:t>
+            </a:r>
+            <a:r>
+              <a:rPr lang="en-US" dirty="0" err="1"/>
+              <a:t>Rgui</a:t>
+            </a:r>
+            <a:r>
+              <a:rPr lang="en-US" dirty="0"/>
+              <a:t> running on the same computer. These </a:t>
+            </a:r>
+            <a:r>
+              <a:rPr lang="en-US" dirty="0" err="1"/>
+              <a:t>addons</a:t>
+            </a:r>
+            <a:r>
+              <a:rPr lang="en-US" dirty="0"/>
+              <a:t> interact with the R console and allow to submit code in part or in whole and to control R directly</a:t>
+            </a:r>
+            <a:r>
+              <a:rPr lang="en-US" dirty="0" smtClean="0"/>
+              <a:t>. </a:t>
+            </a:r>
+            <a:endParaRPr lang="en-US" dirty="0"/>
+          </a:p>
+          <a:p>
+            <a:pPr lvl="1"/>
+            <a:r>
+              <a:rPr lang="en-US" dirty="0" smtClean="0"/>
+              <a:t>It seems to have some </a:t>
+            </a:r>
+            <a:r>
+              <a:rPr lang="en-US" dirty="0" smtClean="0">
+                <a:hlinkClick r:id="rId6"/>
+              </a:rPr>
+              <a:t>limitations</a:t>
+            </a:r>
+            <a:endParaRPr lang="en-US" dirty="0" smtClean="0"/>
+          </a:p>
+          <a:p>
+            <a:r>
+              <a:rPr lang="en-US" dirty="0" smtClean="0"/>
+              <a:t>Maybe DOM is a </a:t>
+            </a:r>
+            <a:r>
+              <a:rPr lang="en-US" dirty="0" smtClean="0">
+                <a:hlinkClick r:id="rId7"/>
+              </a:rPr>
               <a:t>solution</a:t>
             </a:r>
+            <a:r>
+              <a:rPr lang="en-US" dirty="0" smtClean="0"/>
+              <a:t>: </a:t>
+            </a:r>
+            <a:r>
+              <a:rPr lang="en-US" dirty="0" err="1" smtClean="0"/>
+              <a:t>rdom</a:t>
+            </a:r>
+            <a:r>
+              <a:rPr lang="en-US" dirty="0"/>
+              <a:t>, </a:t>
+            </a:r>
+            <a:r>
+              <a:rPr lang="en-US" dirty="0" err="1" smtClean="0"/>
+              <a:t>RDCOMClient</a:t>
+            </a:r>
             <a:endParaRPr lang="en-US" dirty="0" smtClean="0"/>
           </a:p>
           <a:p>
             <a:r>
               <a:rPr lang="en-US" dirty="0" smtClean="0"/>
-              <a:t>Learn from </a:t>
-            </a:r>
-            <a:r>
-              <a:rPr lang="en-US" dirty="0" err="1" smtClean="0"/>
-              <a:t>TinnR</a:t>
+              <a:t>Or </a:t>
+            </a:r>
+            <a:r>
+              <a:rPr lang="en-US" dirty="0" smtClean="0">
+                <a:hlinkClick r:id="rId8"/>
+              </a:rPr>
+              <a:t>white</a:t>
+            </a:r>
+            <a:r>
+              <a:rPr lang="en-US" dirty="0" smtClean="0"/>
+              <a:t> </a:t>
+            </a:r>
+          </a:p>
+          <a:p>
+            <a:r>
+              <a:rPr lang="en-US" dirty="0" smtClean="0"/>
+              <a:t>Or most promising, we could try to use the </a:t>
+            </a:r>
+            <a:r>
+              <a:rPr lang="en-US" dirty="0" smtClean="0">
+                <a:hlinkClick r:id="rId9"/>
+              </a:rPr>
+              <a:t>windows API</a:t>
+            </a:r>
+            <a:r>
+              <a:rPr lang="en-US" dirty="0" smtClean="0"/>
+              <a:t> via VBScript or C#</a:t>
             </a:r>
             <a:endParaRPr lang="en-US" dirty="0"/>
           </a:p>
@@ -5421,7 +5485,7 @@
     </p:spTree>
     <p:extLst>
       <p:ext uri="{BB962C8B-B14F-4D97-AF65-F5344CB8AC3E}">
-        <p14:creationId xmlns:p14="http://schemas.microsoft.com/office/powerpoint/2010/main" val="1475125988"/>
+        <p14:creationId xmlns:p14="http://schemas.microsoft.com/office/powerpoint/2010/main" val="2563764221"/>
       </p:ext>
     </p:extLst>
   </p:cSld>
@@ -5464,83 +5528,56 @@
           <a:lstStyle/>
           <a:p>
             <a:r>
-              <a:rPr lang="en-US" dirty="0" err="1" smtClean="0">
-                <a:hlinkClick r:id="rId2"/>
-              </a:rPr>
-              <a:t>Tinn</a:t>
+              <a:rPr lang="en-US" dirty="0" smtClean="0"/>
+              <a:t>R Console for Idea</a:t>
+            </a:r>
+            <a:endParaRPr lang="en-US" dirty="0"/>
+          </a:p>
+        </p:txBody>
+      </p:sp>
+      <p:sp>
+        <p:nvSpPr>
+          <p:cNvPr id="3" name="Content Placeholder 2"/>
+          <p:cNvSpPr>
+            <a:spLocks noGrp="1"/>
+          </p:cNvSpPr>
+          <p:nvPr>
+            <p:ph idx="1"/>
+          </p:nvPr>
+        </p:nvSpPr>
+        <p:spPr/>
+        <p:txBody>
+          <a:bodyPr/>
+          <a:lstStyle/>
+          <a:p>
+            <a:r>
+              <a:rPr lang="en-US" dirty="0" smtClean="0"/>
+              <a:t>Use </a:t>
+            </a:r>
+            <a:r>
+              <a:rPr lang="en-US" dirty="0" err="1" smtClean="0"/>
+              <a:t>RSession</a:t>
+            </a:r>
+            <a:r>
+              <a:rPr lang="en-US" dirty="0" smtClean="0"/>
+              <a:t> </a:t>
             </a:r>
             <a:r>
               <a:rPr lang="en-US" dirty="0" smtClean="0">
                 <a:hlinkClick r:id="rId2"/>
               </a:rPr>
-              <a:t>-R</a:t>
-            </a:r>
-            <a:endParaRPr lang="en-US" dirty="0"/>
-          </a:p>
-        </p:txBody>
-      </p:sp>
-      <p:sp>
-        <p:nvSpPr>
-          <p:cNvPr id="3" name="Content Placeholder 2"/>
-          <p:cNvSpPr>
-            <a:spLocks noGrp="1"/>
-          </p:cNvSpPr>
-          <p:nvPr>
-            <p:ph idx="1"/>
-          </p:nvPr>
-        </p:nvSpPr>
-        <p:spPr/>
-        <p:txBody>
-          <a:bodyPr>
-            <a:normAutofit/>
-          </a:bodyPr>
-          <a:lstStyle/>
-          <a:p>
-            <a:r>
-              <a:rPr lang="en-US" dirty="0" smtClean="0"/>
-              <a:t>Allows for </a:t>
+              <a:t>solution</a:t>
+            </a:r>
+            <a:endParaRPr lang="en-US" dirty="0" smtClean="0"/>
+          </a:p>
+          <a:p>
+            <a:r>
+              <a:rPr lang="en-US" dirty="0" smtClean="0"/>
+              <a:t>Learn from </a:t>
             </a:r>
             <a:r>
               <a:rPr lang="en-US" dirty="0" err="1" smtClean="0"/>
-              <a:t>Rgui</a:t>
-            </a:r>
-            <a:r>
-              <a:rPr lang="en-US" dirty="0" smtClean="0"/>
-              <a:t> interaction to evaluate line or selection</a:t>
-            </a:r>
-          </a:p>
-          <a:p>
-            <a:pPr lvl="1"/>
-            <a:r>
-              <a:rPr lang="en-US" dirty="0"/>
-              <a:t>including list variables or objects</a:t>
-            </a:r>
-            <a:r>
-              <a:rPr lang="en-US" dirty="0" smtClean="0"/>
-              <a:t>, clearing </a:t>
-            </a:r>
-            <a:r>
-              <a:rPr lang="en-US" dirty="0"/>
-              <a:t>console, even stopping the current process.</a:t>
-            </a:r>
-            <a:endParaRPr lang="en-US" dirty="0" smtClean="0"/>
-          </a:p>
-          <a:p>
-            <a:r>
-              <a:rPr lang="en-US" dirty="0" smtClean="0"/>
-              <a:t>Code formatter</a:t>
-            </a:r>
-          </a:p>
-          <a:p>
-            <a:r>
-              <a:rPr lang="en-US" dirty="0" smtClean="0"/>
-              <a:t>Bracket matching &amp; checking</a:t>
-            </a:r>
-          </a:p>
-          <a:p>
-            <a:r>
-              <a:rPr lang="en-US" dirty="0" smtClean="0"/>
-              <a:t>Commenting uncommenting</a:t>
+              <a:t>TinnR</a:t>
             </a:r>
             <a:endParaRPr lang="en-US" dirty="0"/>
           </a:p>
@@ -5549,7 +5586,7 @@
     </p:spTree>
     <p:extLst>
       <p:ext uri="{BB962C8B-B14F-4D97-AF65-F5344CB8AC3E}">
-        <p14:creationId xmlns:p14="http://schemas.microsoft.com/office/powerpoint/2010/main" val="2449672567"/>
+        <p14:creationId xmlns:p14="http://schemas.microsoft.com/office/powerpoint/2010/main" val="1475125988"/>
       </p:ext>
     </p:extLst>
   </p:cSld>
@@ -5592,6 +5629,134 @@
           <a:lstStyle/>
           <a:p>
             <a:r>
+              <a:rPr lang="en-US" dirty="0" err="1" smtClean="0">
+                <a:hlinkClick r:id="rId2"/>
+              </a:rPr>
+              <a:t>Tinn</a:t>
+            </a:r>
+            <a:r>
+              <a:rPr lang="en-US" dirty="0" smtClean="0">
+                <a:hlinkClick r:id="rId2"/>
+              </a:rPr>
+              <a:t>-R</a:t>
+            </a:r>
+            <a:endParaRPr lang="en-US" dirty="0"/>
+          </a:p>
+        </p:txBody>
+      </p:sp>
+      <p:sp>
+        <p:nvSpPr>
+          <p:cNvPr id="3" name="Content Placeholder 2"/>
+          <p:cNvSpPr>
+            <a:spLocks noGrp="1"/>
+          </p:cNvSpPr>
+          <p:nvPr>
+            <p:ph idx="1"/>
+          </p:nvPr>
+        </p:nvSpPr>
+        <p:spPr/>
+        <p:txBody>
+          <a:bodyPr>
+            <a:normAutofit/>
+          </a:bodyPr>
+          <a:lstStyle/>
+          <a:p>
+            <a:r>
+              <a:rPr lang="en-US" dirty="0" smtClean="0"/>
+              <a:t>Allows for </a:t>
+            </a:r>
+            <a:r>
+              <a:rPr lang="en-US" dirty="0" err="1" smtClean="0"/>
+              <a:t>Rgui</a:t>
+            </a:r>
+            <a:r>
+              <a:rPr lang="en-US" dirty="0" smtClean="0"/>
+              <a:t> interaction to evaluate line or selection</a:t>
+            </a:r>
+          </a:p>
+          <a:p>
+            <a:pPr lvl="1"/>
+            <a:r>
+              <a:rPr lang="en-US" dirty="0"/>
+              <a:t>including list variables or objects</a:t>
+            </a:r>
+            <a:r>
+              <a:rPr lang="en-US" dirty="0" smtClean="0"/>
+              <a:t>, clearing </a:t>
+            </a:r>
+            <a:r>
+              <a:rPr lang="en-US" dirty="0"/>
+              <a:t>console, even stopping the current process.</a:t>
+            </a:r>
+            <a:endParaRPr lang="en-US" dirty="0" smtClean="0"/>
+          </a:p>
+          <a:p>
+            <a:r>
+              <a:rPr lang="en-US" dirty="0" smtClean="0"/>
+              <a:t>Code formatter</a:t>
+            </a:r>
+          </a:p>
+          <a:p>
+            <a:r>
+              <a:rPr lang="en-US" dirty="0" smtClean="0"/>
+              <a:t>Bracket matching &amp; checking</a:t>
+            </a:r>
+          </a:p>
+          <a:p>
+            <a:r>
+              <a:rPr lang="en-US" dirty="0" smtClean="0"/>
+              <a:t>Commenting uncommenting</a:t>
+            </a:r>
+            <a:endParaRPr lang="en-US" dirty="0"/>
+          </a:p>
+        </p:txBody>
+      </p:sp>
+    </p:spTree>
+    <p:extLst>
+      <p:ext uri="{BB962C8B-B14F-4D97-AF65-F5344CB8AC3E}">
+        <p14:creationId xmlns:p14="http://schemas.microsoft.com/office/powerpoint/2010/main" val="2449672567"/>
+      </p:ext>
+    </p:extLst>
+  </p:cSld>
+  <p:clrMapOvr>
+    <a:masterClrMapping/>
+  </p:clrMapOvr>
+</p:sld>
+</file>
+
+<file path=ppt/slides/slide23.xml><?xml version="1.0" encoding="utf-8"?>
+<p:sld xmlns:a="http://schemas.openxmlformats.org/drawingml/2006/main" xmlns:r="http://schemas.openxmlformats.org/officeDocument/2006/relationships" xmlns:p="http://schemas.openxmlformats.org/presentationml/2006/main">
+  <p:cSld>
+    <p:spTree>
+      <p:nvGrpSpPr>
+        <p:cNvPr id="1" name=""/>
+        <p:cNvGrpSpPr/>
+        <p:nvPr/>
+      </p:nvGrpSpPr>
+      <p:grpSpPr>
+        <a:xfrm>
+          <a:off x="0" y="0"/>
+          <a:ext cx="0" cy="0"/>
+          <a:chOff x="0" y="0"/>
+          <a:chExt cx="0" cy="0"/>
+        </a:xfrm>
+      </p:grpSpPr>
+      <p:sp>
+        <p:nvSpPr>
+          <p:cNvPr id="2" name="Title 1"/>
+          <p:cNvSpPr>
+            <a:spLocks noGrp="1"/>
+          </p:cNvSpPr>
+          <p:nvPr>
+            <p:ph type="title"/>
+          </p:nvPr>
+        </p:nvSpPr>
+        <p:spPr/>
+        <p:txBody>
+          <a:bodyPr/>
+          <a:lstStyle/>
+          <a:p>
+            <a:r>
               <a:rPr lang="en-US" dirty="0" err="1" smtClean="0"/>
               <a:t>RStudio</a:t>
             </a:r>
@@ -5631,7 +5796,7 @@
 </p:sld>
 </file>
 
-<file path=ppt/slides/slide23.xml><?xml version="1.0" encoding="utf-8"?>
+<file path=ppt/slides/slide24.xml><?xml version="1.0" encoding="utf-8"?>
 <p:sld xmlns:a="http://schemas.openxmlformats.org/drawingml/2006/main" xmlns:r="http://schemas.openxmlformats.org/officeDocument/2006/relationships" xmlns:p="http://schemas.openxmlformats.org/presentationml/2006/main">
   <p:cSld>
     <p:spTree>
@@ -5733,6 +5898,205 @@
           <a:p>
             <a:r>
               <a:rPr lang="en-US" dirty="0" smtClean="0"/>
+              <a:t>Roadmap (coming soon)</a:t>
+            </a:r>
+            <a:endParaRPr lang="en-US" dirty="0"/>
+          </a:p>
+        </p:txBody>
+      </p:sp>
+      <p:sp>
+        <p:nvSpPr>
+          <p:cNvPr id="3" name="Content Placeholder 2"/>
+          <p:cNvSpPr>
+            <a:spLocks noGrp="1"/>
+          </p:cNvSpPr>
+          <p:nvPr>
+            <p:ph idx="1"/>
+          </p:nvPr>
+        </p:nvSpPr>
+        <p:spPr/>
+        <p:txBody>
+          <a:bodyPr>
+            <a:normAutofit fontScale="92500" lnSpcReduction="20000"/>
+          </a:bodyPr>
+          <a:lstStyle/>
+          <a:p>
+            <a:r>
+              <a:rPr lang="en-US" dirty="0" smtClean="0"/>
+              <a:t>Live </a:t>
+            </a:r>
+            <a:r>
+              <a:rPr lang="en-US" dirty="0" err="1" smtClean="0"/>
+              <a:t>Templates</a:t>
+            </a:r>
+            <a:r>
+              <a:rPr lang="en-US" dirty="0" err="1" smtClean="0"/>
+              <a:t>Code</a:t>
+            </a:r>
+            <a:r>
+              <a:rPr lang="en-US" dirty="0" smtClean="0"/>
+              <a:t> formatter</a:t>
+            </a:r>
+            <a:endParaRPr lang="en-US" dirty="0"/>
+          </a:p>
+          <a:p>
+            <a:r>
+              <a:rPr lang="en-US" dirty="0" smtClean="0"/>
+              <a:t>Inspections </a:t>
+            </a:r>
+            <a:r>
+              <a:rPr lang="en-US" dirty="0"/>
+              <a:t>and </a:t>
+            </a:r>
+            <a:r>
+              <a:rPr lang="en-US" dirty="0" err="1"/>
+              <a:t>quickfixes</a:t>
+            </a:r>
+            <a:r>
+              <a:rPr lang="en-US" dirty="0"/>
+              <a:t> for common </a:t>
+            </a:r>
+            <a:r>
+              <a:rPr lang="en-US" dirty="0" smtClean="0"/>
+              <a:t>problems</a:t>
+            </a:r>
+          </a:p>
+          <a:p>
+            <a:pPr lvl="1"/>
+            <a:r>
+              <a:rPr lang="en-US" dirty="0"/>
+              <a:t>Incorrect subset (or if</a:t>
+            </a:r>
+            <a:r>
+              <a:rPr lang="en-US" dirty="0" smtClean="0"/>
+              <a:t>)</a:t>
+            </a:r>
+            <a:endParaRPr lang="en-US" dirty="0"/>
+          </a:p>
+          <a:p>
+            <a:r>
+              <a:rPr lang="en-US" dirty="0" smtClean="0"/>
+              <a:t>Basic </a:t>
+            </a:r>
+            <a:r>
+              <a:rPr lang="en-US" dirty="0" err="1"/>
+              <a:t>refactorings</a:t>
+            </a:r>
+            <a:r>
+              <a:rPr lang="en-US" dirty="0"/>
+              <a:t> (rename </a:t>
+            </a:r>
+            <a:r>
+              <a:rPr lang="en-US" dirty="0" smtClean="0"/>
+              <a:t>variables </a:t>
+            </a:r>
+            <a:r>
+              <a:rPr lang="en-US" smtClean="0"/>
+              <a:t>and functions)</a:t>
+            </a:r>
+            <a:endParaRPr lang="en-US" dirty="0"/>
+          </a:p>
+          <a:p>
+            <a:r>
+              <a:rPr lang="en-US" dirty="0" smtClean="0"/>
+              <a:t>Advanced </a:t>
+            </a:r>
+            <a:r>
+              <a:rPr lang="en-US" dirty="0"/>
+              <a:t>navigation (structure view, go to declaration, ...</a:t>
+            </a:r>
+            <a:r>
+              <a:rPr lang="en-US" dirty="0" smtClean="0"/>
+              <a:t>)</a:t>
+            </a:r>
+            <a:endParaRPr lang="en-US" dirty="0"/>
+          </a:p>
+          <a:p>
+            <a:r>
+              <a:rPr lang="en-US" dirty="0" err="1" smtClean="0"/>
+              <a:t>Ctrl</a:t>
+            </a:r>
+            <a:r>
+              <a:rPr lang="en-US" dirty="0" err="1"/>
+              <a:t>+Q</a:t>
+            </a:r>
+            <a:r>
+              <a:rPr lang="en-US" dirty="0"/>
+              <a:t> (Quick documentation lookup) for internal commands, external commands and </a:t>
+            </a:r>
+            <a:r>
+              <a:rPr lang="en-US" dirty="0" smtClean="0"/>
+              <a:t>functions</a:t>
+            </a:r>
+            <a:endParaRPr lang="en-US" dirty="0"/>
+          </a:p>
+          <a:p>
+            <a:r>
+              <a:rPr lang="en-US" dirty="0" smtClean="0"/>
+              <a:t>Highlight </a:t>
+            </a:r>
+            <a:r>
+              <a:rPr lang="en-US" dirty="0"/>
+              <a:t>usages in file for functions and </a:t>
+            </a:r>
+            <a:r>
+              <a:rPr lang="en-US" dirty="0" smtClean="0"/>
+              <a:t>variables</a:t>
+            </a:r>
+            <a:endParaRPr lang="en-US" dirty="0"/>
+          </a:p>
+          <a:p>
+            <a:endParaRPr lang="en-US" dirty="0" smtClean="0"/>
+          </a:p>
+        </p:txBody>
+      </p:sp>
+    </p:spTree>
+    <p:extLst>
+      <p:ext uri="{BB962C8B-B14F-4D97-AF65-F5344CB8AC3E}">
+        <p14:creationId xmlns:p14="http://schemas.microsoft.com/office/powerpoint/2010/main" val="3335867933"/>
+      </p:ext>
+    </p:extLst>
+  </p:cSld>
+  <p:clrMapOvr>
+    <a:masterClrMapping/>
+  </p:clrMapOvr>
+</p:sld>
+</file>
+
+<file path=ppt/slides/slide4.xml><?xml version="1.0" encoding="utf-8"?>
+<p:sld xmlns:a="http://schemas.openxmlformats.org/drawingml/2006/main" xmlns:r="http://schemas.openxmlformats.org/officeDocument/2006/relationships" xmlns:p="http://schemas.openxmlformats.org/presentationml/2006/main">
+  <p:cSld>
+    <p:spTree>
+      <p:nvGrpSpPr>
+        <p:cNvPr id="1" name=""/>
+        <p:cNvGrpSpPr/>
+        <p:nvPr/>
+      </p:nvGrpSpPr>
+      <p:grpSpPr>
+        <a:xfrm>
+          <a:off x="0" y="0"/>
+          <a:ext cx="0" cy="0"/>
+          <a:chOff x="0" y="0"/>
+          <a:chExt cx="0" cy="0"/>
+        </a:xfrm>
+      </p:grpSpPr>
+      <p:sp>
+        <p:nvSpPr>
+          <p:cNvPr id="2" name="Title 1"/>
+          <p:cNvSpPr>
+            <a:spLocks noGrp="1"/>
+          </p:cNvSpPr>
+          <p:nvPr>
+            <p:ph type="title"/>
+          </p:nvPr>
+        </p:nvSpPr>
+        <p:spPr/>
+        <p:txBody>
+          <a:bodyPr/>
+          <a:lstStyle/>
+          <a:p>
+            <a:r>
+              <a:rPr lang="en-US" dirty="0" smtClean="0"/>
               <a:t>Roadmap (later)</a:t>
             </a:r>
             <a:endParaRPr lang="en-US" dirty="0"/>
@@ -5751,8 +6115,29 @@
         </p:nvSpPr>
         <p:spPr/>
         <p:txBody>
-          <a:bodyPr/>
-          <a:lstStyle/>
+          <a:bodyPr>
+            <a:normAutofit/>
+          </a:bodyPr>
+          <a:lstStyle/>
+          <a:p>
+            <a:r>
+              <a:rPr lang="en-US" dirty="0"/>
+              <a:t>More context-aware </a:t>
+            </a:r>
+            <a:r>
+              <a:rPr lang="en-US" dirty="0" smtClean="0"/>
+              <a:t>auto-completion </a:t>
+            </a:r>
+            <a:r>
+              <a:rPr lang="en-US" dirty="0"/>
+              <a:t>for variables, functions and file </a:t>
+            </a:r>
+            <a:r>
+              <a:rPr lang="en-US" dirty="0" smtClean="0"/>
+              <a:t>paths</a:t>
+            </a:r>
+            <a:endParaRPr lang="en-US" dirty="0" smtClean="0"/>
+          </a:p>
           <a:p>
             <a:r>
               <a:rPr lang="en-US" dirty="0" smtClean="0"/>
@@ -5792,7 +6177,7 @@
           <a:p>
             <a:pPr lvl="1"/>
             <a:r>
-              <a:rPr lang="en-US" dirty="0"/>
+              <a:rPr lang="en-US" dirty="0" smtClean="0"/>
               <a:t>Example? </a:t>
             </a:r>
             <a:r>
@@ -5808,7 +6193,11 @@
             </a:r>
             <a:r>
               <a:rPr lang="en-US" dirty="0" smtClean="0"/>
-              <a:t> (see Bash implementation)</a:t>
+              <a:t> </a:t>
+            </a:r>
+            <a:r>
+              <a:rPr lang="en-US" dirty="0" smtClean="0"/>
+              <a:t>(see Bash implementation)</a:t>
             </a:r>
           </a:p>
           <a:p>
@@ -5842,7 +6231,7 @@
 </p:sld>
 </file>
 
-<file path=ppt/slides/slide4.xml><?xml version="1.0" encoding="utf-8"?>
+<file path=ppt/slides/slide5.xml><?xml version="1.0" encoding="utf-8"?>
 <p:sld xmlns:a="http://schemas.openxmlformats.org/drawingml/2006/main" xmlns:r="http://schemas.openxmlformats.org/officeDocument/2006/relationships" xmlns:p="http://schemas.openxmlformats.org/presentationml/2006/main">
   <p:cSld>
     <p:spTree>
@@ -6001,112 +6390,6 @@
 </p:sld>
 </file>
 
-<file path=ppt/slides/slide5.xml><?xml version="1.0" encoding="utf-8"?>
-<p:sld xmlns:a="http://schemas.openxmlformats.org/drawingml/2006/main" xmlns:r="http://schemas.openxmlformats.org/officeDocument/2006/relationships" xmlns:p="http://schemas.openxmlformats.org/presentationml/2006/main">
-  <p:cSld>
-    <p:spTree>
-      <p:nvGrpSpPr>
-        <p:cNvPr id="1" name=""/>
-        <p:cNvGrpSpPr/>
-        <p:nvPr/>
-      </p:nvGrpSpPr>
-      <p:grpSpPr>
-        <a:xfrm>
-          <a:off x="0" y="0"/>
-          <a:ext cx="0" cy="0"/>
-          <a:chOff x="0" y="0"/>
-          <a:chExt cx="0" cy="0"/>
-        </a:xfrm>
-      </p:grpSpPr>
-      <p:sp>
-        <p:nvSpPr>
-          <p:cNvPr id="2" name="Title 1"/>
-          <p:cNvSpPr>
-            <a:spLocks noGrp="1"/>
-          </p:cNvSpPr>
-          <p:nvPr>
-            <p:ph type="title"/>
-          </p:nvPr>
-        </p:nvSpPr>
-        <p:spPr/>
-        <p:txBody>
-          <a:bodyPr/>
-          <a:lstStyle/>
-          <a:p>
-            <a:r>
-              <a:rPr lang="en-US" dirty="0" err="1" smtClean="0"/>
-              <a:t>Lexer</a:t>
-            </a:r>
-            <a:endParaRPr lang="en-US" dirty="0"/>
-          </a:p>
-        </p:txBody>
-      </p:sp>
-      <p:sp>
-        <p:nvSpPr>
-          <p:cNvPr id="3" name="Content Placeholder 2"/>
-          <p:cNvSpPr>
-            <a:spLocks noGrp="1"/>
-          </p:cNvSpPr>
-          <p:nvPr>
-            <p:ph idx="1"/>
-          </p:nvPr>
-        </p:nvSpPr>
-        <p:spPr/>
-        <p:txBody>
-          <a:bodyPr/>
-          <a:lstStyle/>
-          <a:p>
-            <a:r>
-              <a:rPr lang="en-US" dirty="0" smtClean="0"/>
-              <a:t>Just as the </a:t>
-            </a:r>
-            <a:r>
-              <a:rPr lang="en-US" dirty="0" err="1" smtClean="0"/>
-              <a:t>lexer</a:t>
-            </a:r>
-            <a:r>
-              <a:rPr lang="en-US" dirty="0" smtClean="0"/>
-              <a:t> is a source code spelling checker, the parser is a grammar checker</a:t>
-            </a:r>
-          </a:p>
-          <a:p>
-            <a:r>
-              <a:rPr lang="en-US" dirty="0" smtClean="0"/>
-              <a:t>A utility such as </a:t>
-            </a:r>
-            <a:r>
-              <a:rPr lang="en-US" dirty="0" err="1" smtClean="0"/>
-              <a:t>JFlex</a:t>
-            </a:r>
-            <a:r>
-              <a:rPr lang="en-US" dirty="0" smtClean="0"/>
-              <a:t> builds a </a:t>
-            </a:r>
-            <a:r>
-              <a:rPr lang="en-US" dirty="0" err="1" smtClean="0"/>
-              <a:t>lexer</a:t>
-            </a:r>
-            <a:r>
-              <a:rPr lang="en-US" smtClean="0"/>
-              <a:t> from a specification file the programmer writes to define the 'words' (lexical tokens) in the desired language</a:t>
-            </a:r>
-            <a:endParaRPr lang="en-US" dirty="0"/>
-          </a:p>
-        </p:txBody>
-      </p:sp>
-    </p:spTree>
-    <p:extLst>
-      <p:ext uri="{BB962C8B-B14F-4D97-AF65-F5344CB8AC3E}">
-        <p14:creationId xmlns:p14="http://schemas.microsoft.com/office/powerpoint/2010/main" val="3371460341"/>
-      </p:ext>
-    </p:extLst>
-  </p:cSld>
-  <p:clrMapOvr>
-    <a:masterClrMapping/>
-  </p:clrMapOvr>
-</p:sld>
-</file>
-
 <file path=ppt/slides/slide6.xml><?xml version="1.0" encoding="utf-8"?>
 <p:sld xmlns:a="http://schemas.openxmlformats.org/drawingml/2006/main" xmlns:r="http://schemas.openxmlformats.org/officeDocument/2006/relationships" xmlns:p="http://schemas.openxmlformats.org/presentationml/2006/main">
   <p:cSld>
@@ -6140,8 +6423,8 @@
           <a:lstStyle/>
           <a:p>
             <a:r>
-              <a:rPr lang="en-US" dirty="0" smtClean="0"/>
-              <a:t>Parser</a:t>
+              <a:rPr lang="en-US" dirty="0" err="1" smtClean="0"/>
+              <a:t>Lexer</a:t>
             </a:r>
             <a:endParaRPr lang="en-US" dirty="0"/>
           </a:p>
@@ -6159,82 +6442,42 @@
         </p:nvSpPr>
         <p:spPr/>
         <p:txBody>
-          <a:bodyPr>
-            <a:normAutofit fontScale="85000" lnSpcReduction="10000"/>
-          </a:bodyPr>
-          <a:lstStyle/>
-          <a:p>
-            <a:r>
-              <a:rPr lang="en-US" dirty="0"/>
-              <a:t>The parser works by setting pairs of markers (</a:t>
-            </a:r>
-            <a:r>
-              <a:rPr lang="en-US" dirty="0" err="1"/>
-              <a:t>PsiBuilder.Marker</a:t>
-            </a:r>
-            <a:r>
-              <a:rPr lang="en-US" dirty="0"/>
-              <a:t> instances) within the stream of tokens received from the </a:t>
-            </a:r>
-            <a:r>
-              <a:rPr lang="en-US" dirty="0" err="1"/>
+          <a:bodyPr/>
+          <a:lstStyle/>
+          <a:p>
+            <a:r>
+              <a:rPr lang="en-US" dirty="0" smtClean="0"/>
+              <a:t>Just as the </a:t>
+            </a:r>
+            <a:r>
+              <a:rPr lang="en-US" dirty="0" err="1" smtClean="0"/>
               <a:t>lexer</a:t>
             </a:r>
             <a:r>
-              <a:rPr lang="en-US" dirty="0"/>
-              <a:t>. Each pair of markers defines the range of </a:t>
-            </a:r>
-            <a:r>
-              <a:rPr lang="en-US" dirty="0" err="1"/>
+              <a:rPr lang="en-US" dirty="0" smtClean="0"/>
+              <a:t> is a source code spelling checker, the parser is a grammar checker</a:t>
+            </a:r>
+          </a:p>
+          <a:p>
+            <a:r>
+              <a:rPr lang="en-US" dirty="0" smtClean="0"/>
+              <a:t>A utility such as </a:t>
+            </a:r>
+            <a:r>
+              <a:rPr lang="en-US" dirty="0" err="1" smtClean="0"/>
+              <a:t>JFlex</a:t>
+            </a:r>
+            <a:r>
+              <a:rPr lang="en-US" dirty="0" smtClean="0"/>
+              <a:t> builds a </a:t>
+            </a:r>
+            <a:r>
+              <a:rPr lang="en-US" dirty="0" err="1" smtClean="0"/>
               <a:t>lexer</a:t>
             </a:r>
             <a:r>
-              <a:rPr lang="en-US" dirty="0"/>
-              <a:t> tokens for a single node in the AST tree. If a pair of markers is nested in another pair (starts after its start and ends before its end), it becomes the child node of the outer pair</a:t>
-            </a:r>
-            <a:r>
-              <a:rPr lang="en-US" dirty="0" smtClean="0"/>
-              <a:t>.</a:t>
-            </a:r>
-          </a:p>
-          <a:p>
-            <a:r>
-              <a:rPr lang="en-US" dirty="0"/>
-              <a:t>The element type for the marker pair (and for the AST node created from it) is specified when the end marker is set (by a call to </a:t>
-            </a:r>
-            <a:r>
-              <a:rPr lang="en-US" dirty="0" err="1"/>
-              <a:t>PsiBuilder.Marker.done</a:t>
-            </a:r>
-            <a:r>
-              <a:rPr lang="en-US" dirty="0"/>
-              <a:t>()</a:t>
-            </a:r>
-            <a:r>
-              <a:rPr lang="en-US" dirty="0" smtClean="0"/>
-              <a:t>)</a:t>
-            </a:r>
-          </a:p>
-          <a:p>
-            <a:r>
-              <a:rPr lang="en-US" dirty="0" err="1" smtClean="0"/>
-              <a:t>BashElementTypes</a:t>
-            </a:r>
-            <a:r>
-              <a:rPr lang="en-US" dirty="0" smtClean="0"/>
-              <a:t> </a:t>
-            </a:r>
-            <a:r>
-              <a:rPr lang="en-US" dirty="0" err="1" smtClean="0"/>
-              <a:t>vs</a:t>
-            </a:r>
-            <a:r>
-              <a:rPr lang="en-US" dirty="0" smtClean="0"/>
-              <a:t> </a:t>
-            </a:r>
-            <a:r>
-              <a:rPr lang="en-US" smtClean="0"/>
-              <a:t>BashTokenTypes</a:t>
+              <a:rPr lang="en-US" smtClean="0"/>
+              <a:t> from a specification file the programmer writes to define the 'words' (lexical tokens) in the desired language</a:t>
             </a:r>
             <a:endParaRPr lang="en-US" dirty="0"/>
           </a:p>
@@ -6243,7 +6486,7 @@
     </p:spTree>
     <p:extLst>
       <p:ext uri="{BB962C8B-B14F-4D97-AF65-F5344CB8AC3E}">
-        <p14:creationId xmlns:p14="http://schemas.microsoft.com/office/powerpoint/2010/main" val="362419930"/>
+        <p14:creationId xmlns:p14="http://schemas.microsoft.com/office/powerpoint/2010/main" val="3371460341"/>
       </p:ext>
     </p:extLst>
   </p:cSld>
@@ -6287,6 +6530,152 @@
           <a:p>
             <a:r>
               <a:rPr lang="en-US" dirty="0" smtClean="0"/>
+              <a:t>Parser</a:t>
+            </a:r>
+            <a:endParaRPr lang="en-US" dirty="0"/>
+          </a:p>
+        </p:txBody>
+      </p:sp>
+      <p:sp>
+        <p:nvSpPr>
+          <p:cNvPr id="3" name="Content Placeholder 2"/>
+          <p:cNvSpPr>
+            <a:spLocks noGrp="1"/>
+          </p:cNvSpPr>
+          <p:nvPr>
+            <p:ph idx="1"/>
+          </p:nvPr>
+        </p:nvSpPr>
+        <p:spPr/>
+        <p:txBody>
+          <a:bodyPr>
+            <a:normAutofit fontScale="85000" lnSpcReduction="10000"/>
+          </a:bodyPr>
+          <a:lstStyle/>
+          <a:p>
+            <a:r>
+              <a:rPr lang="en-US" dirty="0"/>
+              <a:t>The parser works by setting pairs of markers (</a:t>
+            </a:r>
+            <a:r>
+              <a:rPr lang="en-US" dirty="0" err="1"/>
+              <a:t>PsiBuilder.Marker</a:t>
+            </a:r>
+            <a:r>
+              <a:rPr lang="en-US" dirty="0"/>
+              <a:t> instances) within the stream of tokens received from the </a:t>
+            </a:r>
+            <a:r>
+              <a:rPr lang="en-US" dirty="0" err="1"/>
+              <a:t>lexer</a:t>
+            </a:r>
+            <a:r>
+              <a:rPr lang="en-US" dirty="0"/>
+              <a:t>. Each pair of markers defines the range of </a:t>
+            </a:r>
+            <a:r>
+              <a:rPr lang="en-US" dirty="0" err="1"/>
+              <a:t>lexer</a:t>
+            </a:r>
+            <a:r>
+              <a:rPr lang="en-US" dirty="0"/>
+              <a:t> tokens for a single node in the AST tree. If a pair of markers is nested in another pair (starts after its start and ends before its end), it becomes the child node of the outer pair</a:t>
+            </a:r>
+            <a:r>
+              <a:rPr lang="en-US" dirty="0" smtClean="0"/>
+              <a:t>.</a:t>
+            </a:r>
+          </a:p>
+          <a:p>
+            <a:r>
+              <a:rPr lang="en-US" dirty="0"/>
+              <a:t>The element type for the marker pair (and for the AST node created from it) is specified when the end marker is set (by a call to </a:t>
+            </a:r>
+            <a:r>
+              <a:rPr lang="en-US" dirty="0" err="1"/>
+              <a:t>PsiBuilder.Marker.done</a:t>
+            </a:r>
+            <a:r>
+              <a:rPr lang="en-US" dirty="0"/>
+              <a:t>()</a:t>
+            </a:r>
+            <a:r>
+              <a:rPr lang="en-US" dirty="0" smtClean="0"/>
+              <a:t>)</a:t>
+            </a:r>
+          </a:p>
+          <a:p>
+            <a:r>
+              <a:rPr lang="en-US" dirty="0" err="1" smtClean="0"/>
+              <a:t>BashElementTypes</a:t>
+            </a:r>
+            <a:r>
+              <a:rPr lang="en-US" dirty="0" smtClean="0"/>
+              <a:t> </a:t>
+            </a:r>
+            <a:r>
+              <a:rPr lang="en-US" dirty="0" err="1" smtClean="0"/>
+              <a:t>vs</a:t>
+            </a:r>
+            <a:r>
+              <a:rPr lang="en-US" dirty="0" smtClean="0"/>
+              <a:t> </a:t>
+            </a:r>
+            <a:r>
+              <a:rPr lang="en-US" smtClean="0"/>
+              <a:t>BashTokenTypes</a:t>
+            </a:r>
+            <a:endParaRPr lang="en-US" dirty="0"/>
+          </a:p>
+        </p:txBody>
+      </p:sp>
+    </p:spTree>
+    <p:extLst>
+      <p:ext uri="{BB962C8B-B14F-4D97-AF65-F5344CB8AC3E}">
+        <p14:creationId xmlns:p14="http://schemas.microsoft.com/office/powerpoint/2010/main" val="362419930"/>
+      </p:ext>
+    </p:extLst>
+  </p:cSld>
+  <p:clrMapOvr>
+    <a:masterClrMapping/>
+  </p:clrMapOvr>
+</p:sld>
+</file>
+
+<file path=ppt/slides/slide8.xml><?xml version="1.0" encoding="utf-8"?>
+<p:sld xmlns:a="http://schemas.openxmlformats.org/drawingml/2006/main" xmlns:r="http://schemas.openxmlformats.org/officeDocument/2006/relationships" xmlns:p="http://schemas.openxmlformats.org/presentationml/2006/main">
+  <p:cSld>
+    <p:spTree>
+      <p:nvGrpSpPr>
+        <p:cNvPr id="1" name=""/>
+        <p:cNvGrpSpPr/>
+        <p:nvPr/>
+      </p:nvGrpSpPr>
+      <p:grpSpPr>
+        <a:xfrm>
+          <a:off x="0" y="0"/>
+          <a:ext cx="0" cy="0"/>
+          <a:chOff x="0" y="0"/>
+          <a:chExt cx="0" cy="0"/>
+        </a:xfrm>
+      </p:grpSpPr>
+      <p:sp>
+        <p:nvSpPr>
+          <p:cNvPr id="2" name="Title 1"/>
+          <p:cNvSpPr>
+            <a:spLocks noGrp="1"/>
+          </p:cNvSpPr>
+          <p:nvPr>
+            <p:ph type="title"/>
+          </p:nvPr>
+        </p:nvSpPr>
+        <p:spPr/>
+        <p:txBody>
+          <a:bodyPr/>
+          <a:lstStyle/>
+          <a:p>
+            <a:r>
+              <a:rPr lang="en-US" dirty="0" smtClean="0"/>
               <a:t>Parser Basics: LL-Parser</a:t>
             </a:r>
             <a:endParaRPr lang="en-US" dirty="0"/>
@@ -6853,7 +7242,7 @@
 </p:sld>
 </file>
 
-<file path=ppt/slides/slide8.xml><?xml version="1.0" encoding="utf-8"?>
+<file path=ppt/slides/slide9.xml><?xml version="1.0" encoding="utf-8"?>
 <p:sld xmlns:a="http://schemas.openxmlformats.org/drawingml/2006/main" xmlns:r="http://schemas.openxmlformats.org/officeDocument/2006/relationships" xmlns:p="http://schemas.openxmlformats.org/presentationml/2006/main">
   <p:cSld>
     <p:spTree>
@@ -6964,204 +7353,6 @@
     <p:extLst>
       <p:ext uri="{BB962C8B-B14F-4D97-AF65-F5344CB8AC3E}">
         <p14:creationId xmlns:p14="http://schemas.microsoft.com/office/powerpoint/2010/main" val="1182295772"/>
-      </p:ext>
-    </p:extLst>
-  </p:cSld>
-  <p:clrMapOvr>
-    <a:masterClrMapping/>
-  </p:clrMapOvr>
-</p:sld>
-</file>
-
-<file path=ppt/slides/slide9.xml><?xml version="1.0" encoding="utf-8"?>
-<p:sld xmlns:a="http://schemas.openxmlformats.org/drawingml/2006/main" xmlns:r="http://schemas.openxmlformats.org/officeDocument/2006/relationships" xmlns:p="http://schemas.openxmlformats.org/presentationml/2006/main">
-  <p:cSld>
-    <p:spTree>
-      <p:nvGrpSpPr>
-        <p:cNvPr id="1" name=""/>
-        <p:cNvGrpSpPr/>
-        <p:nvPr/>
-      </p:nvGrpSpPr>
-      <p:grpSpPr>
-        <a:xfrm>
-          <a:off x="0" y="0"/>
-          <a:ext cx="0" cy="0"/>
-          <a:chOff x="0" y="0"/>
-          <a:chExt cx="0" cy="0"/>
-        </a:xfrm>
-      </p:grpSpPr>
-      <p:sp>
-        <p:nvSpPr>
-          <p:cNvPr id="2" name="Title 1"/>
-          <p:cNvSpPr>
-            <a:spLocks noGrp="1"/>
-          </p:cNvSpPr>
-          <p:nvPr>
-            <p:ph type="title"/>
-          </p:nvPr>
-        </p:nvSpPr>
-        <p:spPr/>
-        <p:txBody>
-          <a:bodyPr/>
-          <a:lstStyle/>
-          <a:p>
-            <a:r>
-              <a:rPr lang="en-US" dirty="0" smtClean="0"/>
-              <a:t>Psi parser</a:t>
-            </a:r>
-            <a:endParaRPr lang="en-US" dirty="0"/>
-          </a:p>
-        </p:txBody>
-      </p:sp>
-      <p:sp>
-        <p:nvSpPr>
-          <p:cNvPr id="3" name="Content Placeholder 2"/>
-          <p:cNvSpPr>
-            <a:spLocks noGrp="1"/>
-          </p:cNvSpPr>
-          <p:nvPr>
-            <p:ph idx="1"/>
-          </p:nvPr>
-        </p:nvSpPr>
-        <p:spPr/>
-        <p:txBody>
-          <a:bodyPr>
-            <a:normAutofit fontScale="77500" lnSpcReduction="20000"/>
-          </a:bodyPr>
-          <a:lstStyle/>
-          <a:p>
-            <a:r>
-              <a:rPr lang="en-US" dirty="0" smtClean="0"/>
-              <a:t>Try the grammar kit</a:t>
-            </a:r>
-          </a:p>
-          <a:p>
-            <a:r>
-              <a:rPr lang="en-US" dirty="0" smtClean="0"/>
-              <a:t>The </a:t>
-            </a:r>
-            <a:r>
-              <a:rPr lang="en-US" dirty="0" err="1"/>
-              <a:t>Clojure</a:t>
-            </a:r>
-            <a:r>
-              <a:rPr lang="en-US" dirty="0"/>
-              <a:t> parser is probably the simplest and smallest of all the </a:t>
-            </a:r>
-            <a:r>
-              <a:rPr lang="en-US" dirty="0" smtClean="0"/>
-              <a:t>custom language </a:t>
-            </a:r>
-            <a:r>
-              <a:rPr lang="en-US" dirty="0"/>
-              <a:t>plugins that are maintained by </a:t>
-            </a:r>
-            <a:r>
-              <a:rPr lang="en-US" dirty="0" smtClean="0"/>
-              <a:t>us</a:t>
-            </a:r>
-          </a:p>
-          <a:p>
-            <a:r>
-              <a:rPr lang="en-US" dirty="0"/>
-              <a:t>No, IDEA currently does not have a ready solution for using generated </a:t>
-            </a:r>
-            <a:r>
-              <a:rPr lang="en-US" dirty="0" smtClean="0"/>
-              <a:t>parsers. The </a:t>
-            </a:r>
-            <a:r>
-              <a:rPr lang="en-US" b="1" dirty="0"/>
-              <a:t>typical approach </a:t>
-            </a:r>
-            <a:r>
-              <a:rPr lang="en-US" dirty="0"/>
-              <a:t>when writing parsers in IDEA is to create a method </a:t>
-            </a:r>
-            <a:r>
-              <a:rPr lang="en-US" dirty="0" err="1"/>
-              <a:t>parseSmth</a:t>
-            </a:r>
-            <a:r>
-              <a:rPr lang="en-US" dirty="0"/>
-              <a:t>(</a:t>
-            </a:r>
-            <a:r>
-              <a:rPr lang="en-US" dirty="0" smtClean="0"/>
-              <a:t>). for </a:t>
-            </a:r>
-            <a:r>
-              <a:rPr lang="en-US" dirty="0"/>
-              <a:t>each rule in the grammar, and implement the rule in terms of </a:t>
-            </a:r>
-            <a:r>
-              <a:rPr lang="en-US" dirty="0" err="1" smtClean="0"/>
-              <a:t>PsiBuilder</a:t>
-            </a:r>
-            <a:r>
-              <a:rPr lang="en-US" dirty="0" smtClean="0"/>
-              <a:t> markers.</a:t>
-            </a:r>
-          </a:p>
-          <a:p>
-            <a:r>
-              <a:rPr lang="en-US" dirty="0"/>
-              <a:t>write </a:t>
-            </a:r>
-            <a:r>
-              <a:rPr lang="en-US" dirty="0" err="1"/>
-              <a:t>lexer</a:t>
-            </a:r>
-            <a:r>
-              <a:rPr lang="en-US" dirty="0"/>
-              <a:t> and parser manually (</a:t>
-            </a:r>
-            <a:r>
-              <a:rPr lang="en-US" dirty="0" err="1"/>
-              <a:t>lexer</a:t>
-            </a:r>
-            <a:r>
-              <a:rPr lang="en-US" dirty="0"/>
-              <a:t> is </a:t>
-            </a:r>
-            <a:r>
-              <a:rPr lang="en-US" dirty="0" err="1"/>
-              <a:t>jflex</a:t>
-            </a:r>
-            <a:r>
-              <a:rPr lang="en-US" dirty="0"/>
-              <a:t>-generated and parser is completely by hand) since you have to continue your parsing whatever user types in</a:t>
-            </a:r>
-            <a:r>
-              <a:rPr lang="en-US" dirty="0" smtClean="0"/>
-              <a:t>.</a:t>
-            </a:r>
-          </a:p>
-          <a:p>
-            <a:r>
-              <a:rPr lang="en-US" dirty="0"/>
-              <a:t>Language construction never been easy, it doesn't matter if you do it </a:t>
-            </a:r>
-            <a:r>
-              <a:rPr lang="en-US" dirty="0" smtClean="0"/>
-              <a:t>by</a:t>
-            </a:r>
-            <a:r>
-              <a:rPr lang="en-US" dirty="0"/>
-              <a:t>  hand or by </a:t>
-            </a:r>
-            <a:r>
-              <a:rPr lang="en-US" dirty="0" err="1"/>
-              <a:t>Antlr</a:t>
-            </a:r>
-            <a:endParaRPr lang="en-US" dirty="0"/>
-          </a:p>
-        </p:txBody>
-      </p:sp>
-    </p:spTree>
-    <p:extLst>
-      <p:ext uri="{BB962C8B-B14F-4D97-AF65-F5344CB8AC3E}">
-        <p14:creationId xmlns:p14="http://schemas.microsoft.com/office/powerpoint/2010/main" val="3862011816"/>
       </p:ext>
     </p:extLst>
   </p:cSld>

</xml_diff>

<commit_message>
added R-connector for windows
</commit_message>
<xml_diff>
--- a/R4Intellij.pptx
+++ b/R4Intellij.pptx
@@ -5,34 +5,36 @@
     <p:sldMasterId id="2147483648" r:id="rId1"/>
   </p:sldMasterIdLst>
   <p:notesMasterIdLst>
-    <p:notesMasterId r:id="rId27"/>
+    <p:notesMasterId r:id="rId29"/>
   </p:notesMasterIdLst>
   <p:sldIdLst>
     <p:sldId id="256" r:id="rId2"/>
     <p:sldId id="281" r:id="rId3"/>
-    <p:sldId id="282" r:id="rId4"/>
-    <p:sldId id="259" r:id="rId5"/>
-    <p:sldId id="260" r:id="rId6"/>
-    <p:sldId id="261" r:id="rId7"/>
-    <p:sldId id="277" r:id="rId8"/>
-    <p:sldId id="258" r:id="rId9"/>
-    <p:sldId id="275" r:id="rId10"/>
-    <p:sldId id="262" r:id="rId11"/>
-    <p:sldId id="264" r:id="rId12"/>
-    <p:sldId id="272" r:id="rId13"/>
-    <p:sldId id="265" r:id="rId14"/>
-    <p:sldId id="266" r:id="rId15"/>
-    <p:sldId id="269" r:id="rId16"/>
-    <p:sldId id="276" r:id="rId17"/>
-    <p:sldId id="279" r:id="rId18"/>
-    <p:sldId id="268" r:id="rId19"/>
-    <p:sldId id="267" r:id="rId20"/>
-    <p:sldId id="274" r:id="rId21"/>
-    <p:sldId id="271" r:id="rId22"/>
-    <p:sldId id="270" r:id="rId23"/>
-    <p:sldId id="273" r:id="rId24"/>
-    <p:sldId id="278" r:id="rId25"/>
-    <p:sldId id="280" r:id="rId26"/>
+    <p:sldId id="284" r:id="rId4"/>
+    <p:sldId id="282" r:id="rId5"/>
+    <p:sldId id="259" r:id="rId6"/>
+    <p:sldId id="283" r:id="rId7"/>
+    <p:sldId id="260" r:id="rId8"/>
+    <p:sldId id="261" r:id="rId9"/>
+    <p:sldId id="277" r:id="rId10"/>
+    <p:sldId id="258" r:id="rId11"/>
+    <p:sldId id="275" r:id="rId12"/>
+    <p:sldId id="262" r:id="rId13"/>
+    <p:sldId id="264" r:id="rId14"/>
+    <p:sldId id="272" r:id="rId15"/>
+    <p:sldId id="265" r:id="rId16"/>
+    <p:sldId id="266" r:id="rId17"/>
+    <p:sldId id="269" r:id="rId18"/>
+    <p:sldId id="276" r:id="rId19"/>
+    <p:sldId id="279" r:id="rId20"/>
+    <p:sldId id="268" r:id="rId21"/>
+    <p:sldId id="267" r:id="rId22"/>
+    <p:sldId id="274" r:id="rId23"/>
+    <p:sldId id="271" r:id="rId24"/>
+    <p:sldId id="270" r:id="rId25"/>
+    <p:sldId id="273" r:id="rId26"/>
+    <p:sldId id="278" r:id="rId27"/>
+    <p:sldId id="280" r:id="rId28"/>
   </p:sldIdLst>
   <p:sldSz cx="9144000" cy="6858000" type="screen4x3"/>
   <p:notesSz cx="6858000" cy="9144000"/>
@@ -146,8 +148,10 @@
         </p14:section>
         <p14:section name="Roadmap" id="{94DA6817-C3E6-6E46-84C3-EF347EEFF33D}">
           <p14:sldIdLst>
+            <p14:sldId id="284"/>
             <p14:sldId id="282"/>
             <p14:sldId id="259"/>
+            <p14:sldId id="283"/>
             <p14:sldId id="260"/>
             <p14:sldId id="261"/>
           </p14:sldIdLst>
@@ -275,7 +279,7 @@
           <a:p>
             <a:fld id="{87682158-AFB6-1044-826E-FEC32920DECA}" type="datetimeFigureOut">
               <a:rPr lang="en-US" smtClean="0"/>
-              <a:t>1/8/12</a:t>
+              <a:t>1/13/12</a:t>
             </a:fld>
             <a:endParaRPr lang="en-US"/>
           </a:p>
@@ -589,34 +593,144 @@
           <a:p>
             <a:r>
               <a:rPr lang="en-US" dirty="0" smtClean="0"/>
-              <a:t>http://</a:t>
+              <a:t>From </a:t>
             </a:r>
             <a:r>
               <a:rPr lang="en-US" dirty="0" err="1" smtClean="0"/>
-              <a:t>de.wikipedia.org</a:t>
-            </a:r>
-            <a:r>
-              <a:rPr lang="en-US" dirty="0" smtClean="0"/>
-              <a:t>/wiki/LL-</a:t>
+              <a:t>statet</a:t>
+            </a:r>
+            <a:r>
+              <a:rPr lang="en-US" baseline="0" dirty="0" smtClean="0"/>
+              <a:t> website:</a:t>
+            </a:r>
+          </a:p>
+          <a:p>
+            <a:r>
+              <a:rPr lang="en-US" dirty="0" smtClean="0"/>
+              <a:t>The final release of </a:t>
             </a:r>
             <a:r>
               <a:rPr lang="en-US" dirty="0" err="1" smtClean="0"/>
-              <a:t>Parsevr</a:t>
+              <a:t>StatET</a:t>
+            </a:r>
+            <a:r>
+              <a:rPr lang="en-US" dirty="0" smtClean="0"/>
+              <a:t> 0.9.0 [2010-08-27] is available for download now.</a:t>
+            </a:r>
+          </a:p>
+          <a:p>
+            <a:r>
+              <a:rPr lang="en-US" dirty="0" smtClean="0"/>
+              <a:t>The major visible new feature in </a:t>
+            </a:r>
+            <a:r>
+              <a:rPr lang="en-US" dirty="0" err="1" smtClean="0"/>
+              <a:t>StatET</a:t>
+            </a:r>
+            <a:r>
+              <a:rPr lang="en-US" dirty="0" smtClean="0"/>
+              <a:t> is the integration of R help with</a:t>
+            </a:r>
+          </a:p>
+          <a:p>
+            <a:r>
+              <a:rPr lang="en-US" dirty="0" smtClean="0"/>
+              <a:t>A 'R Help' view allowing to read and browse through the help pages</a:t>
+            </a:r>
+          </a:p>
+          <a:p>
+            <a:r>
+              <a:rPr lang="en-US" dirty="0" smtClean="0"/>
+              <a:t>An Eclipse 'R Help' search, including a full-text search mode</a:t>
+            </a:r>
+          </a:p>
+          <a:p>
+            <a:r>
+              <a:rPr lang="en-US" dirty="0" smtClean="0"/>
+              <a:t>Integration in the R editor like an information hover for the help (mouse or keyboard shortcut F2)</a:t>
+            </a:r>
+          </a:p>
+          <a:p>
+            <a:r>
+              <a:rPr lang="en-US" dirty="0" smtClean="0"/>
+              <a:t>To enable the R help features, the help pages must be indexed (see below).</a:t>
+            </a:r>
+          </a:p>
+          <a:p>
+            <a:r>
+              <a:rPr lang="en-US" dirty="0" smtClean="0"/>
+              <a:t>A new R package '</a:t>
+            </a:r>
+            <a:r>
+              <a:rPr lang="en-US" dirty="0" err="1" smtClean="0"/>
+              <a:t>rj</a:t>
+            </a:r>
+            <a:r>
+              <a:rPr lang="en-US" dirty="0" smtClean="0"/>
+              <a:t>' provides R functions for the R help integration and other features in </a:t>
+            </a:r>
+            <a:r>
+              <a:rPr lang="en-US" dirty="0" err="1" smtClean="0"/>
+              <a:t>StatET</a:t>
+            </a:r>
+            <a:r>
+              <a:rPr lang="en-US" dirty="0" smtClean="0"/>
+              <a:t>. It is recommended to install the package, so you can use all tools making your work more comfortable. The '</a:t>
+            </a:r>
+            <a:r>
+              <a:rPr lang="en-US" dirty="0" err="1" smtClean="0"/>
+              <a:t>rj</a:t>
+            </a:r>
+            <a:r>
+              <a:rPr lang="en-US" dirty="0" smtClean="0"/>
+              <a:t>' package must be installed via the command line using:</a:t>
+            </a:r>
+          </a:p>
+          <a:p>
+            <a:r>
+              <a:rPr lang="en-US" dirty="0" smtClean="0"/>
+              <a:t>R CMD INSTALL --no-test-load </a:t>
+            </a:r>
+            <a:r>
+              <a:rPr lang="en-US" dirty="0" err="1" smtClean="0"/>
+              <a:t>rj</a:t>
+            </a:r>
+            <a:r>
+              <a:rPr lang="en-US" dirty="0" smtClean="0"/>
+              <a:t>_*.</a:t>
+            </a:r>
+            <a:r>
+              <a:rPr lang="en-US" dirty="0" err="1" smtClean="0"/>
+              <a:t>tar.gz</a:t>
             </a:r>
             <a:endParaRPr lang="en-US" dirty="0" smtClean="0"/>
           </a:p>
           <a:p>
             <a:r>
               <a:rPr lang="en-US" dirty="0" smtClean="0"/>
-              <a:t>http://</a:t>
+              <a:t>It is recommended to check and complete the settings for your R environments in the Eclipse/</a:t>
             </a:r>
             <a:r>
               <a:rPr lang="en-US" dirty="0" err="1" smtClean="0"/>
-              <a:t>de.wikipedia.org</a:t>
-            </a:r>
-            <a:r>
-              <a:rPr lang="en-US" dirty="0" smtClean="0"/>
-              <a:t>/wiki/LL(k)-Grammatik</a:t>
+              <a:t>StatET</a:t>
+            </a:r>
+            <a:r>
+              <a:rPr lang="en-US" dirty="0" smtClean="0"/>
+              <a:t> preferences.</a:t>
+            </a:r>
+          </a:p>
+          <a:p>
+            <a:r>
+              <a:rPr lang="en-US" dirty="0" smtClean="0"/>
+              <a:t>When starting the R console in </a:t>
+            </a:r>
+            <a:r>
+              <a:rPr lang="en-US" dirty="0" err="1" smtClean="0"/>
+              <a:t>StatET</a:t>
+            </a:r>
+            <a:r>
+              <a:rPr lang="en-US" dirty="0" smtClean="0"/>
+              <a:t>, you will be asked if it may index your R libraries. Depending on the number of installed packages, this can take some minutes.</a:t>
             </a:r>
             <a:endParaRPr lang="en-US" dirty="0"/>
           </a:p>
@@ -639,7 +753,7 @@
           <a:p>
             <a:fld id="{4FA87827-956D-2D4E-9772-6863DC7B302B}" type="slidenum">
               <a:rPr lang="en-US" smtClean="0"/>
-              <a:t>9</a:t>
+              <a:t>3</a:t>
             </a:fld>
             <a:endParaRPr lang="en-US"/>
           </a:p>
@@ -648,7 +762,7 @@
     </p:spTree>
     <p:extLst>
       <p:ext uri="{BB962C8B-B14F-4D97-AF65-F5344CB8AC3E}">
-        <p14:creationId xmlns:p14="http://schemas.microsoft.com/office/powerpoint/2010/main" val="2248504603"/>
+        <p14:creationId xmlns:p14="http://schemas.microsoft.com/office/powerpoint/2010/main" val="2891140552"/>
       </p:ext>
     </p:extLst>
   </p:cSld>
@@ -704,21 +818,51 @@
           <a:p>
             <a:r>
               <a:rPr lang="en-US" dirty="0" smtClean="0"/>
-              <a:t>http://</a:t>
+              <a:t>Every element which can be renamed or referenced (a class definition, a method definition and so on) needs to implement the </a:t>
             </a:r>
             <a:r>
               <a:rPr lang="en-US" dirty="0" err="1" smtClean="0"/>
-              <a:t>www.jetbrains.com</a:t>
-            </a:r>
-            <a:r>
-              <a:rPr lang="en-US" dirty="0" smtClean="0"/>
-              <a:t>/idea/plugins/</a:t>
+              <a:t>PsiNamedElement</a:t>
+            </a:r>
+            <a:r>
+              <a:rPr lang="en-US" dirty="0" smtClean="0"/>
+              <a:t> interface, with methods </a:t>
             </a:r>
             <a:r>
               <a:rPr lang="en-US" dirty="0" err="1" smtClean="0"/>
-              <a:t>PsiBuilder.gif</a:t>
-            </a:r>
-            <a:endParaRPr lang="en-US" dirty="0"/>
+              <a:t>getName</a:t>
+            </a:r>
+            <a:r>
+              <a:rPr lang="en-US" dirty="0" smtClean="0"/>
+              <a:t>() and </a:t>
+            </a:r>
+            <a:r>
+              <a:rPr lang="en-US" dirty="0" err="1" smtClean="0"/>
+              <a:t>setName</a:t>
+            </a:r>
+            <a:r>
+              <a:rPr lang="en-US" dirty="0" smtClean="0"/>
+              <a:t>()</a:t>
+            </a:r>
+          </a:p>
+          <a:p>
+            <a:r>
+              <a:rPr lang="en-US" dirty="0" smtClean="0"/>
+              <a:t>Proper error highlighting (see </a:t>
+            </a:r>
+            <a:r>
+              <a:rPr lang="en-US" dirty="0" smtClean="0">
+                <a:hlinkClick r:id="rId3"/>
+              </a:rPr>
+              <a:t>http://confluence.jetbrains.net/display/IDEADEV/Developing+Custom+Language+Plugins+for+IntelliJ+IDEA</a:t>
+            </a:r>
+            <a:r>
+              <a:rPr lang="en-US" smtClean="0"/>
+              <a:t> )</a:t>
+            </a:r>
+          </a:p>
+          <a:p>
+            <a:endParaRPr lang="en-US"/>
           </a:p>
         </p:txBody>
       </p:sp>
@@ -739,7 +883,7 @@
           <a:p>
             <a:fld id="{4FA87827-956D-2D4E-9772-6863DC7B302B}" type="slidenum">
               <a:rPr lang="en-US" smtClean="0"/>
-              <a:t>12</a:t>
+              <a:t>4</a:t>
             </a:fld>
             <a:endParaRPr lang="en-US"/>
           </a:p>
@@ -748,7 +892,7 @@
     </p:spTree>
     <p:extLst>
       <p:ext uri="{BB962C8B-B14F-4D97-AF65-F5344CB8AC3E}">
-        <p14:creationId xmlns:p14="http://schemas.microsoft.com/office/powerpoint/2010/main" val="2630468623"/>
+        <p14:creationId xmlns:p14="http://schemas.microsoft.com/office/powerpoint/2010/main" val="1775759898"/>
       </p:ext>
     </p:extLst>
   </p:cSld>
@@ -808,17 +952,32 @@
             </a:r>
             <a:r>
               <a:rPr lang="en-US" dirty="0" err="1" smtClean="0"/>
-              <a:t>en.wikipedia.org</a:t>
-            </a:r>
-            <a:r>
-              <a:rPr lang="en-US" dirty="0" smtClean="0"/>
-              <a:t>/wiki/</a:t>
-            </a:r>
-            <a:r>
-              <a:rPr lang="en-US" smtClean="0"/>
-              <a:t>Recursive_descent_parser</a:t>
-            </a:r>
-            <a:endParaRPr lang="en-US"/>
+              <a:t>de.wikipedia.org</a:t>
+            </a:r>
+            <a:r>
+              <a:rPr lang="en-US" dirty="0" smtClean="0"/>
+              <a:t>/wiki/LL-</a:t>
+            </a:r>
+            <a:r>
+              <a:rPr lang="en-US" dirty="0" err="1" smtClean="0"/>
+              <a:t>Parsevr</a:t>
+            </a:r>
+            <a:endParaRPr lang="en-US" dirty="0" smtClean="0"/>
+          </a:p>
+          <a:p>
+            <a:r>
+              <a:rPr lang="en-US" dirty="0" smtClean="0"/>
+              <a:t>http://</a:t>
+            </a:r>
+            <a:r>
+              <a:rPr lang="en-US" dirty="0" err="1" smtClean="0"/>
+              <a:t>de.wikipedia.org</a:t>
+            </a:r>
+            <a:r>
+              <a:rPr lang="en-US" dirty="0" smtClean="0"/>
+              <a:t>/wiki/LL(k)-Grammatik</a:t>
+            </a:r>
+            <a:endParaRPr lang="en-US" dirty="0"/>
           </a:p>
         </p:txBody>
       </p:sp>
@@ -839,7 +998,7 @@
           <a:p>
             <a:fld id="{4FA87827-956D-2D4E-9772-6863DC7B302B}" type="slidenum">
               <a:rPr lang="en-US" smtClean="0"/>
-              <a:t>14</a:t>
+              <a:t>11</a:t>
             </a:fld>
             <a:endParaRPr lang="en-US"/>
           </a:p>
@@ -848,7 +1007,7 @@
     </p:spTree>
     <p:extLst>
       <p:ext uri="{BB962C8B-B14F-4D97-AF65-F5344CB8AC3E}">
-        <p14:creationId xmlns:p14="http://schemas.microsoft.com/office/powerpoint/2010/main" val="476068197"/>
+        <p14:creationId xmlns:p14="http://schemas.microsoft.com/office/powerpoint/2010/main" val="2248504603"/>
       </p:ext>
     </p:extLst>
   </p:cSld>
@@ -912,6 +1071,206 @@
             </a:r>
             <a:r>
               <a:rPr lang="en-US" dirty="0" smtClean="0"/>
+              <a:t>/idea/plugins/</a:t>
+            </a:r>
+            <a:r>
+              <a:rPr lang="en-US" dirty="0" err="1" smtClean="0"/>
+              <a:t>PsiBuilder.gif</a:t>
+            </a:r>
+            <a:endParaRPr lang="en-US" dirty="0"/>
+          </a:p>
+        </p:txBody>
+      </p:sp>
+      <p:sp>
+        <p:nvSpPr>
+          <p:cNvPr id="4" name="Slide Number Placeholder 3"/>
+          <p:cNvSpPr>
+            <a:spLocks noGrp="1"/>
+          </p:cNvSpPr>
+          <p:nvPr>
+            <p:ph type="sldNum" sz="quarter" idx="10"/>
+          </p:nvPr>
+        </p:nvSpPr>
+        <p:spPr/>
+        <p:txBody>
+          <a:bodyPr/>
+          <a:lstStyle/>
+          <a:p>
+            <a:fld id="{4FA87827-956D-2D4E-9772-6863DC7B302B}" type="slidenum">
+              <a:rPr lang="en-US" smtClean="0"/>
+              <a:t>14</a:t>
+            </a:fld>
+            <a:endParaRPr lang="en-US"/>
+          </a:p>
+        </p:txBody>
+      </p:sp>
+    </p:spTree>
+    <p:extLst>
+      <p:ext uri="{BB962C8B-B14F-4D97-AF65-F5344CB8AC3E}">
+        <p14:creationId xmlns:p14="http://schemas.microsoft.com/office/powerpoint/2010/main" val="2630468623"/>
+      </p:ext>
+    </p:extLst>
+  </p:cSld>
+  <p:clrMapOvr>
+    <a:masterClrMapping/>
+  </p:clrMapOvr>
+</p:notes>
+</file>
+
+<file path=ppt/notesSlides/notesSlide5.xml><?xml version="1.0" encoding="utf-8"?>
+<p:notes xmlns:a="http://schemas.openxmlformats.org/drawingml/2006/main" xmlns:r="http://schemas.openxmlformats.org/officeDocument/2006/relationships" xmlns:p="http://schemas.openxmlformats.org/presentationml/2006/main">
+  <p:cSld>
+    <p:spTree>
+      <p:nvGrpSpPr>
+        <p:cNvPr id="1" name=""/>
+        <p:cNvGrpSpPr/>
+        <p:nvPr/>
+      </p:nvGrpSpPr>
+      <p:grpSpPr>
+        <a:xfrm>
+          <a:off x="0" y="0"/>
+          <a:ext cx="0" cy="0"/>
+          <a:chOff x="0" y="0"/>
+          <a:chExt cx="0" cy="0"/>
+        </a:xfrm>
+      </p:grpSpPr>
+      <p:sp>
+        <p:nvSpPr>
+          <p:cNvPr id="2" name="Slide Image Placeholder 1"/>
+          <p:cNvSpPr>
+            <a:spLocks noGrp="1" noRot="1" noChangeAspect="1"/>
+          </p:cNvSpPr>
+          <p:nvPr>
+            <p:ph type="sldImg"/>
+          </p:nvPr>
+        </p:nvSpPr>
+        <p:spPr/>
+      </p:sp>
+      <p:sp>
+        <p:nvSpPr>
+          <p:cNvPr id="3" name="Notes Placeholder 2"/>
+          <p:cNvSpPr>
+            <a:spLocks noGrp="1"/>
+          </p:cNvSpPr>
+          <p:nvPr>
+            <p:ph type="body" idx="1"/>
+          </p:nvPr>
+        </p:nvSpPr>
+        <p:spPr/>
+        <p:txBody>
+          <a:bodyPr/>
+          <a:lstStyle/>
+          <a:p>
+            <a:r>
+              <a:rPr lang="en-US" dirty="0" smtClean="0"/>
+              <a:t>http://</a:t>
+            </a:r>
+            <a:r>
+              <a:rPr lang="en-US" dirty="0" err="1" smtClean="0"/>
+              <a:t>en.wikipedia.org</a:t>
+            </a:r>
+            <a:r>
+              <a:rPr lang="en-US" dirty="0" smtClean="0"/>
+              <a:t>/wiki/</a:t>
+            </a:r>
+            <a:r>
+              <a:rPr lang="en-US" smtClean="0"/>
+              <a:t>Recursive_descent_parser</a:t>
+            </a:r>
+            <a:endParaRPr lang="en-US"/>
+          </a:p>
+        </p:txBody>
+      </p:sp>
+      <p:sp>
+        <p:nvSpPr>
+          <p:cNvPr id="4" name="Slide Number Placeholder 3"/>
+          <p:cNvSpPr>
+            <a:spLocks noGrp="1"/>
+          </p:cNvSpPr>
+          <p:nvPr>
+            <p:ph type="sldNum" sz="quarter" idx="10"/>
+          </p:nvPr>
+        </p:nvSpPr>
+        <p:spPr/>
+        <p:txBody>
+          <a:bodyPr/>
+          <a:lstStyle/>
+          <a:p>
+            <a:fld id="{4FA87827-956D-2D4E-9772-6863DC7B302B}" type="slidenum">
+              <a:rPr lang="en-US" smtClean="0"/>
+              <a:t>16</a:t>
+            </a:fld>
+            <a:endParaRPr lang="en-US"/>
+          </a:p>
+        </p:txBody>
+      </p:sp>
+    </p:spTree>
+    <p:extLst>
+      <p:ext uri="{BB962C8B-B14F-4D97-AF65-F5344CB8AC3E}">
+        <p14:creationId xmlns:p14="http://schemas.microsoft.com/office/powerpoint/2010/main" val="476068197"/>
+      </p:ext>
+    </p:extLst>
+  </p:cSld>
+  <p:clrMapOvr>
+    <a:masterClrMapping/>
+  </p:clrMapOvr>
+</p:notes>
+</file>
+
+<file path=ppt/notesSlides/notesSlide6.xml><?xml version="1.0" encoding="utf-8"?>
+<p:notes xmlns:a="http://schemas.openxmlformats.org/drawingml/2006/main" xmlns:r="http://schemas.openxmlformats.org/officeDocument/2006/relationships" xmlns:p="http://schemas.openxmlformats.org/presentationml/2006/main">
+  <p:cSld>
+    <p:spTree>
+      <p:nvGrpSpPr>
+        <p:cNvPr id="1" name=""/>
+        <p:cNvGrpSpPr/>
+        <p:nvPr/>
+      </p:nvGrpSpPr>
+      <p:grpSpPr>
+        <a:xfrm>
+          <a:off x="0" y="0"/>
+          <a:ext cx="0" cy="0"/>
+          <a:chOff x="0" y="0"/>
+          <a:chExt cx="0" cy="0"/>
+        </a:xfrm>
+      </p:grpSpPr>
+      <p:sp>
+        <p:nvSpPr>
+          <p:cNvPr id="2" name="Slide Image Placeholder 1"/>
+          <p:cNvSpPr>
+            <a:spLocks noGrp="1" noRot="1" noChangeAspect="1"/>
+          </p:cNvSpPr>
+          <p:nvPr>
+            <p:ph type="sldImg"/>
+          </p:nvPr>
+        </p:nvSpPr>
+        <p:spPr/>
+      </p:sp>
+      <p:sp>
+        <p:nvSpPr>
+          <p:cNvPr id="3" name="Notes Placeholder 2"/>
+          <p:cNvSpPr>
+            <a:spLocks noGrp="1"/>
+          </p:cNvSpPr>
+          <p:nvPr>
+            <p:ph type="body" idx="1"/>
+          </p:nvPr>
+        </p:nvSpPr>
+        <p:spPr/>
+        <p:txBody>
+          <a:bodyPr/>
+          <a:lstStyle/>
+          <a:p>
+            <a:r>
+              <a:rPr lang="en-US" dirty="0" smtClean="0"/>
+              <a:t>http://</a:t>
+            </a:r>
+            <a:r>
+              <a:rPr lang="en-US" dirty="0" err="1" smtClean="0"/>
+              <a:t>www.jetbrains.com</a:t>
+            </a:r>
+            <a:r>
+              <a:rPr lang="en-US" dirty="0" smtClean="0"/>
               <a:t>/idea/features/open_api_plugin_manager.html#link2</a:t>
             </a:r>
             <a:endParaRPr lang="en-US" dirty="0"/>
@@ -935,7 +1294,7 @@
           <a:p>
             <a:fld id="{4FA87827-956D-2D4E-9772-6863DC7B302B}" type="slidenum">
               <a:rPr lang="en-US" smtClean="0"/>
-              <a:t>18</a:t>
+              <a:t>20</a:t>
             </a:fld>
             <a:endParaRPr lang="en-US"/>
           </a:p>
@@ -1135,7 +1494,7 @@
           <a:p>
             <a:fld id="{903CF105-E729-A944-8550-FE8B359D2D68}" type="datetimeFigureOut">
               <a:rPr lang="en-US" smtClean="0"/>
-              <a:t>1/8/12</a:t>
+              <a:t>1/13/12</a:t>
             </a:fld>
             <a:endParaRPr lang="en-US"/>
           </a:p>
@@ -1305,7 +1664,7 @@
           <a:p>
             <a:fld id="{903CF105-E729-A944-8550-FE8B359D2D68}" type="datetimeFigureOut">
               <a:rPr lang="en-US" smtClean="0"/>
-              <a:t>1/8/12</a:t>
+              <a:t>1/13/12</a:t>
             </a:fld>
             <a:endParaRPr lang="en-US"/>
           </a:p>
@@ -1485,7 +1844,7 @@
           <a:p>
             <a:fld id="{903CF105-E729-A944-8550-FE8B359D2D68}" type="datetimeFigureOut">
               <a:rPr lang="en-US" smtClean="0"/>
-              <a:t>1/8/12</a:t>
+              <a:t>1/13/12</a:t>
             </a:fld>
             <a:endParaRPr lang="en-US"/>
           </a:p>
@@ -1655,7 +2014,7 @@
           <a:p>
             <a:fld id="{903CF105-E729-A944-8550-FE8B359D2D68}" type="datetimeFigureOut">
               <a:rPr lang="en-US" smtClean="0"/>
-              <a:t>1/8/12</a:t>
+              <a:t>1/13/12</a:t>
             </a:fld>
             <a:endParaRPr lang="en-US"/>
           </a:p>
@@ -1901,7 +2260,7 @@
           <a:p>
             <a:fld id="{903CF105-E729-A944-8550-FE8B359D2D68}" type="datetimeFigureOut">
               <a:rPr lang="en-US" smtClean="0"/>
-              <a:t>1/8/12</a:t>
+              <a:t>1/13/12</a:t>
             </a:fld>
             <a:endParaRPr lang="en-US"/>
           </a:p>
@@ -2189,7 +2548,7 @@
           <a:p>
             <a:fld id="{903CF105-E729-A944-8550-FE8B359D2D68}" type="datetimeFigureOut">
               <a:rPr lang="en-US" smtClean="0"/>
-              <a:t>1/8/12</a:t>
+              <a:t>1/13/12</a:t>
             </a:fld>
             <a:endParaRPr lang="en-US"/>
           </a:p>
@@ -2611,7 +2970,7 @@
           <a:p>
             <a:fld id="{903CF105-E729-A944-8550-FE8B359D2D68}" type="datetimeFigureOut">
               <a:rPr lang="en-US" smtClean="0"/>
-              <a:t>1/8/12</a:t>
+              <a:t>1/13/12</a:t>
             </a:fld>
             <a:endParaRPr lang="en-US"/>
           </a:p>
@@ -2729,7 +3088,7 @@
           <a:p>
             <a:fld id="{903CF105-E729-A944-8550-FE8B359D2D68}" type="datetimeFigureOut">
               <a:rPr lang="en-US" smtClean="0"/>
-              <a:t>1/8/12</a:t>
+              <a:t>1/13/12</a:t>
             </a:fld>
             <a:endParaRPr lang="en-US"/>
           </a:p>
@@ -2824,7 +3183,7 @@
           <a:p>
             <a:fld id="{903CF105-E729-A944-8550-FE8B359D2D68}" type="datetimeFigureOut">
               <a:rPr lang="en-US" smtClean="0"/>
-              <a:t>1/8/12</a:t>
+              <a:t>1/13/12</a:t>
             </a:fld>
             <a:endParaRPr lang="en-US"/>
           </a:p>
@@ -3101,7 +3460,7 @@
           <a:p>
             <a:fld id="{903CF105-E729-A944-8550-FE8B359D2D68}" type="datetimeFigureOut">
               <a:rPr lang="en-US" smtClean="0"/>
-              <a:t>1/8/12</a:t>
+              <a:t>1/13/12</a:t>
             </a:fld>
             <a:endParaRPr lang="en-US"/>
           </a:p>
@@ -3354,7 +3713,7 @@
           <a:p>
             <a:fld id="{903CF105-E729-A944-8550-FE8B359D2D68}" type="datetimeFigureOut">
               <a:rPr lang="en-US" smtClean="0"/>
-              <a:t>1/8/12</a:t>
+              <a:t>1/13/12</a:t>
             </a:fld>
             <a:endParaRPr lang="en-US"/>
           </a:p>
@@ -3567,7 +3926,7 @@
           <a:p>
             <a:fld id="{903CF105-E729-A944-8550-FE8B359D2D68}" type="datetimeFigureOut">
               <a:rPr lang="en-US" smtClean="0"/>
-              <a:t>1/8/12</a:t>
+              <a:t>1/13/12</a:t>
             </a:fld>
             <a:endParaRPr lang="en-US"/>
           </a:p>
@@ -4043,6 +4402,752 @@
           <a:p>
             <a:r>
               <a:rPr lang="en-US" dirty="0" smtClean="0"/>
+              <a:t>Parser</a:t>
+            </a:r>
+            <a:endParaRPr lang="en-US" dirty="0"/>
+          </a:p>
+        </p:txBody>
+      </p:sp>
+      <p:sp>
+        <p:nvSpPr>
+          <p:cNvPr id="3" name="Content Placeholder 2"/>
+          <p:cNvSpPr>
+            <a:spLocks noGrp="1"/>
+          </p:cNvSpPr>
+          <p:nvPr>
+            <p:ph idx="1"/>
+          </p:nvPr>
+        </p:nvSpPr>
+        <p:spPr/>
+        <p:txBody>
+          <a:bodyPr>
+            <a:normAutofit fontScale="85000" lnSpcReduction="10000"/>
+          </a:bodyPr>
+          <a:lstStyle/>
+          <a:p>
+            <a:r>
+              <a:rPr lang="en-US" dirty="0"/>
+              <a:t>The parser works by setting pairs of markers (</a:t>
+            </a:r>
+            <a:r>
+              <a:rPr lang="en-US" dirty="0" err="1"/>
+              <a:t>PsiBuilder.Marker</a:t>
+            </a:r>
+            <a:r>
+              <a:rPr lang="en-US" dirty="0"/>
+              <a:t> instances) within the stream of tokens received from the </a:t>
+            </a:r>
+            <a:r>
+              <a:rPr lang="en-US" dirty="0" err="1"/>
+              <a:t>lexer</a:t>
+            </a:r>
+            <a:r>
+              <a:rPr lang="en-US" dirty="0"/>
+              <a:t>. Each pair of markers defines the range of </a:t>
+            </a:r>
+            <a:r>
+              <a:rPr lang="en-US" dirty="0" err="1"/>
+              <a:t>lexer</a:t>
+            </a:r>
+            <a:r>
+              <a:rPr lang="en-US" dirty="0"/>
+              <a:t> tokens for a single node in the AST tree. If a pair of markers is nested in another pair (starts after its start and ends before its end), it becomes the child node of the outer pair</a:t>
+            </a:r>
+            <a:r>
+              <a:rPr lang="en-US" dirty="0" smtClean="0"/>
+              <a:t>.</a:t>
+            </a:r>
+          </a:p>
+          <a:p>
+            <a:r>
+              <a:rPr lang="en-US" dirty="0"/>
+              <a:t>The element type for the marker pair (and for the AST node created from it) is specified when the end marker is set (by a call to </a:t>
+            </a:r>
+            <a:r>
+              <a:rPr lang="en-US" dirty="0" err="1"/>
+              <a:t>PsiBuilder.Marker.done</a:t>
+            </a:r>
+            <a:r>
+              <a:rPr lang="en-US" dirty="0"/>
+              <a:t>()</a:t>
+            </a:r>
+            <a:r>
+              <a:rPr lang="en-US" dirty="0" smtClean="0"/>
+              <a:t>)</a:t>
+            </a:r>
+          </a:p>
+          <a:p>
+            <a:r>
+              <a:rPr lang="en-US" dirty="0" err="1" smtClean="0"/>
+              <a:t>BashElementTypes</a:t>
+            </a:r>
+            <a:r>
+              <a:rPr lang="en-US" dirty="0" smtClean="0"/>
+              <a:t> </a:t>
+            </a:r>
+            <a:r>
+              <a:rPr lang="en-US" dirty="0" err="1" smtClean="0"/>
+              <a:t>vs</a:t>
+            </a:r>
+            <a:r>
+              <a:rPr lang="en-US" dirty="0" smtClean="0"/>
+              <a:t> </a:t>
+            </a:r>
+            <a:r>
+              <a:rPr lang="en-US" smtClean="0"/>
+              <a:t>BashTokenTypes</a:t>
+            </a:r>
+            <a:endParaRPr lang="en-US" dirty="0"/>
+          </a:p>
+        </p:txBody>
+      </p:sp>
+    </p:spTree>
+    <p:extLst>
+      <p:ext uri="{BB962C8B-B14F-4D97-AF65-F5344CB8AC3E}">
+        <p14:creationId xmlns:p14="http://schemas.microsoft.com/office/powerpoint/2010/main" val="362419930"/>
+      </p:ext>
+    </p:extLst>
+  </p:cSld>
+  <p:clrMapOvr>
+    <a:masterClrMapping/>
+  </p:clrMapOvr>
+</p:sld>
+</file>
+
+<file path=ppt/slides/slide11.xml><?xml version="1.0" encoding="utf-8"?>
+<p:sld xmlns:a="http://schemas.openxmlformats.org/drawingml/2006/main" xmlns:r="http://schemas.openxmlformats.org/officeDocument/2006/relationships" xmlns:p="http://schemas.openxmlformats.org/presentationml/2006/main">
+  <p:cSld>
+    <p:spTree>
+      <p:nvGrpSpPr>
+        <p:cNvPr id="1" name=""/>
+        <p:cNvGrpSpPr/>
+        <p:nvPr/>
+      </p:nvGrpSpPr>
+      <p:grpSpPr>
+        <a:xfrm>
+          <a:off x="0" y="0"/>
+          <a:ext cx="0" cy="0"/>
+          <a:chOff x="0" y="0"/>
+          <a:chExt cx="0" cy="0"/>
+        </a:xfrm>
+      </p:grpSpPr>
+      <p:sp>
+        <p:nvSpPr>
+          <p:cNvPr id="2" name="Title 1"/>
+          <p:cNvSpPr>
+            <a:spLocks noGrp="1"/>
+          </p:cNvSpPr>
+          <p:nvPr>
+            <p:ph type="title"/>
+          </p:nvPr>
+        </p:nvSpPr>
+        <p:spPr/>
+        <p:txBody>
+          <a:bodyPr/>
+          <a:lstStyle/>
+          <a:p>
+            <a:r>
+              <a:rPr lang="en-US" dirty="0" smtClean="0"/>
+              <a:t>Parser Basics: LL-Parser</a:t>
+            </a:r>
+            <a:endParaRPr lang="en-US" dirty="0"/>
+          </a:p>
+        </p:txBody>
+      </p:sp>
+      <p:sp>
+        <p:nvSpPr>
+          <p:cNvPr id="3" name="Content Placeholder 2"/>
+          <p:cNvSpPr>
+            <a:spLocks noGrp="1"/>
+          </p:cNvSpPr>
+          <p:nvPr>
+            <p:ph idx="1"/>
+          </p:nvPr>
+        </p:nvSpPr>
+        <p:spPr/>
+        <p:txBody>
+          <a:bodyPr>
+            <a:normAutofit fontScale="77500" lnSpcReduction="20000"/>
+          </a:bodyPr>
+          <a:lstStyle/>
+          <a:p>
+            <a:r>
+              <a:rPr lang="en-US" dirty="0" err="1"/>
+              <a:t>Ein</a:t>
+            </a:r>
+            <a:r>
+              <a:rPr lang="en-US" dirty="0"/>
+              <a:t> LL-Parser </a:t>
+            </a:r>
+            <a:r>
+              <a:rPr lang="en-US" dirty="0" err="1"/>
+              <a:t>heißt</a:t>
+            </a:r>
+            <a:r>
+              <a:rPr lang="en-US" dirty="0"/>
+              <a:t> LL(k)-Parser, </a:t>
+            </a:r>
+            <a:r>
+              <a:rPr lang="en-US" dirty="0" err="1"/>
+              <a:t>wenn</a:t>
+            </a:r>
+            <a:r>
+              <a:rPr lang="en-US" dirty="0"/>
+              <a:t> </a:t>
+            </a:r>
+            <a:r>
+              <a:rPr lang="en-US" dirty="0" err="1"/>
+              <a:t>er</a:t>
+            </a:r>
+            <a:r>
+              <a:rPr lang="en-US" dirty="0"/>
+              <a:t> </a:t>
+            </a:r>
+            <a:r>
+              <a:rPr lang="en-US" dirty="0" err="1"/>
+              <a:t>während</a:t>
+            </a:r>
+            <a:r>
+              <a:rPr lang="en-US" dirty="0"/>
+              <a:t> des </a:t>
+            </a:r>
+            <a:r>
+              <a:rPr lang="en-US" dirty="0" err="1"/>
+              <a:t>Parsens</a:t>
+            </a:r>
+            <a:r>
+              <a:rPr lang="en-US" dirty="0"/>
+              <a:t> k Tokens </a:t>
+            </a:r>
+            <a:r>
+              <a:rPr lang="en-US" dirty="0" err="1"/>
+              <a:t>vorausschauen</a:t>
+            </a:r>
+            <a:r>
+              <a:rPr lang="en-US" dirty="0"/>
+              <a:t> </a:t>
+            </a:r>
+            <a:r>
+              <a:rPr lang="en-US" dirty="0" err="1"/>
+              <a:t>kann</a:t>
+            </a:r>
+            <a:r>
+              <a:rPr lang="en-US" dirty="0"/>
+              <a:t> und </a:t>
+            </a:r>
+            <a:r>
+              <a:rPr lang="en-US" dirty="0" err="1"/>
+              <a:t>im</a:t>
+            </a:r>
+            <a:r>
+              <a:rPr lang="en-US" dirty="0"/>
+              <a:t> </a:t>
+            </a:r>
+            <a:r>
+              <a:rPr lang="en-US" dirty="0" err="1"/>
+              <a:t>Gegensatz</a:t>
+            </a:r>
+            <a:r>
+              <a:rPr lang="en-US" dirty="0"/>
+              <a:t> </a:t>
+            </a:r>
+            <a:r>
+              <a:rPr lang="en-US" dirty="0" err="1"/>
+              <a:t>zum</a:t>
+            </a:r>
+            <a:r>
+              <a:rPr lang="en-US" dirty="0"/>
+              <a:t> LF-Parser den </a:t>
+            </a:r>
+            <a:r>
+              <a:rPr lang="en-US" dirty="0" err="1"/>
+              <a:t>Kellerinhalt</a:t>
+            </a:r>
+            <a:r>
+              <a:rPr lang="en-US" dirty="0"/>
+              <a:t> </a:t>
+            </a:r>
+            <a:r>
+              <a:rPr lang="en-US" dirty="0" err="1"/>
+              <a:t>benutzt</a:t>
+            </a:r>
+            <a:r>
+              <a:rPr lang="en-US" dirty="0"/>
+              <a:t>. k </a:t>
+            </a:r>
+            <a:r>
+              <a:rPr lang="en-US" dirty="0" err="1"/>
+              <a:t>wird</a:t>
+            </a:r>
+            <a:r>
+              <a:rPr lang="en-US" dirty="0"/>
+              <a:t> </a:t>
+            </a:r>
+            <a:r>
+              <a:rPr lang="en-US" dirty="0" err="1"/>
+              <a:t>dabei</a:t>
+            </a:r>
+            <a:r>
+              <a:rPr lang="en-US" dirty="0"/>
+              <a:t> </a:t>
+            </a:r>
+            <a:r>
+              <a:rPr lang="en-US" dirty="0" err="1"/>
+              <a:t>als</a:t>
+            </a:r>
+            <a:r>
+              <a:rPr lang="en-US" dirty="0"/>
+              <a:t> </a:t>
+            </a:r>
+            <a:r>
+              <a:rPr lang="en-US" dirty="0" err="1"/>
+              <a:t>Lookahead</a:t>
+            </a:r>
+            <a:r>
+              <a:rPr lang="en-US" dirty="0"/>
+              <a:t> </a:t>
+            </a:r>
+            <a:r>
+              <a:rPr lang="en-US" dirty="0" err="1" smtClean="0"/>
+              <a:t>bezeichnet</a:t>
+            </a:r>
+            <a:endParaRPr lang="en-US" dirty="0" smtClean="0"/>
+          </a:p>
+          <a:p>
+            <a:r>
+              <a:rPr lang="en-US" dirty="0" err="1"/>
+              <a:t>Obwohl</a:t>
+            </a:r>
+            <a:r>
+              <a:rPr lang="en-US" dirty="0"/>
+              <a:t> die LL(k)-</a:t>
+            </a:r>
+            <a:r>
+              <a:rPr lang="en-US" dirty="0" err="1"/>
+              <a:t>Grammatiken</a:t>
+            </a:r>
+            <a:r>
+              <a:rPr lang="en-US" dirty="0"/>
+              <a:t> </a:t>
+            </a:r>
+            <a:r>
+              <a:rPr lang="en-US" dirty="0" err="1"/>
+              <a:t>relativ</a:t>
+            </a:r>
+            <a:r>
+              <a:rPr lang="en-US" dirty="0"/>
+              <a:t> </a:t>
+            </a:r>
+            <a:r>
+              <a:rPr lang="en-US" dirty="0" err="1"/>
+              <a:t>eingeschränkt</a:t>
+            </a:r>
+            <a:r>
+              <a:rPr lang="en-US" dirty="0"/>
+              <a:t> </a:t>
+            </a:r>
+            <a:r>
+              <a:rPr lang="en-US" dirty="0" err="1"/>
+              <a:t>sind</a:t>
+            </a:r>
+            <a:r>
+              <a:rPr lang="en-US" dirty="0"/>
+              <a:t>, </a:t>
+            </a:r>
+            <a:r>
+              <a:rPr lang="en-US" dirty="0" err="1"/>
+              <a:t>werden</a:t>
+            </a:r>
+            <a:r>
+              <a:rPr lang="en-US" dirty="0"/>
+              <a:t> LL(k)-Parser oft </a:t>
+            </a:r>
+            <a:r>
+              <a:rPr lang="en-US" dirty="0" err="1"/>
+              <a:t>benutzt</a:t>
+            </a:r>
+            <a:r>
+              <a:rPr lang="en-US" dirty="0"/>
+              <a:t>. Die </a:t>
+            </a:r>
+            <a:r>
+              <a:rPr lang="en-US" dirty="0" err="1"/>
+              <a:t>Entscheidung</a:t>
+            </a:r>
+            <a:r>
+              <a:rPr lang="en-US" dirty="0"/>
+              <a:t>, </a:t>
+            </a:r>
+            <a:r>
+              <a:rPr lang="en-US" dirty="0" err="1"/>
+              <a:t>nach</a:t>
+            </a:r>
+            <a:r>
+              <a:rPr lang="en-US" dirty="0"/>
+              <a:t> </a:t>
+            </a:r>
+            <a:r>
+              <a:rPr lang="en-US" dirty="0" err="1"/>
+              <a:t>welcher</a:t>
+            </a:r>
+            <a:r>
+              <a:rPr lang="en-US" dirty="0"/>
+              <a:t> Regel </a:t>
+            </a:r>
+            <a:r>
+              <a:rPr lang="en-US" dirty="0" err="1"/>
+              <a:t>expandiert</a:t>
+            </a:r>
+            <a:r>
+              <a:rPr lang="en-US" dirty="0"/>
+              <a:t> </a:t>
+            </a:r>
+            <a:r>
+              <a:rPr lang="en-US" dirty="0" err="1"/>
+              <a:t>wird</a:t>
+            </a:r>
+            <a:r>
+              <a:rPr lang="en-US" dirty="0"/>
+              <a:t>, </a:t>
+            </a:r>
+            <a:r>
+              <a:rPr lang="en-US" dirty="0" err="1"/>
+              <a:t>kann</a:t>
+            </a:r>
+            <a:r>
+              <a:rPr lang="en-US" dirty="0"/>
+              <a:t> </a:t>
+            </a:r>
+            <a:r>
+              <a:rPr lang="en-US" dirty="0" err="1"/>
+              <a:t>allein</a:t>
+            </a:r>
+            <a:r>
+              <a:rPr lang="en-US" dirty="0"/>
+              <a:t> </a:t>
+            </a:r>
+            <a:r>
+              <a:rPr lang="en-US" dirty="0" err="1"/>
+              <a:t>durch</a:t>
+            </a:r>
+            <a:r>
+              <a:rPr lang="en-US" dirty="0"/>
+              <a:t> </a:t>
+            </a:r>
+            <a:r>
+              <a:rPr lang="en-US" dirty="0" err="1"/>
+              <a:t>Analyse</a:t>
+            </a:r>
+            <a:r>
+              <a:rPr lang="en-US" dirty="0"/>
+              <a:t> des </a:t>
+            </a:r>
+            <a:r>
+              <a:rPr lang="en-US" dirty="0" err="1"/>
+              <a:t>Lookahead</a:t>
+            </a:r>
+            <a:r>
+              <a:rPr lang="en-US" dirty="0"/>
+              <a:t> </a:t>
+            </a:r>
+            <a:r>
+              <a:rPr lang="en-US" dirty="0" err="1"/>
+              <a:t>getroffen</a:t>
+            </a:r>
+            <a:r>
+              <a:rPr lang="en-US" dirty="0"/>
+              <a:t> </a:t>
+            </a:r>
+            <a:r>
+              <a:rPr lang="en-US" dirty="0" err="1"/>
+              <a:t>werden</a:t>
+            </a:r>
+            <a:r>
+              <a:rPr lang="en-US" dirty="0"/>
+              <a:t>. </a:t>
+            </a:r>
+            <a:r>
+              <a:rPr lang="en-US" dirty="0" err="1"/>
+              <a:t>Eine</a:t>
+            </a:r>
+            <a:r>
+              <a:rPr lang="en-US" dirty="0"/>
+              <a:t> </a:t>
+            </a:r>
+            <a:r>
+              <a:rPr lang="en-US" dirty="0" err="1"/>
+              <a:t>einfache</a:t>
+            </a:r>
+            <a:r>
+              <a:rPr lang="en-US" dirty="0"/>
+              <a:t> </a:t>
+            </a:r>
+            <a:r>
+              <a:rPr lang="en-US" dirty="0" err="1"/>
+              <a:t>Möglichkeit</a:t>
+            </a:r>
+            <a:r>
+              <a:rPr lang="en-US" dirty="0"/>
+              <a:t> </a:t>
+            </a:r>
+            <a:r>
+              <a:rPr lang="en-US" dirty="0" err="1"/>
+              <a:t>zur</a:t>
+            </a:r>
+            <a:r>
+              <a:rPr lang="en-US" dirty="0"/>
+              <a:t> </a:t>
+            </a:r>
+            <a:r>
+              <a:rPr lang="en-US" dirty="0" err="1"/>
+              <a:t>Implementierung</a:t>
+            </a:r>
+            <a:r>
+              <a:rPr lang="en-US" dirty="0"/>
+              <a:t> </a:t>
+            </a:r>
+            <a:r>
+              <a:rPr lang="en-US" dirty="0" err="1"/>
+              <a:t>dieser</a:t>
+            </a:r>
+            <a:r>
+              <a:rPr lang="en-US" dirty="0"/>
+              <a:t> </a:t>
+            </a:r>
+            <a:r>
+              <a:rPr lang="en-US" dirty="0" err="1"/>
+              <a:t>Parsertechnik</a:t>
+            </a:r>
+            <a:r>
+              <a:rPr lang="en-US" dirty="0"/>
+              <a:t> </a:t>
+            </a:r>
+            <a:r>
+              <a:rPr lang="en-US" dirty="0" err="1"/>
+              <a:t>bietet</a:t>
+            </a:r>
+            <a:r>
+              <a:rPr lang="en-US" dirty="0"/>
+              <a:t> die </a:t>
+            </a:r>
+            <a:r>
+              <a:rPr lang="en-US" dirty="0" err="1"/>
+              <a:t>Methode</a:t>
+            </a:r>
+            <a:r>
+              <a:rPr lang="en-US" dirty="0"/>
+              <a:t> des </a:t>
+            </a:r>
+            <a:r>
+              <a:rPr lang="en-US" dirty="0" err="1"/>
+              <a:t>rekursiven</a:t>
+            </a:r>
+            <a:r>
+              <a:rPr lang="en-US" dirty="0"/>
+              <a:t> </a:t>
+            </a:r>
+            <a:r>
+              <a:rPr lang="en-US" dirty="0" err="1" smtClean="0"/>
+              <a:t>Abstiegs</a:t>
+            </a:r>
+            <a:endParaRPr lang="en-US" dirty="0" smtClean="0"/>
+          </a:p>
+          <a:p>
+            <a:r>
+              <a:rPr lang="en-US" dirty="0" err="1"/>
+              <a:t>Eine</a:t>
+            </a:r>
+            <a:r>
+              <a:rPr lang="en-US" dirty="0"/>
+              <a:t> </a:t>
+            </a:r>
+            <a:r>
+              <a:rPr lang="en-US" dirty="0" err="1"/>
+              <a:t>kontextfreie</a:t>
+            </a:r>
+            <a:r>
+              <a:rPr lang="en-US" dirty="0"/>
+              <a:t> Grammatik </a:t>
+            </a:r>
+            <a:r>
+              <a:rPr lang="en-US" dirty="0" err="1"/>
+              <a:t>heißt</a:t>
+            </a:r>
+            <a:r>
+              <a:rPr lang="en-US" dirty="0"/>
+              <a:t> </a:t>
+            </a:r>
+            <a:r>
+              <a:rPr lang="en-US" b="1" dirty="0"/>
+              <a:t>LL(k)-Grammatik </a:t>
+            </a:r>
+            <a:r>
+              <a:rPr lang="en-US" dirty="0" err="1"/>
+              <a:t>für</a:t>
+            </a:r>
+            <a:r>
+              <a:rPr lang="en-US" dirty="0"/>
+              <a:t> </a:t>
+            </a:r>
+            <a:r>
+              <a:rPr lang="en-US" dirty="0" err="1"/>
+              <a:t>eine</a:t>
+            </a:r>
+            <a:r>
+              <a:rPr lang="en-US" dirty="0"/>
+              <a:t> </a:t>
+            </a:r>
+            <a:r>
+              <a:rPr lang="en-US" dirty="0" err="1"/>
+              <a:t>natürliche</a:t>
+            </a:r>
+            <a:r>
+              <a:rPr lang="en-US" dirty="0"/>
+              <a:t> </a:t>
+            </a:r>
+            <a:r>
+              <a:rPr lang="en-US" dirty="0" err="1"/>
+              <a:t>Zahl</a:t>
+            </a:r>
+            <a:r>
+              <a:rPr lang="en-US" dirty="0"/>
+              <a:t> k, </a:t>
+            </a:r>
+            <a:r>
+              <a:rPr lang="en-US" dirty="0" err="1"/>
+              <a:t>wenn</a:t>
+            </a:r>
+            <a:r>
+              <a:rPr lang="en-US" dirty="0"/>
+              <a:t> </a:t>
+            </a:r>
+            <a:r>
+              <a:rPr lang="en-US" dirty="0" err="1"/>
+              <a:t>jeder</a:t>
+            </a:r>
+            <a:r>
+              <a:rPr lang="en-US" dirty="0"/>
+              <a:t> </a:t>
+            </a:r>
+            <a:r>
+              <a:rPr lang="en-US" dirty="0" err="1"/>
+              <a:t>Ableitungsschritt</a:t>
+            </a:r>
+            <a:r>
+              <a:rPr lang="en-US" dirty="0"/>
+              <a:t> </a:t>
+            </a:r>
+            <a:r>
+              <a:rPr lang="en-US" dirty="0" err="1"/>
+              <a:t>eindeutig</a:t>
+            </a:r>
+            <a:r>
+              <a:rPr lang="en-US" dirty="0"/>
+              <a:t> </a:t>
+            </a:r>
+            <a:r>
+              <a:rPr lang="en-US" dirty="0" err="1"/>
+              <a:t>durch</a:t>
+            </a:r>
+            <a:r>
+              <a:rPr lang="en-US" dirty="0"/>
+              <a:t> die </a:t>
+            </a:r>
+            <a:r>
+              <a:rPr lang="en-US" dirty="0" err="1"/>
+              <a:t>nächsten</a:t>
+            </a:r>
+            <a:r>
+              <a:rPr lang="en-US" dirty="0"/>
+              <a:t> k </a:t>
+            </a:r>
+            <a:r>
+              <a:rPr lang="en-US" dirty="0" err="1"/>
+              <a:t>Symbole</a:t>
+            </a:r>
+            <a:r>
+              <a:rPr lang="en-US" dirty="0"/>
+              <a:t> der </a:t>
+            </a:r>
+            <a:r>
+              <a:rPr lang="en-US" dirty="0" err="1"/>
+              <a:t>Eingabe</a:t>
+            </a:r>
+            <a:r>
+              <a:rPr lang="en-US" dirty="0"/>
+              <a:t> (</a:t>
+            </a:r>
+            <a:r>
+              <a:rPr lang="en-US" dirty="0" err="1"/>
+              <a:t>Lookahead</a:t>
+            </a:r>
+            <a:r>
+              <a:rPr lang="en-US" dirty="0"/>
+              <a:t>) </a:t>
+            </a:r>
+            <a:r>
+              <a:rPr lang="en-US" dirty="0" err="1"/>
+              <a:t>bestimmt</a:t>
+            </a:r>
+            <a:r>
+              <a:rPr lang="en-US" dirty="0"/>
+              <a:t> </a:t>
+            </a:r>
+            <a:r>
+              <a:rPr lang="en-US" dirty="0" err="1"/>
+              <a:t>ist</a:t>
+            </a:r>
+            <a:endParaRPr lang="en-US" dirty="0"/>
+          </a:p>
+        </p:txBody>
+      </p:sp>
+    </p:spTree>
+    <p:extLst>
+      <p:ext uri="{BB962C8B-B14F-4D97-AF65-F5344CB8AC3E}">
+        <p14:creationId xmlns:p14="http://schemas.microsoft.com/office/powerpoint/2010/main" val="1604575585"/>
+      </p:ext>
+    </p:extLst>
+  </p:cSld>
+  <p:clrMapOvr>
+    <a:masterClrMapping/>
+  </p:clrMapOvr>
+</p:sld>
+</file>
+
+<file path=ppt/slides/slide12.xml><?xml version="1.0" encoding="utf-8"?>
+<p:sld xmlns:a="http://schemas.openxmlformats.org/drawingml/2006/main" xmlns:r="http://schemas.openxmlformats.org/officeDocument/2006/relationships" xmlns:p="http://schemas.openxmlformats.org/presentationml/2006/main">
+  <p:cSld>
+    <p:spTree>
+      <p:nvGrpSpPr>
+        <p:cNvPr id="1" name=""/>
+        <p:cNvGrpSpPr/>
+        <p:nvPr/>
+      </p:nvGrpSpPr>
+      <p:grpSpPr>
+        <a:xfrm>
+          <a:off x="0" y="0"/>
+          <a:ext cx="0" cy="0"/>
+          <a:chOff x="0" y="0"/>
+          <a:chExt cx="0" cy="0"/>
+        </a:xfrm>
+      </p:grpSpPr>
+      <p:sp>
+        <p:nvSpPr>
+          <p:cNvPr id="2" name="Title 1"/>
+          <p:cNvSpPr>
+            <a:spLocks noGrp="1"/>
+          </p:cNvSpPr>
+          <p:nvPr>
+            <p:ph type="title"/>
+          </p:nvPr>
+        </p:nvSpPr>
+        <p:spPr/>
+        <p:txBody>
+          <a:bodyPr/>
+          <a:lstStyle/>
+          <a:p>
+            <a:r>
+              <a:rPr lang="en-US" dirty="0" smtClean="0"/>
               <a:t>Parser package for R</a:t>
             </a:r>
             <a:endParaRPr lang="en-US" dirty="0"/>
@@ -4129,7 +5234,7 @@
 </p:sld>
 </file>
 
-<file path=ppt/slides/slide11.xml><?xml version="1.0" encoding="utf-8"?>
+<file path=ppt/slides/slide13.xml><?xml version="1.0" encoding="utf-8"?>
 <p:sld xmlns:a="http://schemas.openxmlformats.org/drawingml/2006/main" xmlns:r="http://schemas.openxmlformats.org/officeDocument/2006/relationships" xmlns:p="http://schemas.openxmlformats.org/presentationml/2006/main">
   <p:cSld>
     <p:spTree>
@@ -4327,7 +5432,7 @@
 </p:sld>
 </file>
 
-<file path=ppt/slides/slide12.xml><?xml version="1.0" encoding="utf-8"?>
+<file path=ppt/slides/slide14.xml><?xml version="1.0" encoding="utf-8"?>
 <p:sld xmlns:a="http://schemas.openxmlformats.org/drawingml/2006/main" xmlns:r="http://schemas.openxmlformats.org/officeDocument/2006/relationships" xmlns:p="http://schemas.openxmlformats.org/presentationml/2006/main">
   <p:cSld>
     <p:spTree>
@@ -4410,7 +5515,7 @@
 </p:sld>
 </file>
 
-<file path=ppt/slides/slide13.xml><?xml version="1.0" encoding="utf-8"?>
+<file path=ppt/slides/slide15.xml><?xml version="1.0" encoding="utf-8"?>
 <p:sld xmlns:a="http://schemas.openxmlformats.org/drawingml/2006/main" xmlns:r="http://schemas.openxmlformats.org/officeDocument/2006/relationships" xmlns:p="http://schemas.openxmlformats.org/presentationml/2006/main">
   <p:cSld>
     <p:spTree>
@@ -4506,226 +5611,6 @@
 </p:sld>
 </file>
 
-<file path=ppt/slides/slide14.xml><?xml version="1.0" encoding="utf-8"?>
-<p:sld xmlns:a="http://schemas.openxmlformats.org/drawingml/2006/main" xmlns:r="http://schemas.openxmlformats.org/officeDocument/2006/relationships" xmlns:p="http://schemas.openxmlformats.org/presentationml/2006/main">
-  <p:cSld>
-    <p:spTree>
-      <p:nvGrpSpPr>
-        <p:cNvPr id="1" name=""/>
-        <p:cNvGrpSpPr/>
-        <p:nvPr/>
-      </p:nvGrpSpPr>
-      <p:grpSpPr>
-        <a:xfrm>
-          <a:off x="0" y="0"/>
-          <a:ext cx="0" cy="0"/>
-          <a:chOff x="0" y="0"/>
-          <a:chExt cx="0" cy="0"/>
-        </a:xfrm>
-      </p:grpSpPr>
-      <p:sp>
-        <p:nvSpPr>
-          <p:cNvPr id="2" name="Title 1"/>
-          <p:cNvSpPr>
-            <a:spLocks noGrp="1"/>
-          </p:cNvSpPr>
-          <p:nvPr>
-            <p:ph type="title"/>
-          </p:nvPr>
-        </p:nvSpPr>
-        <p:spPr/>
-        <p:txBody>
-          <a:bodyPr/>
-          <a:lstStyle/>
-          <a:p>
-            <a:r>
-              <a:rPr lang="en-US" dirty="0"/>
-              <a:t>Recursive descent parser</a:t>
-            </a:r>
-          </a:p>
-        </p:txBody>
-      </p:sp>
-      <p:sp>
-        <p:nvSpPr>
-          <p:cNvPr id="3" name="Content Placeholder 2"/>
-          <p:cNvSpPr>
-            <a:spLocks noGrp="1"/>
-          </p:cNvSpPr>
-          <p:nvPr>
-            <p:ph idx="1"/>
-          </p:nvPr>
-        </p:nvSpPr>
-        <p:spPr/>
-        <p:txBody>
-          <a:bodyPr/>
-          <a:lstStyle/>
-          <a:p>
-            <a:r>
-              <a:rPr lang="en-US"/>
-              <a:t>kind of top-down parser built from a set of mutually-recursive procedures</a:t>
-            </a:r>
-            <a:endParaRPr lang="en-US" dirty="0"/>
-          </a:p>
-        </p:txBody>
-      </p:sp>
-    </p:spTree>
-    <p:extLst>
-      <p:ext uri="{BB962C8B-B14F-4D97-AF65-F5344CB8AC3E}">
-        <p14:creationId xmlns:p14="http://schemas.microsoft.com/office/powerpoint/2010/main" val="1704516617"/>
-      </p:ext>
-    </p:extLst>
-  </p:cSld>
-  <p:clrMapOvr>
-    <a:masterClrMapping/>
-  </p:clrMapOvr>
-</p:sld>
-</file>
-
-<file path=ppt/slides/slide15.xml><?xml version="1.0" encoding="utf-8"?>
-<p:sld xmlns:a="http://schemas.openxmlformats.org/drawingml/2006/main" xmlns:r="http://schemas.openxmlformats.org/officeDocument/2006/relationships" xmlns:p="http://schemas.openxmlformats.org/presentationml/2006/main">
-  <p:cSld>
-    <p:spTree>
-      <p:nvGrpSpPr>
-        <p:cNvPr id="1" name=""/>
-        <p:cNvGrpSpPr/>
-        <p:nvPr/>
-      </p:nvGrpSpPr>
-      <p:grpSpPr>
-        <a:xfrm>
-          <a:off x="0" y="0"/>
-          <a:ext cx="0" cy="0"/>
-          <a:chOff x="0" y="0"/>
-          <a:chExt cx="0" cy="0"/>
-        </a:xfrm>
-      </p:grpSpPr>
-      <p:sp>
-        <p:nvSpPr>
-          <p:cNvPr id="2" name="Title 1"/>
-          <p:cNvSpPr>
-            <a:spLocks noGrp="1"/>
-          </p:cNvSpPr>
-          <p:nvPr>
-            <p:ph type="title"/>
-          </p:nvPr>
-        </p:nvSpPr>
-        <p:spPr/>
-        <p:txBody>
-          <a:bodyPr/>
-          <a:lstStyle/>
-          <a:p>
-            <a:r>
-              <a:rPr lang="en-US" dirty="0" err="1" smtClean="0"/>
-              <a:t>GrammarKit</a:t>
-            </a:r>
-            <a:r>
-              <a:rPr lang="en-US" dirty="0" smtClean="0"/>
-              <a:t> Notes</a:t>
-            </a:r>
-            <a:endParaRPr lang="en-US" dirty="0"/>
-          </a:p>
-        </p:txBody>
-      </p:sp>
-      <p:sp>
-        <p:nvSpPr>
-          <p:cNvPr id="3" name="Content Placeholder 2"/>
-          <p:cNvSpPr>
-            <a:spLocks noGrp="1"/>
-          </p:cNvSpPr>
-          <p:nvPr>
-            <p:ph idx="1"/>
-          </p:nvPr>
-        </p:nvSpPr>
-        <p:spPr/>
-        <p:txBody>
-          <a:bodyPr>
-            <a:normAutofit lnSpcReduction="10000"/>
-          </a:bodyPr>
-          <a:lstStyle/>
-          <a:p>
-            <a:r>
-              <a:rPr lang="en-US" dirty="0" smtClean="0"/>
-              <a:t>All used special characters must be named in the token-section of the grammar header</a:t>
-            </a:r>
-          </a:p>
-          <a:p>
-            <a:pPr lvl="1"/>
-            <a:r>
-              <a:rPr lang="en-US" dirty="0" smtClean="0"/>
-              <a:t>Other tokens will be picked up on the fly from the grammar rules (e.g. string, number, id in the </a:t>
-            </a:r>
-            <a:r>
-              <a:rPr lang="en-US" dirty="0" err="1" smtClean="0"/>
-              <a:t>bnf</a:t>
-            </a:r>
-            <a:r>
-              <a:rPr lang="en-US" dirty="0" smtClean="0"/>
-              <a:t>-example)</a:t>
-            </a:r>
-          </a:p>
-          <a:p>
-            <a:pPr lvl="1"/>
-            <a:r>
-              <a:rPr lang="en-US" dirty="0" smtClean="0"/>
-              <a:t>They will be translated </a:t>
-            </a:r>
-            <a:r>
-              <a:rPr lang="en-US" dirty="0"/>
-              <a:t>into </a:t>
-            </a:r>
-            <a:r>
-              <a:rPr lang="en-US" dirty="0" err="1" smtClean="0"/>
-              <a:t>RTokenTypes</a:t>
-            </a:r>
-            <a:r>
-              <a:rPr lang="en-US" dirty="0" smtClean="0"/>
-              <a:t> (</a:t>
-            </a:r>
-            <a:r>
-              <a:rPr lang="en-US" dirty="0" smtClean="0">
-                <a:sym typeface="Wingdings"/>
-              </a:rPr>
-              <a:t></a:t>
-            </a:r>
-            <a:r>
-              <a:rPr lang="en-US" dirty="0" err="1" smtClean="0"/>
-              <a:t>Rtypes</a:t>
-            </a:r>
-            <a:r>
-              <a:rPr lang="en-US" dirty="0" smtClean="0"/>
-              <a:t>)</a:t>
-            </a:r>
-          </a:p>
-          <a:p>
-            <a:pPr lvl="1"/>
-            <a:r>
-              <a:rPr lang="en-US" dirty="0" smtClean="0"/>
-              <a:t>They must be produced by the </a:t>
-            </a:r>
-            <a:r>
-              <a:rPr lang="en-US" dirty="0" err="1" smtClean="0"/>
-              <a:t>Lexer</a:t>
-            </a:r>
-            <a:r>
-              <a:rPr lang="en-US" dirty="0" smtClean="0"/>
-              <a:t>! (And just those, as other tokens will be ignored by the generated parser)</a:t>
-            </a:r>
-            <a:endParaRPr lang="en-US" dirty="0"/>
-          </a:p>
-        </p:txBody>
-      </p:sp>
-    </p:spTree>
-    <p:extLst>
-      <p:ext uri="{BB962C8B-B14F-4D97-AF65-F5344CB8AC3E}">
-        <p14:creationId xmlns:p14="http://schemas.microsoft.com/office/powerpoint/2010/main" val="2865957318"/>
-      </p:ext>
-    </p:extLst>
-  </p:cSld>
-  <p:clrMapOvr>
-    <a:masterClrMapping/>
-  </p:clrMapOvr>
-</p:sld>
-</file>
-
 <file path=ppt/slides/slide16.xml><?xml version="1.0" encoding="utf-8"?>
 <p:sld xmlns:a="http://schemas.openxmlformats.org/drawingml/2006/main" xmlns:r="http://schemas.openxmlformats.org/officeDocument/2006/relationships" xmlns:p="http://schemas.openxmlformats.org/presentationml/2006/main">
   <p:cSld>
@@ -4759,51 +5644,39 @@
           <a:lstStyle/>
           <a:p>
             <a:r>
-              <a:rPr lang="en-US" dirty="0" smtClean="0"/>
-              <a:t>ANTLR notes</a:t>
+              <a:rPr lang="en-US" dirty="0"/>
+              <a:t>Recursive descent parser</a:t>
+            </a:r>
+          </a:p>
+        </p:txBody>
+      </p:sp>
+      <p:sp>
+        <p:nvSpPr>
+          <p:cNvPr id="3" name="Content Placeholder 2"/>
+          <p:cNvSpPr>
+            <a:spLocks noGrp="1"/>
+          </p:cNvSpPr>
+          <p:nvPr>
+            <p:ph idx="1"/>
+          </p:nvPr>
+        </p:nvSpPr>
+        <p:spPr/>
+        <p:txBody>
+          <a:bodyPr/>
+          <a:lstStyle/>
+          <a:p>
+            <a:r>
+              <a:rPr lang="en-US"/>
+              <a:t>kind of top-down parser built from a set of mutually-recursive procedures</a:t>
             </a:r>
             <a:endParaRPr lang="en-US" dirty="0"/>
-          </a:p>
-        </p:txBody>
-      </p:sp>
-      <p:sp>
-        <p:nvSpPr>
-          <p:cNvPr id="3" name="Content Placeholder 2"/>
-          <p:cNvSpPr>
-            <a:spLocks noGrp="1"/>
-          </p:cNvSpPr>
-          <p:nvPr>
-            <p:ph idx="1"/>
-          </p:nvPr>
-        </p:nvSpPr>
-        <p:spPr/>
-        <p:txBody>
-          <a:bodyPr/>
-          <a:lstStyle/>
-          <a:p>
-            <a:r>
-              <a:rPr lang="en-US" dirty="0" smtClean="0"/>
-              <a:t>ANTLR </a:t>
-            </a:r>
-            <a:r>
-              <a:rPr lang="en-US" dirty="0"/>
-              <a:t>imposes the convention that </a:t>
-            </a:r>
-            <a:r>
-              <a:rPr lang="en-US" dirty="0" err="1"/>
-              <a:t>lexer</a:t>
-            </a:r>
-            <a:r>
-              <a:rPr lang="en-US" dirty="0"/>
-              <a:t> rules start with an uppercase letter and parser rules with a lowercase letter</a:t>
-            </a:r>
           </a:p>
         </p:txBody>
       </p:sp>
     </p:spTree>
     <p:extLst>
       <p:ext uri="{BB962C8B-B14F-4D97-AF65-F5344CB8AC3E}">
-        <p14:creationId xmlns:p14="http://schemas.microsoft.com/office/powerpoint/2010/main" val="3457731727"/>
+        <p14:creationId xmlns:p14="http://schemas.microsoft.com/office/powerpoint/2010/main" val="1704516617"/>
       </p:ext>
     </p:extLst>
   </p:cSld>
@@ -4846,6 +5719,238 @@
           <a:lstStyle/>
           <a:p>
             <a:r>
+              <a:rPr lang="en-US" dirty="0" err="1" smtClean="0"/>
+              <a:t>GrammarKit</a:t>
+            </a:r>
+            <a:r>
+              <a:rPr lang="en-US" dirty="0" smtClean="0"/>
+              <a:t> Notes</a:t>
+            </a:r>
+            <a:endParaRPr lang="en-US" dirty="0"/>
+          </a:p>
+        </p:txBody>
+      </p:sp>
+      <p:sp>
+        <p:nvSpPr>
+          <p:cNvPr id="3" name="Content Placeholder 2"/>
+          <p:cNvSpPr>
+            <a:spLocks noGrp="1"/>
+          </p:cNvSpPr>
+          <p:nvPr>
+            <p:ph idx="1"/>
+          </p:nvPr>
+        </p:nvSpPr>
+        <p:spPr/>
+        <p:txBody>
+          <a:bodyPr>
+            <a:normAutofit lnSpcReduction="10000"/>
+          </a:bodyPr>
+          <a:lstStyle/>
+          <a:p>
+            <a:r>
+              <a:rPr lang="en-US" dirty="0" smtClean="0"/>
+              <a:t>All used special characters must be named in the token-section of the grammar header</a:t>
+            </a:r>
+          </a:p>
+          <a:p>
+            <a:pPr lvl="1"/>
+            <a:r>
+              <a:rPr lang="en-US" dirty="0" smtClean="0"/>
+              <a:t>Other tokens will be picked up on the fly from the grammar rules (e.g. string, number, id in the </a:t>
+            </a:r>
+            <a:r>
+              <a:rPr lang="en-US" dirty="0" err="1" smtClean="0"/>
+              <a:t>bnf</a:t>
+            </a:r>
+            <a:r>
+              <a:rPr lang="en-US" dirty="0" smtClean="0"/>
+              <a:t>-example)</a:t>
+            </a:r>
+          </a:p>
+          <a:p>
+            <a:pPr lvl="1"/>
+            <a:r>
+              <a:rPr lang="en-US" dirty="0" smtClean="0"/>
+              <a:t>They will be translated </a:t>
+            </a:r>
+            <a:r>
+              <a:rPr lang="en-US" dirty="0"/>
+              <a:t>into </a:t>
+            </a:r>
+            <a:r>
+              <a:rPr lang="en-US" dirty="0" err="1" smtClean="0"/>
+              <a:t>RTokenTypes</a:t>
+            </a:r>
+            <a:r>
+              <a:rPr lang="en-US" dirty="0" smtClean="0"/>
+              <a:t> (</a:t>
+            </a:r>
+            <a:r>
+              <a:rPr lang="en-US" dirty="0" smtClean="0">
+                <a:sym typeface="Wingdings"/>
+              </a:rPr>
+              <a:t></a:t>
+            </a:r>
+            <a:r>
+              <a:rPr lang="en-US" dirty="0" err="1" smtClean="0"/>
+              <a:t>Rtypes</a:t>
+            </a:r>
+            <a:r>
+              <a:rPr lang="en-US" dirty="0" smtClean="0"/>
+              <a:t>)</a:t>
+            </a:r>
+          </a:p>
+          <a:p>
+            <a:pPr lvl="1"/>
+            <a:r>
+              <a:rPr lang="en-US" dirty="0" smtClean="0"/>
+              <a:t>They must be produced by the </a:t>
+            </a:r>
+            <a:r>
+              <a:rPr lang="en-US" dirty="0" err="1" smtClean="0"/>
+              <a:t>Lexer</a:t>
+            </a:r>
+            <a:r>
+              <a:rPr lang="en-US" dirty="0" smtClean="0"/>
+              <a:t>! (And just those, as other tokens will be ignored by the generated parser)</a:t>
+            </a:r>
+            <a:endParaRPr lang="en-US" dirty="0"/>
+          </a:p>
+        </p:txBody>
+      </p:sp>
+    </p:spTree>
+    <p:extLst>
+      <p:ext uri="{BB962C8B-B14F-4D97-AF65-F5344CB8AC3E}">
+        <p14:creationId xmlns:p14="http://schemas.microsoft.com/office/powerpoint/2010/main" val="2865957318"/>
+      </p:ext>
+    </p:extLst>
+  </p:cSld>
+  <p:clrMapOvr>
+    <a:masterClrMapping/>
+  </p:clrMapOvr>
+</p:sld>
+</file>
+
+<file path=ppt/slides/slide18.xml><?xml version="1.0" encoding="utf-8"?>
+<p:sld xmlns:a="http://schemas.openxmlformats.org/drawingml/2006/main" xmlns:r="http://schemas.openxmlformats.org/officeDocument/2006/relationships" xmlns:p="http://schemas.openxmlformats.org/presentationml/2006/main">
+  <p:cSld>
+    <p:spTree>
+      <p:nvGrpSpPr>
+        <p:cNvPr id="1" name=""/>
+        <p:cNvGrpSpPr/>
+        <p:nvPr/>
+      </p:nvGrpSpPr>
+      <p:grpSpPr>
+        <a:xfrm>
+          <a:off x="0" y="0"/>
+          <a:ext cx="0" cy="0"/>
+          <a:chOff x="0" y="0"/>
+          <a:chExt cx="0" cy="0"/>
+        </a:xfrm>
+      </p:grpSpPr>
+      <p:sp>
+        <p:nvSpPr>
+          <p:cNvPr id="2" name="Title 1"/>
+          <p:cNvSpPr>
+            <a:spLocks noGrp="1"/>
+          </p:cNvSpPr>
+          <p:nvPr>
+            <p:ph type="title"/>
+          </p:nvPr>
+        </p:nvSpPr>
+        <p:spPr/>
+        <p:txBody>
+          <a:bodyPr/>
+          <a:lstStyle/>
+          <a:p>
+            <a:r>
+              <a:rPr lang="en-US" dirty="0" smtClean="0"/>
+              <a:t>ANTLR notes</a:t>
+            </a:r>
+            <a:endParaRPr lang="en-US" dirty="0"/>
+          </a:p>
+        </p:txBody>
+      </p:sp>
+      <p:sp>
+        <p:nvSpPr>
+          <p:cNvPr id="3" name="Content Placeholder 2"/>
+          <p:cNvSpPr>
+            <a:spLocks noGrp="1"/>
+          </p:cNvSpPr>
+          <p:nvPr>
+            <p:ph idx="1"/>
+          </p:nvPr>
+        </p:nvSpPr>
+        <p:spPr/>
+        <p:txBody>
+          <a:bodyPr/>
+          <a:lstStyle/>
+          <a:p>
+            <a:r>
+              <a:rPr lang="en-US" dirty="0" smtClean="0"/>
+              <a:t>ANTLR </a:t>
+            </a:r>
+            <a:r>
+              <a:rPr lang="en-US" dirty="0"/>
+              <a:t>imposes the convention that </a:t>
+            </a:r>
+            <a:r>
+              <a:rPr lang="en-US" dirty="0" err="1"/>
+              <a:t>lexer</a:t>
+            </a:r>
+            <a:r>
+              <a:rPr lang="en-US" dirty="0"/>
+              <a:t> rules start with an uppercase letter and parser rules with a lowercase letter</a:t>
+            </a:r>
+          </a:p>
+        </p:txBody>
+      </p:sp>
+    </p:spTree>
+    <p:extLst>
+      <p:ext uri="{BB962C8B-B14F-4D97-AF65-F5344CB8AC3E}">
+        <p14:creationId xmlns:p14="http://schemas.microsoft.com/office/powerpoint/2010/main" val="3457731727"/>
+      </p:ext>
+    </p:extLst>
+  </p:cSld>
+  <p:clrMapOvr>
+    <a:masterClrMapping/>
+  </p:clrMapOvr>
+</p:sld>
+</file>
+
+<file path=ppt/slides/slide19.xml><?xml version="1.0" encoding="utf-8"?>
+<p:sld xmlns:a="http://schemas.openxmlformats.org/drawingml/2006/main" xmlns:r="http://schemas.openxmlformats.org/officeDocument/2006/relationships" xmlns:p="http://schemas.openxmlformats.org/presentationml/2006/main">
+  <p:cSld>
+    <p:spTree>
+      <p:nvGrpSpPr>
+        <p:cNvPr id="1" name=""/>
+        <p:cNvGrpSpPr/>
+        <p:nvPr/>
+      </p:nvGrpSpPr>
+      <p:grpSpPr>
+        <a:xfrm>
+          <a:off x="0" y="0"/>
+          <a:ext cx="0" cy="0"/>
+          <a:chOff x="0" y="0"/>
+          <a:chExt cx="0" cy="0"/>
+        </a:xfrm>
+      </p:grpSpPr>
+      <p:sp>
+        <p:nvSpPr>
+          <p:cNvPr id="2" name="Title 1"/>
+          <p:cNvSpPr>
+            <a:spLocks noGrp="1"/>
+          </p:cNvSpPr>
+          <p:nvPr>
+            <p:ph type="title"/>
+          </p:nvPr>
+        </p:nvSpPr>
+        <p:spPr/>
+        <p:txBody>
+          <a:bodyPr/>
+          <a:lstStyle/>
+          <a:p>
+            <a:r>
               <a:rPr lang="en-US" dirty="0" smtClean="0"/>
               <a:t>PEG	</a:t>
             </a:r>
@@ -4932,7 +6037,83 @@
 </p:sld>
 </file>
 
-<file path=ppt/slides/slide18.xml><?xml version="1.0" encoding="utf-8"?>
+<file path=ppt/slides/slide2.xml><?xml version="1.0" encoding="utf-8"?>
+<p:sld xmlns:a="http://schemas.openxmlformats.org/drawingml/2006/main" xmlns:r="http://schemas.openxmlformats.org/officeDocument/2006/relationships" xmlns:p="http://schemas.openxmlformats.org/presentationml/2006/main">
+  <p:cSld>
+    <p:spTree>
+      <p:nvGrpSpPr>
+        <p:cNvPr id="1" name=""/>
+        <p:cNvGrpSpPr/>
+        <p:nvPr/>
+      </p:nvGrpSpPr>
+      <p:grpSpPr>
+        <a:xfrm>
+          <a:off x="0" y="0"/>
+          <a:ext cx="0" cy="0"/>
+          <a:chOff x="0" y="0"/>
+          <a:chExt cx="0" cy="0"/>
+        </a:xfrm>
+      </p:grpSpPr>
+      <p:sp>
+        <p:nvSpPr>
+          <p:cNvPr id="2" name="Title 1"/>
+          <p:cNvSpPr>
+            <a:spLocks noGrp="1"/>
+          </p:cNvSpPr>
+          <p:nvPr>
+            <p:ph type="title"/>
+          </p:nvPr>
+        </p:nvSpPr>
+        <p:spPr/>
+        <p:txBody>
+          <a:bodyPr/>
+          <a:lstStyle/>
+          <a:p>
+            <a:r>
+              <a:rPr lang="en-US" dirty="0" smtClean="0"/>
+              <a:t>v0.6</a:t>
+            </a:r>
+            <a:endParaRPr lang="en-US" dirty="0"/>
+          </a:p>
+        </p:txBody>
+      </p:sp>
+      <p:sp>
+        <p:nvSpPr>
+          <p:cNvPr id="3" name="Content Placeholder 2"/>
+          <p:cNvSpPr>
+            <a:spLocks noGrp="1"/>
+          </p:cNvSpPr>
+          <p:nvPr>
+            <p:ph idx="1"/>
+          </p:nvPr>
+        </p:nvSpPr>
+        <p:spPr/>
+        <p:txBody>
+          <a:bodyPr/>
+          <a:lstStyle/>
+          <a:p>
+            <a:r>
+              <a:rPr lang="en-US" dirty="0" smtClean="0"/>
+              <a:t>Nothing yet</a:t>
+            </a:r>
+            <a:endParaRPr lang="en-US" dirty="0"/>
+          </a:p>
+        </p:txBody>
+      </p:sp>
+    </p:spTree>
+    <p:extLst>
+      <p:ext uri="{BB962C8B-B14F-4D97-AF65-F5344CB8AC3E}">
+        <p14:creationId xmlns:p14="http://schemas.microsoft.com/office/powerpoint/2010/main" val="1953636889"/>
+      </p:ext>
+    </p:extLst>
+  </p:cSld>
+  <p:clrMapOvr>
+    <a:masterClrMapping/>
+  </p:clrMapOvr>
+</p:sld>
+</file>
+
+<file path=ppt/slides/slide20.xml><?xml version="1.0" encoding="utf-8"?>
 <p:sld xmlns:a="http://schemas.openxmlformats.org/drawingml/2006/main" xmlns:r="http://schemas.openxmlformats.org/officeDocument/2006/relationships" xmlns:p="http://schemas.openxmlformats.org/presentationml/2006/main">
   <p:cSld>
     <p:spTree>
@@ -5032,7 +6213,7 @@
 </p:sld>
 </file>
 
-<file path=ppt/slides/slide19.xml><?xml version="1.0" encoding="utf-8"?>
+<file path=ppt/slides/slide21.xml><?xml version="1.0" encoding="utf-8"?>
 <p:sld xmlns:a="http://schemas.openxmlformats.org/drawingml/2006/main" xmlns:r="http://schemas.openxmlformats.org/officeDocument/2006/relationships" xmlns:p="http://schemas.openxmlformats.org/presentationml/2006/main">
   <p:cSld>
     <p:spTree>
@@ -5132,97 +6313,7 @@
 </p:sld>
 </file>
 
-<file path=ppt/slides/slide2.xml><?xml version="1.0" encoding="utf-8"?>
-<p:sld xmlns:a="http://schemas.openxmlformats.org/drawingml/2006/main" xmlns:r="http://schemas.openxmlformats.org/officeDocument/2006/relationships" xmlns:p="http://schemas.openxmlformats.org/presentationml/2006/main">
-  <p:cSld>
-    <p:spTree>
-      <p:nvGrpSpPr>
-        <p:cNvPr id="1" name=""/>
-        <p:cNvGrpSpPr/>
-        <p:nvPr/>
-      </p:nvGrpSpPr>
-      <p:grpSpPr>
-        <a:xfrm>
-          <a:off x="0" y="0"/>
-          <a:ext cx="0" cy="0"/>
-          <a:chOff x="0" y="0"/>
-          <a:chExt cx="0" cy="0"/>
-        </a:xfrm>
-      </p:grpSpPr>
-      <p:sp>
-        <p:nvSpPr>
-          <p:cNvPr id="2" name="Title 1"/>
-          <p:cNvSpPr>
-            <a:spLocks noGrp="1"/>
-          </p:cNvSpPr>
-          <p:nvPr>
-            <p:ph type="title"/>
-          </p:nvPr>
-        </p:nvSpPr>
-        <p:spPr/>
-        <p:txBody>
-          <a:bodyPr/>
-          <a:lstStyle/>
-          <a:p>
-            <a:r>
-              <a:rPr lang="en-US" dirty="0" smtClean="0"/>
-              <a:t>v0.5</a:t>
-            </a:r>
-            <a:endParaRPr lang="en-US" dirty="0"/>
-          </a:p>
-        </p:txBody>
-      </p:sp>
-      <p:sp>
-        <p:nvSpPr>
-          <p:cNvPr id="3" name="Content Placeholder 2"/>
-          <p:cNvSpPr>
-            <a:spLocks noGrp="1"/>
-          </p:cNvSpPr>
-          <p:nvPr>
-            <p:ph idx="1"/>
-          </p:nvPr>
-        </p:nvSpPr>
-        <p:spPr/>
-        <p:txBody>
-          <a:bodyPr/>
-          <a:lstStyle/>
-          <a:p>
-            <a:r>
-              <a:rPr lang="en-US" dirty="0" smtClean="0"/>
-              <a:t>R Parser that allows for basic error highlighting</a:t>
-            </a:r>
-          </a:p>
-          <a:p>
-            <a:r>
-              <a:rPr lang="en-US" dirty="0" smtClean="0"/>
-              <a:t>Code Folding for function </a:t>
-            </a:r>
-            <a:r>
-              <a:rPr lang="en-US" dirty="0" err="1" smtClean="0"/>
-              <a:t>defitions</a:t>
-            </a:r>
-            <a:r>
-              <a:rPr lang="en-US" dirty="0" smtClean="0"/>
-              <a:t> </a:t>
-            </a:r>
-            <a:endParaRPr lang="en-US" dirty="0"/>
-          </a:p>
-        </p:txBody>
-      </p:sp>
-    </p:spTree>
-    <p:extLst>
-      <p:ext uri="{BB962C8B-B14F-4D97-AF65-F5344CB8AC3E}">
-        <p14:creationId xmlns:p14="http://schemas.microsoft.com/office/powerpoint/2010/main" val="1953636889"/>
-      </p:ext>
-    </p:extLst>
-  </p:cSld>
-  <p:clrMapOvr>
-    <a:masterClrMapping/>
-  </p:clrMapOvr>
-</p:sld>
-</file>
-
-<file path=ppt/slides/slide20.xml><?xml version="1.0" encoding="utf-8"?>
+<file path=ppt/slides/slide22.xml><?xml version="1.0" encoding="utf-8"?>
 <p:sld xmlns:a="http://schemas.openxmlformats.org/drawingml/2006/main" xmlns:r="http://schemas.openxmlformats.org/officeDocument/2006/relationships" xmlns:p="http://schemas.openxmlformats.org/presentationml/2006/main">
   <p:cSld>
     <p:spTree>
@@ -5344,380 +6435,6 @@
 </p:sld>
 </file>
 
-<file path=ppt/slides/slide21.xml><?xml version="1.0" encoding="utf-8"?>
-<p:sld xmlns:a="http://schemas.openxmlformats.org/drawingml/2006/main" xmlns:r="http://schemas.openxmlformats.org/officeDocument/2006/relationships" xmlns:p="http://schemas.openxmlformats.org/presentationml/2006/main">
-  <p:cSld>
-    <p:spTree>
-      <p:nvGrpSpPr>
-        <p:cNvPr id="1" name=""/>
-        <p:cNvGrpSpPr/>
-        <p:nvPr/>
-      </p:nvGrpSpPr>
-      <p:grpSpPr>
-        <a:xfrm>
-          <a:off x="0" y="0"/>
-          <a:ext cx="0" cy="0"/>
-          <a:chOff x="0" y="0"/>
-          <a:chExt cx="0" cy="0"/>
-        </a:xfrm>
-      </p:grpSpPr>
-      <p:sp>
-        <p:nvSpPr>
-          <p:cNvPr id="2" name="Title 1"/>
-          <p:cNvSpPr>
-            <a:spLocks noGrp="1"/>
-          </p:cNvSpPr>
-          <p:nvPr>
-            <p:ph type="title"/>
-          </p:nvPr>
-        </p:nvSpPr>
-        <p:spPr/>
-        <p:txBody>
-          <a:bodyPr>
-            <a:normAutofit fontScale="90000"/>
-          </a:bodyPr>
-          <a:lstStyle/>
-          <a:p>
-            <a:r>
-              <a:rPr lang="en-US" dirty="0" smtClean="0"/>
-              <a:t>Options for code snippet evaluation</a:t>
-            </a:r>
-            <a:endParaRPr lang="en-US" dirty="0"/>
-          </a:p>
-        </p:txBody>
-      </p:sp>
-      <p:sp>
-        <p:nvSpPr>
-          <p:cNvPr id="3" name="Content Placeholder 2"/>
-          <p:cNvSpPr>
-            <a:spLocks noGrp="1"/>
-          </p:cNvSpPr>
-          <p:nvPr>
-            <p:ph idx="1"/>
-          </p:nvPr>
-        </p:nvSpPr>
-        <p:spPr/>
-        <p:txBody>
-          <a:bodyPr>
-            <a:normAutofit fontScale="62500" lnSpcReduction="20000"/>
-          </a:bodyPr>
-          <a:lstStyle/>
-          <a:p>
-            <a:r>
-              <a:rPr lang="en-US" dirty="0" smtClean="0"/>
-              <a:t>R Session has almost complete implementation for console, objects, </a:t>
-            </a:r>
-            <a:r>
-              <a:rPr lang="en-US" dirty="0" err="1" smtClean="0"/>
-              <a:t>etc</a:t>
-            </a:r>
-            <a:endParaRPr lang="en-US" dirty="0" smtClean="0"/>
-          </a:p>
-          <a:p>
-            <a:r>
-              <a:rPr lang="en-US" dirty="0" err="1" smtClean="0"/>
-              <a:t>TextMate</a:t>
-            </a:r>
-            <a:r>
-              <a:rPr lang="en-US" dirty="0" smtClean="0"/>
-              <a:t> </a:t>
-            </a:r>
-            <a:r>
-              <a:rPr lang="en-US" dirty="0" smtClean="0">
-                <a:hlinkClick r:id="rId2"/>
-              </a:rPr>
-              <a:t>bundle</a:t>
-            </a:r>
-            <a:endParaRPr lang="en-US" dirty="0" smtClean="0"/>
-          </a:p>
-          <a:p>
-            <a:pPr lvl="1"/>
-            <a:r>
-              <a:rPr lang="en-US" dirty="0" smtClean="0"/>
-              <a:t>Start R in special mode that reads all input from file and writes all output to another one which then somehow imported into </a:t>
-            </a:r>
-            <a:r>
-              <a:rPr lang="en-US" dirty="0" err="1" smtClean="0"/>
-              <a:t>textmate</a:t>
-            </a:r>
-            <a:endParaRPr lang="en-US" dirty="0" smtClean="0"/>
-          </a:p>
-          <a:p>
-            <a:r>
-              <a:rPr lang="en-US" dirty="0"/>
-              <a:t>I </a:t>
-            </a:r>
-            <a:r>
-              <a:rPr lang="en-US" dirty="0">
-                <a:hlinkClick r:id="rId3"/>
-              </a:rPr>
-              <a:t>think </a:t>
-            </a:r>
-            <a:r>
-              <a:rPr lang="en-US" dirty="0" err="1"/>
-              <a:t>FindWindow</a:t>
-            </a:r>
-            <a:r>
-              <a:rPr lang="en-US" dirty="0"/>
-              <a:t> and </a:t>
-            </a:r>
-            <a:r>
-              <a:rPr lang="en-US" dirty="0" err="1"/>
-              <a:t>SendMessage</a:t>
-            </a:r>
-            <a:r>
-              <a:rPr lang="en-US" dirty="0"/>
-              <a:t> are the functions you want to use, in general</a:t>
-            </a:r>
-            <a:r>
-              <a:rPr lang="en-US" dirty="0" smtClean="0"/>
-              <a:t>.</a:t>
-            </a:r>
-          </a:p>
-          <a:p>
-            <a:r>
-              <a:rPr lang="en-US" dirty="0" smtClean="0"/>
-              <a:t>Use the </a:t>
-            </a:r>
-            <a:r>
-              <a:rPr lang="en-US" dirty="0" smtClean="0">
-                <a:hlinkClick r:id="rId4"/>
-              </a:rPr>
-              <a:t>clipboard</a:t>
-            </a:r>
-            <a:endParaRPr lang="en-US" dirty="0" smtClean="0"/>
-          </a:p>
-          <a:p>
-            <a:r>
-              <a:rPr lang="en-US" dirty="0" err="1" smtClean="0">
-                <a:hlinkClick r:id="rId5"/>
-              </a:rPr>
-              <a:t>Tinn</a:t>
-            </a:r>
-            <a:r>
-              <a:rPr lang="en-US" dirty="0">
-                <a:hlinkClick r:id="rId5"/>
-              </a:rPr>
-              <a:t>-R</a:t>
-            </a:r>
-            <a:r>
-              <a:rPr lang="en-US" dirty="0"/>
-              <a:t>: It also pops up additional menu and toolbar when it detects </a:t>
-            </a:r>
-            <a:r>
-              <a:rPr lang="en-US" dirty="0" err="1"/>
-              <a:t>Rgui</a:t>
-            </a:r>
-            <a:r>
-              <a:rPr lang="en-US" dirty="0"/>
-              <a:t> running on the same computer. These </a:t>
-            </a:r>
-            <a:r>
-              <a:rPr lang="en-US" dirty="0" err="1"/>
-              <a:t>addons</a:t>
-            </a:r>
-            <a:r>
-              <a:rPr lang="en-US" dirty="0"/>
-              <a:t> interact with the R console and allow to submit code in part or in whole and to control R directly</a:t>
-            </a:r>
-            <a:r>
-              <a:rPr lang="en-US" dirty="0" smtClean="0"/>
-              <a:t>. </a:t>
-            </a:r>
-            <a:endParaRPr lang="en-US" dirty="0"/>
-          </a:p>
-          <a:p>
-            <a:pPr lvl="1"/>
-            <a:r>
-              <a:rPr lang="en-US" dirty="0" smtClean="0"/>
-              <a:t>It seems to have some </a:t>
-            </a:r>
-            <a:r>
-              <a:rPr lang="en-US" dirty="0" smtClean="0">
-                <a:hlinkClick r:id="rId6"/>
-              </a:rPr>
-              <a:t>limitations</a:t>
-            </a:r>
-            <a:endParaRPr lang="en-US" dirty="0" smtClean="0"/>
-          </a:p>
-          <a:p>
-            <a:r>
-              <a:rPr lang="en-US" dirty="0" smtClean="0"/>
-              <a:t>Maybe DOM is a </a:t>
-            </a:r>
-            <a:r>
-              <a:rPr lang="en-US" dirty="0" smtClean="0">
-                <a:hlinkClick r:id="rId7"/>
-              </a:rPr>
-              <a:t>solution</a:t>
-            </a:r>
-            <a:r>
-              <a:rPr lang="en-US" dirty="0" smtClean="0"/>
-              <a:t>: </a:t>
-            </a:r>
-            <a:r>
-              <a:rPr lang="en-US" dirty="0" err="1" smtClean="0"/>
-              <a:t>rdom</a:t>
-            </a:r>
-            <a:r>
-              <a:rPr lang="en-US" dirty="0"/>
-              <a:t>, </a:t>
-            </a:r>
-            <a:r>
-              <a:rPr lang="en-US" dirty="0" err="1" smtClean="0"/>
-              <a:t>RDCOMClient</a:t>
-            </a:r>
-            <a:endParaRPr lang="en-US" dirty="0" smtClean="0"/>
-          </a:p>
-          <a:p>
-            <a:r>
-              <a:rPr lang="en-US" dirty="0" smtClean="0"/>
-              <a:t>Or </a:t>
-            </a:r>
-            <a:r>
-              <a:rPr lang="en-US" dirty="0" smtClean="0">
-                <a:hlinkClick r:id="rId8"/>
-              </a:rPr>
-              <a:t>white</a:t>
-            </a:r>
-            <a:r>
-              <a:rPr lang="en-US" dirty="0" smtClean="0"/>
-              <a:t> </a:t>
-            </a:r>
-          </a:p>
-          <a:p>
-            <a:r>
-              <a:rPr lang="en-US" dirty="0" smtClean="0"/>
-              <a:t>Or most promising, we could try to use the </a:t>
-            </a:r>
-            <a:r>
-              <a:rPr lang="en-US" dirty="0" smtClean="0">
-                <a:hlinkClick r:id="rId9"/>
-              </a:rPr>
-              <a:t>windows API</a:t>
-            </a:r>
-            <a:r>
-              <a:rPr lang="en-US" dirty="0" smtClean="0"/>
-              <a:t> via VBScript or C#</a:t>
-            </a:r>
-            <a:endParaRPr lang="en-US" dirty="0"/>
-          </a:p>
-        </p:txBody>
-      </p:sp>
-    </p:spTree>
-    <p:extLst>
-      <p:ext uri="{BB962C8B-B14F-4D97-AF65-F5344CB8AC3E}">
-        <p14:creationId xmlns:p14="http://schemas.microsoft.com/office/powerpoint/2010/main" val="2563764221"/>
-      </p:ext>
-    </p:extLst>
-  </p:cSld>
-  <p:clrMapOvr>
-    <a:masterClrMapping/>
-  </p:clrMapOvr>
-</p:sld>
-</file>
-
-<file path=ppt/slides/slide22.xml><?xml version="1.0" encoding="utf-8"?>
-<p:sld xmlns:a="http://schemas.openxmlformats.org/drawingml/2006/main" xmlns:r="http://schemas.openxmlformats.org/officeDocument/2006/relationships" xmlns:p="http://schemas.openxmlformats.org/presentationml/2006/main">
-  <p:cSld>
-    <p:spTree>
-      <p:nvGrpSpPr>
-        <p:cNvPr id="1" name=""/>
-        <p:cNvGrpSpPr/>
-        <p:nvPr/>
-      </p:nvGrpSpPr>
-      <p:grpSpPr>
-        <a:xfrm>
-          <a:off x="0" y="0"/>
-          <a:ext cx="0" cy="0"/>
-          <a:chOff x="0" y="0"/>
-          <a:chExt cx="0" cy="0"/>
-        </a:xfrm>
-      </p:grpSpPr>
-      <p:sp>
-        <p:nvSpPr>
-          <p:cNvPr id="2" name="Title 1"/>
-          <p:cNvSpPr>
-            <a:spLocks noGrp="1"/>
-          </p:cNvSpPr>
-          <p:nvPr>
-            <p:ph type="title"/>
-          </p:nvPr>
-        </p:nvSpPr>
-        <p:spPr/>
-        <p:txBody>
-          <a:bodyPr/>
-          <a:lstStyle/>
-          <a:p>
-            <a:r>
-              <a:rPr lang="en-US" dirty="0" smtClean="0"/>
-              <a:t>R Console for Idea</a:t>
-            </a:r>
-            <a:endParaRPr lang="en-US" dirty="0"/>
-          </a:p>
-        </p:txBody>
-      </p:sp>
-      <p:sp>
-        <p:nvSpPr>
-          <p:cNvPr id="3" name="Content Placeholder 2"/>
-          <p:cNvSpPr>
-            <a:spLocks noGrp="1"/>
-          </p:cNvSpPr>
-          <p:nvPr>
-            <p:ph idx="1"/>
-          </p:nvPr>
-        </p:nvSpPr>
-        <p:spPr/>
-        <p:txBody>
-          <a:bodyPr/>
-          <a:lstStyle/>
-          <a:p>
-            <a:r>
-              <a:rPr lang="en-US" dirty="0" smtClean="0"/>
-              <a:t>Use </a:t>
-            </a:r>
-            <a:r>
-              <a:rPr lang="en-US" dirty="0" err="1" smtClean="0"/>
-              <a:t>RSession</a:t>
-            </a:r>
-            <a:r>
-              <a:rPr lang="en-US" dirty="0" smtClean="0"/>
-              <a:t> </a:t>
-            </a:r>
-            <a:r>
-              <a:rPr lang="en-US" dirty="0" smtClean="0">
-                <a:hlinkClick r:id="rId2"/>
-              </a:rPr>
-              <a:t>solution</a:t>
-            </a:r>
-            <a:endParaRPr lang="en-US" dirty="0" smtClean="0"/>
-          </a:p>
-          <a:p>
-            <a:r>
-              <a:rPr lang="en-US" dirty="0" smtClean="0"/>
-              <a:t>Learn from </a:t>
-            </a:r>
-            <a:r>
-              <a:rPr lang="en-US" dirty="0" err="1" smtClean="0"/>
-              <a:t>TinnR</a:t>
-            </a:r>
-            <a:endParaRPr lang="en-US" dirty="0"/>
-          </a:p>
-        </p:txBody>
-      </p:sp>
-    </p:spTree>
-    <p:extLst>
-      <p:ext uri="{BB962C8B-B14F-4D97-AF65-F5344CB8AC3E}">
-        <p14:creationId xmlns:p14="http://schemas.microsoft.com/office/powerpoint/2010/main" val="1475125988"/>
-      </p:ext>
-    </p:extLst>
-  </p:cSld>
-  <p:clrMapOvr>
-    <a:masterClrMapping/>
-  </p:clrMapOvr>
-</p:sld>
-</file>
-
 <file path=ppt/slides/slide23.xml><?xml version="1.0" encoding="utf-8"?>
 <p:sld xmlns:a="http://schemas.openxmlformats.org/drawingml/2006/main" xmlns:r="http://schemas.openxmlformats.org/officeDocument/2006/relationships" xmlns:p="http://schemas.openxmlformats.org/presentationml/2006/main">
   <p:cSld>
@@ -5747,87 +6464,232 @@
         </p:nvSpPr>
         <p:spPr/>
         <p:txBody>
-          <a:bodyPr/>
-          <a:lstStyle/>
-          <a:p>
-            <a:r>
-              <a:rPr lang="en-US" dirty="0" err="1" smtClean="0">
-                <a:hlinkClick r:id="rId2"/>
-              </a:rPr>
-              <a:t>Tinn</a:t>
+          <a:bodyPr>
+            <a:normAutofit fontScale="90000"/>
+          </a:bodyPr>
+          <a:lstStyle/>
+          <a:p>
+            <a:r>
+              <a:rPr lang="en-US" dirty="0" smtClean="0"/>
+              <a:t>Options for code snippet evaluation</a:t>
+            </a:r>
+            <a:endParaRPr lang="en-US" dirty="0"/>
+          </a:p>
+        </p:txBody>
+      </p:sp>
+      <p:sp>
+        <p:nvSpPr>
+          <p:cNvPr id="3" name="Content Placeholder 2"/>
+          <p:cNvSpPr>
+            <a:spLocks noGrp="1"/>
+          </p:cNvSpPr>
+          <p:nvPr>
+            <p:ph idx="1"/>
+          </p:nvPr>
+        </p:nvSpPr>
+        <p:spPr/>
+        <p:txBody>
+          <a:bodyPr>
+            <a:normAutofit fontScale="62500" lnSpcReduction="20000"/>
+          </a:bodyPr>
+          <a:lstStyle/>
+          <a:p>
+            <a:r>
+              <a:rPr lang="en-US" dirty="0" smtClean="0"/>
+              <a:t>R Session has almost complete implementation for console, objects, </a:t>
+            </a:r>
+            <a:r>
+              <a:rPr lang="en-US" dirty="0" err="1" smtClean="0"/>
+              <a:t>etc</a:t>
+            </a:r>
+            <a:endParaRPr lang="en-US" dirty="0" smtClean="0"/>
+          </a:p>
+          <a:p>
+            <a:r>
+              <a:rPr lang="en-US" dirty="0" err="1" smtClean="0"/>
+              <a:t>TextMate</a:t>
+            </a:r>
+            <a:r>
+              <a:rPr lang="en-US" dirty="0" smtClean="0"/>
+              <a:t> </a:t>
             </a:r>
             <a:r>
               <a:rPr lang="en-US" dirty="0" smtClean="0">
                 <a:hlinkClick r:id="rId2"/>
               </a:rPr>
+              <a:t>bundle</a:t>
+            </a:r>
+            <a:endParaRPr lang="en-US" dirty="0" smtClean="0"/>
+          </a:p>
+          <a:p>
+            <a:pPr lvl="1"/>
+            <a:r>
+              <a:rPr lang="en-US" dirty="0" smtClean="0"/>
+              <a:t>Start R in special mode that reads all input from file and writes all output to another one which then somehow imported into </a:t>
+            </a:r>
+            <a:r>
+              <a:rPr lang="en-US" dirty="0" err="1" smtClean="0"/>
+              <a:t>textmate</a:t>
+            </a:r>
+            <a:endParaRPr lang="en-US" dirty="0" smtClean="0"/>
+          </a:p>
+          <a:p>
+            <a:r>
+              <a:rPr lang="en-US" dirty="0"/>
+              <a:t>I </a:t>
+            </a:r>
+            <a:r>
+              <a:rPr lang="en-US" dirty="0">
+                <a:hlinkClick r:id="rId3"/>
+              </a:rPr>
+              <a:t>think </a:t>
+            </a:r>
+            <a:r>
+              <a:rPr lang="en-US" dirty="0" err="1"/>
+              <a:t>FindWindow</a:t>
+            </a:r>
+            <a:r>
+              <a:rPr lang="en-US" dirty="0"/>
+              <a:t> and </a:t>
+            </a:r>
+            <a:r>
+              <a:rPr lang="en-US" dirty="0" err="1"/>
+              <a:t>SendMessage</a:t>
+            </a:r>
+            <a:r>
+              <a:rPr lang="en-US" dirty="0"/>
+              <a:t> are the functions you want to use, in general</a:t>
+            </a:r>
+            <a:r>
+              <a:rPr lang="en-US" dirty="0" smtClean="0"/>
+              <a:t>.</a:t>
+            </a:r>
+          </a:p>
+          <a:p>
+            <a:r>
+              <a:rPr lang="en-US" dirty="0" smtClean="0"/>
+              <a:t>Use the </a:t>
+            </a:r>
+            <a:r>
+              <a:rPr lang="en-US" dirty="0" smtClean="0">
+                <a:hlinkClick r:id="rId4"/>
+              </a:rPr>
+              <a:t>clipboard</a:t>
+            </a:r>
+            <a:endParaRPr lang="en-US" dirty="0" smtClean="0"/>
+          </a:p>
+          <a:p>
+            <a:r>
+              <a:rPr lang="en-US" dirty="0" err="1" smtClean="0">
+                <a:hlinkClick r:id="rId5"/>
+              </a:rPr>
+              <a:t>Tinn</a:t>
+            </a:r>
+            <a:r>
+              <a:rPr lang="en-US" dirty="0">
+                <a:hlinkClick r:id="rId5"/>
+              </a:rPr>
               <a:t>-R</a:t>
             </a:r>
+            <a:r>
+              <a:rPr lang="en-US" dirty="0"/>
+              <a:t>: It also pops up additional menu and toolbar when it detects </a:t>
+            </a:r>
+            <a:r>
+              <a:rPr lang="en-US" dirty="0" err="1"/>
+              <a:t>Rgui</a:t>
+            </a:r>
+            <a:r>
+              <a:rPr lang="en-US" dirty="0"/>
+              <a:t> running on the same computer. These </a:t>
+            </a:r>
+            <a:r>
+              <a:rPr lang="en-US" dirty="0" err="1"/>
+              <a:t>addons</a:t>
+            </a:r>
+            <a:r>
+              <a:rPr lang="en-US" dirty="0"/>
+              <a:t> interact with the R console and allow to submit code in part or in whole and to control R directly</a:t>
+            </a:r>
+            <a:r>
+              <a:rPr lang="en-US" dirty="0" smtClean="0"/>
+              <a:t>. </a:t>
+            </a:r>
             <a:endParaRPr lang="en-US" dirty="0"/>
           </a:p>
-        </p:txBody>
-      </p:sp>
-      <p:sp>
-        <p:nvSpPr>
-          <p:cNvPr id="3" name="Content Placeholder 2"/>
-          <p:cNvSpPr>
-            <a:spLocks noGrp="1"/>
-          </p:cNvSpPr>
-          <p:nvPr>
-            <p:ph idx="1"/>
-          </p:nvPr>
-        </p:nvSpPr>
-        <p:spPr/>
-        <p:txBody>
-          <a:bodyPr>
-            <a:normAutofit/>
-          </a:bodyPr>
-          <a:lstStyle/>
-          <a:p>
-            <a:r>
-              <a:rPr lang="en-US" dirty="0" smtClean="0"/>
-              <a:t>Allows for </a:t>
+          <a:p>
+            <a:pPr lvl="1"/>
+            <a:r>
+              <a:rPr lang="en-US" dirty="0" smtClean="0"/>
+              <a:t>It seems to have some </a:t>
+            </a:r>
+            <a:r>
+              <a:rPr lang="en-US" dirty="0" smtClean="0">
+                <a:hlinkClick r:id="rId6"/>
+              </a:rPr>
+              <a:t>limitations</a:t>
+            </a:r>
+            <a:endParaRPr lang="en-US" dirty="0" smtClean="0"/>
+          </a:p>
+          <a:p>
+            <a:r>
+              <a:rPr lang="en-US" dirty="0" smtClean="0"/>
+              <a:t>Maybe DOM is a </a:t>
+            </a:r>
+            <a:r>
+              <a:rPr lang="en-US" dirty="0" smtClean="0">
+                <a:hlinkClick r:id="rId7"/>
+              </a:rPr>
+              <a:t>solution</a:t>
+            </a:r>
+            <a:r>
+              <a:rPr lang="en-US" dirty="0" smtClean="0"/>
+              <a:t>: </a:t>
             </a:r>
             <a:r>
               <a:rPr lang="en-US" dirty="0" err="1" smtClean="0"/>
-              <a:t>Rgui</a:t>
-            </a:r>
-            <a:r>
-              <a:rPr lang="en-US" dirty="0" smtClean="0"/>
-              <a:t> interaction to evaluate line or selection</a:t>
-            </a:r>
-          </a:p>
-          <a:p>
-            <a:pPr lvl="1"/>
-            <a:r>
-              <a:rPr lang="en-US" dirty="0"/>
-              <a:t>including list variables or objects</a:t>
-            </a:r>
-            <a:r>
-              <a:rPr lang="en-US" dirty="0" smtClean="0"/>
-              <a:t>, clearing </a:t>
-            </a:r>
-            <a:r>
-              <a:rPr lang="en-US" dirty="0"/>
-              <a:t>console, even stopping the current process.</a:t>
+              <a:t>rdom</a:t>
+            </a:r>
+            <a:r>
+              <a:rPr lang="en-US" dirty="0"/>
+              <a:t>, </a:t>
+            </a:r>
+            <a:r>
+              <a:rPr lang="en-US" dirty="0" err="1" smtClean="0"/>
+              <a:t>RDCOMClient</a:t>
             </a:r>
             <a:endParaRPr lang="en-US" dirty="0" smtClean="0"/>
           </a:p>
           <a:p>
             <a:r>
               <a:rPr lang="en-US" dirty="0" smtClean="0"/>
-              <a:t>Code formatter</a:t>
-            </a:r>
-          </a:p>
-          <a:p>
-            <a:r>
-              <a:rPr lang="en-US" dirty="0" smtClean="0"/>
-              <a:t>Bracket matching &amp; checking</a:t>
-            </a:r>
-          </a:p>
-          <a:p>
-            <a:r>
-              <a:rPr lang="en-US" dirty="0" smtClean="0"/>
-              <a:t>Commenting uncommenting</a:t>
+              <a:t>Or </a:t>
+            </a:r>
+            <a:r>
+              <a:rPr lang="en-US" dirty="0" smtClean="0">
+                <a:hlinkClick r:id="rId8"/>
+              </a:rPr>
+              <a:t>white</a:t>
+            </a:r>
+            <a:r>
+              <a:rPr lang="en-US" dirty="0" smtClean="0"/>
+              <a:t> </a:t>
+            </a:r>
+          </a:p>
+          <a:p>
+            <a:r>
+              <a:rPr lang="en-US" dirty="0" smtClean="0"/>
+              <a:t>Or most promising, we could try to use the </a:t>
+            </a:r>
+            <a:r>
+              <a:rPr lang="en-US" dirty="0" smtClean="0">
+                <a:hlinkClick r:id="rId9"/>
+              </a:rPr>
+              <a:t>windows API</a:t>
+            </a:r>
+            <a:r>
+              <a:rPr lang="en-US" dirty="0" smtClean="0"/>
+              <a:t> via VBScript or C#</a:t>
             </a:r>
             <a:endParaRPr lang="en-US" dirty="0"/>
           </a:p>
@@ -5836,7 +6698,7 @@
     </p:spTree>
     <p:extLst>
       <p:ext uri="{BB962C8B-B14F-4D97-AF65-F5344CB8AC3E}">
-        <p14:creationId xmlns:p14="http://schemas.microsoft.com/office/powerpoint/2010/main" val="2449672567"/>
+        <p14:creationId xmlns:p14="http://schemas.microsoft.com/office/powerpoint/2010/main" val="2563764221"/>
       </p:ext>
     </p:extLst>
   </p:cSld>
@@ -5879,6 +6741,235 @@
           <a:lstStyle/>
           <a:p>
             <a:r>
+              <a:rPr lang="en-US" dirty="0" smtClean="0"/>
+              <a:t>R Console for Idea</a:t>
+            </a:r>
+            <a:endParaRPr lang="en-US" dirty="0"/>
+          </a:p>
+        </p:txBody>
+      </p:sp>
+      <p:sp>
+        <p:nvSpPr>
+          <p:cNvPr id="3" name="Content Placeholder 2"/>
+          <p:cNvSpPr>
+            <a:spLocks noGrp="1"/>
+          </p:cNvSpPr>
+          <p:nvPr>
+            <p:ph idx="1"/>
+          </p:nvPr>
+        </p:nvSpPr>
+        <p:spPr/>
+        <p:txBody>
+          <a:bodyPr/>
+          <a:lstStyle/>
+          <a:p>
+            <a:r>
+              <a:rPr lang="en-US" dirty="0" smtClean="0"/>
+              <a:t>Use </a:t>
+            </a:r>
+            <a:r>
+              <a:rPr lang="en-US" dirty="0" err="1" smtClean="0"/>
+              <a:t>RSession</a:t>
+            </a:r>
+            <a:r>
+              <a:rPr lang="en-US" dirty="0" smtClean="0"/>
+              <a:t> </a:t>
+            </a:r>
+            <a:r>
+              <a:rPr lang="en-US" dirty="0" smtClean="0">
+                <a:hlinkClick r:id="rId2"/>
+              </a:rPr>
+              <a:t>solution</a:t>
+            </a:r>
+            <a:endParaRPr lang="en-US" dirty="0" smtClean="0"/>
+          </a:p>
+          <a:p>
+            <a:r>
+              <a:rPr lang="en-US" dirty="0" smtClean="0"/>
+              <a:t>Learn from </a:t>
+            </a:r>
+            <a:r>
+              <a:rPr lang="en-US" dirty="0" err="1" smtClean="0"/>
+              <a:t>TinnR</a:t>
+            </a:r>
+            <a:endParaRPr lang="en-US" dirty="0"/>
+          </a:p>
+        </p:txBody>
+      </p:sp>
+    </p:spTree>
+    <p:extLst>
+      <p:ext uri="{BB962C8B-B14F-4D97-AF65-F5344CB8AC3E}">
+        <p14:creationId xmlns:p14="http://schemas.microsoft.com/office/powerpoint/2010/main" val="1475125988"/>
+      </p:ext>
+    </p:extLst>
+  </p:cSld>
+  <p:clrMapOvr>
+    <a:masterClrMapping/>
+  </p:clrMapOvr>
+</p:sld>
+</file>
+
+<file path=ppt/slides/slide25.xml><?xml version="1.0" encoding="utf-8"?>
+<p:sld xmlns:a="http://schemas.openxmlformats.org/drawingml/2006/main" xmlns:r="http://schemas.openxmlformats.org/officeDocument/2006/relationships" xmlns:p="http://schemas.openxmlformats.org/presentationml/2006/main">
+  <p:cSld>
+    <p:spTree>
+      <p:nvGrpSpPr>
+        <p:cNvPr id="1" name=""/>
+        <p:cNvGrpSpPr/>
+        <p:nvPr/>
+      </p:nvGrpSpPr>
+      <p:grpSpPr>
+        <a:xfrm>
+          <a:off x="0" y="0"/>
+          <a:ext cx="0" cy="0"/>
+          <a:chOff x="0" y="0"/>
+          <a:chExt cx="0" cy="0"/>
+        </a:xfrm>
+      </p:grpSpPr>
+      <p:sp>
+        <p:nvSpPr>
+          <p:cNvPr id="2" name="Title 1"/>
+          <p:cNvSpPr>
+            <a:spLocks noGrp="1"/>
+          </p:cNvSpPr>
+          <p:nvPr>
+            <p:ph type="title"/>
+          </p:nvPr>
+        </p:nvSpPr>
+        <p:spPr/>
+        <p:txBody>
+          <a:bodyPr/>
+          <a:lstStyle/>
+          <a:p>
+            <a:r>
+              <a:rPr lang="en-US" dirty="0" err="1" smtClean="0">
+                <a:hlinkClick r:id="rId2"/>
+              </a:rPr>
+              <a:t>Tinn</a:t>
+            </a:r>
+            <a:r>
+              <a:rPr lang="en-US" dirty="0" smtClean="0">
+                <a:hlinkClick r:id="rId2"/>
+              </a:rPr>
+              <a:t>-R</a:t>
+            </a:r>
+            <a:endParaRPr lang="en-US" dirty="0"/>
+          </a:p>
+        </p:txBody>
+      </p:sp>
+      <p:sp>
+        <p:nvSpPr>
+          <p:cNvPr id="3" name="Content Placeholder 2"/>
+          <p:cNvSpPr>
+            <a:spLocks noGrp="1"/>
+          </p:cNvSpPr>
+          <p:nvPr>
+            <p:ph idx="1"/>
+          </p:nvPr>
+        </p:nvSpPr>
+        <p:spPr/>
+        <p:txBody>
+          <a:bodyPr>
+            <a:normAutofit/>
+          </a:bodyPr>
+          <a:lstStyle/>
+          <a:p>
+            <a:r>
+              <a:rPr lang="en-US" dirty="0" smtClean="0"/>
+              <a:t>Allows for </a:t>
+            </a:r>
+            <a:r>
+              <a:rPr lang="en-US" dirty="0" err="1" smtClean="0"/>
+              <a:t>Rgui</a:t>
+            </a:r>
+            <a:r>
+              <a:rPr lang="en-US" dirty="0" smtClean="0"/>
+              <a:t> interaction to evaluate line or selection</a:t>
+            </a:r>
+          </a:p>
+          <a:p>
+            <a:pPr lvl="1"/>
+            <a:r>
+              <a:rPr lang="en-US" dirty="0"/>
+              <a:t>including list variables or objects</a:t>
+            </a:r>
+            <a:r>
+              <a:rPr lang="en-US" dirty="0" smtClean="0"/>
+              <a:t>, clearing </a:t>
+            </a:r>
+            <a:r>
+              <a:rPr lang="en-US" dirty="0"/>
+              <a:t>console, even stopping the current process.</a:t>
+            </a:r>
+            <a:endParaRPr lang="en-US" dirty="0" smtClean="0"/>
+          </a:p>
+          <a:p>
+            <a:r>
+              <a:rPr lang="en-US" dirty="0" smtClean="0"/>
+              <a:t>Code formatter</a:t>
+            </a:r>
+          </a:p>
+          <a:p>
+            <a:r>
+              <a:rPr lang="en-US" dirty="0" smtClean="0"/>
+              <a:t>Bracket matching &amp; checking</a:t>
+            </a:r>
+          </a:p>
+          <a:p>
+            <a:r>
+              <a:rPr lang="en-US" dirty="0" smtClean="0"/>
+              <a:t>Commenting uncommenting</a:t>
+            </a:r>
+            <a:endParaRPr lang="en-US" dirty="0"/>
+          </a:p>
+        </p:txBody>
+      </p:sp>
+    </p:spTree>
+    <p:extLst>
+      <p:ext uri="{BB962C8B-B14F-4D97-AF65-F5344CB8AC3E}">
+        <p14:creationId xmlns:p14="http://schemas.microsoft.com/office/powerpoint/2010/main" val="2449672567"/>
+      </p:ext>
+    </p:extLst>
+  </p:cSld>
+  <p:clrMapOvr>
+    <a:masterClrMapping/>
+  </p:clrMapOvr>
+</p:sld>
+</file>
+
+<file path=ppt/slides/slide26.xml><?xml version="1.0" encoding="utf-8"?>
+<p:sld xmlns:a="http://schemas.openxmlformats.org/drawingml/2006/main" xmlns:r="http://schemas.openxmlformats.org/officeDocument/2006/relationships" xmlns:p="http://schemas.openxmlformats.org/presentationml/2006/main">
+  <p:cSld>
+    <p:spTree>
+      <p:nvGrpSpPr>
+        <p:cNvPr id="1" name=""/>
+        <p:cNvGrpSpPr/>
+        <p:nvPr/>
+      </p:nvGrpSpPr>
+      <p:grpSpPr>
+        <a:xfrm>
+          <a:off x="0" y="0"/>
+          <a:ext cx="0" cy="0"/>
+          <a:chOff x="0" y="0"/>
+          <a:chExt cx="0" cy="0"/>
+        </a:xfrm>
+      </p:grpSpPr>
+      <p:sp>
+        <p:nvSpPr>
+          <p:cNvPr id="2" name="Title 1"/>
+          <p:cNvSpPr>
+            <a:spLocks noGrp="1"/>
+          </p:cNvSpPr>
+          <p:nvPr>
+            <p:ph type="title"/>
+          </p:nvPr>
+        </p:nvSpPr>
+        <p:spPr/>
+        <p:txBody>
+          <a:bodyPr/>
+          <a:lstStyle/>
+          <a:p>
+            <a:r>
               <a:rPr lang="en-US" dirty="0" err="1" smtClean="0"/>
               <a:t>RStudio</a:t>
             </a:r>
@@ -5918,7 +7009,7 @@
 </p:sld>
 </file>
 
-<file path=ppt/slides/slide25.xml><?xml version="1.0" encoding="utf-8"?>
+<file path=ppt/slides/slide27.xml><?xml version="1.0" encoding="utf-8"?>
 <p:sld xmlns:a="http://schemas.openxmlformats.org/drawingml/2006/main" xmlns:r="http://schemas.openxmlformats.org/officeDocument/2006/relationships" xmlns:p="http://schemas.openxmlformats.org/presentationml/2006/main">
   <p:cSld>
     <p:spTree>
@@ -6020,7 +7111,7 @@
           <a:p>
             <a:r>
               <a:rPr lang="en-US" dirty="0" smtClean="0"/>
-              <a:t>Next</a:t>
+              <a:t>Documentation integration</a:t>
             </a:r>
             <a:endParaRPr lang="en-US" dirty="0"/>
           </a:p>
@@ -6038,76 +7129,12 @@
         </p:nvSpPr>
         <p:spPr/>
         <p:txBody>
-          <a:bodyPr>
-            <a:normAutofit lnSpcReduction="10000"/>
-          </a:bodyPr>
-          <a:lstStyle/>
-          <a:p>
-            <a:r>
-              <a:rPr lang="en-US" dirty="0"/>
-              <a:t>Every element which can be renamed </a:t>
-            </a:r>
-            <a:r>
-              <a:rPr lang="en-US" dirty="0" smtClean="0"/>
-              <a:t>or referenced </a:t>
-            </a:r>
-            <a:r>
-              <a:rPr lang="en-US" dirty="0"/>
-              <a:t>(a class definition, a method definition and so on) needs to implement the </a:t>
-            </a:r>
-            <a:r>
-              <a:rPr lang="en-US" dirty="0" err="1"/>
-              <a:t>PsiNamedElement</a:t>
-            </a:r>
-            <a:r>
-              <a:rPr lang="en-US" dirty="0"/>
-              <a:t> interface, with methods </a:t>
-            </a:r>
-            <a:r>
-              <a:rPr lang="en-US" dirty="0" err="1"/>
-              <a:t>getName</a:t>
-            </a:r>
-            <a:r>
-              <a:rPr lang="en-US" dirty="0"/>
-              <a:t>() and </a:t>
-            </a:r>
-            <a:r>
-              <a:rPr lang="en-US" dirty="0" err="1"/>
-              <a:t>setName</a:t>
-            </a:r>
-            <a:r>
-              <a:rPr lang="en-US" dirty="0"/>
-              <a:t>(</a:t>
-            </a:r>
-            <a:r>
-              <a:rPr lang="en-US" dirty="0" smtClean="0"/>
-              <a:t>)</a:t>
-            </a:r>
-          </a:p>
-          <a:p>
-            <a:r>
-              <a:rPr lang="en-US" dirty="0" smtClean="0"/>
-              <a:t>Proper </a:t>
-            </a:r>
-            <a:r>
-              <a:rPr lang="en-US" dirty="0"/>
-              <a:t>error highlighting (see </a:t>
-            </a:r>
-            <a:r>
-              <a:rPr lang="en-US" dirty="0">
-                <a:hlinkClick r:id="rId2"/>
-              </a:rPr>
-              <a:t>http://confluence.jetbrains.net/display/IDEADEV/Developing+Custom+Language+Plugins+for+IntelliJ+</a:t>
-            </a:r>
-            <a:r>
-              <a:rPr lang="en-US" dirty="0" smtClean="0">
-                <a:hlinkClick r:id="rId2"/>
-              </a:rPr>
-              <a:t>IDEA</a:t>
-            </a:r>
-            <a:r>
-              <a:rPr lang="en-US" smtClean="0"/>
-              <a:t> )</a:t>
+          <a:bodyPr/>
+          <a:lstStyle/>
+          <a:p>
+            <a:r>
+              <a:rPr lang="en-US" dirty="0" err="1" smtClean="0"/>
+              <a:t>StatET</a:t>
             </a:r>
             <a:endParaRPr lang="en-US" dirty="0"/>
           </a:p>
@@ -6116,7 +7143,7 @@
     </p:spTree>
     <p:extLst>
       <p:ext uri="{BB962C8B-B14F-4D97-AF65-F5344CB8AC3E}">
-        <p14:creationId xmlns:p14="http://schemas.microsoft.com/office/powerpoint/2010/main" val="1292058259"/>
+        <p14:creationId xmlns:p14="http://schemas.microsoft.com/office/powerpoint/2010/main" val="1458029459"/>
       </p:ext>
     </p:extLst>
   </p:cSld>
@@ -6160,7 +7187,7 @@
           <a:p>
             <a:r>
               <a:rPr lang="en-US" dirty="0" smtClean="0"/>
-              <a:t>Roadmap (coming soon)</a:t>
+              <a:t>Next</a:t>
             </a:r>
             <a:endParaRPr lang="en-US" dirty="0"/>
           </a:p>
@@ -6179,139 +7206,48 @@
         <p:spPr/>
         <p:txBody>
           <a:bodyPr>
-            <a:normAutofit fontScale="92500" lnSpcReduction="20000"/>
+            <a:normAutofit/>
           </a:bodyPr>
           <a:lstStyle/>
           <a:p>
             <a:r>
               <a:rPr lang="en-US" dirty="0" smtClean="0"/>
-              <a:t>Live </a:t>
-            </a:r>
+              <a:t>Reference resolving</a:t>
+            </a:r>
+          </a:p>
+          <a:p>
             <a:r>
               <a:rPr lang="en-US" dirty="0" err="1" smtClean="0"/>
-              <a:t>Templates</a:t>
-            </a:r>
+              <a:t>BnfAnnotator</a:t>
+            </a:r>
+            <a:endParaRPr lang="en-US" dirty="0" smtClean="0"/>
+          </a:p>
+          <a:p>
             <a:r>
               <a:rPr lang="en-US" dirty="0" err="1" smtClean="0"/>
-              <a:t>Code</a:t>
-            </a:r>
-            <a:r>
-              <a:rPr lang="en-US" dirty="0" smtClean="0"/>
-              <a:t> formatter</a:t>
+              <a:t>BnfQuoteHandler</a:t>
+            </a:r>
+            <a:endParaRPr lang="en-US" dirty="0" smtClean="0"/>
+          </a:p>
+          <a:p>
+            <a:r>
+              <a:rPr lang="en-US" dirty="0" smtClean="0"/>
+              <a:t>Fix parser</a:t>
+            </a:r>
+          </a:p>
+          <a:p>
+            <a:r>
+              <a:rPr lang="en-US" smtClean="0"/>
+              <a:t>Windows connector</a:t>
             </a:r>
             <a:endParaRPr lang="en-US" dirty="0"/>
-          </a:p>
-          <a:p>
-            <a:r>
-              <a:rPr lang="en-US" dirty="0" smtClean="0"/>
-              <a:t>Inspections </a:t>
-            </a:r>
-            <a:r>
-              <a:rPr lang="en-US" dirty="0"/>
-              <a:t>and </a:t>
-            </a:r>
-            <a:r>
-              <a:rPr lang="en-US" dirty="0" err="1"/>
-              <a:t>quickfixes</a:t>
-            </a:r>
-            <a:r>
-              <a:rPr lang="en-US" dirty="0"/>
-              <a:t> for common </a:t>
-            </a:r>
-            <a:r>
-              <a:rPr lang="en-US" dirty="0" smtClean="0"/>
-              <a:t>problems</a:t>
-            </a:r>
-          </a:p>
-          <a:p>
-            <a:pPr lvl="1"/>
-            <a:r>
-              <a:rPr lang="en-US" dirty="0"/>
-              <a:t>Incorrect subset (or if</a:t>
-            </a:r>
-            <a:r>
-              <a:rPr lang="en-US" dirty="0" smtClean="0"/>
-              <a:t>)</a:t>
-            </a:r>
-            <a:endParaRPr lang="en-US" dirty="0"/>
-          </a:p>
-          <a:p>
-            <a:r>
-              <a:rPr lang="en-US" dirty="0" smtClean="0"/>
-              <a:t>Basic </a:t>
-            </a:r>
-            <a:r>
-              <a:rPr lang="en-US" dirty="0" err="1"/>
-              <a:t>refactorings</a:t>
-            </a:r>
-            <a:r>
-              <a:rPr lang="en-US" dirty="0"/>
-              <a:t> (rename </a:t>
-            </a:r>
-            <a:r>
-              <a:rPr lang="en-US" dirty="0" smtClean="0"/>
-              <a:t>variables and functions)</a:t>
-            </a:r>
-            <a:endParaRPr lang="en-US" dirty="0"/>
-          </a:p>
-          <a:p>
-            <a:r>
-              <a:rPr lang="en-US" dirty="0" smtClean="0"/>
-              <a:t>Advanced </a:t>
-            </a:r>
-            <a:r>
-              <a:rPr lang="en-US" dirty="0"/>
-              <a:t>navigation (structure view, go to declaration, ...</a:t>
-            </a:r>
-            <a:r>
-              <a:rPr lang="en-US" dirty="0" smtClean="0"/>
-              <a:t>)</a:t>
-            </a:r>
-            <a:endParaRPr lang="en-US" dirty="0"/>
-          </a:p>
-          <a:p>
-            <a:r>
-              <a:rPr lang="en-US" dirty="0" err="1" smtClean="0"/>
-              <a:t>Ctrl</a:t>
-            </a:r>
-            <a:r>
-              <a:rPr lang="en-US" dirty="0" err="1"/>
-              <a:t>+Q</a:t>
-            </a:r>
-            <a:r>
-              <a:rPr lang="en-US" dirty="0"/>
-              <a:t> (Quick documentation lookup) for internal commands, external commands and </a:t>
-            </a:r>
-            <a:r>
-              <a:rPr lang="en-US" dirty="0" smtClean="0"/>
-              <a:t>functions</a:t>
-            </a:r>
-            <a:endParaRPr lang="en-US" dirty="0"/>
-          </a:p>
-          <a:p>
-            <a:r>
-              <a:rPr lang="en-US" dirty="0" smtClean="0"/>
-              <a:t>Highlight </a:t>
-            </a:r>
-            <a:r>
-              <a:rPr lang="en-US" dirty="0"/>
-              <a:t>usages in file for functions and </a:t>
-            </a:r>
-            <a:r>
-              <a:rPr lang="en-US" dirty="0" smtClean="0"/>
-              <a:t>variables</a:t>
-            </a:r>
-            <a:endParaRPr lang="en-US" dirty="0"/>
-          </a:p>
-          <a:p>
-            <a:endParaRPr lang="en-US" dirty="0" smtClean="0"/>
           </a:p>
         </p:txBody>
       </p:sp>
     </p:spTree>
     <p:extLst>
       <p:ext uri="{BB962C8B-B14F-4D97-AF65-F5344CB8AC3E}">
-        <p14:creationId xmlns:p14="http://schemas.microsoft.com/office/powerpoint/2010/main" val="3335867933"/>
+        <p14:creationId xmlns:p14="http://schemas.microsoft.com/office/powerpoint/2010/main" val="1292058259"/>
       </p:ext>
     </p:extLst>
   </p:cSld>
@@ -6355,6 +7291,381 @@
           <a:p>
             <a:r>
               <a:rPr lang="en-US" dirty="0" smtClean="0"/>
+              <a:t>Roadmap (coming soon)</a:t>
+            </a:r>
+            <a:endParaRPr lang="en-US" dirty="0"/>
+          </a:p>
+        </p:txBody>
+      </p:sp>
+      <p:sp>
+        <p:nvSpPr>
+          <p:cNvPr id="3" name="Content Placeholder 2"/>
+          <p:cNvSpPr>
+            <a:spLocks noGrp="1"/>
+          </p:cNvSpPr>
+          <p:nvPr>
+            <p:ph idx="1"/>
+          </p:nvPr>
+        </p:nvSpPr>
+        <p:spPr/>
+        <p:txBody>
+          <a:bodyPr>
+            <a:normAutofit fontScale="85000" lnSpcReduction="20000"/>
+          </a:bodyPr>
+          <a:lstStyle/>
+          <a:p>
+            <a:r>
+              <a:rPr lang="en-US" dirty="0" smtClean="0"/>
+              <a:t>Live </a:t>
+            </a:r>
+            <a:r>
+              <a:rPr lang="en-US" dirty="0" err="1" smtClean="0"/>
+              <a:t>TemplatesCode</a:t>
+            </a:r>
+            <a:r>
+              <a:rPr lang="en-US" dirty="0" smtClean="0"/>
+              <a:t> formatter</a:t>
+            </a:r>
+            <a:endParaRPr lang="en-US" dirty="0"/>
+          </a:p>
+          <a:p>
+            <a:r>
+              <a:rPr lang="en-US" dirty="0" smtClean="0"/>
+              <a:t>Inspections </a:t>
+            </a:r>
+            <a:r>
+              <a:rPr lang="en-US" dirty="0"/>
+              <a:t>and </a:t>
+            </a:r>
+            <a:r>
+              <a:rPr lang="en-US" dirty="0" err="1"/>
+              <a:t>quickfixes</a:t>
+            </a:r>
+            <a:r>
+              <a:rPr lang="en-US" dirty="0"/>
+              <a:t> for common </a:t>
+            </a:r>
+            <a:r>
+              <a:rPr lang="en-US" dirty="0" smtClean="0"/>
+              <a:t>problems</a:t>
+            </a:r>
+          </a:p>
+          <a:p>
+            <a:pPr lvl="1"/>
+            <a:r>
+              <a:rPr lang="en-US" dirty="0"/>
+              <a:t>Incorrect subset (or if</a:t>
+            </a:r>
+            <a:r>
+              <a:rPr lang="en-US" dirty="0" smtClean="0"/>
+              <a:t>)</a:t>
+            </a:r>
+            <a:endParaRPr lang="en-US" dirty="0"/>
+          </a:p>
+          <a:p>
+            <a:r>
+              <a:rPr lang="en-US" dirty="0" smtClean="0"/>
+              <a:t>Basic </a:t>
+            </a:r>
+            <a:r>
+              <a:rPr lang="en-US" dirty="0" err="1" smtClean="0"/>
+              <a:t>refactorings</a:t>
+            </a:r>
+            <a:r>
+              <a:rPr lang="en-US" dirty="0" smtClean="0"/>
+              <a:t> to match </a:t>
+            </a:r>
+            <a:r>
+              <a:rPr lang="en-US" dirty="0" err="1" smtClean="0"/>
+              <a:t>StatET</a:t>
+            </a:r>
+            <a:r>
+              <a:rPr lang="en-US" dirty="0" smtClean="0"/>
+              <a:t> </a:t>
+            </a:r>
+            <a:r>
+              <a:rPr lang="en-US" dirty="0"/>
+              <a:t>(rename </a:t>
+            </a:r>
+            <a:r>
+              <a:rPr lang="en-US" dirty="0" smtClean="0"/>
+              <a:t>variable, introduce local variable, inline local variable,  extract function, Generate Element Comment)</a:t>
+            </a:r>
+            <a:endParaRPr lang="en-US" dirty="0"/>
+          </a:p>
+          <a:p>
+            <a:r>
+              <a:rPr lang="en-US" dirty="0" smtClean="0"/>
+              <a:t>Advanced </a:t>
+            </a:r>
+            <a:r>
+              <a:rPr lang="en-US" dirty="0"/>
+              <a:t>navigation (structure view, go to declaration (Example: </a:t>
+            </a:r>
+            <a:r>
+              <a:rPr lang="en-US" dirty="0" err="1"/>
+              <a:t>ArcChooser</a:t>
+            </a:r>
+            <a:r>
+              <a:rPr lang="en-US" dirty="0"/>
+              <a:t>), ...</a:t>
+            </a:r>
+            <a:r>
+              <a:rPr lang="en-US" dirty="0" smtClean="0"/>
+              <a:t>)</a:t>
+            </a:r>
+            <a:endParaRPr lang="en-US" dirty="0"/>
+          </a:p>
+          <a:p>
+            <a:r>
+              <a:rPr lang="en-US" dirty="0" err="1" smtClean="0"/>
+              <a:t>Ctrl</a:t>
+            </a:r>
+            <a:r>
+              <a:rPr lang="en-US" dirty="0" err="1"/>
+              <a:t>+Q</a:t>
+            </a:r>
+            <a:r>
+              <a:rPr lang="en-US" dirty="0"/>
+              <a:t> (Quick documentation lookup) for internal commands, external commands and </a:t>
+            </a:r>
+            <a:r>
+              <a:rPr lang="en-US" dirty="0" smtClean="0"/>
+              <a:t>functions (learn from </a:t>
+            </a:r>
+            <a:r>
+              <a:rPr lang="en-US" dirty="0" err="1" smtClean="0"/>
+              <a:t>StatET</a:t>
+            </a:r>
+            <a:r>
+              <a:rPr lang="en-US" dirty="0" smtClean="0"/>
+              <a:t>!)</a:t>
+            </a:r>
+            <a:endParaRPr lang="en-US" dirty="0"/>
+          </a:p>
+          <a:p>
+            <a:r>
+              <a:rPr lang="en-US" dirty="0" smtClean="0"/>
+              <a:t>Highlight </a:t>
+            </a:r>
+            <a:r>
+              <a:rPr lang="en-US" dirty="0"/>
+              <a:t>usages in file for functions and </a:t>
+            </a:r>
+            <a:r>
+              <a:rPr lang="en-US" dirty="0" smtClean="0"/>
+              <a:t>variables</a:t>
+            </a:r>
+          </a:p>
+          <a:p>
+            <a:endParaRPr lang="en-US" dirty="0"/>
+          </a:p>
+          <a:p>
+            <a:endParaRPr lang="en-US" dirty="0" smtClean="0"/>
+          </a:p>
+        </p:txBody>
+      </p:sp>
+    </p:spTree>
+    <p:extLst>
+      <p:ext uri="{BB962C8B-B14F-4D97-AF65-F5344CB8AC3E}">
+        <p14:creationId xmlns:p14="http://schemas.microsoft.com/office/powerpoint/2010/main" val="3335867933"/>
+      </p:ext>
+    </p:extLst>
+  </p:cSld>
+  <p:clrMapOvr>
+    <a:masterClrMapping/>
+  </p:clrMapOvr>
+</p:sld>
+</file>
+
+<file path=ppt/slides/slide6.xml><?xml version="1.0" encoding="utf-8"?>
+<p:sld xmlns:a="http://schemas.openxmlformats.org/drawingml/2006/main" xmlns:r="http://schemas.openxmlformats.org/officeDocument/2006/relationships" xmlns:p="http://schemas.openxmlformats.org/presentationml/2006/main">
+  <p:cSld>
+    <p:spTree>
+      <p:nvGrpSpPr>
+        <p:cNvPr id="1" name=""/>
+        <p:cNvGrpSpPr/>
+        <p:nvPr/>
+      </p:nvGrpSpPr>
+      <p:grpSpPr>
+        <a:xfrm>
+          <a:off x="0" y="0"/>
+          <a:ext cx="0" cy="0"/>
+          <a:chOff x="0" y="0"/>
+          <a:chExt cx="0" cy="0"/>
+        </a:xfrm>
+      </p:grpSpPr>
+      <p:sp>
+        <p:nvSpPr>
+          <p:cNvPr id="2" name="Title 1"/>
+          <p:cNvSpPr>
+            <a:spLocks noGrp="1"/>
+          </p:cNvSpPr>
+          <p:nvPr>
+            <p:ph type="title"/>
+          </p:nvPr>
+        </p:nvSpPr>
+        <p:spPr/>
+        <p:txBody>
+          <a:bodyPr>
+            <a:normAutofit fontScale="90000"/>
+          </a:bodyPr>
+          <a:lstStyle/>
+          <a:p>
+            <a:r>
+              <a:rPr lang="en-US" dirty="0" smtClean="0"/>
+              <a:t>To match </a:t>
+            </a:r>
+            <a:r>
+              <a:rPr lang="en-US" dirty="0" err="1" smtClean="0"/>
+              <a:t>StatET</a:t>
+            </a:r>
+            <a:r>
+              <a:rPr lang="en-US" dirty="0" smtClean="0"/>
+              <a:t> we would need in addition</a:t>
+            </a:r>
+            <a:endParaRPr lang="en-US" dirty="0"/>
+          </a:p>
+        </p:txBody>
+      </p:sp>
+      <p:sp>
+        <p:nvSpPr>
+          <p:cNvPr id="3" name="Content Placeholder 2"/>
+          <p:cNvSpPr>
+            <a:spLocks noGrp="1"/>
+          </p:cNvSpPr>
+          <p:nvPr>
+            <p:ph idx="1"/>
+          </p:nvPr>
+        </p:nvSpPr>
+        <p:spPr/>
+        <p:txBody>
+          <a:bodyPr/>
+          <a:lstStyle/>
+          <a:p>
+            <a:r>
+              <a:rPr lang="en-US" dirty="0" smtClean="0"/>
+              <a:t>File path completion (learn from bash plugin)</a:t>
+            </a:r>
+          </a:p>
+          <a:p>
+            <a:r>
+              <a:rPr lang="en-US" dirty="0" smtClean="0"/>
+              <a:t>Better highlighting of syntax errors</a:t>
+            </a:r>
+          </a:p>
+          <a:p>
+            <a:r>
+              <a:rPr lang="en-US" dirty="0" smtClean="0"/>
+              <a:t>Intention to add </a:t>
+            </a:r>
+            <a:r>
+              <a:rPr lang="en-US" dirty="0" err="1" smtClean="0"/>
+              <a:t>roxygen</a:t>
+            </a:r>
+            <a:r>
+              <a:rPr lang="en-US" dirty="0" smtClean="0"/>
+              <a:t> </a:t>
+            </a:r>
+            <a:r>
+              <a:rPr lang="en-US" dirty="0" err="1" smtClean="0"/>
+              <a:t>docu</a:t>
+            </a:r>
+            <a:r>
+              <a:rPr lang="en-US" dirty="0" smtClean="0"/>
+              <a:t> + code basic tag completion for </a:t>
+            </a:r>
+            <a:r>
+              <a:rPr lang="en-US" dirty="0" err="1" smtClean="0"/>
+              <a:t>roxygen</a:t>
+            </a:r>
+            <a:r>
+              <a:rPr lang="en-US" dirty="0" smtClean="0"/>
+              <a:t> comments</a:t>
+            </a:r>
+          </a:p>
+          <a:p>
+            <a:r>
+              <a:rPr lang="en-US" dirty="0" smtClean="0"/>
+              <a:t>Intention to change function to S4 function</a:t>
+            </a:r>
+          </a:p>
+          <a:p>
+            <a:r>
+              <a:rPr lang="en-US" dirty="0" smtClean="0"/>
+              <a:t>Connectors for </a:t>
+            </a:r>
+            <a:r>
+              <a:rPr lang="en-US" dirty="0" err="1" smtClean="0"/>
+              <a:t>xterm</a:t>
+            </a:r>
+            <a:r>
+              <a:rPr lang="en-US" dirty="0" smtClean="0"/>
+              <a:t> and </a:t>
+            </a:r>
+            <a:r>
+              <a:rPr lang="en-US" dirty="0" err="1" smtClean="0"/>
+              <a:t>Rgui</a:t>
+            </a:r>
+            <a:r>
+              <a:rPr lang="en-US" dirty="0" smtClean="0"/>
+              <a:t> </a:t>
+            </a:r>
+            <a:r>
+              <a:rPr lang="en-US" smtClean="0"/>
+              <a:t>on windows</a:t>
+            </a:r>
+            <a:endParaRPr lang="en-US" dirty="0"/>
+          </a:p>
+        </p:txBody>
+      </p:sp>
+    </p:spTree>
+    <p:extLst>
+      <p:ext uri="{BB962C8B-B14F-4D97-AF65-F5344CB8AC3E}">
+        <p14:creationId xmlns:p14="http://schemas.microsoft.com/office/powerpoint/2010/main" val="1725818345"/>
+      </p:ext>
+    </p:extLst>
+  </p:cSld>
+  <p:clrMapOvr>
+    <a:masterClrMapping/>
+  </p:clrMapOvr>
+</p:sld>
+</file>
+
+<file path=ppt/slides/slide7.xml><?xml version="1.0" encoding="utf-8"?>
+<p:sld xmlns:a="http://schemas.openxmlformats.org/drawingml/2006/main" xmlns:r="http://schemas.openxmlformats.org/officeDocument/2006/relationships" xmlns:p="http://schemas.openxmlformats.org/presentationml/2006/main">
+  <p:cSld>
+    <p:spTree>
+      <p:nvGrpSpPr>
+        <p:cNvPr id="1" name=""/>
+        <p:cNvGrpSpPr/>
+        <p:nvPr/>
+      </p:nvGrpSpPr>
+      <p:grpSpPr>
+        <a:xfrm>
+          <a:off x="0" y="0"/>
+          <a:ext cx="0" cy="0"/>
+          <a:chOff x="0" y="0"/>
+          <a:chExt cx="0" cy="0"/>
+        </a:xfrm>
+      </p:grpSpPr>
+      <p:sp>
+        <p:nvSpPr>
+          <p:cNvPr id="2" name="Title 1"/>
+          <p:cNvSpPr>
+            <a:spLocks noGrp="1"/>
+          </p:cNvSpPr>
+          <p:nvPr>
+            <p:ph type="title"/>
+          </p:nvPr>
+        </p:nvSpPr>
+        <p:spPr/>
+        <p:txBody>
+          <a:bodyPr/>
+          <a:lstStyle/>
+          <a:p>
+            <a:r>
+              <a:rPr lang="en-US" dirty="0" smtClean="0"/>
               <a:t>Roadmap (later)</a:t>
             </a:r>
             <a:endParaRPr lang="en-US" dirty="0"/>
@@ -6379,8 +7690,18 @@
           <a:lstStyle/>
           <a:p>
             <a:r>
-              <a:rPr lang="en-US" dirty="0"/>
-              <a:t>More context-aware </a:t>
+              <a:rPr lang="en-US" dirty="0" smtClean="0"/>
+              <a:t>Check that function is available and provide import library statement if necessary</a:t>
+            </a:r>
+          </a:p>
+          <a:p>
+            <a:r>
+              <a:rPr lang="en-US" dirty="0" smtClean="0"/>
+              <a:t>More </a:t>
+            </a:r>
+            <a:r>
+              <a:rPr lang="en-US" dirty="0"/>
+              <a:t>context-aware </a:t>
             </a:r>
             <a:r>
               <a:rPr lang="en-US" dirty="0" smtClean="0"/>
@@ -6394,37 +7715,6 @@
               <a:rPr lang="en-US" dirty="0" smtClean="0"/>
               <a:t>paths</a:t>
             </a:r>
-            <a:endParaRPr lang="en-US" dirty="0" smtClean="0"/>
-          </a:p>
-          <a:p>
-            <a:r>
-              <a:rPr lang="en-US" dirty="0" smtClean="0"/>
-              <a:t>quick </a:t>
-            </a:r>
-            <a:r>
-              <a:rPr lang="en-US" dirty="0"/>
-              <a:t>navigation to variable </a:t>
-            </a:r>
-            <a:r>
-              <a:rPr lang="en-US" dirty="0" smtClean="0"/>
-              <a:t>definitions</a:t>
-            </a:r>
-          </a:p>
-          <a:p>
-            <a:pPr lvl="1"/>
-            <a:r>
-              <a:rPr lang="en-US" dirty="0" smtClean="0"/>
-              <a:t>(excellent) Example</a:t>
-            </a:r>
-            <a:r>
-              <a:rPr lang="en-US" dirty="0"/>
-              <a:t>: </a:t>
-            </a:r>
-            <a:r>
-              <a:rPr lang="en-US" dirty="0" err="1" smtClean="0"/>
-              <a:t>ArcChooser</a:t>
-            </a:r>
-            <a:endParaRPr lang="en-US" dirty="0"/>
           </a:p>
           <a:p>
             <a:r>
@@ -6451,11 +7741,7 @@
             </a:r>
             <a:r>
               <a:rPr lang="en-US" dirty="0" smtClean="0"/>
-              <a:t> </a:t>
-            </a:r>
-            <a:r>
-              <a:rPr lang="en-US" dirty="0" smtClean="0"/>
-              <a:t>(see Bash implementation)</a:t>
+              <a:t> (see Bash implementation)</a:t>
             </a:r>
           </a:p>
           <a:p>
@@ -6489,7 +7775,7 @@
 </p:sld>
 </file>
 
-<file path=ppt/slides/slide6.xml><?xml version="1.0" encoding="utf-8"?>
+<file path=ppt/slides/slide8.xml><?xml version="1.0" encoding="utf-8"?>
 <p:sld xmlns:a="http://schemas.openxmlformats.org/drawingml/2006/main" xmlns:r="http://schemas.openxmlformats.org/officeDocument/2006/relationships" xmlns:p="http://schemas.openxmlformats.org/presentationml/2006/main">
   <p:cSld>
     <p:spTree>
@@ -6648,258 +7934,6 @@
 </p:sld>
 </file>
 
-<file path=ppt/slides/slide7.xml><?xml version="1.0" encoding="utf-8"?>
-<p:sld xmlns:a="http://schemas.openxmlformats.org/drawingml/2006/main" xmlns:r="http://schemas.openxmlformats.org/officeDocument/2006/relationships" xmlns:p="http://schemas.openxmlformats.org/presentationml/2006/main">
-  <p:cSld>
-    <p:spTree>
-      <p:nvGrpSpPr>
-        <p:cNvPr id="1" name=""/>
-        <p:cNvGrpSpPr/>
-        <p:nvPr/>
-      </p:nvGrpSpPr>
-      <p:grpSpPr>
-        <a:xfrm>
-          <a:off x="0" y="0"/>
-          <a:ext cx="0" cy="0"/>
-          <a:chOff x="0" y="0"/>
-          <a:chExt cx="0" cy="0"/>
-        </a:xfrm>
-      </p:grpSpPr>
-      <p:sp>
-        <p:nvSpPr>
-          <p:cNvPr id="2" name="Title 1"/>
-          <p:cNvSpPr>
-            <a:spLocks noGrp="1"/>
-          </p:cNvSpPr>
-          <p:nvPr>
-            <p:ph type="title"/>
-          </p:nvPr>
-        </p:nvSpPr>
-        <p:spPr/>
-        <p:txBody>
-          <a:bodyPr/>
-          <a:lstStyle/>
-          <a:p>
-            <a:r>
-              <a:rPr lang="en-US" dirty="0" err="1" smtClean="0"/>
-              <a:t>Lexer</a:t>
-            </a:r>
-            <a:endParaRPr lang="en-US" dirty="0"/>
-          </a:p>
-        </p:txBody>
-      </p:sp>
-      <p:sp>
-        <p:nvSpPr>
-          <p:cNvPr id="3" name="Content Placeholder 2"/>
-          <p:cNvSpPr>
-            <a:spLocks noGrp="1"/>
-          </p:cNvSpPr>
-          <p:nvPr>
-            <p:ph idx="1"/>
-          </p:nvPr>
-        </p:nvSpPr>
-        <p:spPr/>
-        <p:txBody>
-          <a:bodyPr/>
-          <a:lstStyle/>
-          <a:p>
-            <a:r>
-              <a:rPr lang="en-US" dirty="0" smtClean="0"/>
-              <a:t>Just as the </a:t>
-            </a:r>
-            <a:r>
-              <a:rPr lang="en-US" dirty="0" err="1" smtClean="0"/>
-              <a:t>lexer</a:t>
-            </a:r>
-            <a:r>
-              <a:rPr lang="en-US" dirty="0" smtClean="0"/>
-              <a:t> is a source code spelling checker, the parser is a grammar checker</a:t>
-            </a:r>
-          </a:p>
-          <a:p>
-            <a:r>
-              <a:rPr lang="en-US" dirty="0" smtClean="0"/>
-              <a:t>A utility such as </a:t>
-            </a:r>
-            <a:r>
-              <a:rPr lang="en-US" dirty="0" err="1" smtClean="0"/>
-              <a:t>JFlex</a:t>
-            </a:r>
-            <a:r>
-              <a:rPr lang="en-US" dirty="0" smtClean="0"/>
-              <a:t> builds a </a:t>
-            </a:r>
-            <a:r>
-              <a:rPr lang="en-US" dirty="0" err="1" smtClean="0"/>
-              <a:t>lexer</a:t>
-            </a:r>
-            <a:r>
-              <a:rPr lang="en-US" smtClean="0"/>
-              <a:t> from a specification file the programmer writes to define the 'words' (lexical tokens) in the desired language</a:t>
-            </a:r>
-            <a:endParaRPr lang="en-US" dirty="0"/>
-          </a:p>
-        </p:txBody>
-      </p:sp>
-    </p:spTree>
-    <p:extLst>
-      <p:ext uri="{BB962C8B-B14F-4D97-AF65-F5344CB8AC3E}">
-        <p14:creationId xmlns:p14="http://schemas.microsoft.com/office/powerpoint/2010/main" val="3371460341"/>
-      </p:ext>
-    </p:extLst>
-  </p:cSld>
-  <p:clrMapOvr>
-    <a:masterClrMapping/>
-  </p:clrMapOvr>
-</p:sld>
-</file>
-
-<file path=ppt/slides/slide8.xml><?xml version="1.0" encoding="utf-8"?>
-<p:sld xmlns:a="http://schemas.openxmlformats.org/drawingml/2006/main" xmlns:r="http://schemas.openxmlformats.org/officeDocument/2006/relationships" xmlns:p="http://schemas.openxmlformats.org/presentationml/2006/main">
-  <p:cSld>
-    <p:spTree>
-      <p:nvGrpSpPr>
-        <p:cNvPr id="1" name=""/>
-        <p:cNvGrpSpPr/>
-        <p:nvPr/>
-      </p:nvGrpSpPr>
-      <p:grpSpPr>
-        <a:xfrm>
-          <a:off x="0" y="0"/>
-          <a:ext cx="0" cy="0"/>
-          <a:chOff x="0" y="0"/>
-          <a:chExt cx="0" cy="0"/>
-        </a:xfrm>
-      </p:grpSpPr>
-      <p:sp>
-        <p:nvSpPr>
-          <p:cNvPr id="2" name="Title 1"/>
-          <p:cNvSpPr>
-            <a:spLocks noGrp="1"/>
-          </p:cNvSpPr>
-          <p:nvPr>
-            <p:ph type="title"/>
-          </p:nvPr>
-        </p:nvSpPr>
-        <p:spPr/>
-        <p:txBody>
-          <a:bodyPr/>
-          <a:lstStyle/>
-          <a:p>
-            <a:r>
-              <a:rPr lang="en-US" dirty="0" smtClean="0"/>
-              <a:t>Parser</a:t>
-            </a:r>
-            <a:endParaRPr lang="en-US" dirty="0"/>
-          </a:p>
-        </p:txBody>
-      </p:sp>
-      <p:sp>
-        <p:nvSpPr>
-          <p:cNvPr id="3" name="Content Placeholder 2"/>
-          <p:cNvSpPr>
-            <a:spLocks noGrp="1"/>
-          </p:cNvSpPr>
-          <p:nvPr>
-            <p:ph idx="1"/>
-          </p:nvPr>
-        </p:nvSpPr>
-        <p:spPr/>
-        <p:txBody>
-          <a:bodyPr>
-            <a:normAutofit fontScale="85000" lnSpcReduction="10000"/>
-          </a:bodyPr>
-          <a:lstStyle/>
-          <a:p>
-            <a:r>
-              <a:rPr lang="en-US" dirty="0"/>
-              <a:t>The parser works by setting pairs of markers (</a:t>
-            </a:r>
-            <a:r>
-              <a:rPr lang="en-US" dirty="0" err="1"/>
-              <a:t>PsiBuilder.Marker</a:t>
-            </a:r>
-            <a:r>
-              <a:rPr lang="en-US" dirty="0"/>
-              <a:t> instances) within the stream of tokens received from the </a:t>
-            </a:r>
-            <a:r>
-              <a:rPr lang="en-US" dirty="0" err="1"/>
-              <a:t>lexer</a:t>
-            </a:r>
-            <a:r>
-              <a:rPr lang="en-US" dirty="0"/>
-              <a:t>. Each pair of markers defines the range of </a:t>
-            </a:r>
-            <a:r>
-              <a:rPr lang="en-US" dirty="0" err="1"/>
-              <a:t>lexer</a:t>
-            </a:r>
-            <a:r>
-              <a:rPr lang="en-US" dirty="0"/>
-              <a:t> tokens for a single node in the AST tree. If a pair of markers is nested in another pair (starts after its start and ends before its end), it becomes the child node of the outer pair</a:t>
-            </a:r>
-            <a:r>
-              <a:rPr lang="en-US" dirty="0" smtClean="0"/>
-              <a:t>.</a:t>
-            </a:r>
-          </a:p>
-          <a:p>
-            <a:r>
-              <a:rPr lang="en-US" dirty="0"/>
-              <a:t>The element type for the marker pair (and for the AST node created from it) is specified when the end marker is set (by a call to </a:t>
-            </a:r>
-            <a:r>
-              <a:rPr lang="en-US" dirty="0" err="1"/>
-              <a:t>PsiBuilder.Marker.done</a:t>
-            </a:r>
-            <a:r>
-              <a:rPr lang="en-US" dirty="0"/>
-              <a:t>()</a:t>
-            </a:r>
-            <a:r>
-              <a:rPr lang="en-US" dirty="0" smtClean="0"/>
-              <a:t>)</a:t>
-            </a:r>
-          </a:p>
-          <a:p>
-            <a:r>
-              <a:rPr lang="en-US" dirty="0" err="1" smtClean="0"/>
-              <a:t>BashElementTypes</a:t>
-            </a:r>
-            <a:r>
-              <a:rPr lang="en-US" dirty="0" smtClean="0"/>
-              <a:t> </a:t>
-            </a:r>
-            <a:r>
-              <a:rPr lang="en-US" dirty="0" err="1" smtClean="0"/>
-              <a:t>vs</a:t>
-            </a:r>
-            <a:r>
-              <a:rPr lang="en-US" dirty="0" smtClean="0"/>
-              <a:t> </a:t>
-            </a:r>
-            <a:r>
-              <a:rPr lang="en-US" smtClean="0"/>
-              <a:t>BashTokenTypes</a:t>
-            </a:r>
-            <a:endParaRPr lang="en-US" dirty="0"/>
-          </a:p>
-        </p:txBody>
-      </p:sp>
-    </p:spTree>
-    <p:extLst>
-      <p:ext uri="{BB962C8B-B14F-4D97-AF65-F5344CB8AC3E}">
-        <p14:creationId xmlns:p14="http://schemas.microsoft.com/office/powerpoint/2010/main" val="362419930"/>
-      </p:ext>
-    </p:extLst>
-  </p:cSld>
-  <p:clrMapOvr>
-    <a:masterClrMapping/>
-  </p:clrMapOvr>
-</p:sld>
-</file>
-
 <file path=ppt/slides/slide9.xml><?xml version="1.0" encoding="utf-8"?>
 <p:sld xmlns:a="http://schemas.openxmlformats.org/drawingml/2006/main" xmlns:r="http://schemas.openxmlformats.org/officeDocument/2006/relationships" xmlns:p="http://schemas.openxmlformats.org/presentationml/2006/main">
   <p:cSld>
@@ -6933,8 +7967,8 @@
           <a:lstStyle/>
           <a:p>
             <a:r>
-              <a:rPr lang="en-US" dirty="0" smtClean="0"/>
-              <a:t>Parser Basics: LL-Parser</a:t>
+              <a:rPr lang="en-US" dirty="0" err="1" smtClean="0"/>
+              <a:t>Lexer</a:t>
             </a:r>
             <a:endParaRPr lang="en-US" dirty="0"/>
           </a:p>
@@ -6952,536 +7986,42 @@
         </p:nvSpPr>
         <p:spPr/>
         <p:txBody>
-          <a:bodyPr>
-            <a:normAutofit fontScale="77500" lnSpcReduction="20000"/>
-          </a:bodyPr>
-          <a:lstStyle/>
-          <a:p>
-            <a:r>
-              <a:rPr lang="en-US" dirty="0" err="1"/>
-              <a:t>Ein</a:t>
-            </a:r>
-            <a:r>
-              <a:rPr lang="en-US" dirty="0"/>
-              <a:t> LL-Parser </a:t>
-            </a:r>
-            <a:r>
-              <a:rPr lang="en-US" dirty="0" err="1"/>
-              <a:t>heißt</a:t>
-            </a:r>
-            <a:r>
-              <a:rPr lang="en-US" dirty="0"/>
-              <a:t> LL(k)-Parser, </a:t>
-            </a:r>
-            <a:r>
-              <a:rPr lang="en-US" dirty="0" err="1"/>
-              <a:t>wenn</a:t>
-            </a:r>
-            <a:r>
-              <a:rPr lang="en-US" dirty="0"/>
-              <a:t> </a:t>
-            </a:r>
-            <a:r>
-              <a:rPr lang="en-US" dirty="0" err="1"/>
-              <a:t>er</a:t>
-            </a:r>
-            <a:r>
-              <a:rPr lang="en-US" dirty="0"/>
-              <a:t> </a:t>
-            </a:r>
-            <a:r>
-              <a:rPr lang="en-US" dirty="0" err="1"/>
-              <a:t>während</a:t>
-            </a:r>
-            <a:r>
-              <a:rPr lang="en-US" dirty="0"/>
-              <a:t> des </a:t>
-            </a:r>
-            <a:r>
-              <a:rPr lang="en-US" dirty="0" err="1"/>
-              <a:t>Parsens</a:t>
-            </a:r>
-            <a:r>
-              <a:rPr lang="en-US" dirty="0"/>
-              <a:t> k Tokens </a:t>
-            </a:r>
-            <a:r>
-              <a:rPr lang="en-US" dirty="0" err="1"/>
-              <a:t>vorausschauen</a:t>
-            </a:r>
-            <a:r>
-              <a:rPr lang="en-US" dirty="0"/>
-              <a:t> </a:t>
-            </a:r>
-            <a:r>
-              <a:rPr lang="en-US" dirty="0" err="1"/>
-              <a:t>kann</a:t>
-            </a:r>
-            <a:r>
-              <a:rPr lang="en-US" dirty="0"/>
-              <a:t> und </a:t>
-            </a:r>
-            <a:r>
-              <a:rPr lang="en-US" dirty="0" err="1"/>
-              <a:t>im</a:t>
-            </a:r>
-            <a:r>
-              <a:rPr lang="en-US" dirty="0"/>
-              <a:t> </a:t>
-            </a:r>
-            <a:r>
-              <a:rPr lang="en-US" dirty="0" err="1"/>
-              <a:t>Gegensatz</a:t>
-            </a:r>
-            <a:r>
-              <a:rPr lang="en-US" dirty="0"/>
-              <a:t> </a:t>
-            </a:r>
-            <a:r>
-              <a:rPr lang="en-US" dirty="0" err="1"/>
-              <a:t>zum</a:t>
-            </a:r>
-            <a:r>
-              <a:rPr lang="en-US" dirty="0"/>
-              <a:t> LF-Parser den </a:t>
-            </a:r>
-            <a:r>
-              <a:rPr lang="en-US" dirty="0" err="1"/>
-              <a:t>Kellerinhalt</a:t>
-            </a:r>
-            <a:r>
-              <a:rPr lang="en-US" dirty="0"/>
-              <a:t> </a:t>
-            </a:r>
-            <a:r>
-              <a:rPr lang="en-US" dirty="0" err="1"/>
-              <a:t>benutzt</a:t>
-            </a:r>
-            <a:r>
-              <a:rPr lang="en-US" dirty="0"/>
-              <a:t>. k </a:t>
-            </a:r>
-            <a:r>
-              <a:rPr lang="en-US" dirty="0" err="1"/>
-              <a:t>wird</a:t>
-            </a:r>
-            <a:r>
-              <a:rPr lang="en-US" dirty="0"/>
-              <a:t> </a:t>
-            </a:r>
-            <a:r>
-              <a:rPr lang="en-US" dirty="0" err="1"/>
-              <a:t>dabei</a:t>
-            </a:r>
-            <a:r>
-              <a:rPr lang="en-US" dirty="0"/>
-              <a:t> </a:t>
-            </a:r>
-            <a:r>
-              <a:rPr lang="en-US" dirty="0" err="1"/>
-              <a:t>als</a:t>
-            </a:r>
-            <a:r>
-              <a:rPr lang="en-US" dirty="0"/>
-              <a:t> </a:t>
-            </a:r>
-            <a:r>
-              <a:rPr lang="en-US" dirty="0" err="1"/>
-              <a:t>Lookahead</a:t>
-            </a:r>
-            <a:r>
-              <a:rPr lang="en-US" dirty="0"/>
-              <a:t> </a:t>
+          <a:bodyPr/>
+          <a:lstStyle/>
+          <a:p>
+            <a:r>
+              <a:rPr lang="en-US" dirty="0" smtClean="0"/>
+              <a:t>Just as the </a:t>
             </a:r>
             <a:r>
               <a:rPr lang="en-US" dirty="0" err="1" smtClean="0"/>
-              <a:t>bezeichnet</a:t>
-            </a:r>
-            <a:endParaRPr lang="en-US" dirty="0" smtClean="0"/>
-          </a:p>
-          <a:p>
-            <a:r>
-              <a:rPr lang="en-US" dirty="0" err="1"/>
-              <a:t>Obwohl</a:t>
-            </a:r>
-            <a:r>
-              <a:rPr lang="en-US" dirty="0"/>
-              <a:t> die LL(k)-</a:t>
-            </a:r>
-            <a:r>
-              <a:rPr lang="en-US" dirty="0" err="1"/>
-              <a:t>Grammatiken</a:t>
-            </a:r>
-            <a:r>
-              <a:rPr lang="en-US" dirty="0"/>
-              <a:t> </a:t>
-            </a:r>
-            <a:r>
-              <a:rPr lang="en-US" dirty="0" err="1"/>
-              <a:t>relativ</a:t>
-            </a:r>
-            <a:r>
-              <a:rPr lang="en-US" dirty="0"/>
-              <a:t> </a:t>
-            </a:r>
-            <a:r>
-              <a:rPr lang="en-US" dirty="0" err="1"/>
-              <a:t>eingeschränkt</a:t>
-            </a:r>
-            <a:r>
-              <a:rPr lang="en-US" dirty="0"/>
-              <a:t> </a:t>
-            </a:r>
-            <a:r>
-              <a:rPr lang="en-US" dirty="0" err="1"/>
-              <a:t>sind</a:t>
-            </a:r>
-            <a:r>
-              <a:rPr lang="en-US" dirty="0"/>
-              <a:t>, </a:t>
-            </a:r>
-            <a:r>
-              <a:rPr lang="en-US" dirty="0" err="1"/>
-              <a:t>werden</a:t>
-            </a:r>
-            <a:r>
-              <a:rPr lang="en-US" dirty="0"/>
-              <a:t> LL(k)-Parser oft </a:t>
-            </a:r>
-            <a:r>
-              <a:rPr lang="en-US" dirty="0" err="1"/>
-              <a:t>benutzt</a:t>
-            </a:r>
-            <a:r>
-              <a:rPr lang="en-US" dirty="0"/>
-              <a:t>. Die </a:t>
-            </a:r>
-            <a:r>
-              <a:rPr lang="en-US" dirty="0" err="1"/>
-              <a:t>Entscheidung</a:t>
-            </a:r>
-            <a:r>
-              <a:rPr lang="en-US" dirty="0"/>
-              <a:t>, </a:t>
-            </a:r>
-            <a:r>
-              <a:rPr lang="en-US" dirty="0" err="1"/>
-              <a:t>nach</a:t>
-            </a:r>
-            <a:r>
-              <a:rPr lang="en-US" dirty="0"/>
-              <a:t> </a:t>
-            </a:r>
-            <a:r>
-              <a:rPr lang="en-US" dirty="0" err="1"/>
-              <a:t>welcher</a:t>
-            </a:r>
-            <a:r>
-              <a:rPr lang="en-US" dirty="0"/>
-              <a:t> Regel </a:t>
-            </a:r>
-            <a:r>
-              <a:rPr lang="en-US" dirty="0" err="1"/>
-              <a:t>expandiert</a:t>
-            </a:r>
-            <a:r>
-              <a:rPr lang="en-US" dirty="0"/>
-              <a:t> </a:t>
-            </a:r>
-            <a:r>
-              <a:rPr lang="en-US" dirty="0" err="1"/>
-              <a:t>wird</a:t>
-            </a:r>
-            <a:r>
-              <a:rPr lang="en-US" dirty="0"/>
-              <a:t>, </a:t>
-            </a:r>
-            <a:r>
-              <a:rPr lang="en-US" dirty="0" err="1"/>
-              <a:t>kann</a:t>
-            </a:r>
-            <a:r>
-              <a:rPr lang="en-US" dirty="0"/>
-              <a:t> </a:t>
-            </a:r>
-            <a:r>
-              <a:rPr lang="en-US" dirty="0" err="1"/>
-              <a:t>allein</a:t>
-            </a:r>
-            <a:r>
-              <a:rPr lang="en-US" dirty="0"/>
-              <a:t> </a:t>
-            </a:r>
-            <a:r>
-              <a:rPr lang="en-US" dirty="0" err="1"/>
-              <a:t>durch</a:t>
-            </a:r>
-            <a:r>
-              <a:rPr lang="en-US" dirty="0"/>
-              <a:t> </a:t>
-            </a:r>
-            <a:r>
-              <a:rPr lang="en-US" dirty="0" err="1"/>
-              <a:t>Analyse</a:t>
-            </a:r>
-            <a:r>
-              <a:rPr lang="en-US" dirty="0"/>
-              <a:t> des </a:t>
-            </a:r>
-            <a:r>
-              <a:rPr lang="en-US" dirty="0" err="1"/>
-              <a:t>Lookahead</a:t>
-            </a:r>
-            <a:r>
-              <a:rPr lang="en-US" dirty="0"/>
-              <a:t> </a:t>
-            </a:r>
-            <a:r>
-              <a:rPr lang="en-US" dirty="0" err="1"/>
-              <a:t>getroffen</a:t>
-            </a:r>
-            <a:r>
-              <a:rPr lang="en-US" dirty="0"/>
-              <a:t> </a:t>
-            </a:r>
-            <a:r>
-              <a:rPr lang="en-US" dirty="0" err="1"/>
-              <a:t>werden</a:t>
-            </a:r>
-            <a:r>
-              <a:rPr lang="en-US" dirty="0"/>
-              <a:t>. </a:t>
-            </a:r>
-            <a:r>
-              <a:rPr lang="en-US" dirty="0" err="1"/>
-              <a:t>Eine</a:t>
-            </a:r>
-            <a:r>
-              <a:rPr lang="en-US" dirty="0"/>
-              <a:t> </a:t>
-            </a:r>
-            <a:r>
-              <a:rPr lang="en-US" dirty="0" err="1"/>
-              <a:t>einfache</a:t>
-            </a:r>
-            <a:r>
-              <a:rPr lang="en-US" dirty="0"/>
-              <a:t> </a:t>
-            </a:r>
-            <a:r>
-              <a:rPr lang="en-US" dirty="0" err="1"/>
-              <a:t>Möglichkeit</a:t>
-            </a:r>
-            <a:r>
-              <a:rPr lang="en-US" dirty="0"/>
-              <a:t> </a:t>
-            </a:r>
-            <a:r>
-              <a:rPr lang="en-US" dirty="0" err="1"/>
-              <a:t>zur</a:t>
-            </a:r>
-            <a:r>
-              <a:rPr lang="en-US" dirty="0"/>
-              <a:t> </a:t>
-            </a:r>
-            <a:r>
-              <a:rPr lang="en-US" dirty="0" err="1"/>
-              <a:t>Implementierung</a:t>
-            </a:r>
-            <a:r>
-              <a:rPr lang="en-US" dirty="0"/>
-              <a:t> </a:t>
-            </a:r>
-            <a:r>
-              <a:rPr lang="en-US" dirty="0" err="1"/>
-              <a:t>dieser</a:t>
-            </a:r>
-            <a:r>
-              <a:rPr lang="en-US" dirty="0"/>
-              <a:t> </a:t>
-            </a:r>
-            <a:r>
-              <a:rPr lang="en-US" dirty="0" err="1"/>
-              <a:t>Parsertechnik</a:t>
-            </a:r>
-            <a:r>
-              <a:rPr lang="en-US" dirty="0"/>
-              <a:t> </a:t>
-            </a:r>
-            <a:r>
-              <a:rPr lang="en-US" dirty="0" err="1"/>
-              <a:t>bietet</a:t>
-            </a:r>
-            <a:r>
-              <a:rPr lang="en-US" dirty="0"/>
-              <a:t> die </a:t>
-            </a:r>
-            <a:r>
-              <a:rPr lang="en-US" dirty="0" err="1"/>
-              <a:t>Methode</a:t>
-            </a:r>
-            <a:r>
-              <a:rPr lang="en-US" dirty="0"/>
-              <a:t> des </a:t>
-            </a:r>
-            <a:r>
-              <a:rPr lang="en-US" dirty="0" err="1"/>
-              <a:t>rekursiven</a:t>
-            </a:r>
-            <a:r>
-              <a:rPr lang="en-US" dirty="0"/>
-              <a:t> </a:t>
+              <a:t>lexer</a:t>
+            </a:r>
+            <a:r>
+              <a:rPr lang="en-US" dirty="0" smtClean="0"/>
+              <a:t> is a source code spelling checker, the parser is a grammar checker</a:t>
+            </a:r>
+          </a:p>
+          <a:p>
+            <a:r>
+              <a:rPr lang="en-US" dirty="0" smtClean="0"/>
+              <a:t>A utility such as </a:t>
             </a:r>
             <a:r>
               <a:rPr lang="en-US" dirty="0" err="1" smtClean="0"/>
-              <a:t>Abstiegs</a:t>
-            </a:r>
-            <a:endParaRPr lang="en-US" dirty="0" smtClean="0"/>
-          </a:p>
-          <a:p>
-            <a:r>
-              <a:rPr lang="en-US" dirty="0" err="1"/>
-              <a:t>Eine</a:t>
-            </a:r>
-            <a:r>
-              <a:rPr lang="en-US" dirty="0"/>
-              <a:t> </a:t>
-            </a:r>
-            <a:r>
-              <a:rPr lang="en-US" dirty="0" err="1"/>
-              <a:t>kontextfreie</a:t>
-            </a:r>
-            <a:r>
-              <a:rPr lang="en-US" dirty="0"/>
-              <a:t> Grammatik </a:t>
-            </a:r>
-            <a:r>
-              <a:rPr lang="en-US" dirty="0" err="1"/>
-              <a:t>heißt</a:t>
-            </a:r>
-            <a:r>
-              <a:rPr lang="en-US" dirty="0"/>
-              <a:t> </a:t>
-            </a:r>
-            <a:r>
-              <a:rPr lang="en-US" b="1" dirty="0"/>
-              <a:t>LL(k)-Grammatik </a:t>
-            </a:r>
-            <a:r>
-              <a:rPr lang="en-US" dirty="0" err="1"/>
-              <a:t>für</a:t>
-            </a:r>
-            <a:r>
-              <a:rPr lang="en-US" dirty="0"/>
-              <a:t> </a:t>
-            </a:r>
-            <a:r>
-              <a:rPr lang="en-US" dirty="0" err="1"/>
-              <a:t>eine</a:t>
-            </a:r>
-            <a:r>
-              <a:rPr lang="en-US" dirty="0"/>
-              <a:t> </a:t>
-            </a:r>
-            <a:r>
-              <a:rPr lang="en-US" dirty="0" err="1"/>
-              <a:t>natürliche</a:t>
-            </a:r>
-            <a:r>
-              <a:rPr lang="en-US" dirty="0"/>
-              <a:t> </a:t>
-            </a:r>
-            <a:r>
-              <a:rPr lang="en-US" dirty="0" err="1"/>
-              <a:t>Zahl</a:t>
-            </a:r>
-            <a:r>
-              <a:rPr lang="en-US" dirty="0"/>
-              <a:t> k, </a:t>
-            </a:r>
-            <a:r>
-              <a:rPr lang="en-US" dirty="0" err="1"/>
-              <a:t>wenn</a:t>
-            </a:r>
-            <a:r>
-              <a:rPr lang="en-US" dirty="0"/>
-              <a:t> </a:t>
-            </a:r>
-            <a:r>
-              <a:rPr lang="en-US" dirty="0" err="1"/>
-              <a:t>jeder</a:t>
-            </a:r>
-            <a:r>
-              <a:rPr lang="en-US" dirty="0"/>
-              <a:t> </a:t>
-            </a:r>
-            <a:r>
-              <a:rPr lang="en-US" dirty="0" err="1"/>
-              <a:t>Ableitungsschritt</a:t>
-            </a:r>
-            <a:r>
-              <a:rPr lang="en-US" dirty="0"/>
-              <a:t> </a:t>
-            </a:r>
-            <a:r>
-              <a:rPr lang="en-US" dirty="0" err="1"/>
-              <a:t>eindeutig</a:t>
-            </a:r>
-            <a:r>
-              <a:rPr lang="en-US" dirty="0"/>
-              <a:t> </a:t>
-            </a:r>
-            <a:r>
-              <a:rPr lang="en-US" dirty="0" err="1"/>
-              <a:t>durch</a:t>
-            </a:r>
-            <a:r>
-              <a:rPr lang="en-US" dirty="0"/>
-              <a:t> die </a:t>
-            </a:r>
-            <a:r>
-              <a:rPr lang="en-US" dirty="0" err="1"/>
-              <a:t>nächsten</a:t>
-            </a:r>
-            <a:r>
-              <a:rPr lang="en-US" dirty="0"/>
-              <a:t> k </a:t>
-            </a:r>
-            <a:r>
-              <a:rPr lang="en-US" dirty="0" err="1"/>
-              <a:t>Symbole</a:t>
-            </a:r>
-            <a:r>
-              <a:rPr lang="en-US" dirty="0"/>
-              <a:t> der </a:t>
-            </a:r>
-            <a:r>
-              <a:rPr lang="en-US" dirty="0" err="1"/>
-              <a:t>Eingabe</a:t>
-            </a:r>
-            <a:r>
-              <a:rPr lang="en-US" dirty="0"/>
-              <a:t> (</a:t>
-            </a:r>
-            <a:r>
-              <a:rPr lang="en-US" dirty="0" err="1"/>
-              <a:t>Lookahead</a:t>
-            </a:r>
-            <a:r>
-              <a:rPr lang="en-US" dirty="0"/>
-              <a:t>) </a:t>
-            </a:r>
-            <a:r>
-              <a:rPr lang="en-US" dirty="0" err="1"/>
-              <a:t>bestimmt</a:t>
-            </a:r>
-            <a:r>
-              <a:rPr lang="en-US" dirty="0"/>
-              <a:t> </a:t>
-            </a:r>
-            <a:r>
-              <a:rPr lang="en-US" dirty="0" err="1"/>
-              <a:t>ist</a:t>
+              <a:t>JFlex</a:t>
+            </a:r>
+            <a:r>
+              <a:rPr lang="en-US" dirty="0" smtClean="0"/>
+              <a:t> builds a </a:t>
+            </a:r>
+            <a:r>
+              <a:rPr lang="en-US" dirty="0" err="1" smtClean="0"/>
+              <a:t>lexer</a:t>
+            </a:r>
+            <a:r>
+              <a:rPr lang="en-US" smtClean="0"/>
+              <a:t> from a specification file the programmer writes to define the 'words' (lexical tokens) in the desired language</a:t>
             </a:r>
             <a:endParaRPr lang="en-US" dirty="0"/>
           </a:p>
@@ -7490,7 +8030,7 @@
     </p:spTree>
     <p:extLst>
       <p:ext uri="{BB962C8B-B14F-4D97-AF65-F5344CB8AC3E}">
-        <p14:creationId xmlns:p14="http://schemas.microsoft.com/office/powerpoint/2010/main" val="1604575585"/>
+        <p14:creationId xmlns:p14="http://schemas.microsoft.com/office/powerpoint/2010/main" val="3371460341"/>
       </p:ext>
     </p:extLst>
   </p:cSld>

</xml_diff>

<commit_message>
finished basic reference resolving
</commit_message>
<xml_diff>
--- a/R4Intellij.pptx
+++ b/R4Intellij.pptx
@@ -279,7 +279,7 @@
           <a:p>
             <a:fld id="{87682158-AFB6-1044-826E-FEC32920DECA}" type="datetimeFigureOut">
               <a:rPr lang="en-US" smtClean="0"/>
-              <a:t>1/13/12</a:t>
+              <a:t>1/14/12</a:t>
             </a:fld>
             <a:endParaRPr lang="en-US"/>
           </a:p>
@@ -1494,7 +1494,7 @@
           <a:p>
             <a:fld id="{903CF105-E729-A944-8550-FE8B359D2D68}" type="datetimeFigureOut">
               <a:rPr lang="en-US" smtClean="0"/>
-              <a:t>1/13/12</a:t>
+              <a:t>1/14/12</a:t>
             </a:fld>
             <a:endParaRPr lang="en-US"/>
           </a:p>
@@ -1664,7 +1664,7 @@
           <a:p>
             <a:fld id="{903CF105-E729-A944-8550-FE8B359D2D68}" type="datetimeFigureOut">
               <a:rPr lang="en-US" smtClean="0"/>
-              <a:t>1/13/12</a:t>
+              <a:t>1/14/12</a:t>
             </a:fld>
             <a:endParaRPr lang="en-US"/>
           </a:p>
@@ -1844,7 +1844,7 @@
           <a:p>
             <a:fld id="{903CF105-E729-A944-8550-FE8B359D2D68}" type="datetimeFigureOut">
               <a:rPr lang="en-US" smtClean="0"/>
-              <a:t>1/13/12</a:t>
+              <a:t>1/14/12</a:t>
             </a:fld>
             <a:endParaRPr lang="en-US"/>
           </a:p>
@@ -2014,7 +2014,7 @@
           <a:p>
             <a:fld id="{903CF105-E729-A944-8550-FE8B359D2D68}" type="datetimeFigureOut">
               <a:rPr lang="en-US" smtClean="0"/>
-              <a:t>1/13/12</a:t>
+              <a:t>1/14/12</a:t>
             </a:fld>
             <a:endParaRPr lang="en-US"/>
           </a:p>
@@ -2260,7 +2260,7 @@
           <a:p>
             <a:fld id="{903CF105-E729-A944-8550-FE8B359D2D68}" type="datetimeFigureOut">
               <a:rPr lang="en-US" smtClean="0"/>
-              <a:t>1/13/12</a:t>
+              <a:t>1/14/12</a:t>
             </a:fld>
             <a:endParaRPr lang="en-US"/>
           </a:p>
@@ -2548,7 +2548,7 @@
           <a:p>
             <a:fld id="{903CF105-E729-A944-8550-FE8B359D2D68}" type="datetimeFigureOut">
               <a:rPr lang="en-US" smtClean="0"/>
-              <a:t>1/13/12</a:t>
+              <a:t>1/14/12</a:t>
             </a:fld>
             <a:endParaRPr lang="en-US"/>
           </a:p>
@@ -2970,7 +2970,7 @@
           <a:p>
             <a:fld id="{903CF105-E729-A944-8550-FE8B359D2D68}" type="datetimeFigureOut">
               <a:rPr lang="en-US" smtClean="0"/>
-              <a:t>1/13/12</a:t>
+              <a:t>1/14/12</a:t>
             </a:fld>
             <a:endParaRPr lang="en-US"/>
           </a:p>
@@ -3088,7 +3088,7 @@
           <a:p>
             <a:fld id="{903CF105-E729-A944-8550-FE8B359D2D68}" type="datetimeFigureOut">
               <a:rPr lang="en-US" smtClean="0"/>
-              <a:t>1/13/12</a:t>
+              <a:t>1/14/12</a:t>
             </a:fld>
             <a:endParaRPr lang="en-US"/>
           </a:p>
@@ -3183,7 +3183,7 @@
           <a:p>
             <a:fld id="{903CF105-E729-A944-8550-FE8B359D2D68}" type="datetimeFigureOut">
               <a:rPr lang="en-US" smtClean="0"/>
-              <a:t>1/13/12</a:t>
+              <a:t>1/14/12</a:t>
             </a:fld>
             <a:endParaRPr lang="en-US"/>
           </a:p>
@@ -3460,7 +3460,7 @@
           <a:p>
             <a:fld id="{903CF105-E729-A944-8550-FE8B359D2D68}" type="datetimeFigureOut">
               <a:rPr lang="en-US" smtClean="0"/>
-              <a:t>1/13/12</a:t>
+              <a:t>1/14/12</a:t>
             </a:fld>
             <a:endParaRPr lang="en-US"/>
           </a:p>
@@ -3713,7 +3713,7 @@
           <a:p>
             <a:fld id="{903CF105-E729-A944-8550-FE8B359D2D68}" type="datetimeFigureOut">
               <a:rPr lang="en-US" smtClean="0"/>
-              <a:t>1/13/12</a:t>
+              <a:t>1/14/12</a:t>
             </a:fld>
             <a:endParaRPr lang="en-US"/>
           </a:p>
@@ -3926,7 +3926,7 @@
           <a:p>
             <a:fld id="{903CF105-E729-A944-8550-FE8B359D2D68}" type="datetimeFigureOut">
               <a:rPr lang="en-US" smtClean="0"/>
-              <a:t>1/13/12</a:t>
+              <a:t>1/14/12</a:t>
             </a:fld>
             <a:endParaRPr lang="en-US"/>
           </a:p>
@@ -7220,6 +7220,22 @@
               <a:rPr lang="en-US" dirty="0" err="1" smtClean="0"/>
               <a:t>BnfAnnotator</a:t>
             </a:r>
+            <a:r>
+              <a:rPr lang="en-US" dirty="0" smtClean="0"/>
+              <a:t>: psi-aware </a:t>
+            </a:r>
+            <a:r>
+              <a:rPr lang="en-US" dirty="0" err="1" smtClean="0"/>
+              <a:t>highlightling</a:t>
+            </a:r>
+            <a:r>
+              <a:rPr lang="en-US" dirty="0" smtClean="0"/>
+              <a:t> of </a:t>
+            </a:r>
+            <a:r>
+              <a:rPr lang="en-US" smtClean="0"/>
+              <a:t>syntax elements</a:t>
+            </a:r>
             <a:endParaRPr lang="en-US" dirty="0" smtClean="0"/>
           </a:p>
           <a:p>
@@ -7237,7 +7253,7 @@
           </a:p>
           <a:p>
             <a:r>
-              <a:rPr lang="en-US" smtClean="0"/>
+              <a:rPr lang="en-US" dirty="0" smtClean="0"/>
               <a:t>Windows connector</a:t>
             </a:r>
             <a:endParaRPr lang="en-US" dirty="0"/>

</xml_diff>

<commit_message>
added section support; added simple structure view
</commit_message>
<xml_diff>
--- a/R4Intellij.pptx
+++ b/R4Intellij.pptx
@@ -5,36 +5,35 @@
     <p:sldMasterId id="2147483648" r:id="rId1"/>
   </p:sldMasterIdLst>
   <p:notesMasterIdLst>
-    <p:notesMasterId r:id="rId29"/>
+    <p:notesMasterId r:id="rId28"/>
   </p:notesMasterIdLst>
   <p:sldIdLst>
     <p:sldId id="256" r:id="rId2"/>
     <p:sldId id="281" r:id="rId3"/>
-    <p:sldId id="284" r:id="rId4"/>
-    <p:sldId id="282" r:id="rId5"/>
-    <p:sldId id="259" r:id="rId6"/>
-    <p:sldId id="283" r:id="rId7"/>
-    <p:sldId id="260" r:id="rId8"/>
-    <p:sldId id="261" r:id="rId9"/>
-    <p:sldId id="277" r:id="rId10"/>
-    <p:sldId id="258" r:id="rId11"/>
-    <p:sldId id="275" r:id="rId12"/>
-    <p:sldId id="262" r:id="rId13"/>
-    <p:sldId id="264" r:id="rId14"/>
-    <p:sldId id="272" r:id="rId15"/>
-    <p:sldId id="265" r:id="rId16"/>
-    <p:sldId id="266" r:id="rId17"/>
-    <p:sldId id="269" r:id="rId18"/>
-    <p:sldId id="276" r:id="rId19"/>
-    <p:sldId id="279" r:id="rId20"/>
-    <p:sldId id="268" r:id="rId21"/>
-    <p:sldId id="267" r:id="rId22"/>
-    <p:sldId id="274" r:id="rId23"/>
-    <p:sldId id="271" r:id="rId24"/>
-    <p:sldId id="270" r:id="rId25"/>
-    <p:sldId id="273" r:id="rId26"/>
-    <p:sldId id="278" r:id="rId27"/>
-    <p:sldId id="280" r:id="rId28"/>
+    <p:sldId id="282" r:id="rId4"/>
+    <p:sldId id="259" r:id="rId5"/>
+    <p:sldId id="283" r:id="rId6"/>
+    <p:sldId id="260" r:id="rId7"/>
+    <p:sldId id="261" r:id="rId8"/>
+    <p:sldId id="277" r:id="rId9"/>
+    <p:sldId id="258" r:id="rId10"/>
+    <p:sldId id="275" r:id="rId11"/>
+    <p:sldId id="262" r:id="rId12"/>
+    <p:sldId id="264" r:id="rId13"/>
+    <p:sldId id="272" r:id="rId14"/>
+    <p:sldId id="265" r:id="rId15"/>
+    <p:sldId id="266" r:id="rId16"/>
+    <p:sldId id="269" r:id="rId17"/>
+    <p:sldId id="276" r:id="rId18"/>
+    <p:sldId id="279" r:id="rId19"/>
+    <p:sldId id="268" r:id="rId20"/>
+    <p:sldId id="267" r:id="rId21"/>
+    <p:sldId id="274" r:id="rId22"/>
+    <p:sldId id="271" r:id="rId23"/>
+    <p:sldId id="270" r:id="rId24"/>
+    <p:sldId id="273" r:id="rId25"/>
+    <p:sldId id="278" r:id="rId26"/>
+    <p:sldId id="280" r:id="rId27"/>
   </p:sldIdLst>
   <p:sldSz cx="9144000" cy="6858000" type="screen4x3"/>
   <p:notesSz cx="6858000" cy="9144000"/>
@@ -148,7 +147,6 @@
         </p14:section>
         <p14:section name="Roadmap" id="{94DA6817-C3E6-6E46-84C3-EF347EEFF33D}">
           <p14:sldIdLst>
-            <p14:sldId id="284"/>
             <p14:sldId id="282"/>
             <p14:sldId id="259"/>
             <p14:sldId id="283"/>
@@ -593,146 +591,51 @@
           <a:p>
             <a:r>
               <a:rPr lang="en-US" dirty="0" smtClean="0"/>
-              <a:t>From </a:t>
+              <a:t>Every element which can be renamed or referenced (a class definition, a method definition and so on) needs to implement the </a:t>
             </a:r>
             <a:r>
               <a:rPr lang="en-US" dirty="0" err="1" smtClean="0"/>
-              <a:t>statet</a:t>
-            </a:r>
-            <a:r>
-              <a:rPr lang="en-US" baseline="0" dirty="0" smtClean="0"/>
-              <a:t> website:</a:t>
-            </a:r>
-          </a:p>
-          <a:p>
-            <a:r>
-              <a:rPr lang="en-US" dirty="0" smtClean="0"/>
-              <a:t>The final release of </a:t>
+              <a:t>PsiNamedElement</a:t>
+            </a:r>
+            <a:r>
+              <a:rPr lang="en-US" dirty="0" smtClean="0"/>
+              <a:t> interface, with methods </a:t>
             </a:r>
             <a:r>
               <a:rPr lang="en-US" dirty="0" err="1" smtClean="0"/>
-              <a:t>StatET</a:t>
-            </a:r>
-            <a:r>
-              <a:rPr lang="en-US" dirty="0" smtClean="0"/>
-              <a:t> 0.9.0 [2010-08-27] is available for download now.</a:t>
-            </a:r>
-          </a:p>
-          <a:p>
-            <a:r>
-              <a:rPr lang="en-US" dirty="0" smtClean="0"/>
-              <a:t>The major visible new feature in </a:t>
+              <a:t>getName</a:t>
+            </a:r>
+            <a:r>
+              <a:rPr lang="en-US" dirty="0" smtClean="0"/>
+              <a:t>() and </a:t>
             </a:r>
             <a:r>
               <a:rPr lang="en-US" dirty="0" err="1" smtClean="0"/>
-              <a:t>StatET</a:t>
-            </a:r>
-            <a:r>
-              <a:rPr lang="en-US" dirty="0" smtClean="0"/>
-              <a:t> is the integration of R help with</a:t>
-            </a:r>
-          </a:p>
-          <a:p>
-            <a:r>
-              <a:rPr lang="en-US" dirty="0" smtClean="0"/>
-              <a:t>A 'R Help' view allowing to read and browse through the help pages</a:t>
-            </a:r>
-          </a:p>
-          <a:p>
-            <a:r>
-              <a:rPr lang="en-US" dirty="0" smtClean="0"/>
-              <a:t>An Eclipse 'R Help' search, including a full-text search mode</a:t>
-            </a:r>
-          </a:p>
-          <a:p>
-            <a:r>
-              <a:rPr lang="en-US" dirty="0" smtClean="0"/>
-              <a:t>Integration in the R editor like an information hover for the help (mouse or keyboard shortcut F2)</a:t>
-            </a:r>
-          </a:p>
-          <a:p>
-            <a:r>
-              <a:rPr lang="en-US" dirty="0" smtClean="0"/>
-              <a:t>To enable the R help features, the help pages must be indexed (see below).</a:t>
-            </a:r>
-          </a:p>
-          <a:p>
-            <a:r>
-              <a:rPr lang="en-US" dirty="0" smtClean="0"/>
-              <a:t>A new R package '</a:t>
-            </a:r>
-            <a:r>
-              <a:rPr lang="en-US" dirty="0" err="1" smtClean="0"/>
-              <a:t>rj</a:t>
-            </a:r>
-            <a:r>
-              <a:rPr lang="en-US" dirty="0" smtClean="0"/>
-              <a:t>' provides R functions for the R help integration and other features in </a:t>
-            </a:r>
-            <a:r>
-              <a:rPr lang="en-US" dirty="0" err="1" smtClean="0"/>
-              <a:t>StatET</a:t>
-            </a:r>
-            <a:r>
-              <a:rPr lang="en-US" dirty="0" smtClean="0"/>
-              <a:t>. It is recommended to install the package, so you can use all tools making your work more comfortable. The '</a:t>
-            </a:r>
-            <a:r>
-              <a:rPr lang="en-US" dirty="0" err="1" smtClean="0"/>
-              <a:t>rj</a:t>
-            </a:r>
-            <a:r>
-              <a:rPr lang="en-US" dirty="0" smtClean="0"/>
-              <a:t>' package must be installed via the command line using:</a:t>
-            </a:r>
-          </a:p>
-          <a:p>
-            <a:r>
-              <a:rPr lang="en-US" dirty="0" smtClean="0"/>
-              <a:t>R CMD INSTALL --no-test-load </a:t>
-            </a:r>
-            <a:r>
-              <a:rPr lang="en-US" dirty="0" err="1" smtClean="0"/>
-              <a:t>rj</a:t>
-            </a:r>
-            <a:r>
-              <a:rPr lang="en-US" dirty="0" smtClean="0"/>
-              <a:t>_*.</a:t>
-            </a:r>
-            <a:r>
-              <a:rPr lang="en-US" dirty="0" err="1" smtClean="0"/>
-              <a:t>tar.gz</a:t>
-            </a:r>
-            <a:endParaRPr lang="en-US" dirty="0" smtClean="0"/>
-          </a:p>
-          <a:p>
-            <a:r>
-              <a:rPr lang="en-US" dirty="0" smtClean="0"/>
-              <a:t>It is recommended to check and complete the settings for your R environments in the Eclipse/</a:t>
-            </a:r>
-            <a:r>
-              <a:rPr lang="en-US" dirty="0" err="1" smtClean="0"/>
-              <a:t>StatET</a:t>
-            </a:r>
-            <a:r>
-              <a:rPr lang="en-US" dirty="0" smtClean="0"/>
-              <a:t> preferences.</a:t>
-            </a:r>
-          </a:p>
-          <a:p>
-            <a:r>
-              <a:rPr lang="en-US" dirty="0" smtClean="0"/>
-              <a:t>When starting the R console in </a:t>
-            </a:r>
-            <a:r>
-              <a:rPr lang="en-US" dirty="0" err="1" smtClean="0"/>
-              <a:t>StatET</a:t>
-            </a:r>
-            <a:r>
-              <a:rPr lang="en-US" dirty="0" smtClean="0"/>
-              <a:t>, you will be asked if it may index your R libraries. Depending on the number of installed packages, this can take some minutes.</a:t>
-            </a:r>
-            <a:endParaRPr lang="en-US" dirty="0"/>
+              <a:t>setName</a:t>
+            </a:r>
+            <a:r>
+              <a:rPr lang="en-US" dirty="0" smtClean="0"/>
+              <a:t>()</a:t>
+            </a:r>
+          </a:p>
+          <a:p>
+            <a:r>
+              <a:rPr lang="en-US" dirty="0" smtClean="0"/>
+              <a:t>Proper error highlighting (see </a:t>
+            </a:r>
+            <a:r>
+              <a:rPr lang="en-US" dirty="0" smtClean="0">
+                <a:hlinkClick r:id="rId3"/>
+              </a:rPr>
+              <a:t>http://confluence.jetbrains.net/display/IDEADEV/Developing+Custom+Language+Plugins+for+IntelliJ+IDEA</a:t>
+            </a:r>
+            <a:r>
+              <a:rPr lang="en-US" smtClean="0"/>
+              <a:t> )</a:t>
+            </a:r>
+          </a:p>
+          <a:p>
+            <a:endParaRPr lang="en-US"/>
           </a:p>
         </p:txBody>
       </p:sp>
@@ -762,7 +665,7 @@
     </p:spTree>
     <p:extLst>
       <p:ext uri="{BB962C8B-B14F-4D97-AF65-F5344CB8AC3E}">
-        <p14:creationId xmlns:p14="http://schemas.microsoft.com/office/powerpoint/2010/main" val="2891140552"/>
+        <p14:creationId xmlns:p14="http://schemas.microsoft.com/office/powerpoint/2010/main" val="1775759898"/>
       </p:ext>
     </p:extLst>
   </p:cSld>
@@ -818,51 +721,36 @@
           <a:p>
             <a:r>
               <a:rPr lang="en-US" dirty="0" smtClean="0"/>
-              <a:t>Every element which can be renamed or referenced (a class definition, a method definition and so on) needs to implement the </a:t>
+              <a:t>http://</a:t>
             </a:r>
             <a:r>
               <a:rPr lang="en-US" dirty="0" err="1" smtClean="0"/>
-              <a:t>PsiNamedElement</a:t>
-            </a:r>
-            <a:r>
-              <a:rPr lang="en-US" dirty="0" smtClean="0"/>
-              <a:t> interface, with methods </a:t>
+              <a:t>de.wikipedia.org</a:t>
+            </a:r>
+            <a:r>
+              <a:rPr lang="en-US" dirty="0" smtClean="0"/>
+              <a:t>/wiki/LL-</a:t>
             </a:r>
             <a:r>
               <a:rPr lang="en-US" dirty="0" err="1" smtClean="0"/>
-              <a:t>getName</a:t>
-            </a:r>
-            <a:r>
-              <a:rPr lang="en-US" dirty="0" smtClean="0"/>
-              <a:t>() and </a:t>
+              <a:t>Parsevr</a:t>
+            </a:r>
+            <a:endParaRPr lang="en-US" dirty="0" smtClean="0"/>
+          </a:p>
+          <a:p>
+            <a:r>
+              <a:rPr lang="en-US" dirty="0" smtClean="0"/>
+              <a:t>http://</a:t>
             </a:r>
             <a:r>
               <a:rPr lang="en-US" dirty="0" err="1" smtClean="0"/>
-              <a:t>setName</a:t>
-            </a:r>
-            <a:r>
-              <a:rPr lang="en-US" dirty="0" smtClean="0"/>
-              <a:t>()</a:t>
-            </a:r>
-          </a:p>
-          <a:p>
-            <a:r>
-              <a:rPr lang="en-US" dirty="0" smtClean="0"/>
-              <a:t>Proper error highlighting (see </a:t>
-            </a:r>
-            <a:r>
-              <a:rPr lang="en-US" dirty="0" smtClean="0">
-                <a:hlinkClick r:id="rId3"/>
-              </a:rPr>
-              <a:t>http://confluence.jetbrains.net/display/IDEADEV/Developing+Custom+Language+Plugins+for+IntelliJ+IDEA</a:t>
-            </a:r>
-            <a:r>
-              <a:rPr lang="en-US" smtClean="0"/>
-              <a:t> )</a:t>
-            </a:r>
-          </a:p>
-          <a:p>
-            <a:endParaRPr lang="en-US"/>
+              <a:t>de.wikipedia.org</a:t>
+            </a:r>
+            <a:r>
+              <a:rPr lang="en-US" dirty="0" smtClean="0"/>
+              <a:t>/wiki/LL(k)-Grammatik</a:t>
+            </a:r>
+            <a:endParaRPr lang="en-US" dirty="0"/>
           </a:p>
         </p:txBody>
       </p:sp>
@@ -883,7 +771,7 @@
           <a:p>
             <a:fld id="{4FA87827-956D-2D4E-9772-6863DC7B302B}" type="slidenum">
               <a:rPr lang="en-US" smtClean="0"/>
-              <a:t>4</a:t>
+              <a:t>10</a:t>
             </a:fld>
             <a:endParaRPr lang="en-US"/>
           </a:p>
@@ -892,7 +780,7 @@
     </p:spTree>
     <p:extLst>
       <p:ext uri="{BB962C8B-B14F-4D97-AF65-F5344CB8AC3E}">
-        <p14:creationId xmlns:p14="http://schemas.microsoft.com/office/powerpoint/2010/main" val="1775759898"/>
+        <p14:creationId xmlns:p14="http://schemas.microsoft.com/office/powerpoint/2010/main" val="2248504603"/>
       </p:ext>
     </p:extLst>
   </p:cSld>
@@ -952,30 +840,15 @@
             </a:r>
             <a:r>
               <a:rPr lang="en-US" dirty="0" err="1" smtClean="0"/>
-              <a:t>de.wikipedia.org</a:t>
-            </a:r>
-            <a:r>
-              <a:rPr lang="en-US" dirty="0" smtClean="0"/>
-              <a:t>/wiki/LL-</a:t>
+              <a:t>www.jetbrains.com</a:t>
+            </a:r>
+            <a:r>
+              <a:rPr lang="en-US" dirty="0" smtClean="0"/>
+              <a:t>/idea/plugins/</a:t>
             </a:r>
             <a:r>
               <a:rPr lang="en-US" dirty="0" err="1" smtClean="0"/>
-              <a:t>Parsevr</a:t>
-            </a:r>
-            <a:endParaRPr lang="en-US" dirty="0" smtClean="0"/>
-          </a:p>
-          <a:p>
-            <a:r>
-              <a:rPr lang="en-US" dirty="0" smtClean="0"/>
-              <a:t>http://</a:t>
-            </a:r>
-            <a:r>
-              <a:rPr lang="en-US" dirty="0" err="1" smtClean="0"/>
-              <a:t>de.wikipedia.org</a:t>
-            </a:r>
-            <a:r>
-              <a:rPr lang="en-US" dirty="0" smtClean="0"/>
-              <a:t>/wiki/LL(k)-Grammatik</a:t>
+              <a:t>PsiBuilder.gif</a:t>
             </a:r>
             <a:endParaRPr lang="en-US" dirty="0"/>
           </a:p>
@@ -998,7 +871,7 @@
           <a:p>
             <a:fld id="{4FA87827-956D-2D4E-9772-6863DC7B302B}" type="slidenum">
               <a:rPr lang="en-US" smtClean="0"/>
-              <a:t>11</a:t>
+              <a:t>13</a:t>
             </a:fld>
             <a:endParaRPr lang="en-US"/>
           </a:p>
@@ -1007,7 +880,7 @@
     </p:spTree>
     <p:extLst>
       <p:ext uri="{BB962C8B-B14F-4D97-AF65-F5344CB8AC3E}">
-        <p14:creationId xmlns:p14="http://schemas.microsoft.com/office/powerpoint/2010/main" val="2248504603"/>
+        <p14:creationId xmlns:p14="http://schemas.microsoft.com/office/powerpoint/2010/main" val="2630468623"/>
       </p:ext>
     </p:extLst>
   </p:cSld>
@@ -1067,17 +940,17 @@
             </a:r>
             <a:r>
               <a:rPr lang="en-US" dirty="0" err="1" smtClean="0"/>
-              <a:t>www.jetbrains.com</a:t>
-            </a:r>
-            <a:r>
-              <a:rPr lang="en-US" dirty="0" smtClean="0"/>
-              <a:t>/idea/plugins/</a:t>
-            </a:r>
-            <a:r>
-              <a:rPr lang="en-US" dirty="0" err="1" smtClean="0"/>
-              <a:t>PsiBuilder.gif</a:t>
-            </a:r>
-            <a:endParaRPr lang="en-US" dirty="0"/>
+              <a:t>en.wikipedia.org</a:t>
+            </a:r>
+            <a:r>
+              <a:rPr lang="en-US" dirty="0" smtClean="0"/>
+              <a:t>/wiki/</a:t>
+            </a:r>
+            <a:r>
+              <a:rPr lang="en-US" smtClean="0"/>
+              <a:t>Recursive_descent_parser</a:t>
+            </a:r>
+            <a:endParaRPr lang="en-US"/>
           </a:p>
         </p:txBody>
       </p:sp>
@@ -1098,7 +971,7 @@
           <a:p>
             <a:fld id="{4FA87827-956D-2D4E-9772-6863DC7B302B}" type="slidenum">
               <a:rPr lang="en-US" smtClean="0"/>
-              <a:t>14</a:t>
+              <a:t>15</a:t>
             </a:fld>
             <a:endParaRPr lang="en-US"/>
           </a:p>
@@ -1107,7 +980,7 @@
     </p:spTree>
     <p:extLst>
       <p:ext uri="{BB962C8B-B14F-4D97-AF65-F5344CB8AC3E}">
-        <p14:creationId xmlns:p14="http://schemas.microsoft.com/office/powerpoint/2010/main" val="2630468623"/>
+        <p14:creationId xmlns:p14="http://schemas.microsoft.com/office/powerpoint/2010/main" val="476068197"/>
       </p:ext>
     </p:extLst>
   </p:cSld>
@@ -1167,17 +1040,13 @@
             </a:r>
             <a:r>
               <a:rPr lang="en-US" dirty="0" err="1" smtClean="0"/>
-              <a:t>en.wikipedia.org</a:t>
-            </a:r>
-            <a:r>
-              <a:rPr lang="en-US" dirty="0" smtClean="0"/>
-              <a:t>/wiki/</a:t>
-            </a:r>
-            <a:r>
-              <a:rPr lang="en-US" smtClean="0"/>
-              <a:t>Recursive_descent_parser</a:t>
-            </a:r>
-            <a:endParaRPr lang="en-US"/>
+              <a:t>www.jetbrains.com</a:t>
+            </a:r>
+            <a:r>
+              <a:rPr lang="en-US" dirty="0" smtClean="0"/>
+              <a:t>/idea/features/open_api_plugin_manager.html#link2</a:t>
+            </a:r>
+            <a:endParaRPr lang="en-US" dirty="0"/>
           </a:p>
         </p:txBody>
       </p:sp>
@@ -1198,103 +1067,7 @@
           <a:p>
             <a:fld id="{4FA87827-956D-2D4E-9772-6863DC7B302B}" type="slidenum">
               <a:rPr lang="en-US" smtClean="0"/>
-              <a:t>16</a:t>
-            </a:fld>
-            <a:endParaRPr lang="en-US"/>
-          </a:p>
-        </p:txBody>
-      </p:sp>
-    </p:spTree>
-    <p:extLst>
-      <p:ext uri="{BB962C8B-B14F-4D97-AF65-F5344CB8AC3E}">
-        <p14:creationId xmlns:p14="http://schemas.microsoft.com/office/powerpoint/2010/main" val="476068197"/>
-      </p:ext>
-    </p:extLst>
-  </p:cSld>
-  <p:clrMapOvr>
-    <a:masterClrMapping/>
-  </p:clrMapOvr>
-</p:notes>
-</file>
-
-<file path=ppt/notesSlides/notesSlide6.xml><?xml version="1.0" encoding="utf-8"?>
-<p:notes xmlns:a="http://schemas.openxmlformats.org/drawingml/2006/main" xmlns:r="http://schemas.openxmlformats.org/officeDocument/2006/relationships" xmlns:p="http://schemas.openxmlformats.org/presentationml/2006/main">
-  <p:cSld>
-    <p:spTree>
-      <p:nvGrpSpPr>
-        <p:cNvPr id="1" name=""/>
-        <p:cNvGrpSpPr/>
-        <p:nvPr/>
-      </p:nvGrpSpPr>
-      <p:grpSpPr>
-        <a:xfrm>
-          <a:off x="0" y="0"/>
-          <a:ext cx="0" cy="0"/>
-          <a:chOff x="0" y="0"/>
-          <a:chExt cx="0" cy="0"/>
-        </a:xfrm>
-      </p:grpSpPr>
-      <p:sp>
-        <p:nvSpPr>
-          <p:cNvPr id="2" name="Slide Image Placeholder 1"/>
-          <p:cNvSpPr>
-            <a:spLocks noGrp="1" noRot="1" noChangeAspect="1"/>
-          </p:cNvSpPr>
-          <p:nvPr>
-            <p:ph type="sldImg"/>
-          </p:nvPr>
-        </p:nvSpPr>
-        <p:spPr/>
-      </p:sp>
-      <p:sp>
-        <p:nvSpPr>
-          <p:cNvPr id="3" name="Notes Placeholder 2"/>
-          <p:cNvSpPr>
-            <a:spLocks noGrp="1"/>
-          </p:cNvSpPr>
-          <p:nvPr>
-            <p:ph type="body" idx="1"/>
-          </p:nvPr>
-        </p:nvSpPr>
-        <p:spPr/>
-        <p:txBody>
-          <a:bodyPr/>
-          <a:lstStyle/>
-          <a:p>
-            <a:r>
-              <a:rPr lang="en-US" dirty="0" smtClean="0"/>
-              <a:t>http://</a:t>
-            </a:r>
-            <a:r>
-              <a:rPr lang="en-US" dirty="0" err="1" smtClean="0"/>
-              <a:t>www.jetbrains.com</a:t>
-            </a:r>
-            <a:r>
-              <a:rPr lang="en-US" dirty="0" smtClean="0"/>
-              <a:t>/idea/features/open_api_plugin_manager.html#link2</a:t>
-            </a:r>
-            <a:endParaRPr lang="en-US" dirty="0"/>
-          </a:p>
-        </p:txBody>
-      </p:sp>
-      <p:sp>
-        <p:nvSpPr>
-          <p:cNvPr id="4" name="Slide Number Placeholder 3"/>
-          <p:cNvSpPr>
-            <a:spLocks noGrp="1"/>
-          </p:cNvSpPr>
-          <p:nvPr>
-            <p:ph type="sldNum" sz="quarter" idx="10"/>
-          </p:nvPr>
-        </p:nvSpPr>
-        <p:spPr/>
-        <p:txBody>
-          <a:bodyPr/>
-          <a:lstStyle/>
-          <a:p>
-            <a:fld id="{4FA87827-956D-2D4E-9772-6863DC7B302B}" type="slidenum">
-              <a:rPr lang="en-US" smtClean="0"/>
-              <a:t>20</a:t>
+              <a:t>19</a:t>
             </a:fld>
             <a:endParaRPr lang="en-US"/>
           </a:p>
@@ -4402,152 +4175,6 @@
           <a:p>
             <a:r>
               <a:rPr lang="en-US" dirty="0" smtClean="0"/>
-              <a:t>Parser</a:t>
-            </a:r>
-            <a:endParaRPr lang="en-US" dirty="0"/>
-          </a:p>
-        </p:txBody>
-      </p:sp>
-      <p:sp>
-        <p:nvSpPr>
-          <p:cNvPr id="3" name="Content Placeholder 2"/>
-          <p:cNvSpPr>
-            <a:spLocks noGrp="1"/>
-          </p:cNvSpPr>
-          <p:nvPr>
-            <p:ph idx="1"/>
-          </p:nvPr>
-        </p:nvSpPr>
-        <p:spPr/>
-        <p:txBody>
-          <a:bodyPr>
-            <a:normAutofit fontScale="85000" lnSpcReduction="10000"/>
-          </a:bodyPr>
-          <a:lstStyle/>
-          <a:p>
-            <a:r>
-              <a:rPr lang="en-US" dirty="0"/>
-              <a:t>The parser works by setting pairs of markers (</a:t>
-            </a:r>
-            <a:r>
-              <a:rPr lang="en-US" dirty="0" err="1"/>
-              <a:t>PsiBuilder.Marker</a:t>
-            </a:r>
-            <a:r>
-              <a:rPr lang="en-US" dirty="0"/>
-              <a:t> instances) within the stream of tokens received from the </a:t>
-            </a:r>
-            <a:r>
-              <a:rPr lang="en-US" dirty="0" err="1"/>
-              <a:t>lexer</a:t>
-            </a:r>
-            <a:r>
-              <a:rPr lang="en-US" dirty="0"/>
-              <a:t>. Each pair of markers defines the range of </a:t>
-            </a:r>
-            <a:r>
-              <a:rPr lang="en-US" dirty="0" err="1"/>
-              <a:t>lexer</a:t>
-            </a:r>
-            <a:r>
-              <a:rPr lang="en-US" dirty="0"/>
-              <a:t> tokens for a single node in the AST tree. If a pair of markers is nested in another pair (starts after its start and ends before its end), it becomes the child node of the outer pair</a:t>
-            </a:r>
-            <a:r>
-              <a:rPr lang="en-US" dirty="0" smtClean="0"/>
-              <a:t>.</a:t>
-            </a:r>
-          </a:p>
-          <a:p>
-            <a:r>
-              <a:rPr lang="en-US" dirty="0"/>
-              <a:t>The element type for the marker pair (and for the AST node created from it) is specified when the end marker is set (by a call to </a:t>
-            </a:r>
-            <a:r>
-              <a:rPr lang="en-US" dirty="0" err="1"/>
-              <a:t>PsiBuilder.Marker.done</a:t>
-            </a:r>
-            <a:r>
-              <a:rPr lang="en-US" dirty="0"/>
-              <a:t>()</a:t>
-            </a:r>
-            <a:r>
-              <a:rPr lang="en-US" dirty="0" smtClean="0"/>
-              <a:t>)</a:t>
-            </a:r>
-          </a:p>
-          <a:p>
-            <a:r>
-              <a:rPr lang="en-US" dirty="0" err="1" smtClean="0"/>
-              <a:t>BashElementTypes</a:t>
-            </a:r>
-            <a:r>
-              <a:rPr lang="en-US" dirty="0" smtClean="0"/>
-              <a:t> </a:t>
-            </a:r>
-            <a:r>
-              <a:rPr lang="en-US" dirty="0" err="1" smtClean="0"/>
-              <a:t>vs</a:t>
-            </a:r>
-            <a:r>
-              <a:rPr lang="en-US" dirty="0" smtClean="0"/>
-              <a:t> </a:t>
-            </a:r>
-            <a:r>
-              <a:rPr lang="en-US" smtClean="0"/>
-              <a:t>BashTokenTypes</a:t>
-            </a:r>
-            <a:endParaRPr lang="en-US" dirty="0"/>
-          </a:p>
-        </p:txBody>
-      </p:sp>
-    </p:spTree>
-    <p:extLst>
-      <p:ext uri="{BB962C8B-B14F-4D97-AF65-F5344CB8AC3E}">
-        <p14:creationId xmlns:p14="http://schemas.microsoft.com/office/powerpoint/2010/main" val="362419930"/>
-      </p:ext>
-    </p:extLst>
-  </p:cSld>
-  <p:clrMapOvr>
-    <a:masterClrMapping/>
-  </p:clrMapOvr>
-</p:sld>
-</file>
-
-<file path=ppt/slides/slide11.xml><?xml version="1.0" encoding="utf-8"?>
-<p:sld xmlns:a="http://schemas.openxmlformats.org/drawingml/2006/main" xmlns:r="http://schemas.openxmlformats.org/officeDocument/2006/relationships" xmlns:p="http://schemas.openxmlformats.org/presentationml/2006/main">
-  <p:cSld>
-    <p:spTree>
-      <p:nvGrpSpPr>
-        <p:cNvPr id="1" name=""/>
-        <p:cNvGrpSpPr/>
-        <p:nvPr/>
-      </p:nvGrpSpPr>
-      <p:grpSpPr>
-        <a:xfrm>
-          <a:off x="0" y="0"/>
-          <a:ext cx="0" cy="0"/>
-          <a:chOff x="0" y="0"/>
-          <a:chExt cx="0" cy="0"/>
-        </a:xfrm>
-      </p:grpSpPr>
-      <p:sp>
-        <p:nvSpPr>
-          <p:cNvPr id="2" name="Title 1"/>
-          <p:cNvSpPr>
-            <a:spLocks noGrp="1"/>
-          </p:cNvSpPr>
-          <p:nvPr>
-            <p:ph type="title"/>
-          </p:nvPr>
-        </p:nvSpPr>
-        <p:spPr/>
-        <p:txBody>
-          <a:bodyPr/>
-          <a:lstStyle/>
-          <a:p>
-            <a:r>
-              <a:rPr lang="en-US" dirty="0" smtClean="0"/>
               <a:t>Parser Basics: LL-Parser</a:t>
             </a:r>
             <a:endParaRPr lang="en-US" dirty="0"/>
@@ -5114,7 +4741,7 @@
 </p:sld>
 </file>
 
-<file path=ppt/slides/slide12.xml><?xml version="1.0" encoding="utf-8"?>
+<file path=ppt/slides/slide11.xml><?xml version="1.0" encoding="utf-8"?>
 <p:sld xmlns:a="http://schemas.openxmlformats.org/drawingml/2006/main" xmlns:r="http://schemas.openxmlformats.org/officeDocument/2006/relationships" xmlns:p="http://schemas.openxmlformats.org/presentationml/2006/main">
   <p:cSld>
     <p:spTree>
@@ -5234,7 +4861,7 @@
 </p:sld>
 </file>
 
-<file path=ppt/slides/slide13.xml><?xml version="1.0" encoding="utf-8"?>
+<file path=ppt/slides/slide12.xml><?xml version="1.0" encoding="utf-8"?>
 <p:sld xmlns:a="http://schemas.openxmlformats.org/drawingml/2006/main" xmlns:r="http://schemas.openxmlformats.org/officeDocument/2006/relationships" xmlns:p="http://schemas.openxmlformats.org/presentationml/2006/main">
   <p:cSld>
     <p:spTree>
@@ -5432,7 +5059,7 @@
 </p:sld>
 </file>
 
-<file path=ppt/slides/slide14.xml><?xml version="1.0" encoding="utf-8"?>
+<file path=ppt/slides/slide13.xml><?xml version="1.0" encoding="utf-8"?>
 <p:sld xmlns:a="http://schemas.openxmlformats.org/drawingml/2006/main" xmlns:r="http://schemas.openxmlformats.org/officeDocument/2006/relationships" xmlns:p="http://schemas.openxmlformats.org/presentationml/2006/main">
   <p:cSld>
     <p:spTree>
@@ -5515,7 +5142,7 @@
 </p:sld>
 </file>
 
-<file path=ppt/slides/slide15.xml><?xml version="1.0" encoding="utf-8"?>
+<file path=ppt/slides/slide14.xml><?xml version="1.0" encoding="utf-8"?>
 <p:sld xmlns:a="http://schemas.openxmlformats.org/drawingml/2006/main" xmlns:r="http://schemas.openxmlformats.org/officeDocument/2006/relationships" xmlns:p="http://schemas.openxmlformats.org/presentationml/2006/main">
   <p:cSld>
     <p:spTree>
@@ -5611,6 +5238,81 @@
 </p:sld>
 </file>
 
+<file path=ppt/slides/slide15.xml><?xml version="1.0" encoding="utf-8"?>
+<p:sld xmlns:a="http://schemas.openxmlformats.org/drawingml/2006/main" xmlns:r="http://schemas.openxmlformats.org/officeDocument/2006/relationships" xmlns:p="http://schemas.openxmlformats.org/presentationml/2006/main">
+  <p:cSld>
+    <p:spTree>
+      <p:nvGrpSpPr>
+        <p:cNvPr id="1" name=""/>
+        <p:cNvGrpSpPr/>
+        <p:nvPr/>
+      </p:nvGrpSpPr>
+      <p:grpSpPr>
+        <a:xfrm>
+          <a:off x="0" y="0"/>
+          <a:ext cx="0" cy="0"/>
+          <a:chOff x="0" y="0"/>
+          <a:chExt cx="0" cy="0"/>
+        </a:xfrm>
+      </p:grpSpPr>
+      <p:sp>
+        <p:nvSpPr>
+          <p:cNvPr id="2" name="Title 1"/>
+          <p:cNvSpPr>
+            <a:spLocks noGrp="1"/>
+          </p:cNvSpPr>
+          <p:nvPr>
+            <p:ph type="title"/>
+          </p:nvPr>
+        </p:nvSpPr>
+        <p:spPr/>
+        <p:txBody>
+          <a:bodyPr/>
+          <a:lstStyle/>
+          <a:p>
+            <a:r>
+              <a:rPr lang="en-US" dirty="0"/>
+              <a:t>Recursive descent parser</a:t>
+            </a:r>
+          </a:p>
+        </p:txBody>
+      </p:sp>
+      <p:sp>
+        <p:nvSpPr>
+          <p:cNvPr id="3" name="Content Placeholder 2"/>
+          <p:cNvSpPr>
+            <a:spLocks noGrp="1"/>
+          </p:cNvSpPr>
+          <p:nvPr>
+            <p:ph idx="1"/>
+          </p:nvPr>
+        </p:nvSpPr>
+        <p:spPr/>
+        <p:txBody>
+          <a:bodyPr/>
+          <a:lstStyle/>
+          <a:p>
+            <a:r>
+              <a:rPr lang="en-US"/>
+              <a:t>kind of top-down parser built from a set of mutually-recursive procedures</a:t>
+            </a:r>
+            <a:endParaRPr lang="en-US" dirty="0"/>
+          </a:p>
+        </p:txBody>
+      </p:sp>
+    </p:spTree>
+    <p:extLst>
+      <p:ext uri="{BB962C8B-B14F-4D97-AF65-F5344CB8AC3E}">
+        <p14:creationId xmlns:p14="http://schemas.microsoft.com/office/powerpoint/2010/main" val="1704516617"/>
+      </p:ext>
+    </p:extLst>
+  </p:cSld>
+  <p:clrMapOvr>
+    <a:masterClrMapping/>
+  </p:clrMapOvr>
+</p:sld>
+</file>
+
 <file path=ppt/slides/slide16.xml><?xml version="1.0" encoding="utf-8"?>
 <p:sld xmlns:a="http://schemas.openxmlformats.org/drawingml/2006/main" xmlns:r="http://schemas.openxmlformats.org/officeDocument/2006/relationships" xmlns:p="http://schemas.openxmlformats.org/presentationml/2006/main">
   <p:cSld>
@@ -5644,9 +5346,14 @@
           <a:lstStyle/>
           <a:p>
             <a:r>
-              <a:rPr lang="en-US" dirty="0"/>
-              <a:t>Recursive descent parser</a:t>
-            </a:r>
+              <a:rPr lang="en-US" dirty="0" err="1" smtClean="0"/>
+              <a:t>GrammarKit</a:t>
+            </a:r>
+            <a:r>
+              <a:rPr lang="en-US" dirty="0" smtClean="0"/>
+              <a:t> Notes</a:t>
+            </a:r>
+            <a:endParaRPr lang="en-US" dirty="0"/>
           </a:p>
         </p:txBody>
       </p:sp>
@@ -5662,12 +5369,77 @@
         </p:nvSpPr>
         <p:spPr/>
         <p:txBody>
-          <a:bodyPr/>
-          <a:lstStyle/>
-          <a:p>
-            <a:r>
-              <a:rPr lang="en-US"/>
-              <a:t>kind of top-down parser built from a set of mutually-recursive procedures</a:t>
+          <a:bodyPr>
+            <a:normAutofit lnSpcReduction="10000"/>
+          </a:bodyPr>
+          <a:lstStyle/>
+          <a:p>
+            <a:r>
+              <a:rPr lang="en-US" dirty="0" smtClean="0"/>
+              <a:t>All used special characters must be named in the token-section of the grammar header</a:t>
+            </a:r>
+          </a:p>
+          <a:p>
+            <a:pPr lvl="1"/>
+            <a:r>
+              <a:rPr lang="en-US" dirty="0" smtClean="0"/>
+              <a:t>Other tokens will be picked up on the fly from the grammar rules (e.g. string, number, id in the </a:t>
+            </a:r>
+            <a:r>
+              <a:rPr lang="en-US" dirty="0" err="1" smtClean="0"/>
+              <a:t>bnf</a:t>
+            </a:r>
+            <a:r>
+              <a:rPr lang="en-US" dirty="0" smtClean="0"/>
+              <a:t>-example)</a:t>
+            </a:r>
+          </a:p>
+          <a:p>
+            <a:pPr lvl="1"/>
+            <a:r>
+              <a:rPr lang="en-US" dirty="0" smtClean="0"/>
+              <a:t>They will be translated </a:t>
+            </a:r>
+            <a:r>
+              <a:rPr lang="en-US" dirty="0"/>
+              <a:t>into </a:t>
+            </a:r>
+            <a:r>
+              <a:rPr lang="en-US" dirty="0" err="1" smtClean="0"/>
+              <a:t>RTokenTypes</a:t>
+            </a:r>
+            <a:r>
+              <a:rPr lang="en-US" dirty="0" smtClean="0"/>
+              <a:t> (</a:t>
+            </a:r>
+            <a:r>
+              <a:rPr lang="en-US" dirty="0" smtClean="0">
+                <a:sym typeface="Wingdings"/>
+              </a:rPr>
+              <a:t></a:t>
+            </a:r>
+            <a:r>
+              <a:rPr lang="en-US" dirty="0" err="1" smtClean="0"/>
+              <a:t>Rtypes</a:t>
+            </a:r>
+            <a:r>
+              <a:rPr lang="en-US" dirty="0" smtClean="0"/>
+              <a:t>)</a:t>
+            </a:r>
+          </a:p>
+          <a:p>
+            <a:pPr lvl="1"/>
+            <a:r>
+              <a:rPr lang="en-US" dirty="0" smtClean="0"/>
+              <a:t>They must be produced by the </a:t>
+            </a:r>
+            <a:r>
+              <a:rPr lang="en-US" dirty="0" err="1" smtClean="0"/>
+              <a:t>Lexer</a:t>
+            </a:r>
+            <a:r>
+              <a:rPr lang="en-US" dirty="0" smtClean="0"/>
+              <a:t>! (And just those, as other tokens will be ignored by the generated parser)</a:t>
             </a:r>
             <a:endParaRPr lang="en-US" dirty="0"/>
           </a:p>
@@ -5676,7 +5448,7 @@
     </p:spTree>
     <p:extLst>
       <p:ext uri="{BB962C8B-B14F-4D97-AF65-F5344CB8AC3E}">
-        <p14:creationId xmlns:p14="http://schemas.microsoft.com/office/powerpoint/2010/main" val="1704516617"/>
+        <p14:creationId xmlns:p14="http://schemas.microsoft.com/office/powerpoint/2010/main" val="2865957318"/>
       </p:ext>
     </p:extLst>
   </p:cSld>
@@ -5719,12 +5491,8 @@
           <a:lstStyle/>
           <a:p>
             <a:r>
-              <a:rPr lang="en-US" dirty="0" err="1" smtClean="0"/>
-              <a:t>GrammarKit</a:t>
-            </a:r>
-            <a:r>
-              <a:rPr lang="en-US" dirty="0" smtClean="0"/>
-              <a:t> Notes</a:t>
+              <a:rPr lang="en-US" dirty="0" smtClean="0"/>
+              <a:t>ANTLR notes</a:t>
             </a:r>
             <a:endParaRPr lang="en-US" dirty="0"/>
           </a:p>
@@ -5742,86 +5510,32 @@
         </p:nvSpPr>
         <p:spPr/>
         <p:txBody>
-          <a:bodyPr>
-            <a:normAutofit lnSpcReduction="10000"/>
-          </a:bodyPr>
-          <a:lstStyle/>
-          <a:p>
-            <a:r>
-              <a:rPr lang="en-US" dirty="0" smtClean="0"/>
-              <a:t>All used special characters must be named in the token-section of the grammar header</a:t>
-            </a:r>
-          </a:p>
-          <a:p>
-            <a:pPr lvl="1"/>
-            <a:r>
-              <a:rPr lang="en-US" dirty="0" smtClean="0"/>
-              <a:t>Other tokens will be picked up on the fly from the grammar rules (e.g. string, number, id in the </a:t>
-            </a:r>
-            <a:r>
-              <a:rPr lang="en-US" dirty="0" err="1" smtClean="0"/>
-              <a:t>bnf</a:t>
-            </a:r>
-            <a:r>
-              <a:rPr lang="en-US" dirty="0" smtClean="0"/>
-              <a:t>-example)</a:t>
-            </a:r>
-          </a:p>
-          <a:p>
-            <a:pPr lvl="1"/>
-            <a:r>
-              <a:rPr lang="en-US" dirty="0" smtClean="0"/>
-              <a:t>They will be translated </a:t>
-            </a:r>
-            <a:r>
-              <a:rPr lang="en-US" dirty="0"/>
-              <a:t>into </a:t>
-            </a:r>
-            <a:r>
-              <a:rPr lang="en-US" dirty="0" err="1" smtClean="0"/>
-              <a:t>RTokenTypes</a:t>
-            </a:r>
-            <a:r>
-              <a:rPr lang="en-US" dirty="0" smtClean="0"/>
-              <a:t> (</a:t>
-            </a:r>
-            <a:r>
-              <a:rPr lang="en-US" dirty="0" smtClean="0">
-                <a:sym typeface="Wingdings"/>
-              </a:rPr>
-              <a:t></a:t>
-            </a:r>
-            <a:r>
-              <a:rPr lang="en-US" dirty="0" err="1" smtClean="0"/>
-              <a:t>Rtypes</a:t>
-            </a:r>
-            <a:r>
-              <a:rPr lang="en-US" dirty="0" smtClean="0"/>
-              <a:t>)</a:t>
-            </a:r>
-          </a:p>
-          <a:p>
-            <a:pPr lvl="1"/>
-            <a:r>
-              <a:rPr lang="en-US" dirty="0" smtClean="0"/>
-              <a:t>They must be produced by the </a:t>
-            </a:r>
-            <a:r>
-              <a:rPr lang="en-US" dirty="0" err="1" smtClean="0"/>
-              <a:t>Lexer</a:t>
-            </a:r>
-            <a:r>
-              <a:rPr lang="en-US" dirty="0" smtClean="0"/>
-              <a:t>! (And just those, as other tokens will be ignored by the generated parser)</a:t>
-            </a:r>
-            <a:endParaRPr lang="en-US" dirty="0"/>
+          <a:bodyPr/>
+          <a:lstStyle/>
+          <a:p>
+            <a:r>
+              <a:rPr lang="en-US" dirty="0" smtClean="0"/>
+              <a:t>ANTLR </a:t>
+            </a:r>
+            <a:r>
+              <a:rPr lang="en-US" dirty="0"/>
+              <a:t>imposes the convention that </a:t>
+            </a:r>
+            <a:r>
+              <a:rPr lang="en-US" dirty="0" err="1"/>
+              <a:t>lexer</a:t>
+            </a:r>
+            <a:r>
+              <a:rPr lang="en-US" dirty="0"/>
+              <a:t> rules start with an uppercase letter and parser rules with a lowercase letter</a:t>
+            </a:r>
           </a:p>
         </p:txBody>
       </p:sp>
     </p:spTree>
     <p:extLst>
       <p:ext uri="{BB962C8B-B14F-4D97-AF65-F5344CB8AC3E}">
-        <p14:creationId xmlns:p14="http://schemas.microsoft.com/office/powerpoint/2010/main" val="2865957318"/>
+        <p14:creationId xmlns:p14="http://schemas.microsoft.com/office/powerpoint/2010/main" val="3457731727"/>
       </p:ext>
     </p:extLst>
   </p:cSld>
@@ -5865,93 +5579,6 @@
           <a:p>
             <a:r>
               <a:rPr lang="en-US" dirty="0" smtClean="0"/>
-              <a:t>ANTLR notes</a:t>
-            </a:r>
-            <a:endParaRPr lang="en-US" dirty="0"/>
-          </a:p>
-        </p:txBody>
-      </p:sp>
-      <p:sp>
-        <p:nvSpPr>
-          <p:cNvPr id="3" name="Content Placeholder 2"/>
-          <p:cNvSpPr>
-            <a:spLocks noGrp="1"/>
-          </p:cNvSpPr>
-          <p:nvPr>
-            <p:ph idx="1"/>
-          </p:nvPr>
-        </p:nvSpPr>
-        <p:spPr/>
-        <p:txBody>
-          <a:bodyPr/>
-          <a:lstStyle/>
-          <a:p>
-            <a:r>
-              <a:rPr lang="en-US" dirty="0" smtClean="0"/>
-              <a:t>ANTLR </a:t>
-            </a:r>
-            <a:r>
-              <a:rPr lang="en-US" dirty="0"/>
-              <a:t>imposes the convention that </a:t>
-            </a:r>
-            <a:r>
-              <a:rPr lang="en-US" dirty="0" err="1"/>
-              <a:t>lexer</a:t>
-            </a:r>
-            <a:r>
-              <a:rPr lang="en-US" dirty="0"/>
-              <a:t> rules start with an uppercase letter and parser rules with a lowercase letter</a:t>
-            </a:r>
-          </a:p>
-        </p:txBody>
-      </p:sp>
-    </p:spTree>
-    <p:extLst>
-      <p:ext uri="{BB962C8B-B14F-4D97-AF65-F5344CB8AC3E}">
-        <p14:creationId xmlns:p14="http://schemas.microsoft.com/office/powerpoint/2010/main" val="3457731727"/>
-      </p:ext>
-    </p:extLst>
-  </p:cSld>
-  <p:clrMapOvr>
-    <a:masterClrMapping/>
-  </p:clrMapOvr>
-</p:sld>
-</file>
-
-<file path=ppt/slides/slide19.xml><?xml version="1.0" encoding="utf-8"?>
-<p:sld xmlns:a="http://schemas.openxmlformats.org/drawingml/2006/main" xmlns:r="http://schemas.openxmlformats.org/officeDocument/2006/relationships" xmlns:p="http://schemas.openxmlformats.org/presentationml/2006/main">
-  <p:cSld>
-    <p:spTree>
-      <p:nvGrpSpPr>
-        <p:cNvPr id="1" name=""/>
-        <p:cNvGrpSpPr/>
-        <p:nvPr/>
-      </p:nvGrpSpPr>
-      <p:grpSpPr>
-        <a:xfrm>
-          <a:off x="0" y="0"/>
-          <a:ext cx="0" cy="0"/>
-          <a:chOff x="0" y="0"/>
-          <a:chExt cx="0" cy="0"/>
-        </a:xfrm>
-      </p:grpSpPr>
-      <p:sp>
-        <p:nvSpPr>
-          <p:cNvPr id="2" name="Title 1"/>
-          <p:cNvSpPr>
-            <a:spLocks noGrp="1"/>
-          </p:cNvSpPr>
-          <p:nvPr>
-            <p:ph type="title"/>
-          </p:nvPr>
-        </p:nvSpPr>
-        <p:spPr/>
-        <p:txBody>
-          <a:bodyPr/>
-          <a:lstStyle/>
-          <a:p>
-            <a:r>
-              <a:rPr lang="en-US" dirty="0" smtClean="0"/>
               <a:t>PEG	</a:t>
             </a:r>
             <a:endParaRPr lang="en-US" dirty="0"/>
@@ -6037,83 +5664,7 @@
 </p:sld>
 </file>
 
-<file path=ppt/slides/slide2.xml><?xml version="1.0" encoding="utf-8"?>
-<p:sld xmlns:a="http://schemas.openxmlformats.org/drawingml/2006/main" xmlns:r="http://schemas.openxmlformats.org/officeDocument/2006/relationships" xmlns:p="http://schemas.openxmlformats.org/presentationml/2006/main">
-  <p:cSld>
-    <p:spTree>
-      <p:nvGrpSpPr>
-        <p:cNvPr id="1" name=""/>
-        <p:cNvGrpSpPr/>
-        <p:nvPr/>
-      </p:nvGrpSpPr>
-      <p:grpSpPr>
-        <a:xfrm>
-          <a:off x="0" y="0"/>
-          <a:ext cx="0" cy="0"/>
-          <a:chOff x="0" y="0"/>
-          <a:chExt cx="0" cy="0"/>
-        </a:xfrm>
-      </p:grpSpPr>
-      <p:sp>
-        <p:nvSpPr>
-          <p:cNvPr id="2" name="Title 1"/>
-          <p:cNvSpPr>
-            <a:spLocks noGrp="1"/>
-          </p:cNvSpPr>
-          <p:nvPr>
-            <p:ph type="title"/>
-          </p:nvPr>
-        </p:nvSpPr>
-        <p:spPr/>
-        <p:txBody>
-          <a:bodyPr/>
-          <a:lstStyle/>
-          <a:p>
-            <a:r>
-              <a:rPr lang="en-US" dirty="0" smtClean="0"/>
-              <a:t>v0.6</a:t>
-            </a:r>
-            <a:endParaRPr lang="en-US" dirty="0"/>
-          </a:p>
-        </p:txBody>
-      </p:sp>
-      <p:sp>
-        <p:nvSpPr>
-          <p:cNvPr id="3" name="Content Placeholder 2"/>
-          <p:cNvSpPr>
-            <a:spLocks noGrp="1"/>
-          </p:cNvSpPr>
-          <p:nvPr>
-            <p:ph idx="1"/>
-          </p:nvPr>
-        </p:nvSpPr>
-        <p:spPr/>
-        <p:txBody>
-          <a:bodyPr/>
-          <a:lstStyle/>
-          <a:p>
-            <a:r>
-              <a:rPr lang="en-US" dirty="0" smtClean="0"/>
-              <a:t>Nothing yet</a:t>
-            </a:r>
-            <a:endParaRPr lang="en-US" dirty="0"/>
-          </a:p>
-        </p:txBody>
-      </p:sp>
-    </p:spTree>
-    <p:extLst>
-      <p:ext uri="{BB962C8B-B14F-4D97-AF65-F5344CB8AC3E}">
-        <p14:creationId xmlns:p14="http://schemas.microsoft.com/office/powerpoint/2010/main" val="1953636889"/>
-      </p:ext>
-    </p:extLst>
-  </p:cSld>
-  <p:clrMapOvr>
-    <a:masterClrMapping/>
-  </p:clrMapOvr>
-</p:sld>
-</file>
-
-<file path=ppt/slides/slide20.xml><?xml version="1.0" encoding="utf-8"?>
+<file path=ppt/slides/slide19.xml><?xml version="1.0" encoding="utf-8"?>
 <p:sld xmlns:a="http://schemas.openxmlformats.org/drawingml/2006/main" xmlns:r="http://schemas.openxmlformats.org/officeDocument/2006/relationships" xmlns:p="http://schemas.openxmlformats.org/presentationml/2006/main">
   <p:cSld>
     <p:spTree>
@@ -6213,7 +5764,87 @@
 </p:sld>
 </file>
 
-<file path=ppt/slides/slide21.xml><?xml version="1.0" encoding="utf-8"?>
+<file path=ppt/slides/slide2.xml><?xml version="1.0" encoding="utf-8"?>
+<p:sld xmlns:a="http://schemas.openxmlformats.org/drawingml/2006/main" xmlns:r="http://schemas.openxmlformats.org/officeDocument/2006/relationships" xmlns:p="http://schemas.openxmlformats.org/presentationml/2006/main">
+  <p:cSld>
+    <p:spTree>
+      <p:nvGrpSpPr>
+        <p:cNvPr id="1" name=""/>
+        <p:cNvGrpSpPr/>
+        <p:nvPr/>
+      </p:nvGrpSpPr>
+      <p:grpSpPr>
+        <a:xfrm>
+          <a:off x="0" y="0"/>
+          <a:ext cx="0" cy="0"/>
+          <a:chOff x="0" y="0"/>
+          <a:chExt cx="0" cy="0"/>
+        </a:xfrm>
+      </p:grpSpPr>
+      <p:sp>
+        <p:nvSpPr>
+          <p:cNvPr id="2" name="Title 1"/>
+          <p:cNvSpPr>
+            <a:spLocks noGrp="1"/>
+          </p:cNvSpPr>
+          <p:nvPr>
+            <p:ph type="title"/>
+          </p:nvPr>
+        </p:nvSpPr>
+        <p:spPr/>
+        <p:txBody>
+          <a:bodyPr/>
+          <a:lstStyle/>
+          <a:p>
+            <a:r>
+              <a:rPr lang="en-US" dirty="0" smtClean="0"/>
+              <a:t>v0.6</a:t>
+            </a:r>
+            <a:endParaRPr lang="en-US" dirty="0"/>
+          </a:p>
+        </p:txBody>
+      </p:sp>
+      <p:sp>
+        <p:nvSpPr>
+          <p:cNvPr id="3" name="Content Placeholder 2"/>
+          <p:cNvSpPr>
+            <a:spLocks noGrp="1"/>
+          </p:cNvSpPr>
+          <p:nvPr>
+            <p:ph idx="1"/>
+          </p:nvPr>
+        </p:nvSpPr>
+        <p:spPr/>
+        <p:txBody>
+          <a:bodyPr/>
+          <a:lstStyle/>
+          <a:p>
+            <a:r>
+              <a:rPr lang="en-US" dirty="0" smtClean="0"/>
+              <a:t>Basic: Find usages, got </a:t>
+            </a:r>
+            <a:r>
+              <a:rPr lang="en-US" smtClean="0"/>
+              <a:t>to declaration</a:t>
+            </a:r>
+            <a:endParaRPr lang="en-US" dirty="0"/>
+          </a:p>
+        </p:txBody>
+      </p:sp>
+    </p:spTree>
+    <p:extLst>
+      <p:ext uri="{BB962C8B-B14F-4D97-AF65-F5344CB8AC3E}">
+        <p14:creationId xmlns:p14="http://schemas.microsoft.com/office/powerpoint/2010/main" val="1953636889"/>
+      </p:ext>
+    </p:extLst>
+  </p:cSld>
+  <p:clrMapOvr>
+    <a:masterClrMapping/>
+  </p:clrMapOvr>
+</p:sld>
+</file>
+
+<file path=ppt/slides/slide20.xml><?xml version="1.0" encoding="utf-8"?>
 <p:sld xmlns:a="http://schemas.openxmlformats.org/drawingml/2006/main" xmlns:r="http://schemas.openxmlformats.org/officeDocument/2006/relationships" xmlns:p="http://schemas.openxmlformats.org/presentationml/2006/main">
   <p:cSld>
     <p:spTree>
@@ -6313,7 +5944,7 @@
 </p:sld>
 </file>
 
-<file path=ppt/slides/slide22.xml><?xml version="1.0" encoding="utf-8"?>
+<file path=ppt/slides/slide21.xml><?xml version="1.0" encoding="utf-8"?>
 <p:sld xmlns:a="http://schemas.openxmlformats.org/drawingml/2006/main" xmlns:r="http://schemas.openxmlformats.org/officeDocument/2006/relationships" xmlns:p="http://schemas.openxmlformats.org/presentationml/2006/main">
   <p:cSld>
     <p:spTree>
@@ -6435,6 +6066,279 @@
 </p:sld>
 </file>
 
+<file path=ppt/slides/slide22.xml><?xml version="1.0" encoding="utf-8"?>
+<p:sld xmlns:a="http://schemas.openxmlformats.org/drawingml/2006/main" xmlns:r="http://schemas.openxmlformats.org/officeDocument/2006/relationships" xmlns:p="http://schemas.openxmlformats.org/presentationml/2006/main">
+  <p:cSld>
+    <p:spTree>
+      <p:nvGrpSpPr>
+        <p:cNvPr id="1" name=""/>
+        <p:cNvGrpSpPr/>
+        <p:nvPr/>
+      </p:nvGrpSpPr>
+      <p:grpSpPr>
+        <a:xfrm>
+          <a:off x="0" y="0"/>
+          <a:ext cx="0" cy="0"/>
+          <a:chOff x="0" y="0"/>
+          <a:chExt cx="0" cy="0"/>
+        </a:xfrm>
+      </p:grpSpPr>
+      <p:sp>
+        <p:nvSpPr>
+          <p:cNvPr id="2" name="Title 1"/>
+          <p:cNvSpPr>
+            <a:spLocks noGrp="1"/>
+          </p:cNvSpPr>
+          <p:nvPr>
+            <p:ph type="title"/>
+          </p:nvPr>
+        </p:nvSpPr>
+        <p:spPr/>
+        <p:txBody>
+          <a:bodyPr>
+            <a:normAutofit fontScale="90000"/>
+          </a:bodyPr>
+          <a:lstStyle/>
+          <a:p>
+            <a:r>
+              <a:rPr lang="en-US" dirty="0" smtClean="0"/>
+              <a:t>Options for code snippet evaluation</a:t>
+            </a:r>
+            <a:endParaRPr lang="en-US" dirty="0"/>
+          </a:p>
+        </p:txBody>
+      </p:sp>
+      <p:sp>
+        <p:nvSpPr>
+          <p:cNvPr id="3" name="Content Placeholder 2"/>
+          <p:cNvSpPr>
+            <a:spLocks noGrp="1"/>
+          </p:cNvSpPr>
+          <p:nvPr>
+            <p:ph idx="1"/>
+          </p:nvPr>
+        </p:nvSpPr>
+        <p:spPr/>
+        <p:txBody>
+          <a:bodyPr>
+            <a:normAutofit fontScale="62500" lnSpcReduction="20000"/>
+          </a:bodyPr>
+          <a:lstStyle/>
+          <a:p>
+            <a:r>
+              <a:rPr lang="en-US" dirty="0" smtClean="0"/>
+              <a:t>R Session has almost complete implementation for console, objects, </a:t>
+            </a:r>
+            <a:r>
+              <a:rPr lang="en-US" dirty="0" err="1" smtClean="0"/>
+              <a:t>etc</a:t>
+            </a:r>
+            <a:endParaRPr lang="en-US" dirty="0" smtClean="0"/>
+          </a:p>
+          <a:p>
+            <a:r>
+              <a:rPr lang="en-US" dirty="0" err="1" smtClean="0"/>
+              <a:t>TextMate</a:t>
+            </a:r>
+            <a:r>
+              <a:rPr lang="en-US" dirty="0" smtClean="0"/>
+              <a:t> </a:t>
+            </a:r>
+            <a:r>
+              <a:rPr lang="en-US" dirty="0" smtClean="0">
+                <a:hlinkClick r:id="rId2"/>
+              </a:rPr>
+              <a:t>bundle</a:t>
+            </a:r>
+            <a:endParaRPr lang="en-US" dirty="0" smtClean="0"/>
+          </a:p>
+          <a:p>
+            <a:pPr lvl="1"/>
+            <a:r>
+              <a:rPr lang="en-US" dirty="0" smtClean="0"/>
+              <a:t>Start R in special mode that reads all input from file and writes all output to another one which then somehow imported into </a:t>
+            </a:r>
+            <a:r>
+              <a:rPr lang="en-US" dirty="0" err="1" smtClean="0"/>
+              <a:t>textmate</a:t>
+            </a:r>
+            <a:endParaRPr lang="en-US" dirty="0" smtClean="0"/>
+          </a:p>
+          <a:p>
+            <a:r>
+              <a:rPr lang="en-US" dirty="0"/>
+              <a:t>I </a:t>
+            </a:r>
+            <a:r>
+              <a:rPr lang="en-US" dirty="0">
+                <a:hlinkClick r:id="rId3"/>
+              </a:rPr>
+              <a:t>think </a:t>
+            </a:r>
+            <a:r>
+              <a:rPr lang="en-US" dirty="0" err="1"/>
+              <a:t>FindWindow</a:t>
+            </a:r>
+            <a:r>
+              <a:rPr lang="en-US" dirty="0"/>
+              <a:t> and </a:t>
+            </a:r>
+            <a:r>
+              <a:rPr lang="en-US" dirty="0" err="1"/>
+              <a:t>SendMessage</a:t>
+            </a:r>
+            <a:r>
+              <a:rPr lang="en-US" dirty="0"/>
+              <a:t> are the functions you want to use, in general</a:t>
+            </a:r>
+            <a:r>
+              <a:rPr lang="en-US" dirty="0" smtClean="0"/>
+              <a:t>.</a:t>
+            </a:r>
+          </a:p>
+          <a:p>
+            <a:r>
+              <a:rPr lang="en-US" dirty="0" smtClean="0"/>
+              <a:t>Use the </a:t>
+            </a:r>
+            <a:r>
+              <a:rPr lang="en-US" dirty="0" smtClean="0">
+                <a:hlinkClick r:id="rId4"/>
+              </a:rPr>
+              <a:t>clipboard</a:t>
+            </a:r>
+            <a:endParaRPr lang="en-US" dirty="0" smtClean="0"/>
+          </a:p>
+          <a:p>
+            <a:r>
+              <a:rPr lang="en-US" dirty="0" err="1" smtClean="0">
+                <a:hlinkClick r:id="rId5"/>
+              </a:rPr>
+              <a:t>Tinn</a:t>
+            </a:r>
+            <a:r>
+              <a:rPr lang="en-US" dirty="0">
+                <a:hlinkClick r:id="rId5"/>
+              </a:rPr>
+              <a:t>-R</a:t>
+            </a:r>
+            <a:r>
+              <a:rPr lang="en-US" dirty="0"/>
+              <a:t>: It also pops up additional menu and toolbar when it detects </a:t>
+            </a:r>
+            <a:r>
+              <a:rPr lang="en-US" dirty="0" err="1"/>
+              <a:t>Rgui</a:t>
+            </a:r>
+            <a:r>
+              <a:rPr lang="en-US" dirty="0"/>
+              <a:t> running on the same computer. These </a:t>
+            </a:r>
+            <a:r>
+              <a:rPr lang="en-US" dirty="0" err="1"/>
+              <a:t>addons</a:t>
+            </a:r>
+            <a:r>
+              <a:rPr lang="en-US" dirty="0"/>
+              <a:t> interact with the R console and allow to submit code in part or in whole and to control R directly</a:t>
+            </a:r>
+            <a:r>
+              <a:rPr lang="en-US" dirty="0" smtClean="0"/>
+              <a:t>. </a:t>
+            </a:r>
+            <a:endParaRPr lang="en-US" dirty="0"/>
+          </a:p>
+          <a:p>
+            <a:pPr lvl="1"/>
+            <a:r>
+              <a:rPr lang="en-US" dirty="0" smtClean="0"/>
+              <a:t>It seems to have some </a:t>
+            </a:r>
+            <a:r>
+              <a:rPr lang="en-US" dirty="0" smtClean="0">
+                <a:hlinkClick r:id="rId6"/>
+              </a:rPr>
+              <a:t>limitations</a:t>
+            </a:r>
+            <a:endParaRPr lang="en-US" dirty="0" smtClean="0"/>
+          </a:p>
+          <a:p>
+            <a:r>
+              <a:rPr lang="en-US" dirty="0" smtClean="0"/>
+              <a:t>Maybe DOM is a </a:t>
+            </a:r>
+            <a:r>
+              <a:rPr lang="en-US" dirty="0" smtClean="0">
+                <a:hlinkClick r:id="rId7"/>
+              </a:rPr>
+              <a:t>solution</a:t>
+            </a:r>
+            <a:r>
+              <a:rPr lang="en-US" dirty="0" smtClean="0"/>
+              <a:t>: </a:t>
+            </a:r>
+            <a:r>
+              <a:rPr lang="en-US" dirty="0" err="1" smtClean="0"/>
+              <a:t>rdom</a:t>
+            </a:r>
+            <a:r>
+              <a:rPr lang="en-US" dirty="0"/>
+              <a:t>, </a:t>
+            </a:r>
+            <a:r>
+              <a:rPr lang="en-US" dirty="0" err="1" smtClean="0"/>
+              <a:t>RDCOMClient</a:t>
+            </a:r>
+            <a:endParaRPr lang="en-US" dirty="0" smtClean="0"/>
+          </a:p>
+          <a:p>
+            <a:r>
+              <a:rPr lang="en-US" dirty="0" smtClean="0"/>
+              <a:t>Or </a:t>
+            </a:r>
+            <a:r>
+              <a:rPr lang="en-US" dirty="0" smtClean="0">
+                <a:hlinkClick r:id="rId8"/>
+              </a:rPr>
+              <a:t>white</a:t>
+            </a:r>
+            <a:r>
+              <a:rPr lang="en-US" dirty="0" smtClean="0"/>
+              <a:t> </a:t>
+            </a:r>
+          </a:p>
+          <a:p>
+            <a:r>
+              <a:rPr lang="en-US" dirty="0" smtClean="0"/>
+              <a:t>Or most promising, we could try to use the </a:t>
+            </a:r>
+            <a:r>
+              <a:rPr lang="en-US" dirty="0" smtClean="0">
+                <a:hlinkClick r:id="rId9"/>
+              </a:rPr>
+              <a:t>windows API</a:t>
+            </a:r>
+            <a:r>
+              <a:rPr lang="en-US" dirty="0" smtClean="0"/>
+              <a:t> via VBScript or C#</a:t>
+            </a:r>
+            <a:endParaRPr lang="en-US" dirty="0"/>
+          </a:p>
+        </p:txBody>
+      </p:sp>
+    </p:spTree>
+    <p:extLst>
+      <p:ext uri="{BB962C8B-B14F-4D97-AF65-F5344CB8AC3E}">
+        <p14:creationId xmlns:p14="http://schemas.microsoft.com/office/powerpoint/2010/main" val="2563764221"/>
+      </p:ext>
+    </p:extLst>
+  </p:cSld>
+  <p:clrMapOvr>
+    <a:masterClrMapping/>
+  </p:clrMapOvr>
+</p:sld>
+</file>
+
 <file path=ppt/slides/slide23.xml><?xml version="1.0" encoding="utf-8"?>
 <p:sld xmlns:a="http://schemas.openxmlformats.org/drawingml/2006/main" xmlns:r="http://schemas.openxmlformats.org/officeDocument/2006/relationships" xmlns:p="http://schemas.openxmlformats.org/presentationml/2006/main">
   <p:cSld>
@@ -6464,14 +6368,12 @@
         </p:nvSpPr>
         <p:spPr/>
         <p:txBody>
-          <a:bodyPr>
-            <a:normAutofit fontScale="90000"/>
-          </a:bodyPr>
-          <a:lstStyle/>
-          <a:p>
-            <a:r>
-              <a:rPr lang="en-US" dirty="0" smtClean="0"/>
-              <a:t>Options for code snippet evaluation</a:t>
+          <a:bodyPr/>
+          <a:lstStyle/>
+          <a:p>
+            <a:r>
+              <a:rPr lang="en-US" dirty="0" smtClean="0"/>
+              <a:t>R Console for Idea</a:t>
             </a:r>
             <a:endParaRPr lang="en-US" dirty="0"/>
           </a:p>
@@ -6489,25 +6391,16 @@
         </p:nvSpPr>
         <p:spPr/>
         <p:txBody>
-          <a:bodyPr>
-            <a:normAutofit fontScale="62500" lnSpcReduction="20000"/>
-          </a:bodyPr>
-          <a:lstStyle/>
-          <a:p>
-            <a:r>
-              <a:rPr lang="en-US" dirty="0" smtClean="0"/>
-              <a:t>R Session has almost complete implementation for console, objects, </a:t>
+          <a:bodyPr/>
+          <a:lstStyle/>
+          <a:p>
+            <a:r>
+              <a:rPr lang="en-US" dirty="0" smtClean="0"/>
+              <a:t>Use </a:t>
             </a:r>
             <a:r>
               <a:rPr lang="en-US" dirty="0" err="1" smtClean="0"/>
-              <a:t>etc</a:t>
-            </a:r>
-            <a:endParaRPr lang="en-US" dirty="0" smtClean="0"/>
-          </a:p>
-          <a:p>
-            <a:r>
-              <a:rPr lang="en-US" dirty="0" err="1" smtClean="0"/>
-              <a:t>TextMate</a:t>
+              <a:t>RSession</a:t>
             </a:r>
             <a:r>
               <a:rPr lang="en-US" dirty="0" smtClean="0"/>
@@ -6517,179 +6410,18 @@
               <a:rPr lang="en-US" dirty="0" smtClean="0">
                 <a:hlinkClick r:id="rId2"/>
               </a:rPr>
-              <a:t>bundle</a:t>
+              <a:t>solution</a:t>
             </a:r>
             <a:endParaRPr lang="en-US" dirty="0" smtClean="0"/>
           </a:p>
           <a:p>
-            <a:pPr lvl="1"/>
-            <a:r>
-              <a:rPr lang="en-US" dirty="0" smtClean="0"/>
-              <a:t>Start R in special mode that reads all input from file and writes all output to another one which then somehow imported into </a:t>
+            <a:r>
+              <a:rPr lang="en-US" dirty="0" smtClean="0"/>
+              <a:t>Learn from </a:t>
             </a:r>
             <a:r>
               <a:rPr lang="en-US" dirty="0" err="1" smtClean="0"/>
-              <a:t>textmate</a:t>
-            </a:r>
-            <a:endParaRPr lang="en-US" dirty="0" smtClean="0"/>
-          </a:p>
-          <a:p>
-            <a:r>
-              <a:rPr lang="en-US" dirty="0"/>
-              <a:t>I </a:t>
-            </a:r>
-            <a:r>
-              <a:rPr lang="en-US" dirty="0">
-                <a:hlinkClick r:id="rId3"/>
-              </a:rPr>
-              <a:t>think </a:t>
-            </a:r>
-            <a:r>
-              <a:rPr lang="en-US" dirty="0" err="1"/>
-              <a:t>FindWindow</a:t>
-            </a:r>
-            <a:r>
-              <a:rPr lang="en-US" dirty="0"/>
-              <a:t> and </a:t>
-            </a:r>
-            <a:r>
-              <a:rPr lang="en-US" dirty="0" err="1"/>
-              <a:t>SendMessage</a:t>
-            </a:r>
-            <a:r>
-              <a:rPr lang="en-US" dirty="0"/>
-              <a:t> are the functions you want to use, in general</a:t>
-            </a:r>
-            <a:r>
-              <a:rPr lang="en-US" dirty="0" smtClean="0"/>
-              <a:t>.</a:t>
-            </a:r>
-          </a:p>
-          <a:p>
-            <a:r>
-              <a:rPr lang="en-US" dirty="0" smtClean="0"/>
-              <a:t>Use the </a:t>
-            </a:r>
-            <a:r>
-              <a:rPr lang="en-US" dirty="0" smtClean="0">
-                <a:hlinkClick r:id="rId4"/>
-              </a:rPr>
-              <a:t>clipboard</a:t>
-            </a:r>
-            <a:endParaRPr lang="en-US" dirty="0" smtClean="0"/>
-          </a:p>
-          <a:p>
-            <a:r>
-              <a:rPr lang="en-US" dirty="0" err="1" smtClean="0">
-                <a:hlinkClick r:id="rId5"/>
-              </a:rPr>
-              <a:t>Tinn</a:t>
-            </a:r>
-            <a:r>
-              <a:rPr lang="en-US" dirty="0">
-                <a:hlinkClick r:id="rId5"/>
-              </a:rPr>
-              <a:t>-R</a:t>
-            </a:r>
-            <a:r>
-              <a:rPr lang="en-US" dirty="0"/>
-              <a:t>: It also pops up additional menu and toolbar when it detects </a:t>
-            </a:r>
-            <a:r>
-              <a:rPr lang="en-US" dirty="0" err="1"/>
-              <a:t>Rgui</a:t>
-            </a:r>
-            <a:r>
-              <a:rPr lang="en-US" dirty="0"/>
-              <a:t> running on the same computer. These </a:t>
-            </a:r>
-            <a:r>
-              <a:rPr lang="en-US" dirty="0" err="1"/>
-              <a:t>addons</a:t>
-            </a:r>
-            <a:r>
-              <a:rPr lang="en-US" dirty="0"/>
-              <a:t> interact with the R console and allow to submit code in part or in whole and to control R directly</a:t>
-            </a:r>
-            <a:r>
-              <a:rPr lang="en-US" dirty="0" smtClean="0"/>
-              <a:t>. </a:t>
-            </a:r>
-            <a:endParaRPr lang="en-US" dirty="0"/>
-          </a:p>
-          <a:p>
-            <a:pPr lvl="1"/>
-            <a:r>
-              <a:rPr lang="en-US" dirty="0" smtClean="0"/>
-              <a:t>It seems to have some </a:t>
-            </a:r>
-            <a:r>
-              <a:rPr lang="en-US" dirty="0" smtClean="0">
-                <a:hlinkClick r:id="rId6"/>
-              </a:rPr>
-              <a:t>limitations</a:t>
-            </a:r>
-            <a:endParaRPr lang="en-US" dirty="0" smtClean="0"/>
-          </a:p>
-          <a:p>
-            <a:r>
-              <a:rPr lang="en-US" dirty="0" smtClean="0"/>
-              <a:t>Maybe DOM is a </a:t>
-            </a:r>
-            <a:r>
-              <a:rPr lang="en-US" dirty="0" smtClean="0">
-                <a:hlinkClick r:id="rId7"/>
-              </a:rPr>
-              <a:t>solution</a:t>
-            </a:r>
-            <a:r>
-              <a:rPr lang="en-US" dirty="0" smtClean="0"/>
-              <a:t>: </a:t>
-            </a:r>
-            <a:r>
-              <a:rPr lang="en-US" dirty="0" err="1" smtClean="0"/>
-              <a:t>rdom</a:t>
-            </a:r>
-            <a:r>
-              <a:rPr lang="en-US" dirty="0"/>
-              <a:t>, </a:t>
-            </a:r>
-            <a:r>
-              <a:rPr lang="en-US" dirty="0" err="1" smtClean="0"/>
-              <a:t>RDCOMClient</a:t>
-            </a:r>
-            <a:endParaRPr lang="en-US" dirty="0" smtClean="0"/>
-          </a:p>
-          <a:p>
-            <a:r>
-              <a:rPr lang="en-US" dirty="0" smtClean="0"/>
-              <a:t>Or </a:t>
-            </a:r>
-            <a:r>
-              <a:rPr lang="en-US" dirty="0" smtClean="0">
-                <a:hlinkClick r:id="rId8"/>
-              </a:rPr>
-              <a:t>white</a:t>
-            </a:r>
-            <a:r>
-              <a:rPr lang="en-US" dirty="0" smtClean="0"/>
-              <a:t> </a:t>
-            </a:r>
-          </a:p>
-          <a:p>
-            <a:r>
-              <a:rPr lang="en-US" dirty="0" smtClean="0"/>
-              <a:t>Or most promising, we could try to use the </a:t>
-            </a:r>
-            <a:r>
-              <a:rPr lang="en-US" dirty="0" smtClean="0">
-                <a:hlinkClick r:id="rId9"/>
-              </a:rPr>
-              <a:t>windows API</a:t>
-            </a:r>
-            <a:r>
-              <a:rPr lang="en-US" dirty="0" smtClean="0"/>
-              <a:t> via VBScript or C#</a:t>
+              <a:t>TinnR</a:t>
             </a:r>
             <a:endParaRPr lang="en-US" dirty="0"/>
           </a:p>
@@ -6698,7 +6430,7 @@
     </p:spTree>
     <p:extLst>
       <p:ext uri="{BB962C8B-B14F-4D97-AF65-F5344CB8AC3E}">
-        <p14:creationId xmlns:p14="http://schemas.microsoft.com/office/powerpoint/2010/main" val="2563764221"/>
+        <p14:creationId xmlns:p14="http://schemas.microsoft.com/office/powerpoint/2010/main" val="1475125988"/>
       </p:ext>
     </p:extLst>
   </p:cSld>
@@ -6741,56 +6473,83 @@
           <a:lstStyle/>
           <a:p>
             <a:r>
-              <a:rPr lang="en-US" dirty="0" smtClean="0"/>
-              <a:t>R Console for Idea</a:t>
-            </a:r>
-            <a:endParaRPr lang="en-US" dirty="0"/>
-          </a:p>
-        </p:txBody>
-      </p:sp>
-      <p:sp>
-        <p:nvSpPr>
-          <p:cNvPr id="3" name="Content Placeholder 2"/>
-          <p:cNvSpPr>
-            <a:spLocks noGrp="1"/>
-          </p:cNvSpPr>
-          <p:nvPr>
-            <p:ph idx="1"/>
-          </p:nvPr>
-        </p:nvSpPr>
-        <p:spPr/>
-        <p:txBody>
-          <a:bodyPr/>
-          <a:lstStyle/>
-          <a:p>
-            <a:r>
-              <a:rPr lang="en-US" dirty="0" smtClean="0"/>
-              <a:t>Use </a:t>
-            </a:r>
-            <a:r>
-              <a:rPr lang="en-US" dirty="0" err="1" smtClean="0"/>
-              <a:t>RSession</a:t>
-            </a:r>
-            <a:r>
-              <a:rPr lang="en-US" dirty="0" smtClean="0"/>
-              <a:t> </a:t>
+              <a:rPr lang="en-US" dirty="0" err="1" smtClean="0">
+                <a:hlinkClick r:id="rId2"/>
+              </a:rPr>
+              <a:t>Tinn</a:t>
             </a:r>
             <a:r>
               <a:rPr lang="en-US" dirty="0" smtClean="0">
                 <a:hlinkClick r:id="rId2"/>
               </a:rPr>
-              <a:t>solution</a:t>
+              <a:t>-R</a:t>
+            </a:r>
+            <a:endParaRPr lang="en-US" dirty="0"/>
+          </a:p>
+        </p:txBody>
+      </p:sp>
+      <p:sp>
+        <p:nvSpPr>
+          <p:cNvPr id="3" name="Content Placeholder 2"/>
+          <p:cNvSpPr>
+            <a:spLocks noGrp="1"/>
+          </p:cNvSpPr>
+          <p:nvPr>
+            <p:ph idx="1"/>
+          </p:nvPr>
+        </p:nvSpPr>
+        <p:spPr/>
+        <p:txBody>
+          <a:bodyPr>
+            <a:normAutofit/>
+          </a:bodyPr>
+          <a:lstStyle/>
+          <a:p>
+            <a:r>
+              <a:rPr lang="en-US" dirty="0" smtClean="0"/>
+              <a:t>Allows for </a:t>
+            </a:r>
+            <a:r>
+              <a:rPr lang="en-US" dirty="0" err="1" smtClean="0"/>
+              <a:t>Rgui</a:t>
+            </a:r>
+            <a:r>
+              <a:rPr lang="en-US" dirty="0" smtClean="0"/>
+              <a:t> interaction to evaluate line or selection</a:t>
+            </a:r>
+          </a:p>
+          <a:p>
+            <a:pPr lvl="1"/>
+            <a:r>
+              <a:rPr lang="en-US" dirty="0"/>
+              <a:t>including list variables or objects</a:t>
+            </a:r>
+            <a:r>
+              <a:rPr lang="en-US" dirty="0" smtClean="0"/>
+              <a:t>, clearing </a:t>
+            </a:r>
+            <a:r>
+              <a:rPr lang="en-US" dirty="0"/>
+              <a:t>console, even stopping the current process.</a:t>
             </a:r>
             <a:endParaRPr lang="en-US" dirty="0" smtClean="0"/>
           </a:p>
           <a:p>
             <a:r>
               <a:rPr lang="en-US" dirty="0" smtClean="0"/>
-              <a:t>Learn from </a:t>
-            </a:r>
-            <a:r>
-              <a:rPr lang="en-US" dirty="0" err="1" smtClean="0"/>
-              <a:t>TinnR</a:t>
+              <a:t>Code formatter</a:t>
+            </a:r>
+          </a:p>
+          <a:p>
+            <a:r>
+              <a:rPr lang="en-US" dirty="0" smtClean="0"/>
+              <a:t>Bracket matching &amp; checking</a:t>
+            </a:r>
+          </a:p>
+          <a:p>
+            <a:r>
+              <a:rPr lang="en-US" dirty="0" smtClean="0"/>
+              <a:t>Commenting uncommenting</a:t>
             </a:r>
             <a:endParaRPr lang="en-US" dirty="0"/>
           </a:p>
@@ -6799,7 +6558,7 @@
     </p:spTree>
     <p:extLst>
       <p:ext uri="{BB962C8B-B14F-4D97-AF65-F5344CB8AC3E}">
-        <p14:creationId xmlns:p14="http://schemas.microsoft.com/office/powerpoint/2010/main" val="1475125988"/>
+        <p14:creationId xmlns:p14="http://schemas.microsoft.com/office/powerpoint/2010/main" val="2449672567"/>
       </p:ext>
     </p:extLst>
   </p:cSld>
@@ -6842,134 +6601,6 @@
           <a:lstStyle/>
           <a:p>
             <a:r>
-              <a:rPr lang="en-US" dirty="0" err="1" smtClean="0">
-                <a:hlinkClick r:id="rId2"/>
-              </a:rPr>
-              <a:t>Tinn</a:t>
-            </a:r>
-            <a:r>
-              <a:rPr lang="en-US" dirty="0" smtClean="0">
-                <a:hlinkClick r:id="rId2"/>
-              </a:rPr>
-              <a:t>-R</a:t>
-            </a:r>
-            <a:endParaRPr lang="en-US" dirty="0"/>
-          </a:p>
-        </p:txBody>
-      </p:sp>
-      <p:sp>
-        <p:nvSpPr>
-          <p:cNvPr id="3" name="Content Placeholder 2"/>
-          <p:cNvSpPr>
-            <a:spLocks noGrp="1"/>
-          </p:cNvSpPr>
-          <p:nvPr>
-            <p:ph idx="1"/>
-          </p:nvPr>
-        </p:nvSpPr>
-        <p:spPr/>
-        <p:txBody>
-          <a:bodyPr>
-            <a:normAutofit/>
-          </a:bodyPr>
-          <a:lstStyle/>
-          <a:p>
-            <a:r>
-              <a:rPr lang="en-US" dirty="0" smtClean="0"/>
-              <a:t>Allows for </a:t>
-            </a:r>
-            <a:r>
-              <a:rPr lang="en-US" dirty="0" err="1" smtClean="0"/>
-              <a:t>Rgui</a:t>
-            </a:r>
-            <a:r>
-              <a:rPr lang="en-US" dirty="0" smtClean="0"/>
-              <a:t> interaction to evaluate line or selection</a:t>
-            </a:r>
-          </a:p>
-          <a:p>
-            <a:pPr lvl="1"/>
-            <a:r>
-              <a:rPr lang="en-US" dirty="0"/>
-              <a:t>including list variables or objects</a:t>
-            </a:r>
-            <a:r>
-              <a:rPr lang="en-US" dirty="0" smtClean="0"/>
-              <a:t>, clearing </a:t>
-            </a:r>
-            <a:r>
-              <a:rPr lang="en-US" dirty="0"/>
-              <a:t>console, even stopping the current process.</a:t>
-            </a:r>
-            <a:endParaRPr lang="en-US" dirty="0" smtClean="0"/>
-          </a:p>
-          <a:p>
-            <a:r>
-              <a:rPr lang="en-US" dirty="0" smtClean="0"/>
-              <a:t>Code formatter</a:t>
-            </a:r>
-          </a:p>
-          <a:p>
-            <a:r>
-              <a:rPr lang="en-US" dirty="0" smtClean="0"/>
-              <a:t>Bracket matching &amp; checking</a:t>
-            </a:r>
-          </a:p>
-          <a:p>
-            <a:r>
-              <a:rPr lang="en-US" dirty="0" smtClean="0"/>
-              <a:t>Commenting uncommenting</a:t>
-            </a:r>
-            <a:endParaRPr lang="en-US" dirty="0"/>
-          </a:p>
-        </p:txBody>
-      </p:sp>
-    </p:spTree>
-    <p:extLst>
-      <p:ext uri="{BB962C8B-B14F-4D97-AF65-F5344CB8AC3E}">
-        <p14:creationId xmlns:p14="http://schemas.microsoft.com/office/powerpoint/2010/main" val="2449672567"/>
-      </p:ext>
-    </p:extLst>
-  </p:cSld>
-  <p:clrMapOvr>
-    <a:masterClrMapping/>
-  </p:clrMapOvr>
-</p:sld>
-</file>
-
-<file path=ppt/slides/slide26.xml><?xml version="1.0" encoding="utf-8"?>
-<p:sld xmlns:a="http://schemas.openxmlformats.org/drawingml/2006/main" xmlns:r="http://schemas.openxmlformats.org/officeDocument/2006/relationships" xmlns:p="http://schemas.openxmlformats.org/presentationml/2006/main">
-  <p:cSld>
-    <p:spTree>
-      <p:nvGrpSpPr>
-        <p:cNvPr id="1" name=""/>
-        <p:cNvGrpSpPr/>
-        <p:nvPr/>
-      </p:nvGrpSpPr>
-      <p:grpSpPr>
-        <a:xfrm>
-          <a:off x="0" y="0"/>
-          <a:ext cx="0" cy="0"/>
-          <a:chOff x="0" y="0"/>
-          <a:chExt cx="0" cy="0"/>
-        </a:xfrm>
-      </p:grpSpPr>
-      <p:sp>
-        <p:nvSpPr>
-          <p:cNvPr id="2" name="Title 1"/>
-          <p:cNvSpPr>
-            <a:spLocks noGrp="1"/>
-          </p:cNvSpPr>
-          <p:nvPr>
-            <p:ph type="title"/>
-          </p:nvPr>
-        </p:nvSpPr>
-        <p:spPr/>
-        <p:txBody>
-          <a:bodyPr/>
-          <a:lstStyle/>
-          <a:p>
-            <a:r>
               <a:rPr lang="en-US" dirty="0" err="1" smtClean="0"/>
               <a:t>RStudio</a:t>
             </a:r>
@@ -7009,7 +6640,7 @@
 </p:sld>
 </file>
 
-<file path=ppt/slides/slide27.xml><?xml version="1.0" encoding="utf-8"?>
+<file path=ppt/slides/slide26.xml><?xml version="1.0" encoding="utf-8"?>
 <p:sld xmlns:a="http://schemas.openxmlformats.org/drawingml/2006/main" xmlns:r="http://schemas.openxmlformats.org/officeDocument/2006/relationships" xmlns:p="http://schemas.openxmlformats.org/presentationml/2006/main">
   <p:cSld>
     <p:spTree>
@@ -7111,7 +6742,7 @@
           <a:p>
             <a:r>
               <a:rPr lang="en-US" dirty="0" smtClean="0"/>
-              <a:t>Documentation integration</a:t>
+              <a:t>Next</a:t>
             </a:r>
             <a:endParaRPr lang="en-US" dirty="0"/>
           </a:p>
@@ -7129,12 +6760,81 @@
         </p:nvSpPr>
         <p:spPr/>
         <p:txBody>
-          <a:bodyPr/>
-          <a:lstStyle/>
-          <a:p>
+          <a:bodyPr>
+            <a:normAutofit/>
+          </a:bodyPr>
+          <a:lstStyle/>
+          <a:p>
+            <a:r>
+              <a:rPr lang="en-US" dirty="0" smtClean="0"/>
+              <a:t>Reference resolving</a:t>
+            </a:r>
+          </a:p>
+          <a:p>
+            <a:r>
+              <a:rPr lang="en-US" dirty="0" err="1" smtClean="0"/>
+              <a:t>BnfAnnotator</a:t>
+            </a:r>
+            <a:r>
+              <a:rPr lang="en-US" dirty="0" smtClean="0"/>
+              <a:t>: psi-aware </a:t>
+            </a:r>
+            <a:r>
+              <a:rPr lang="en-US" dirty="0" err="1" smtClean="0"/>
+              <a:t>highlightling</a:t>
+            </a:r>
+            <a:r>
+              <a:rPr lang="en-US" dirty="0" smtClean="0"/>
+              <a:t> of syntax elements</a:t>
+            </a:r>
+            <a:endParaRPr lang="en-US" dirty="0" smtClean="0"/>
+          </a:p>
+          <a:p>
+            <a:r>
+              <a:rPr lang="en-US" dirty="0" err="1" smtClean="0"/>
+              <a:t>BnfQuoteHandler</a:t>
+            </a:r>
+            <a:endParaRPr lang="en-US" dirty="0" smtClean="0"/>
+          </a:p>
+          <a:p>
+            <a:r>
+              <a:rPr lang="en-US" dirty="0" smtClean="0"/>
+              <a:t>Fix parser</a:t>
+            </a:r>
+          </a:p>
+          <a:p>
+            <a:r>
+              <a:rPr lang="en-US" dirty="0" smtClean="0"/>
+              <a:t>Windows </a:t>
+            </a:r>
+            <a:r>
+              <a:rPr lang="en-US" dirty="0" smtClean="0"/>
+              <a:t>connector</a:t>
+            </a:r>
+          </a:p>
+          <a:p>
+            <a:r>
+              <a:rPr lang="en-US" dirty="0" err="1" smtClean="0"/>
+              <a:t>Basci</a:t>
+            </a:r>
+            <a:r>
+              <a:rPr lang="en-US" dirty="0" smtClean="0"/>
+              <a:t> Documentation integration</a:t>
+            </a:r>
+          </a:p>
+          <a:p>
+            <a:pPr lvl="1"/>
+            <a:r>
+              <a:rPr lang="en-US" dirty="0" smtClean="0"/>
+              <a:t>See </a:t>
+            </a:r>
             <a:r>
               <a:rPr lang="en-US" dirty="0" err="1" smtClean="0"/>
               <a:t>StatET</a:t>
+            </a:r>
+            <a:r>
+              <a:rPr lang="en-US" dirty="0" smtClean="0"/>
+              <a:t> way of doing it</a:t>
             </a:r>
             <a:endParaRPr lang="en-US" dirty="0"/>
           </a:p>
@@ -7143,7 +6843,7 @@
     </p:spTree>
     <p:extLst>
       <p:ext uri="{BB962C8B-B14F-4D97-AF65-F5344CB8AC3E}">
-        <p14:creationId xmlns:p14="http://schemas.microsoft.com/office/powerpoint/2010/main" val="1458029459"/>
+        <p14:creationId xmlns:p14="http://schemas.microsoft.com/office/powerpoint/2010/main" val="1292058259"/>
       </p:ext>
     </p:extLst>
   </p:cSld>
@@ -7187,7 +6887,7 @@
           <a:p>
             <a:r>
               <a:rPr lang="en-US" dirty="0" smtClean="0"/>
-              <a:t>Next</a:t>
+              <a:t>Roadmap (coming soon)</a:t>
             </a:r>
             <a:endParaRPr lang="en-US" dirty="0"/>
           </a:p>
@@ -7206,64 +6906,165 @@
         <p:spPr/>
         <p:txBody>
           <a:bodyPr>
-            <a:normAutofit/>
+            <a:normAutofit fontScale="85000" lnSpcReduction="20000"/>
           </a:bodyPr>
           <a:lstStyle/>
           <a:p>
             <a:r>
               <a:rPr lang="en-US" dirty="0" smtClean="0"/>
-              <a:t>Reference resolving</a:t>
-            </a:r>
-          </a:p>
-          <a:p>
+              <a:t>Live </a:t>
+            </a:r>
             <a:r>
               <a:rPr lang="en-US" dirty="0" err="1" smtClean="0"/>
-              <a:t>BnfAnnotator</a:t>
-            </a:r>
-            <a:r>
-              <a:rPr lang="en-US" dirty="0" smtClean="0"/>
-              <a:t>: psi-aware </a:t>
+              <a:t>TemplatesCode</a:t>
+            </a:r>
+            <a:r>
+              <a:rPr lang="en-US" dirty="0" smtClean="0"/>
+              <a:t> formatter</a:t>
+            </a:r>
+            <a:endParaRPr lang="en-US" dirty="0"/>
+          </a:p>
+          <a:p>
+            <a:r>
+              <a:rPr lang="en-US" dirty="0" smtClean="0"/>
+              <a:t>Inspections </a:t>
+            </a:r>
+            <a:r>
+              <a:rPr lang="en-US" dirty="0"/>
+              <a:t>and </a:t>
+            </a:r>
+            <a:r>
+              <a:rPr lang="en-US" dirty="0" err="1"/>
+              <a:t>quickfixes</a:t>
+            </a:r>
+            <a:r>
+              <a:rPr lang="en-US" dirty="0"/>
+              <a:t> for common </a:t>
+            </a:r>
+            <a:r>
+              <a:rPr lang="en-US" dirty="0" smtClean="0"/>
+              <a:t>problems</a:t>
+            </a:r>
+          </a:p>
+          <a:p>
+            <a:pPr lvl="1"/>
+            <a:r>
+              <a:rPr lang="en-US" dirty="0"/>
+              <a:t>Incorrect subset (or if</a:t>
+            </a:r>
+            <a:r>
+              <a:rPr lang="en-US" dirty="0" smtClean="0"/>
+              <a:t>)</a:t>
+            </a:r>
+            <a:endParaRPr lang="en-US" dirty="0"/>
+          </a:p>
+          <a:p>
+            <a:r>
+              <a:rPr lang="en-US" dirty="0" smtClean="0"/>
+              <a:t>Basic </a:t>
             </a:r>
             <a:r>
               <a:rPr lang="en-US" dirty="0" err="1" smtClean="0"/>
-              <a:t>highlightling</a:t>
-            </a:r>
-            <a:r>
-              <a:rPr lang="en-US" dirty="0" smtClean="0"/>
-              <a:t> of </a:t>
-            </a:r>
-            <a:r>
-              <a:rPr lang="en-US" smtClean="0"/>
-              <a:t>syntax elements</a:t>
-            </a:r>
+              <a:t>refactorings</a:t>
+            </a:r>
+            <a:r>
+              <a:rPr lang="en-US" dirty="0" smtClean="0"/>
+              <a:t> to match </a:t>
+            </a:r>
+            <a:r>
+              <a:rPr lang="en-US" dirty="0" err="1" smtClean="0"/>
+              <a:t>StatET</a:t>
+            </a:r>
+            <a:r>
+              <a:rPr lang="en-US" dirty="0" smtClean="0"/>
+              <a:t> </a:t>
+            </a:r>
+            <a:r>
+              <a:rPr lang="en-US" dirty="0"/>
+              <a:t>(rename </a:t>
+            </a:r>
+            <a:r>
+              <a:rPr lang="en-US" dirty="0" smtClean="0"/>
+              <a:t>variable, introduce local variable, inline local variable,  extract function, Generate Element Comment)</a:t>
+            </a:r>
+            <a:endParaRPr lang="en-US" dirty="0"/>
+          </a:p>
+          <a:p>
+            <a:r>
+              <a:rPr lang="en-US" dirty="0" smtClean="0"/>
+              <a:t>Advanced </a:t>
+            </a:r>
+            <a:r>
+              <a:rPr lang="en-US" dirty="0"/>
+              <a:t>navigation (structure view, go to declaration (Example: </a:t>
+            </a:r>
+            <a:r>
+              <a:rPr lang="en-US" dirty="0" err="1"/>
+              <a:t>ArcChooser</a:t>
+            </a:r>
+            <a:r>
+              <a:rPr lang="en-US" dirty="0"/>
+              <a:t>), ...</a:t>
+            </a:r>
+            <a:r>
+              <a:rPr lang="en-US" dirty="0" smtClean="0"/>
+              <a:t>)</a:t>
+            </a:r>
+            <a:endParaRPr lang="en-US" dirty="0"/>
+          </a:p>
+          <a:p>
+            <a:r>
+              <a:rPr lang="en-US" dirty="0" err="1" smtClean="0"/>
+              <a:t>Ctrl</a:t>
+            </a:r>
+            <a:r>
+              <a:rPr lang="en-US" dirty="0" err="1"/>
+              <a:t>+Q</a:t>
+            </a:r>
+            <a:r>
+              <a:rPr lang="en-US" dirty="0"/>
+              <a:t> (Quick documentation lookup) for internal commands, external commands and </a:t>
+            </a:r>
+            <a:r>
+              <a:rPr lang="en-US" dirty="0" smtClean="0"/>
+              <a:t>functions (learn from </a:t>
+            </a:r>
+            <a:r>
+              <a:rPr lang="en-US" dirty="0" err="1" smtClean="0"/>
+              <a:t>StatET</a:t>
+            </a:r>
+            <a:r>
+              <a:rPr lang="en-US" dirty="0" smtClean="0"/>
+              <a:t>!)</a:t>
+            </a:r>
+            <a:endParaRPr lang="en-US" dirty="0"/>
+          </a:p>
+          <a:p>
+            <a:r>
+              <a:rPr lang="en-US" dirty="0" smtClean="0"/>
+              <a:t>Highlight </a:t>
+            </a:r>
+            <a:r>
+              <a:rPr lang="en-US" dirty="0"/>
+              <a:t>usages in file for functions and </a:t>
+            </a:r>
+            <a:r>
+              <a:rPr lang="en-US" dirty="0" smtClean="0"/>
+              <a:t>variables</a:t>
+            </a:r>
+          </a:p>
+          <a:p>
+            <a:endParaRPr lang="en-US" dirty="0"/>
+          </a:p>
+          <a:p>
             <a:endParaRPr lang="en-US" dirty="0" smtClean="0"/>
-          </a:p>
-          <a:p>
-            <a:r>
-              <a:rPr lang="en-US" dirty="0" err="1" smtClean="0"/>
-              <a:t>BnfQuoteHandler</a:t>
-            </a:r>
-            <a:endParaRPr lang="en-US" dirty="0" smtClean="0"/>
-          </a:p>
-          <a:p>
-            <a:r>
-              <a:rPr lang="en-US" dirty="0" smtClean="0"/>
-              <a:t>Fix parser</a:t>
-            </a:r>
-          </a:p>
-          <a:p>
-            <a:r>
-              <a:rPr lang="en-US" dirty="0" smtClean="0"/>
-              <a:t>Windows connector</a:t>
-            </a:r>
-            <a:endParaRPr lang="en-US" dirty="0"/>
           </a:p>
         </p:txBody>
       </p:sp>
     </p:spTree>
     <p:extLst>
       <p:ext uri="{BB962C8B-B14F-4D97-AF65-F5344CB8AC3E}">
-        <p14:creationId xmlns:p14="http://schemas.microsoft.com/office/powerpoint/2010/main" val="1292058259"/>
+        <p14:creationId xmlns:p14="http://schemas.microsoft.com/office/powerpoint/2010/main" val="3335867933"/>
       </p:ext>
     </p:extLst>
   </p:cSld>
@@ -7302,94 +7103,14 @@
         </p:nvSpPr>
         <p:spPr/>
         <p:txBody>
-          <a:bodyPr/>
-          <a:lstStyle/>
-          <a:p>
-            <a:r>
-              <a:rPr lang="en-US" dirty="0" smtClean="0"/>
-              <a:t>Roadmap (coming soon)</a:t>
-            </a:r>
-            <a:endParaRPr lang="en-US" dirty="0"/>
-          </a:p>
-        </p:txBody>
-      </p:sp>
-      <p:sp>
-        <p:nvSpPr>
-          <p:cNvPr id="3" name="Content Placeholder 2"/>
-          <p:cNvSpPr>
-            <a:spLocks noGrp="1"/>
-          </p:cNvSpPr>
-          <p:nvPr>
-            <p:ph idx="1"/>
-          </p:nvPr>
-        </p:nvSpPr>
-        <p:spPr/>
-        <p:txBody>
           <a:bodyPr>
-            <a:normAutofit fontScale="85000" lnSpcReduction="20000"/>
+            <a:normAutofit fontScale="90000"/>
           </a:bodyPr>
           <a:lstStyle/>
           <a:p>
             <a:r>
               <a:rPr lang="en-US" dirty="0" smtClean="0"/>
-              <a:t>Live </a:t>
-            </a:r>
-            <a:r>
-              <a:rPr lang="en-US" dirty="0" err="1" smtClean="0"/>
-              <a:t>TemplatesCode</a:t>
-            </a:r>
-            <a:r>
-              <a:rPr lang="en-US" dirty="0" smtClean="0"/>
-              <a:t> formatter</a:t>
-            </a:r>
-            <a:endParaRPr lang="en-US" dirty="0"/>
-          </a:p>
-          <a:p>
-            <a:r>
-              <a:rPr lang="en-US" dirty="0" smtClean="0"/>
-              <a:t>Inspections </a:t>
-            </a:r>
-            <a:r>
-              <a:rPr lang="en-US" dirty="0"/>
-              <a:t>and </a:t>
-            </a:r>
-            <a:r>
-              <a:rPr lang="en-US" dirty="0" err="1"/>
-              <a:t>quickfixes</a:t>
-            </a:r>
-            <a:r>
-              <a:rPr lang="en-US" dirty="0"/>
-              <a:t> for common </a:t>
-            </a:r>
-            <a:r>
-              <a:rPr lang="en-US" dirty="0" smtClean="0"/>
-              <a:t>problems</a:t>
-            </a:r>
-          </a:p>
-          <a:p>
-            <a:pPr lvl="1"/>
-            <a:r>
-              <a:rPr lang="en-US" dirty="0"/>
-              <a:t>Incorrect subset (or if</a:t>
-            </a:r>
-            <a:r>
-              <a:rPr lang="en-US" dirty="0" smtClean="0"/>
-              <a:t>)</a:t>
-            </a:r>
-            <a:endParaRPr lang="en-US" dirty="0"/>
-          </a:p>
-          <a:p>
-            <a:r>
-              <a:rPr lang="en-US" dirty="0" smtClean="0"/>
-              <a:t>Basic </a:t>
-            </a:r>
-            <a:r>
-              <a:rPr lang="en-US" dirty="0" err="1" smtClean="0"/>
-              <a:t>refactorings</a:t>
-            </a:r>
-            <a:r>
-              <a:rPr lang="en-US" dirty="0" smtClean="0"/>
-              <a:t> to match </a:t>
+              <a:t>To match </a:t>
             </a:r>
             <a:r>
               <a:rPr lang="en-US" dirty="0" err="1" smtClean="0"/>
@@ -7397,94 +7118,107 @@
             </a:r>
             <a:r>
               <a:rPr lang="en-US" dirty="0" smtClean="0"/>
+              <a:t> we would need in addition</a:t>
+            </a:r>
+            <a:endParaRPr lang="en-US" dirty="0"/>
+          </a:p>
+        </p:txBody>
+      </p:sp>
+      <p:sp>
+        <p:nvSpPr>
+          <p:cNvPr id="3" name="Content Placeholder 2"/>
+          <p:cNvSpPr>
+            <a:spLocks noGrp="1"/>
+          </p:cNvSpPr>
+          <p:nvPr>
+            <p:ph idx="1"/>
+          </p:nvPr>
+        </p:nvSpPr>
+        <p:spPr/>
+        <p:txBody>
+          <a:bodyPr/>
+          <a:lstStyle/>
+          <a:p>
+            <a:r>
+              <a:rPr lang="en-US" dirty="0" smtClean="0"/>
+              <a:t>File path completion (learn from bash plugin)</a:t>
+            </a:r>
+          </a:p>
+          <a:p>
+            <a:r>
+              <a:rPr lang="en-US" dirty="0" smtClean="0"/>
+              <a:t>Better highlighting of syntax errors</a:t>
+            </a:r>
+          </a:p>
+          <a:p>
+            <a:r>
+              <a:rPr lang="en-US" dirty="0" smtClean="0"/>
+              <a:t>Intention to add </a:t>
+            </a:r>
+            <a:r>
+              <a:rPr lang="en-US" dirty="0" err="1" smtClean="0"/>
+              <a:t>roxygen</a:t>
+            </a:r>
+            <a:r>
+              <a:rPr lang="en-US" dirty="0" smtClean="0"/>
               <a:t> </a:t>
             </a:r>
             <a:r>
-              <a:rPr lang="en-US" dirty="0"/>
-              <a:t>(rename </a:t>
-            </a:r>
-            <a:r>
-              <a:rPr lang="en-US" dirty="0" smtClean="0"/>
-              <a:t>variable, introduce local variable, inline local variable,  extract function, Generate Element Comment)</a:t>
+              <a:rPr lang="en-US" dirty="0" err="1" smtClean="0"/>
+              <a:t>docu</a:t>
+            </a:r>
+            <a:r>
+              <a:rPr lang="en-US" dirty="0" smtClean="0"/>
+              <a:t> + code basic tag completion for </a:t>
+            </a:r>
+            <a:r>
+              <a:rPr lang="en-US" dirty="0" err="1" smtClean="0"/>
+              <a:t>roxygen</a:t>
+            </a:r>
+            <a:r>
+              <a:rPr lang="en-US" dirty="0" smtClean="0"/>
+              <a:t> comments</a:t>
+            </a:r>
+          </a:p>
+          <a:p>
+            <a:r>
+              <a:rPr lang="en-US" dirty="0" smtClean="0"/>
+              <a:t>Intention to change function to S4 function</a:t>
+            </a:r>
+          </a:p>
+          <a:p>
+            <a:r>
+              <a:rPr lang="en-US" dirty="0" smtClean="0"/>
+              <a:t>Connectors for </a:t>
+            </a:r>
+            <a:r>
+              <a:rPr lang="en-US" dirty="0" err="1" smtClean="0"/>
+              <a:t>xterm</a:t>
+            </a:r>
+            <a:r>
+              <a:rPr lang="en-US" dirty="0" smtClean="0"/>
+              <a:t> and </a:t>
+            </a:r>
+            <a:r>
+              <a:rPr lang="en-US" dirty="0" err="1" smtClean="0"/>
+              <a:t>Rgui</a:t>
+            </a:r>
+            <a:r>
+              <a:rPr lang="en-US" dirty="0" smtClean="0"/>
+              <a:t> </a:t>
+            </a:r>
+            <a:r>
+              <a:rPr lang="en-US" smtClean="0"/>
+              <a:t>on windows</a:t>
             </a:r>
             <a:endParaRPr lang="en-US" dirty="0"/>
-          </a:p>
-          <a:p>
-            <a:r>
-              <a:rPr lang="en-US" dirty="0" smtClean="0"/>
-              <a:t>Advanced </a:t>
-            </a:r>
-            <a:r>
-              <a:rPr lang="en-US" dirty="0"/>
-              <a:t>navigation (structure view, go to declaration (Example: </a:t>
-            </a:r>
-            <a:r>
-              <a:rPr lang="en-US" dirty="0" err="1"/>
-              <a:t>ArcChooser</a:t>
-            </a:r>
-            <a:r>
-              <a:rPr lang="en-US" dirty="0"/>
-              <a:t>), ...</a:t>
-            </a:r>
-            <a:r>
-              <a:rPr lang="en-US" dirty="0" smtClean="0"/>
-              <a:t>)</a:t>
-            </a:r>
-            <a:endParaRPr lang="en-US" dirty="0"/>
-          </a:p>
-          <a:p>
-            <a:r>
-              <a:rPr lang="en-US" dirty="0" err="1" smtClean="0"/>
-              <a:t>Ctrl</a:t>
-            </a:r>
-            <a:r>
-              <a:rPr lang="en-US" dirty="0" err="1"/>
-              <a:t>+Q</a:t>
-            </a:r>
-            <a:r>
-              <a:rPr lang="en-US" dirty="0"/>
-              <a:t> (Quick documentation lookup) for internal commands, external commands and </a:t>
-            </a:r>
-            <a:r>
-              <a:rPr lang="en-US" dirty="0" smtClean="0"/>
-              <a:t>functions (learn from </a:t>
-            </a:r>
-            <a:r>
-              <a:rPr lang="en-US" dirty="0" err="1" smtClean="0"/>
-              <a:t>StatET</a:t>
-            </a:r>
-            <a:r>
-              <a:rPr lang="en-US" dirty="0" smtClean="0"/>
-              <a:t>!)</a:t>
-            </a:r>
-            <a:endParaRPr lang="en-US" dirty="0"/>
-          </a:p>
-          <a:p>
-            <a:r>
-              <a:rPr lang="en-US" dirty="0" smtClean="0"/>
-              <a:t>Highlight </a:t>
-            </a:r>
-            <a:r>
-              <a:rPr lang="en-US" dirty="0"/>
-              <a:t>usages in file for functions and </a:t>
-            </a:r>
-            <a:r>
-              <a:rPr lang="en-US" dirty="0" smtClean="0"/>
-              <a:t>variables</a:t>
-            </a:r>
-          </a:p>
-          <a:p>
-            <a:endParaRPr lang="en-US" dirty="0"/>
-          </a:p>
-          <a:p>
-            <a:endParaRPr lang="en-US" dirty="0" smtClean="0"/>
           </a:p>
         </p:txBody>
       </p:sp>
     </p:spTree>
     <p:extLst>
       <p:ext uri="{BB962C8B-B14F-4D97-AF65-F5344CB8AC3E}">
-        <p14:creationId xmlns:p14="http://schemas.microsoft.com/office/powerpoint/2010/main" val="3335867933"/>
+        <p14:creationId xmlns:p14="http://schemas.microsoft.com/office/powerpoint/2010/main" val="1725818345"/>
       </p:ext>
     </p:extLst>
   </p:cSld>
@@ -7523,160 +7257,6 @@
         </p:nvSpPr>
         <p:spPr/>
         <p:txBody>
-          <a:bodyPr>
-            <a:normAutofit fontScale="90000"/>
-          </a:bodyPr>
-          <a:lstStyle/>
-          <a:p>
-            <a:r>
-              <a:rPr lang="en-US" dirty="0" smtClean="0"/>
-              <a:t>To match </a:t>
-            </a:r>
-            <a:r>
-              <a:rPr lang="en-US" dirty="0" err="1" smtClean="0"/>
-              <a:t>StatET</a:t>
-            </a:r>
-            <a:r>
-              <a:rPr lang="en-US" dirty="0" smtClean="0"/>
-              <a:t> we would need in addition</a:t>
-            </a:r>
-            <a:endParaRPr lang="en-US" dirty="0"/>
-          </a:p>
-        </p:txBody>
-      </p:sp>
-      <p:sp>
-        <p:nvSpPr>
-          <p:cNvPr id="3" name="Content Placeholder 2"/>
-          <p:cNvSpPr>
-            <a:spLocks noGrp="1"/>
-          </p:cNvSpPr>
-          <p:nvPr>
-            <p:ph idx="1"/>
-          </p:nvPr>
-        </p:nvSpPr>
-        <p:spPr/>
-        <p:txBody>
-          <a:bodyPr/>
-          <a:lstStyle/>
-          <a:p>
-            <a:r>
-              <a:rPr lang="en-US" dirty="0" smtClean="0"/>
-              <a:t>File path completion (learn from bash plugin)</a:t>
-            </a:r>
-          </a:p>
-          <a:p>
-            <a:r>
-              <a:rPr lang="en-US" dirty="0" smtClean="0"/>
-              <a:t>Better highlighting of syntax errors</a:t>
-            </a:r>
-          </a:p>
-          <a:p>
-            <a:r>
-              <a:rPr lang="en-US" dirty="0" smtClean="0"/>
-              <a:t>Intention to add </a:t>
-            </a:r>
-            <a:r>
-              <a:rPr lang="en-US" dirty="0" err="1" smtClean="0"/>
-              <a:t>roxygen</a:t>
-            </a:r>
-            <a:r>
-              <a:rPr lang="en-US" dirty="0" smtClean="0"/>
-              <a:t> </a:t>
-            </a:r>
-            <a:r>
-              <a:rPr lang="en-US" dirty="0" err="1" smtClean="0"/>
-              <a:t>docu</a:t>
-            </a:r>
-            <a:r>
-              <a:rPr lang="en-US" dirty="0" smtClean="0"/>
-              <a:t> + code basic tag completion for </a:t>
-            </a:r>
-            <a:r>
-              <a:rPr lang="en-US" dirty="0" err="1" smtClean="0"/>
-              <a:t>roxygen</a:t>
-            </a:r>
-            <a:r>
-              <a:rPr lang="en-US" dirty="0" smtClean="0"/>
-              <a:t> comments</a:t>
-            </a:r>
-          </a:p>
-          <a:p>
-            <a:r>
-              <a:rPr lang="en-US" dirty="0" smtClean="0"/>
-              <a:t>Intention to change function to S4 function</a:t>
-            </a:r>
-          </a:p>
-          <a:p>
-            <a:r>
-              <a:rPr lang="en-US" dirty="0" smtClean="0"/>
-              <a:t>Connectors for </a:t>
-            </a:r>
-            <a:r>
-              <a:rPr lang="en-US" dirty="0" err="1" smtClean="0"/>
-              <a:t>xterm</a:t>
-            </a:r>
-            <a:r>
-              <a:rPr lang="en-US" dirty="0" smtClean="0"/>
-              <a:t> and </a:t>
-            </a:r>
-            <a:r>
-              <a:rPr lang="en-US" dirty="0" err="1" smtClean="0"/>
-              <a:t>Rgui</a:t>
-            </a:r>
-            <a:r>
-              <a:rPr lang="en-US" dirty="0" smtClean="0"/>
-              <a:t> </a:t>
-            </a:r>
-            <a:r>
-              <a:rPr lang="en-US" smtClean="0"/>
-              <a:t>on windows</a:t>
-            </a:r>
-            <a:endParaRPr lang="en-US" dirty="0"/>
-          </a:p>
-        </p:txBody>
-      </p:sp>
-    </p:spTree>
-    <p:extLst>
-      <p:ext uri="{BB962C8B-B14F-4D97-AF65-F5344CB8AC3E}">
-        <p14:creationId xmlns:p14="http://schemas.microsoft.com/office/powerpoint/2010/main" val="1725818345"/>
-      </p:ext>
-    </p:extLst>
-  </p:cSld>
-  <p:clrMapOvr>
-    <a:masterClrMapping/>
-  </p:clrMapOvr>
-</p:sld>
-</file>
-
-<file path=ppt/slides/slide7.xml><?xml version="1.0" encoding="utf-8"?>
-<p:sld xmlns:a="http://schemas.openxmlformats.org/drawingml/2006/main" xmlns:r="http://schemas.openxmlformats.org/officeDocument/2006/relationships" xmlns:p="http://schemas.openxmlformats.org/presentationml/2006/main">
-  <p:cSld>
-    <p:spTree>
-      <p:nvGrpSpPr>
-        <p:cNvPr id="1" name=""/>
-        <p:cNvGrpSpPr/>
-        <p:nvPr/>
-      </p:nvGrpSpPr>
-      <p:grpSpPr>
-        <a:xfrm>
-          <a:off x="0" y="0"/>
-          <a:ext cx="0" cy="0"/>
-          <a:chOff x="0" y="0"/>
-          <a:chExt cx="0" cy="0"/>
-        </a:xfrm>
-      </p:grpSpPr>
-      <p:sp>
-        <p:nvSpPr>
-          <p:cNvPr id="2" name="Title 1"/>
-          <p:cNvSpPr>
-            <a:spLocks noGrp="1"/>
-          </p:cNvSpPr>
-          <p:nvPr>
-            <p:ph type="title"/>
-          </p:nvPr>
-        </p:nvSpPr>
-        <p:spPr/>
-        <p:txBody>
           <a:bodyPr/>
           <a:lstStyle/>
           <a:p>
@@ -7791,7 +7371,7 @@
 </p:sld>
 </file>
 
-<file path=ppt/slides/slide8.xml><?xml version="1.0" encoding="utf-8"?>
+<file path=ppt/slides/slide7.xml><?xml version="1.0" encoding="utf-8"?>
 <p:sld xmlns:a="http://schemas.openxmlformats.org/drawingml/2006/main" xmlns:r="http://schemas.openxmlformats.org/officeDocument/2006/relationships" xmlns:p="http://schemas.openxmlformats.org/presentationml/2006/main">
   <p:cSld>
     <p:spTree>
@@ -7950,6 +7530,112 @@
 </p:sld>
 </file>
 
+<file path=ppt/slides/slide8.xml><?xml version="1.0" encoding="utf-8"?>
+<p:sld xmlns:a="http://schemas.openxmlformats.org/drawingml/2006/main" xmlns:r="http://schemas.openxmlformats.org/officeDocument/2006/relationships" xmlns:p="http://schemas.openxmlformats.org/presentationml/2006/main">
+  <p:cSld>
+    <p:spTree>
+      <p:nvGrpSpPr>
+        <p:cNvPr id="1" name=""/>
+        <p:cNvGrpSpPr/>
+        <p:nvPr/>
+      </p:nvGrpSpPr>
+      <p:grpSpPr>
+        <a:xfrm>
+          <a:off x="0" y="0"/>
+          <a:ext cx="0" cy="0"/>
+          <a:chOff x="0" y="0"/>
+          <a:chExt cx="0" cy="0"/>
+        </a:xfrm>
+      </p:grpSpPr>
+      <p:sp>
+        <p:nvSpPr>
+          <p:cNvPr id="2" name="Title 1"/>
+          <p:cNvSpPr>
+            <a:spLocks noGrp="1"/>
+          </p:cNvSpPr>
+          <p:nvPr>
+            <p:ph type="title"/>
+          </p:nvPr>
+        </p:nvSpPr>
+        <p:spPr/>
+        <p:txBody>
+          <a:bodyPr/>
+          <a:lstStyle/>
+          <a:p>
+            <a:r>
+              <a:rPr lang="en-US" dirty="0" err="1" smtClean="0"/>
+              <a:t>Lexer</a:t>
+            </a:r>
+            <a:endParaRPr lang="en-US" dirty="0"/>
+          </a:p>
+        </p:txBody>
+      </p:sp>
+      <p:sp>
+        <p:nvSpPr>
+          <p:cNvPr id="3" name="Content Placeholder 2"/>
+          <p:cNvSpPr>
+            <a:spLocks noGrp="1"/>
+          </p:cNvSpPr>
+          <p:nvPr>
+            <p:ph idx="1"/>
+          </p:nvPr>
+        </p:nvSpPr>
+        <p:spPr/>
+        <p:txBody>
+          <a:bodyPr/>
+          <a:lstStyle/>
+          <a:p>
+            <a:r>
+              <a:rPr lang="en-US" dirty="0" smtClean="0"/>
+              <a:t>Just as the </a:t>
+            </a:r>
+            <a:r>
+              <a:rPr lang="en-US" dirty="0" err="1" smtClean="0"/>
+              <a:t>lexer</a:t>
+            </a:r>
+            <a:r>
+              <a:rPr lang="en-US" dirty="0" smtClean="0"/>
+              <a:t> is a source code spelling checker, the parser is a grammar checker</a:t>
+            </a:r>
+          </a:p>
+          <a:p>
+            <a:r>
+              <a:rPr lang="en-US" dirty="0" smtClean="0"/>
+              <a:t>A utility such as </a:t>
+            </a:r>
+            <a:r>
+              <a:rPr lang="en-US" dirty="0" err="1" smtClean="0"/>
+              <a:t>JFlex</a:t>
+            </a:r>
+            <a:r>
+              <a:rPr lang="en-US" dirty="0" smtClean="0"/>
+              <a:t> builds a </a:t>
+            </a:r>
+            <a:r>
+              <a:rPr lang="en-US" dirty="0" err="1" smtClean="0"/>
+              <a:t>lexer</a:t>
+            </a:r>
+            <a:r>
+              <a:rPr lang="en-US" smtClean="0"/>
+              <a:t> from a specification file the programmer writes to define the 'words' (lexical tokens) in the desired language</a:t>
+            </a:r>
+            <a:endParaRPr lang="en-US" dirty="0"/>
+          </a:p>
+        </p:txBody>
+      </p:sp>
+    </p:spTree>
+    <p:extLst>
+      <p:ext uri="{BB962C8B-B14F-4D97-AF65-F5344CB8AC3E}">
+        <p14:creationId xmlns:p14="http://schemas.microsoft.com/office/powerpoint/2010/main" val="3371460341"/>
+      </p:ext>
+    </p:extLst>
+  </p:cSld>
+  <p:clrMapOvr>
+    <a:masterClrMapping/>
+  </p:clrMapOvr>
+</p:sld>
+</file>
+
 <file path=ppt/slides/slide9.xml><?xml version="1.0" encoding="utf-8"?>
 <p:sld xmlns:a="http://schemas.openxmlformats.org/drawingml/2006/main" xmlns:r="http://schemas.openxmlformats.org/officeDocument/2006/relationships" xmlns:p="http://schemas.openxmlformats.org/presentationml/2006/main">
   <p:cSld>
@@ -7983,61 +7669,101 @@
           <a:lstStyle/>
           <a:p>
             <a:r>
+              <a:rPr lang="en-US" dirty="0" smtClean="0"/>
+              <a:t>Parser</a:t>
+            </a:r>
+            <a:endParaRPr lang="en-US" dirty="0"/>
+          </a:p>
+        </p:txBody>
+      </p:sp>
+      <p:sp>
+        <p:nvSpPr>
+          <p:cNvPr id="3" name="Content Placeholder 2"/>
+          <p:cNvSpPr>
+            <a:spLocks noGrp="1"/>
+          </p:cNvSpPr>
+          <p:nvPr>
+            <p:ph idx="1"/>
+          </p:nvPr>
+        </p:nvSpPr>
+        <p:spPr/>
+        <p:txBody>
+          <a:bodyPr>
+            <a:normAutofit fontScale="85000" lnSpcReduction="10000"/>
+          </a:bodyPr>
+          <a:lstStyle/>
+          <a:p>
+            <a:r>
+              <a:rPr lang="en-US" dirty="0"/>
+              <a:t>The parser works by setting pairs of markers (</a:t>
+            </a:r>
+            <a:r>
+              <a:rPr lang="en-US" dirty="0" err="1"/>
+              <a:t>PsiBuilder.Marker</a:t>
+            </a:r>
+            <a:r>
+              <a:rPr lang="en-US" dirty="0"/>
+              <a:t> instances) within the stream of tokens received from the </a:t>
+            </a:r>
+            <a:r>
+              <a:rPr lang="en-US" dirty="0" err="1"/>
+              <a:t>lexer</a:t>
+            </a:r>
+            <a:r>
+              <a:rPr lang="en-US" dirty="0"/>
+              <a:t>. Each pair of markers defines the range of </a:t>
+            </a:r>
+            <a:r>
+              <a:rPr lang="en-US" dirty="0" err="1"/>
+              <a:t>lexer</a:t>
+            </a:r>
+            <a:r>
+              <a:rPr lang="en-US" dirty="0"/>
+              <a:t> tokens for a single node in the AST tree. If a pair of markers is nested in another pair (starts after its start and ends before its end), it becomes the child node of the outer pair</a:t>
+            </a:r>
+            <a:r>
+              <a:rPr lang="en-US" dirty="0" smtClean="0"/>
+              <a:t>.</a:t>
+            </a:r>
+          </a:p>
+          <a:p>
+            <a:r>
+              <a:rPr lang="en-US" dirty="0"/>
+              <a:t>The element type for the marker pair (and for the AST node created from it) is specified when the end marker is set (by a call to </a:t>
+            </a:r>
+            <a:r>
+              <a:rPr lang="en-US" dirty="0" err="1"/>
+              <a:t>PsiBuilder.Marker.done</a:t>
+            </a:r>
+            <a:r>
+              <a:rPr lang="en-US" dirty="0"/>
+              <a:t>()</a:t>
+            </a:r>
+            <a:r>
+              <a:rPr lang="en-US" dirty="0" smtClean="0"/>
+              <a:t>)</a:t>
+            </a:r>
+          </a:p>
+          <a:p>
+            <a:r>
               <a:rPr lang="en-US" dirty="0" err="1" smtClean="0"/>
-              <a:t>Lexer</a:t>
-            </a:r>
-            <a:endParaRPr lang="en-US" dirty="0"/>
-          </a:p>
-        </p:txBody>
-      </p:sp>
-      <p:sp>
-        <p:nvSpPr>
-          <p:cNvPr id="3" name="Content Placeholder 2"/>
-          <p:cNvSpPr>
-            <a:spLocks noGrp="1"/>
-          </p:cNvSpPr>
-          <p:nvPr>
-            <p:ph idx="1"/>
-          </p:nvPr>
-        </p:nvSpPr>
-        <p:spPr/>
-        <p:txBody>
-          <a:bodyPr/>
-          <a:lstStyle/>
-          <a:p>
-            <a:r>
-              <a:rPr lang="en-US" dirty="0" smtClean="0"/>
-              <a:t>Just as the </a:t>
+              <a:t>BashElementTypes</a:t>
+            </a:r>
+            <a:r>
+              <a:rPr lang="en-US" dirty="0" smtClean="0"/>
+              <a:t> </a:t>
             </a:r>
             <a:r>
               <a:rPr lang="en-US" dirty="0" err="1" smtClean="0"/>
-              <a:t>lexer</a:t>
-            </a:r>
-            <a:r>
-              <a:rPr lang="en-US" dirty="0" smtClean="0"/>
-              <a:t> is a source code spelling checker, the parser is a grammar checker</a:t>
-            </a:r>
-          </a:p>
-          <a:p>
-            <a:r>
-              <a:rPr lang="en-US" dirty="0" smtClean="0"/>
-              <a:t>A utility such as </a:t>
-            </a:r>
-            <a:r>
-              <a:rPr lang="en-US" dirty="0" err="1" smtClean="0"/>
-              <a:t>JFlex</a:t>
-            </a:r>
-            <a:r>
-              <a:rPr lang="en-US" dirty="0" smtClean="0"/>
-              <a:t> builds a </a:t>
-            </a:r>
-            <a:r>
-              <a:rPr lang="en-US" dirty="0" err="1" smtClean="0"/>
-              <a:t>lexer</a:t>
-            </a:r>
-            <a:r>
-              <a:rPr lang="en-US" smtClean="0"/>
-              <a:t> from a specification file the programmer writes to define the 'words' (lexical tokens) in the desired language</a:t>
+              <a:t>vs</a:t>
+            </a:r>
+            <a:r>
+              <a:rPr lang="en-US" dirty="0" smtClean="0"/>
+              <a:t> </a:t>
+            </a:r>
+            <a:r>
+              <a:rPr lang="en-US" smtClean="0"/>
+              <a:t>BashTokenTypes</a:t>
             </a:r>
             <a:endParaRPr lang="en-US" dirty="0"/>
           </a:p>
@@ -8046,7 +7772,7 @@
     </p:spTree>
     <p:extLst>
       <p:ext uri="{BB962C8B-B14F-4D97-AF65-F5344CB8AC3E}">
-        <p14:creationId xmlns:p14="http://schemas.microsoft.com/office/powerpoint/2010/main" val="3371460341"/>
+        <p14:creationId xmlns:p14="http://schemas.microsoft.com/office/powerpoint/2010/main" val="362419930"/>
       </p:ext>
     </p:extLst>
   </p:cSld>

</xml_diff>

<commit_message>
implemented section folding and quote handling
</commit_message>
<xml_diff>
--- a/R4Intellij.pptx
+++ b/R4Intellij.pptx
@@ -5821,12 +5821,57 @@
           <a:p>
             <a:r>
               <a:rPr lang="en-US" dirty="0" smtClean="0"/>
-              <a:t>Basic: Find usages, got </a:t>
-            </a:r>
-            <a:r>
-              <a:rPr lang="en-US" smtClean="0"/>
-              <a:t>to declaration</a:t>
-            </a:r>
+              <a:t>Basic: Find usages, got to declaration</a:t>
+            </a:r>
+          </a:p>
+          <a:p>
+            <a:r>
+              <a:rPr lang="en-US" dirty="0" smtClean="0"/>
+              <a:t>Structure view: Sections, functions, classes</a:t>
+            </a:r>
+          </a:p>
+          <a:p>
+            <a:r>
+              <a:rPr lang="en-US" dirty="0" smtClean="0"/>
+              <a:t>Code section folding</a:t>
+            </a:r>
+          </a:p>
+          <a:p>
+            <a:r>
+              <a:rPr lang="en-US" dirty="0" smtClean="0"/>
+              <a:t>Code evaluation connectors for Windows (</a:t>
+            </a:r>
+            <a:r>
+              <a:rPr lang="en-US" dirty="0" err="1" smtClean="0"/>
+              <a:t>Rgui</a:t>
+            </a:r>
+            <a:r>
+              <a:rPr lang="en-US" dirty="0" smtClean="0"/>
+              <a:t>), </a:t>
+            </a:r>
+            <a:r>
+              <a:rPr lang="en-US" dirty="0" err="1" smtClean="0"/>
+              <a:t>MacOS</a:t>
+            </a:r>
+            <a:r>
+              <a:rPr lang="en-US" dirty="0" smtClean="0"/>
+              <a:t> (</a:t>
+            </a:r>
+            <a:r>
+              <a:rPr lang="en-US" dirty="0" err="1" smtClean="0"/>
+              <a:t>Rgui</a:t>
+            </a:r>
+            <a:r>
+              <a:rPr lang="en-US" dirty="0" smtClean="0"/>
+              <a:t> </a:t>
+            </a:r>
+            <a:r>
+              <a:rPr lang="en-US" smtClean="0"/>
+              <a:t>via AppleScript)</a:t>
+            </a:r>
+            <a:endParaRPr lang="en-US" dirty="0" smtClean="0"/>
+          </a:p>
+          <a:p>
             <a:endParaRPr lang="en-US" dirty="0"/>
           </a:p>
         </p:txBody>
@@ -6766,12 +6811,6 @@
           <a:lstStyle/>
           <a:p>
             <a:r>
-              <a:rPr lang="en-US" dirty="0" smtClean="0"/>
-              <a:t>Reference resolving</a:t>
-            </a:r>
-          </a:p>
-          <a:p>
-            <a:r>
               <a:rPr lang="en-US" dirty="0" err="1" smtClean="0"/>
               <a:t>BnfAnnotator</a:t>
             </a:r>
@@ -6800,16 +6839,6 @@
             <a:r>
               <a:rPr lang="en-US" dirty="0" smtClean="0"/>
               <a:t>Fix parser</a:t>
-            </a:r>
-          </a:p>
-          <a:p>
-            <a:r>
-              <a:rPr lang="en-US" dirty="0" smtClean="0"/>
-              <a:t>Windows </a:t>
-            </a:r>
-            <a:r>
-              <a:rPr lang="en-US" dirty="0" smtClean="0"/>
-              <a:t>connector</a:t>
             </a:r>
           </a:p>
           <a:p>

</xml_diff>

<commit_message>
support anonymous function definitions
</commit_message>
<xml_diff>
--- a/R4Intellij.pptx
+++ b/R4Intellij.pptx
@@ -5820,14 +5820,22 @@
           <a:lstStyle/>
           <a:p>
             <a:r>
-              <a:rPr lang="en-US" dirty="0" smtClean="0"/>
-              <a:t>Basic: Find usages, got to declaration</a:t>
-            </a:r>
-          </a:p>
-          <a:p>
-            <a:r>
-              <a:rPr lang="en-US" dirty="0" smtClean="0"/>
-              <a:t>Structure view: Sections, functions, classes</a:t>
+              <a:rPr lang="en-US" dirty="0"/>
+              <a:t>Highlight usages of functions and variables in file</a:t>
+            </a:r>
+          </a:p>
+          <a:p>
+            <a:r>
+              <a:rPr lang="en-US" dirty="0" smtClean="0"/>
+              <a:t>Advanced </a:t>
+            </a:r>
+            <a:r>
+              <a:rPr lang="en-US" dirty="0"/>
+              <a:t>navigation (structure view, go to </a:t>
+            </a:r>
+            <a:r>
+              <a:rPr lang="en-US" dirty="0" smtClean="0"/>
+              <a:t>declaration) </a:t>
             </a:r>
           </a:p>
           <a:p>
@@ -5847,7 +5855,7 @@
             </a:r>
             <a:r>
               <a:rPr lang="en-US" dirty="0" smtClean="0"/>
-              <a:t>), </a:t>
+              <a:t>) and </a:t>
             </a:r>
             <a:r>
               <a:rPr lang="en-US" dirty="0" err="1" smtClean="0"/>
@@ -5863,11 +5871,7 @@
             </a:r>
             <a:r>
               <a:rPr lang="en-US" dirty="0" smtClean="0"/>
-              <a:t> </a:t>
-            </a:r>
-            <a:r>
-              <a:rPr lang="en-US" smtClean="0"/>
-              <a:t>via AppleScript)</a:t>
+              <a:t> via AppleScript)</a:t>
             </a:r>
             <a:endParaRPr lang="en-US" dirty="0" smtClean="0"/>
           </a:p>
@@ -6830,13 +6834,6 @@
           </a:p>
           <a:p>
             <a:r>
-              <a:rPr lang="en-US" dirty="0" err="1" smtClean="0"/>
-              <a:t>BnfQuoteHandler</a:t>
-            </a:r>
-            <a:endParaRPr lang="en-US" dirty="0" smtClean="0"/>
-          </a:p>
-          <a:p>
-            <a:r>
               <a:rPr lang="en-US" dirty="0" smtClean="0"/>
               <a:t>Fix parser</a:t>
             </a:r>
@@ -6935,7 +6932,7 @@
         <p:spPr/>
         <p:txBody>
           <a:bodyPr>
-            <a:normAutofit fontScale="85000" lnSpcReduction="20000"/>
+            <a:normAutofit fontScale="92500" lnSpcReduction="10000"/>
           </a:bodyPr>
           <a:lstStyle/>
           <a:p>
@@ -6989,16 +6986,83 @@
           </a:p>
           <a:p>
             <a:r>
-              <a:rPr lang="en-US" dirty="0" smtClean="0"/>
+              <a:rPr lang="en-US" dirty="0" smtClean="0">
+                <a:solidFill>
+                  <a:srgbClr val="FF0000"/>
+                </a:solidFill>
+              </a:rPr>
               <a:t>Basic </a:t>
             </a:r>
             <a:r>
+              <a:rPr lang="en-US" dirty="0" err="1" smtClean="0">
+                <a:solidFill>
+                  <a:srgbClr val="FF0000"/>
+                </a:solidFill>
+              </a:rPr>
+              <a:t>refactorings</a:t>
+            </a:r>
+            <a:r>
+              <a:rPr lang="en-US" dirty="0" smtClean="0">
+                <a:solidFill>
+                  <a:srgbClr val="FF0000"/>
+                </a:solidFill>
+              </a:rPr>
+              <a:t> to match </a:t>
+            </a:r>
+            <a:r>
+              <a:rPr lang="en-US" dirty="0" err="1" smtClean="0">
+                <a:solidFill>
+                  <a:srgbClr val="FF0000"/>
+                </a:solidFill>
+              </a:rPr>
+              <a:t>StatET</a:t>
+            </a:r>
+            <a:r>
+              <a:rPr lang="en-US" dirty="0" smtClean="0">
+                <a:solidFill>
+                  <a:srgbClr val="FF0000"/>
+                </a:solidFill>
+              </a:rPr>
+              <a:t> </a:t>
+            </a:r>
+            <a:r>
+              <a:rPr lang="en-US" dirty="0">
+                <a:solidFill>
+                  <a:srgbClr val="FF0000"/>
+                </a:solidFill>
+              </a:rPr>
+              <a:t>(rename </a:t>
+            </a:r>
+            <a:r>
+              <a:rPr lang="en-US" dirty="0" smtClean="0">
+                <a:solidFill>
+                  <a:srgbClr val="FF0000"/>
+                </a:solidFill>
+              </a:rPr>
+              <a:t>variable, introduce local variable, inline local variable,  extract function, Generate Element Comment)</a:t>
+            </a:r>
+            <a:endParaRPr lang="en-US" dirty="0">
+              <a:solidFill>
+                <a:srgbClr val="FF0000"/>
+              </a:solidFill>
+            </a:endParaRPr>
+          </a:p>
+          <a:p>
+            <a:r>
               <a:rPr lang="en-US" dirty="0" err="1" smtClean="0"/>
-              <a:t>refactorings</a:t>
-            </a:r>
-            <a:r>
-              <a:rPr lang="en-US" dirty="0" smtClean="0"/>
-              <a:t> to match </a:t>
+              <a:t>Ctrl</a:t>
+            </a:r>
+            <a:r>
+              <a:rPr lang="en-US" dirty="0" err="1"/>
+              <a:t>+Q</a:t>
+            </a:r>
+            <a:r>
+              <a:rPr lang="en-US" dirty="0"/>
+              <a:t> (Quick documentation lookup) for internal commands, external commands and </a:t>
+            </a:r>
+            <a:r>
+              <a:rPr lang="en-US" dirty="0" smtClean="0"/>
+              <a:t>functions (learn from </a:t>
             </a:r>
             <a:r>
               <a:rPr lang="en-US" dirty="0" err="1" smtClean="0"/>
@@ -7006,81 +7070,9 @@
             </a:r>
             <a:r>
               <a:rPr lang="en-US" dirty="0" smtClean="0"/>
-              <a:t> </a:t>
-            </a:r>
-            <a:r>
-              <a:rPr lang="en-US" dirty="0"/>
-              <a:t>(rename </a:t>
-            </a:r>
-            <a:r>
-              <a:rPr lang="en-US" dirty="0" smtClean="0"/>
-              <a:t>variable, introduce local variable, inline local variable,  extract function, Generate Element Comment)</a:t>
+              <a:t>!)</a:t>
             </a:r>
             <a:endParaRPr lang="en-US" dirty="0"/>
-          </a:p>
-          <a:p>
-            <a:r>
-              <a:rPr lang="en-US" dirty="0" smtClean="0"/>
-              <a:t>Advanced </a:t>
-            </a:r>
-            <a:r>
-              <a:rPr lang="en-US" dirty="0"/>
-              <a:t>navigation (structure view, go to declaration (Example: </a:t>
-            </a:r>
-            <a:r>
-              <a:rPr lang="en-US" dirty="0" err="1"/>
-              <a:t>ArcChooser</a:t>
-            </a:r>
-            <a:r>
-              <a:rPr lang="en-US" dirty="0"/>
-              <a:t>), ...</a:t>
-            </a:r>
-            <a:r>
-              <a:rPr lang="en-US" dirty="0" smtClean="0"/>
-              <a:t>)</a:t>
-            </a:r>
-            <a:endParaRPr lang="en-US" dirty="0"/>
-          </a:p>
-          <a:p>
-            <a:r>
-              <a:rPr lang="en-US" dirty="0" err="1" smtClean="0"/>
-              <a:t>Ctrl</a:t>
-            </a:r>
-            <a:r>
-              <a:rPr lang="en-US" dirty="0" err="1"/>
-              <a:t>+Q</a:t>
-            </a:r>
-            <a:r>
-              <a:rPr lang="en-US" dirty="0"/>
-              <a:t> (Quick documentation lookup) for internal commands, external commands and </a:t>
-            </a:r>
-            <a:r>
-              <a:rPr lang="en-US" dirty="0" smtClean="0"/>
-              <a:t>functions (learn from </a:t>
-            </a:r>
-            <a:r>
-              <a:rPr lang="en-US" dirty="0" err="1" smtClean="0"/>
-              <a:t>StatET</a:t>
-            </a:r>
-            <a:r>
-              <a:rPr lang="en-US" dirty="0" smtClean="0"/>
-              <a:t>!)</a:t>
-            </a:r>
-            <a:endParaRPr lang="en-US" dirty="0"/>
-          </a:p>
-          <a:p>
-            <a:r>
-              <a:rPr lang="en-US" dirty="0" smtClean="0"/>
-              <a:t>Highlight </a:t>
-            </a:r>
-            <a:r>
-              <a:rPr lang="en-US" dirty="0"/>
-              <a:t>usages in file for functions and </a:t>
-            </a:r>
-            <a:r>
-              <a:rPr lang="en-US" dirty="0" smtClean="0"/>
-              <a:t>variables</a:t>
-            </a:r>
           </a:p>
           <a:p>
             <a:endParaRPr lang="en-US" dirty="0"/>
@@ -7170,8 +7162,24 @@
           <a:p>
             <a:r>
               <a:rPr lang="en-US" dirty="0" smtClean="0"/>
-              <a:t>File path completion (learn from bash plugin)</a:t>
-            </a:r>
+              <a:t>File path completion (learn from bash plugin</a:t>
+            </a:r>
+            <a:r>
+              <a:rPr lang="en-US" dirty="0" smtClean="0"/>
+              <a:t>)</a:t>
+            </a:r>
+          </a:p>
+          <a:p>
+            <a:pPr lvl="1"/>
+            <a:r>
+              <a:rPr lang="en-US" dirty="0" smtClean="0"/>
+              <a:t>Already possible by injecting bash </a:t>
+            </a:r>
+            <a:r>
+              <a:rPr lang="en-US" smtClean="0"/>
+              <a:t>into literal</a:t>
+            </a:r>
+            <a:endParaRPr lang="en-US" dirty="0" smtClean="0"/>
           </a:p>
           <a:p>
             <a:r>
@@ -7226,21 +7234,37 @@
             </a:r>
             <a:r>
               <a:rPr lang="en-US" dirty="0" smtClean="0"/>
-              <a:t> and </a:t>
-            </a:r>
-            <a:r>
-              <a:rPr lang="en-US" dirty="0" err="1" smtClean="0"/>
+              <a:t> </a:t>
+            </a:r>
+            <a:r>
+              <a:rPr lang="en-US" dirty="0" smtClean="0">
+                <a:solidFill>
+                  <a:srgbClr val="008000"/>
+                </a:solidFill>
+              </a:rPr>
+              <a:t>and </a:t>
+            </a:r>
+            <a:r>
+              <a:rPr lang="en-US" dirty="0" err="1" smtClean="0">
+                <a:solidFill>
+                  <a:srgbClr val="008000"/>
+                </a:solidFill>
+              </a:rPr>
               <a:t>Rgui</a:t>
             </a:r>
             <a:r>
-              <a:rPr lang="en-US" dirty="0" smtClean="0"/>
-              <a:t> </a:t>
-            </a:r>
-            <a:r>
-              <a:rPr lang="en-US" smtClean="0"/>
-              <a:t>on windows</a:t>
-            </a:r>
-            <a:endParaRPr lang="en-US" dirty="0"/>
+              <a:rPr lang="en-US" dirty="0" smtClean="0">
+                <a:solidFill>
+                  <a:srgbClr val="008000"/>
+                </a:solidFill>
+              </a:rPr>
+              <a:t> on windows</a:t>
+            </a:r>
+            <a:endParaRPr lang="en-US" dirty="0">
+              <a:solidFill>
+                <a:srgbClr val="008000"/>
+              </a:solidFill>
+            </a:endParaRPr>
           </a:p>
         </p:txBody>
       </p:sp>

</xml_diff>

<commit_message>
moved files to lang package
</commit_message>
<xml_diff>
--- a/R4Intellij.pptx
+++ b/R4Intellij.pptx
@@ -5,7 +5,7 @@
     <p:sldMasterId id="2147483648" r:id="rId1"/>
   </p:sldMasterIdLst>
   <p:notesMasterIdLst>
-    <p:notesMasterId r:id="rId28"/>
+    <p:notesMasterId r:id="rId29"/>
   </p:notesMasterIdLst>
   <p:sldIdLst>
     <p:sldId id="256" r:id="rId2"/>
@@ -27,13 +27,14 @@
     <p:sldId id="276" r:id="rId18"/>
     <p:sldId id="279" r:id="rId19"/>
     <p:sldId id="268" r:id="rId20"/>
-    <p:sldId id="267" r:id="rId21"/>
-    <p:sldId id="274" r:id="rId22"/>
-    <p:sldId id="271" r:id="rId23"/>
-    <p:sldId id="270" r:id="rId24"/>
-    <p:sldId id="273" r:id="rId25"/>
-    <p:sldId id="278" r:id="rId26"/>
-    <p:sldId id="280" r:id="rId27"/>
+    <p:sldId id="284" r:id="rId21"/>
+    <p:sldId id="267" r:id="rId22"/>
+    <p:sldId id="274" r:id="rId23"/>
+    <p:sldId id="271" r:id="rId24"/>
+    <p:sldId id="270" r:id="rId25"/>
+    <p:sldId id="273" r:id="rId26"/>
+    <p:sldId id="278" r:id="rId27"/>
+    <p:sldId id="280" r:id="rId28"/>
   </p:sldIdLst>
   <p:sldSz cx="9144000" cy="6858000" type="screen4x3"/>
   <p:notesSz cx="6858000" cy="9144000"/>
@@ -172,6 +173,7 @@
         <p14:section name="Feature Overview" id="{8B615B06-FCEC-9144-A445-B2B6278F12C6}">
           <p14:sldIdLst>
             <p14:sldId id="268"/>
+            <p14:sldId id="284"/>
             <p14:sldId id="267"/>
             <p14:sldId id="274"/>
           </p14:sldIdLst>
@@ -5926,6 +5928,114 @@
           <a:lstStyle/>
           <a:p>
             <a:r>
+              <a:rPr lang="en-US" smtClean="0"/>
+              <a:t>Intentions vs. </a:t>
+            </a:r>
+            <a:r>
+              <a:rPr lang="en-US" dirty="0" smtClean="0"/>
+              <a:t>Inspections</a:t>
+            </a:r>
+            <a:endParaRPr lang="en-US" dirty="0"/>
+          </a:p>
+        </p:txBody>
+      </p:sp>
+      <p:sp>
+        <p:nvSpPr>
+          <p:cNvPr id="3" name="Content Placeholder 2"/>
+          <p:cNvSpPr>
+            <a:spLocks noGrp="1"/>
+          </p:cNvSpPr>
+          <p:nvPr>
+            <p:ph idx="1"/>
+          </p:nvPr>
+        </p:nvSpPr>
+        <p:spPr/>
+        <p:txBody>
+          <a:bodyPr/>
+          <a:lstStyle/>
+          <a:p>
+            <a:r>
+              <a:rPr lang="en-US" dirty="0" smtClean="0"/>
+              <a:t>Inspections: Error warning + fix</a:t>
+            </a:r>
+          </a:p>
+          <a:p>
+            <a:pPr lvl="1"/>
+            <a:r>
+              <a:rPr lang="en-US" dirty="0" smtClean="0"/>
+              <a:t>Error/warning indicators in code and at the right side</a:t>
+            </a:r>
+          </a:p>
+          <a:p>
+            <a:r>
+              <a:rPr lang="en-US" dirty="0" smtClean="0"/>
+              <a:t>Local </a:t>
+            </a:r>
+            <a:r>
+              <a:rPr lang="en-US" dirty="0" err="1" smtClean="0"/>
+              <a:t>refactorings</a:t>
+            </a:r>
+            <a:r>
+              <a:rPr lang="en-US" dirty="0" smtClean="0"/>
+              <a:t> (like expression conversion)</a:t>
+            </a:r>
+          </a:p>
+          <a:p>
+            <a:pPr lvl="1"/>
+            <a:r>
+              <a:rPr lang="en-US" dirty="0" smtClean="0"/>
+              <a:t>More hidden: just show up when using Alt-Enter</a:t>
+            </a:r>
+            <a:endParaRPr lang="en-US" dirty="0"/>
+          </a:p>
+        </p:txBody>
+      </p:sp>
+    </p:spTree>
+    <p:extLst>
+      <p:ext uri="{BB962C8B-B14F-4D97-AF65-F5344CB8AC3E}">
+        <p14:creationId xmlns:p14="http://schemas.microsoft.com/office/powerpoint/2010/main" val="1875299896"/>
+      </p:ext>
+    </p:extLst>
+  </p:cSld>
+  <p:clrMapOvr>
+    <a:masterClrMapping/>
+  </p:clrMapOvr>
+</p:sld>
+</file>
+
+<file path=ppt/slides/slide21.xml><?xml version="1.0" encoding="utf-8"?>
+<p:sld xmlns:a="http://schemas.openxmlformats.org/drawingml/2006/main" xmlns:r="http://schemas.openxmlformats.org/officeDocument/2006/relationships" xmlns:p="http://schemas.openxmlformats.org/presentationml/2006/main">
+  <p:cSld>
+    <p:spTree>
+      <p:nvGrpSpPr>
+        <p:cNvPr id="1" name=""/>
+        <p:cNvGrpSpPr/>
+        <p:nvPr/>
+      </p:nvGrpSpPr>
+      <p:grpSpPr>
+        <a:xfrm>
+          <a:off x="0" y="0"/>
+          <a:ext cx="0" cy="0"/>
+          <a:chOff x="0" y="0"/>
+          <a:chExt cx="0" cy="0"/>
+        </a:xfrm>
+      </p:grpSpPr>
+      <p:sp>
+        <p:nvSpPr>
+          <p:cNvPr id="2" name="Title 1"/>
+          <p:cNvSpPr>
+            <a:spLocks noGrp="1"/>
+          </p:cNvSpPr>
+          <p:nvPr>
+            <p:ph type="title"/>
+          </p:nvPr>
+        </p:nvSpPr>
+        <p:spPr/>
+        <p:txBody>
+          <a:bodyPr/>
+          <a:lstStyle/>
+          <a:p>
+            <a:r>
               <a:rPr lang="en-US" dirty="0" smtClean="0"/>
               <a:t>Language Injection</a:t>
             </a:r>
@@ -5993,7 +6103,7 @@
 </p:sld>
 </file>
 
-<file path=ppt/slides/slide21.xml><?xml version="1.0" encoding="utf-8"?>
+<file path=ppt/slides/slide22.xml><?xml version="1.0" encoding="utf-8"?>
 <p:sld xmlns:a="http://schemas.openxmlformats.org/drawingml/2006/main" xmlns:r="http://schemas.openxmlformats.org/officeDocument/2006/relationships" xmlns:p="http://schemas.openxmlformats.org/presentationml/2006/main">
   <p:cSld>
     <p:spTree>
@@ -6115,279 +6225,6 @@
 </p:sld>
 </file>
 
-<file path=ppt/slides/slide22.xml><?xml version="1.0" encoding="utf-8"?>
-<p:sld xmlns:a="http://schemas.openxmlformats.org/drawingml/2006/main" xmlns:r="http://schemas.openxmlformats.org/officeDocument/2006/relationships" xmlns:p="http://schemas.openxmlformats.org/presentationml/2006/main">
-  <p:cSld>
-    <p:spTree>
-      <p:nvGrpSpPr>
-        <p:cNvPr id="1" name=""/>
-        <p:cNvGrpSpPr/>
-        <p:nvPr/>
-      </p:nvGrpSpPr>
-      <p:grpSpPr>
-        <a:xfrm>
-          <a:off x="0" y="0"/>
-          <a:ext cx="0" cy="0"/>
-          <a:chOff x="0" y="0"/>
-          <a:chExt cx="0" cy="0"/>
-        </a:xfrm>
-      </p:grpSpPr>
-      <p:sp>
-        <p:nvSpPr>
-          <p:cNvPr id="2" name="Title 1"/>
-          <p:cNvSpPr>
-            <a:spLocks noGrp="1"/>
-          </p:cNvSpPr>
-          <p:nvPr>
-            <p:ph type="title"/>
-          </p:nvPr>
-        </p:nvSpPr>
-        <p:spPr/>
-        <p:txBody>
-          <a:bodyPr>
-            <a:normAutofit fontScale="90000"/>
-          </a:bodyPr>
-          <a:lstStyle/>
-          <a:p>
-            <a:r>
-              <a:rPr lang="en-US" dirty="0" smtClean="0"/>
-              <a:t>Options for code snippet evaluation</a:t>
-            </a:r>
-            <a:endParaRPr lang="en-US" dirty="0"/>
-          </a:p>
-        </p:txBody>
-      </p:sp>
-      <p:sp>
-        <p:nvSpPr>
-          <p:cNvPr id="3" name="Content Placeholder 2"/>
-          <p:cNvSpPr>
-            <a:spLocks noGrp="1"/>
-          </p:cNvSpPr>
-          <p:nvPr>
-            <p:ph idx="1"/>
-          </p:nvPr>
-        </p:nvSpPr>
-        <p:spPr/>
-        <p:txBody>
-          <a:bodyPr>
-            <a:normAutofit fontScale="62500" lnSpcReduction="20000"/>
-          </a:bodyPr>
-          <a:lstStyle/>
-          <a:p>
-            <a:r>
-              <a:rPr lang="en-US" dirty="0" smtClean="0"/>
-              <a:t>R Session has almost complete implementation for console, objects, </a:t>
-            </a:r>
-            <a:r>
-              <a:rPr lang="en-US" dirty="0" err="1" smtClean="0"/>
-              <a:t>etc</a:t>
-            </a:r>
-            <a:endParaRPr lang="en-US" dirty="0" smtClean="0"/>
-          </a:p>
-          <a:p>
-            <a:r>
-              <a:rPr lang="en-US" dirty="0" err="1" smtClean="0"/>
-              <a:t>TextMate</a:t>
-            </a:r>
-            <a:r>
-              <a:rPr lang="en-US" dirty="0" smtClean="0"/>
-              <a:t> </a:t>
-            </a:r>
-            <a:r>
-              <a:rPr lang="en-US" dirty="0" smtClean="0">
-                <a:hlinkClick r:id="rId2"/>
-              </a:rPr>
-              <a:t>bundle</a:t>
-            </a:r>
-            <a:endParaRPr lang="en-US" dirty="0" smtClean="0"/>
-          </a:p>
-          <a:p>
-            <a:pPr lvl="1"/>
-            <a:r>
-              <a:rPr lang="en-US" dirty="0" smtClean="0"/>
-              <a:t>Start R in special mode that reads all input from file and writes all output to another one which then somehow imported into </a:t>
-            </a:r>
-            <a:r>
-              <a:rPr lang="en-US" dirty="0" err="1" smtClean="0"/>
-              <a:t>textmate</a:t>
-            </a:r>
-            <a:endParaRPr lang="en-US" dirty="0" smtClean="0"/>
-          </a:p>
-          <a:p>
-            <a:r>
-              <a:rPr lang="en-US" dirty="0"/>
-              <a:t>I </a:t>
-            </a:r>
-            <a:r>
-              <a:rPr lang="en-US" dirty="0">
-                <a:hlinkClick r:id="rId3"/>
-              </a:rPr>
-              <a:t>think </a:t>
-            </a:r>
-            <a:r>
-              <a:rPr lang="en-US" dirty="0" err="1"/>
-              <a:t>FindWindow</a:t>
-            </a:r>
-            <a:r>
-              <a:rPr lang="en-US" dirty="0"/>
-              <a:t> and </a:t>
-            </a:r>
-            <a:r>
-              <a:rPr lang="en-US" dirty="0" err="1"/>
-              <a:t>SendMessage</a:t>
-            </a:r>
-            <a:r>
-              <a:rPr lang="en-US" dirty="0"/>
-              <a:t> are the functions you want to use, in general</a:t>
-            </a:r>
-            <a:r>
-              <a:rPr lang="en-US" dirty="0" smtClean="0"/>
-              <a:t>.</a:t>
-            </a:r>
-          </a:p>
-          <a:p>
-            <a:r>
-              <a:rPr lang="en-US" dirty="0" smtClean="0"/>
-              <a:t>Use the </a:t>
-            </a:r>
-            <a:r>
-              <a:rPr lang="en-US" dirty="0" smtClean="0">
-                <a:hlinkClick r:id="rId4"/>
-              </a:rPr>
-              <a:t>clipboard</a:t>
-            </a:r>
-            <a:endParaRPr lang="en-US" dirty="0" smtClean="0"/>
-          </a:p>
-          <a:p>
-            <a:r>
-              <a:rPr lang="en-US" dirty="0" err="1" smtClean="0">
-                <a:hlinkClick r:id="rId5"/>
-              </a:rPr>
-              <a:t>Tinn</a:t>
-            </a:r>
-            <a:r>
-              <a:rPr lang="en-US" dirty="0">
-                <a:hlinkClick r:id="rId5"/>
-              </a:rPr>
-              <a:t>-R</a:t>
-            </a:r>
-            <a:r>
-              <a:rPr lang="en-US" dirty="0"/>
-              <a:t>: It also pops up additional menu and toolbar when it detects </a:t>
-            </a:r>
-            <a:r>
-              <a:rPr lang="en-US" dirty="0" err="1"/>
-              <a:t>Rgui</a:t>
-            </a:r>
-            <a:r>
-              <a:rPr lang="en-US" dirty="0"/>
-              <a:t> running on the same computer. These </a:t>
-            </a:r>
-            <a:r>
-              <a:rPr lang="en-US" dirty="0" err="1"/>
-              <a:t>addons</a:t>
-            </a:r>
-            <a:r>
-              <a:rPr lang="en-US" dirty="0"/>
-              <a:t> interact with the R console and allow to submit code in part or in whole and to control R directly</a:t>
-            </a:r>
-            <a:r>
-              <a:rPr lang="en-US" dirty="0" smtClean="0"/>
-              <a:t>. </a:t>
-            </a:r>
-            <a:endParaRPr lang="en-US" dirty="0"/>
-          </a:p>
-          <a:p>
-            <a:pPr lvl="1"/>
-            <a:r>
-              <a:rPr lang="en-US" dirty="0" smtClean="0"/>
-              <a:t>It seems to have some </a:t>
-            </a:r>
-            <a:r>
-              <a:rPr lang="en-US" dirty="0" smtClean="0">
-                <a:hlinkClick r:id="rId6"/>
-              </a:rPr>
-              <a:t>limitations</a:t>
-            </a:r>
-            <a:endParaRPr lang="en-US" dirty="0" smtClean="0"/>
-          </a:p>
-          <a:p>
-            <a:r>
-              <a:rPr lang="en-US" dirty="0" smtClean="0"/>
-              <a:t>Maybe DOM is a </a:t>
-            </a:r>
-            <a:r>
-              <a:rPr lang="en-US" dirty="0" smtClean="0">
-                <a:hlinkClick r:id="rId7"/>
-              </a:rPr>
-              <a:t>solution</a:t>
-            </a:r>
-            <a:r>
-              <a:rPr lang="en-US" dirty="0" smtClean="0"/>
-              <a:t>: </a:t>
-            </a:r>
-            <a:r>
-              <a:rPr lang="en-US" dirty="0" err="1" smtClean="0"/>
-              <a:t>rdom</a:t>
-            </a:r>
-            <a:r>
-              <a:rPr lang="en-US" dirty="0"/>
-              <a:t>, </a:t>
-            </a:r>
-            <a:r>
-              <a:rPr lang="en-US" dirty="0" err="1" smtClean="0"/>
-              <a:t>RDCOMClient</a:t>
-            </a:r>
-            <a:endParaRPr lang="en-US" dirty="0" smtClean="0"/>
-          </a:p>
-          <a:p>
-            <a:r>
-              <a:rPr lang="en-US" dirty="0" smtClean="0"/>
-              <a:t>Or </a:t>
-            </a:r>
-            <a:r>
-              <a:rPr lang="en-US" dirty="0" smtClean="0">
-                <a:hlinkClick r:id="rId8"/>
-              </a:rPr>
-              <a:t>white</a:t>
-            </a:r>
-            <a:r>
-              <a:rPr lang="en-US" dirty="0" smtClean="0"/>
-              <a:t> </a:t>
-            </a:r>
-          </a:p>
-          <a:p>
-            <a:r>
-              <a:rPr lang="en-US" dirty="0" smtClean="0"/>
-              <a:t>Or most promising, we could try to use the </a:t>
-            </a:r>
-            <a:r>
-              <a:rPr lang="en-US" dirty="0" smtClean="0">
-                <a:hlinkClick r:id="rId9"/>
-              </a:rPr>
-              <a:t>windows API</a:t>
-            </a:r>
-            <a:r>
-              <a:rPr lang="en-US" dirty="0" smtClean="0"/>
-              <a:t> via VBScript or C#</a:t>
-            </a:r>
-            <a:endParaRPr lang="en-US" dirty="0"/>
-          </a:p>
-        </p:txBody>
-      </p:sp>
-    </p:spTree>
-    <p:extLst>
-      <p:ext uri="{BB962C8B-B14F-4D97-AF65-F5344CB8AC3E}">
-        <p14:creationId xmlns:p14="http://schemas.microsoft.com/office/powerpoint/2010/main" val="2563764221"/>
-      </p:ext>
-    </p:extLst>
-  </p:cSld>
-  <p:clrMapOvr>
-    <a:masterClrMapping/>
-  </p:clrMapOvr>
-</p:sld>
-</file>
-
 <file path=ppt/slides/slide23.xml><?xml version="1.0" encoding="utf-8"?>
 <p:sld xmlns:a="http://schemas.openxmlformats.org/drawingml/2006/main" xmlns:r="http://schemas.openxmlformats.org/officeDocument/2006/relationships" xmlns:p="http://schemas.openxmlformats.org/presentationml/2006/main">
   <p:cSld>
@@ -6417,12 +6254,14 @@
         </p:nvSpPr>
         <p:spPr/>
         <p:txBody>
-          <a:bodyPr/>
-          <a:lstStyle/>
-          <a:p>
-            <a:r>
-              <a:rPr lang="en-US" dirty="0" smtClean="0"/>
-              <a:t>R Console for Idea</a:t>
+          <a:bodyPr>
+            <a:normAutofit fontScale="90000"/>
+          </a:bodyPr>
+          <a:lstStyle/>
+          <a:p>
+            <a:r>
+              <a:rPr lang="en-US" dirty="0" smtClean="0"/>
+              <a:t>Options for code snippet evaluation</a:t>
             </a:r>
             <a:endParaRPr lang="en-US" dirty="0"/>
           </a:p>
@@ -6440,16 +6279,25 @@
         </p:nvSpPr>
         <p:spPr/>
         <p:txBody>
-          <a:bodyPr/>
-          <a:lstStyle/>
-          <a:p>
-            <a:r>
-              <a:rPr lang="en-US" dirty="0" smtClean="0"/>
-              <a:t>Use </a:t>
+          <a:bodyPr>
+            <a:normAutofit fontScale="62500" lnSpcReduction="20000"/>
+          </a:bodyPr>
+          <a:lstStyle/>
+          <a:p>
+            <a:r>
+              <a:rPr lang="en-US" dirty="0" smtClean="0"/>
+              <a:t>R Session has almost complete implementation for console, objects, </a:t>
             </a:r>
             <a:r>
               <a:rPr lang="en-US" dirty="0" err="1" smtClean="0"/>
-              <a:t>RSession</a:t>
+              <a:t>etc</a:t>
+            </a:r>
+            <a:endParaRPr lang="en-US" dirty="0" smtClean="0"/>
+          </a:p>
+          <a:p>
+            <a:r>
+              <a:rPr lang="en-US" dirty="0" err="1" smtClean="0"/>
+              <a:t>TextMate</a:t>
             </a:r>
             <a:r>
               <a:rPr lang="en-US" dirty="0" smtClean="0"/>
@@ -6459,18 +6307,179 @@
               <a:rPr lang="en-US" dirty="0" smtClean="0">
                 <a:hlinkClick r:id="rId2"/>
               </a:rPr>
+              <a:t>bundle</a:t>
+            </a:r>
+            <a:endParaRPr lang="en-US" dirty="0" smtClean="0"/>
+          </a:p>
+          <a:p>
+            <a:pPr lvl="1"/>
+            <a:r>
+              <a:rPr lang="en-US" dirty="0" smtClean="0"/>
+              <a:t>Start R in special mode that reads all input from file and writes all output to another one which then somehow imported into </a:t>
+            </a:r>
+            <a:r>
+              <a:rPr lang="en-US" dirty="0" err="1" smtClean="0"/>
+              <a:t>textmate</a:t>
+            </a:r>
+            <a:endParaRPr lang="en-US" dirty="0" smtClean="0"/>
+          </a:p>
+          <a:p>
+            <a:r>
+              <a:rPr lang="en-US" dirty="0"/>
+              <a:t>I </a:t>
+            </a:r>
+            <a:r>
+              <a:rPr lang="en-US" dirty="0">
+                <a:hlinkClick r:id="rId3"/>
+              </a:rPr>
+              <a:t>think </a:t>
+            </a:r>
+            <a:r>
+              <a:rPr lang="en-US" dirty="0" err="1"/>
+              <a:t>FindWindow</a:t>
+            </a:r>
+            <a:r>
+              <a:rPr lang="en-US" dirty="0"/>
+              <a:t> and </a:t>
+            </a:r>
+            <a:r>
+              <a:rPr lang="en-US" dirty="0" err="1"/>
+              <a:t>SendMessage</a:t>
+            </a:r>
+            <a:r>
+              <a:rPr lang="en-US" dirty="0"/>
+              <a:t> are the functions you want to use, in general</a:t>
+            </a:r>
+            <a:r>
+              <a:rPr lang="en-US" dirty="0" smtClean="0"/>
+              <a:t>.</a:t>
+            </a:r>
+          </a:p>
+          <a:p>
+            <a:r>
+              <a:rPr lang="en-US" dirty="0" smtClean="0"/>
+              <a:t>Use the </a:t>
+            </a:r>
+            <a:r>
+              <a:rPr lang="en-US" dirty="0" smtClean="0">
+                <a:hlinkClick r:id="rId4"/>
+              </a:rPr>
+              <a:t>clipboard</a:t>
+            </a:r>
+            <a:endParaRPr lang="en-US" dirty="0" smtClean="0"/>
+          </a:p>
+          <a:p>
+            <a:r>
+              <a:rPr lang="en-US" dirty="0" err="1" smtClean="0">
+                <a:hlinkClick r:id="rId5"/>
+              </a:rPr>
+              <a:t>Tinn</a:t>
+            </a:r>
+            <a:r>
+              <a:rPr lang="en-US" dirty="0">
+                <a:hlinkClick r:id="rId5"/>
+              </a:rPr>
+              <a:t>-R</a:t>
+            </a:r>
+            <a:r>
+              <a:rPr lang="en-US" dirty="0"/>
+              <a:t>: It also pops up additional menu and toolbar when it detects </a:t>
+            </a:r>
+            <a:r>
+              <a:rPr lang="en-US" dirty="0" err="1"/>
+              <a:t>Rgui</a:t>
+            </a:r>
+            <a:r>
+              <a:rPr lang="en-US" dirty="0"/>
+              <a:t> running on the same computer. These </a:t>
+            </a:r>
+            <a:r>
+              <a:rPr lang="en-US" dirty="0" err="1"/>
+              <a:t>addons</a:t>
+            </a:r>
+            <a:r>
+              <a:rPr lang="en-US" dirty="0"/>
+              <a:t> interact with the R console and allow to submit code in part or in whole and to control R directly</a:t>
+            </a:r>
+            <a:r>
+              <a:rPr lang="en-US" dirty="0" smtClean="0"/>
+              <a:t>. </a:t>
+            </a:r>
+            <a:endParaRPr lang="en-US" dirty="0"/>
+          </a:p>
+          <a:p>
+            <a:pPr lvl="1"/>
+            <a:r>
+              <a:rPr lang="en-US" dirty="0" smtClean="0"/>
+              <a:t>It seems to have some </a:t>
+            </a:r>
+            <a:r>
+              <a:rPr lang="en-US" dirty="0" smtClean="0">
+                <a:hlinkClick r:id="rId6"/>
+              </a:rPr>
+              <a:t>limitations</a:t>
+            </a:r>
+            <a:endParaRPr lang="en-US" dirty="0" smtClean="0"/>
+          </a:p>
+          <a:p>
+            <a:r>
+              <a:rPr lang="en-US" dirty="0" smtClean="0"/>
+              <a:t>Maybe DOM is a </a:t>
+            </a:r>
+            <a:r>
+              <a:rPr lang="en-US" dirty="0" smtClean="0">
+                <a:hlinkClick r:id="rId7"/>
+              </a:rPr>
               <a:t>solution</a:t>
             </a:r>
+            <a:r>
+              <a:rPr lang="en-US" dirty="0" smtClean="0"/>
+              <a:t>: </a:t>
+            </a:r>
+            <a:r>
+              <a:rPr lang="en-US" dirty="0" err="1" smtClean="0"/>
+              <a:t>rdom</a:t>
+            </a:r>
+            <a:r>
+              <a:rPr lang="en-US" dirty="0"/>
+              <a:t>, </a:t>
+            </a:r>
+            <a:r>
+              <a:rPr lang="en-US" dirty="0" err="1" smtClean="0"/>
+              <a:t>RDCOMClient</a:t>
+            </a:r>
             <a:endParaRPr lang="en-US" dirty="0" smtClean="0"/>
           </a:p>
           <a:p>
             <a:r>
               <a:rPr lang="en-US" dirty="0" smtClean="0"/>
-              <a:t>Learn from </a:t>
-            </a:r>
-            <a:r>
-              <a:rPr lang="en-US" dirty="0" err="1" smtClean="0"/>
-              <a:t>TinnR</a:t>
+              <a:t>Or </a:t>
+            </a:r>
+            <a:r>
+              <a:rPr lang="en-US" dirty="0" smtClean="0">
+                <a:hlinkClick r:id="rId8"/>
+              </a:rPr>
+              <a:t>white</a:t>
+            </a:r>
+            <a:r>
+              <a:rPr lang="en-US" dirty="0" smtClean="0"/>
+              <a:t> </a:t>
+            </a:r>
+          </a:p>
+          <a:p>
+            <a:r>
+              <a:rPr lang="en-US" dirty="0" smtClean="0"/>
+              <a:t>Or most promising, we could try to use the </a:t>
+            </a:r>
+            <a:r>
+              <a:rPr lang="en-US" dirty="0" smtClean="0">
+                <a:hlinkClick r:id="rId9"/>
+              </a:rPr>
+              <a:t>windows API</a:t>
+            </a:r>
+            <a:r>
+              <a:rPr lang="en-US" dirty="0" smtClean="0"/>
+              <a:t> via VBScript or C#</a:t>
             </a:r>
             <a:endParaRPr lang="en-US" dirty="0"/>
           </a:p>
@@ -6479,7 +6488,7 @@
     </p:spTree>
     <p:extLst>
       <p:ext uri="{BB962C8B-B14F-4D97-AF65-F5344CB8AC3E}">
-        <p14:creationId xmlns:p14="http://schemas.microsoft.com/office/powerpoint/2010/main" val="1475125988"/>
+        <p14:creationId xmlns:p14="http://schemas.microsoft.com/office/powerpoint/2010/main" val="2563764221"/>
       </p:ext>
     </p:extLst>
   </p:cSld>
@@ -6522,83 +6531,56 @@
           <a:lstStyle/>
           <a:p>
             <a:r>
-              <a:rPr lang="en-US" dirty="0" err="1" smtClean="0">
-                <a:hlinkClick r:id="rId2"/>
-              </a:rPr>
-              <a:t>Tinn</a:t>
+              <a:rPr lang="en-US" dirty="0" smtClean="0"/>
+              <a:t>R Console for Idea</a:t>
+            </a:r>
+            <a:endParaRPr lang="en-US" dirty="0"/>
+          </a:p>
+        </p:txBody>
+      </p:sp>
+      <p:sp>
+        <p:nvSpPr>
+          <p:cNvPr id="3" name="Content Placeholder 2"/>
+          <p:cNvSpPr>
+            <a:spLocks noGrp="1"/>
+          </p:cNvSpPr>
+          <p:nvPr>
+            <p:ph idx="1"/>
+          </p:nvPr>
+        </p:nvSpPr>
+        <p:spPr/>
+        <p:txBody>
+          <a:bodyPr/>
+          <a:lstStyle/>
+          <a:p>
+            <a:r>
+              <a:rPr lang="en-US" dirty="0" smtClean="0"/>
+              <a:t>Use </a:t>
+            </a:r>
+            <a:r>
+              <a:rPr lang="en-US" dirty="0" err="1" smtClean="0"/>
+              <a:t>RSession</a:t>
+            </a:r>
+            <a:r>
+              <a:rPr lang="en-US" dirty="0" smtClean="0"/>
+              <a:t> </a:t>
             </a:r>
             <a:r>
               <a:rPr lang="en-US" dirty="0" smtClean="0">
                 <a:hlinkClick r:id="rId2"/>
               </a:rPr>
-              <a:t>-R</a:t>
-            </a:r>
-            <a:endParaRPr lang="en-US" dirty="0"/>
-          </a:p>
-        </p:txBody>
-      </p:sp>
-      <p:sp>
-        <p:nvSpPr>
-          <p:cNvPr id="3" name="Content Placeholder 2"/>
-          <p:cNvSpPr>
-            <a:spLocks noGrp="1"/>
-          </p:cNvSpPr>
-          <p:nvPr>
-            <p:ph idx="1"/>
-          </p:nvPr>
-        </p:nvSpPr>
-        <p:spPr/>
-        <p:txBody>
-          <a:bodyPr>
-            <a:normAutofit/>
-          </a:bodyPr>
-          <a:lstStyle/>
-          <a:p>
-            <a:r>
-              <a:rPr lang="en-US" dirty="0" smtClean="0"/>
-              <a:t>Allows for </a:t>
+              <a:t>solution</a:t>
+            </a:r>
+            <a:endParaRPr lang="en-US" dirty="0" smtClean="0"/>
+          </a:p>
+          <a:p>
+            <a:r>
+              <a:rPr lang="en-US" dirty="0" smtClean="0"/>
+              <a:t>Learn from </a:t>
             </a:r>
             <a:r>
               <a:rPr lang="en-US" dirty="0" err="1" smtClean="0"/>
-              <a:t>Rgui</a:t>
-            </a:r>
-            <a:r>
-              <a:rPr lang="en-US" dirty="0" smtClean="0"/>
-              <a:t> interaction to evaluate line or selection</a:t>
-            </a:r>
-          </a:p>
-          <a:p>
-            <a:pPr lvl="1"/>
-            <a:r>
-              <a:rPr lang="en-US" dirty="0"/>
-              <a:t>including list variables or objects</a:t>
-            </a:r>
-            <a:r>
-              <a:rPr lang="en-US" dirty="0" smtClean="0"/>
-              <a:t>, clearing </a:t>
-            </a:r>
-            <a:r>
-              <a:rPr lang="en-US" dirty="0"/>
-              <a:t>console, even stopping the current process.</a:t>
-            </a:r>
-            <a:endParaRPr lang="en-US" dirty="0" smtClean="0"/>
-          </a:p>
-          <a:p>
-            <a:r>
-              <a:rPr lang="en-US" dirty="0" smtClean="0"/>
-              <a:t>Code formatter</a:t>
-            </a:r>
-          </a:p>
-          <a:p>
-            <a:r>
-              <a:rPr lang="en-US" dirty="0" smtClean="0"/>
-              <a:t>Bracket matching &amp; checking</a:t>
-            </a:r>
-          </a:p>
-          <a:p>
-            <a:r>
-              <a:rPr lang="en-US" dirty="0" smtClean="0"/>
-              <a:t>Commenting uncommenting</a:t>
+              <a:t>TinnR</a:t>
             </a:r>
             <a:endParaRPr lang="en-US" dirty="0"/>
           </a:p>
@@ -6607,7 +6589,7 @@
     </p:spTree>
     <p:extLst>
       <p:ext uri="{BB962C8B-B14F-4D97-AF65-F5344CB8AC3E}">
-        <p14:creationId xmlns:p14="http://schemas.microsoft.com/office/powerpoint/2010/main" val="2449672567"/>
+        <p14:creationId xmlns:p14="http://schemas.microsoft.com/office/powerpoint/2010/main" val="1475125988"/>
       </p:ext>
     </p:extLst>
   </p:cSld>
@@ -6650,6 +6632,134 @@
           <a:lstStyle/>
           <a:p>
             <a:r>
+              <a:rPr lang="en-US" dirty="0" err="1" smtClean="0">
+                <a:hlinkClick r:id="rId2"/>
+              </a:rPr>
+              <a:t>Tinn</a:t>
+            </a:r>
+            <a:r>
+              <a:rPr lang="en-US" dirty="0" smtClean="0">
+                <a:hlinkClick r:id="rId2"/>
+              </a:rPr>
+              <a:t>-R</a:t>
+            </a:r>
+            <a:endParaRPr lang="en-US" dirty="0"/>
+          </a:p>
+        </p:txBody>
+      </p:sp>
+      <p:sp>
+        <p:nvSpPr>
+          <p:cNvPr id="3" name="Content Placeholder 2"/>
+          <p:cNvSpPr>
+            <a:spLocks noGrp="1"/>
+          </p:cNvSpPr>
+          <p:nvPr>
+            <p:ph idx="1"/>
+          </p:nvPr>
+        </p:nvSpPr>
+        <p:spPr/>
+        <p:txBody>
+          <a:bodyPr>
+            <a:normAutofit/>
+          </a:bodyPr>
+          <a:lstStyle/>
+          <a:p>
+            <a:r>
+              <a:rPr lang="en-US" dirty="0" smtClean="0"/>
+              <a:t>Allows for </a:t>
+            </a:r>
+            <a:r>
+              <a:rPr lang="en-US" dirty="0" err="1" smtClean="0"/>
+              <a:t>Rgui</a:t>
+            </a:r>
+            <a:r>
+              <a:rPr lang="en-US" dirty="0" smtClean="0"/>
+              <a:t> interaction to evaluate line or selection</a:t>
+            </a:r>
+          </a:p>
+          <a:p>
+            <a:pPr lvl="1"/>
+            <a:r>
+              <a:rPr lang="en-US" dirty="0"/>
+              <a:t>including list variables or objects</a:t>
+            </a:r>
+            <a:r>
+              <a:rPr lang="en-US" dirty="0" smtClean="0"/>
+              <a:t>, clearing </a:t>
+            </a:r>
+            <a:r>
+              <a:rPr lang="en-US" dirty="0"/>
+              <a:t>console, even stopping the current process.</a:t>
+            </a:r>
+            <a:endParaRPr lang="en-US" dirty="0" smtClean="0"/>
+          </a:p>
+          <a:p>
+            <a:r>
+              <a:rPr lang="en-US" dirty="0" smtClean="0"/>
+              <a:t>Code formatter</a:t>
+            </a:r>
+          </a:p>
+          <a:p>
+            <a:r>
+              <a:rPr lang="en-US" dirty="0" smtClean="0"/>
+              <a:t>Bracket matching &amp; checking</a:t>
+            </a:r>
+          </a:p>
+          <a:p>
+            <a:r>
+              <a:rPr lang="en-US" dirty="0" smtClean="0"/>
+              <a:t>Commenting uncommenting</a:t>
+            </a:r>
+            <a:endParaRPr lang="en-US" dirty="0"/>
+          </a:p>
+        </p:txBody>
+      </p:sp>
+    </p:spTree>
+    <p:extLst>
+      <p:ext uri="{BB962C8B-B14F-4D97-AF65-F5344CB8AC3E}">
+        <p14:creationId xmlns:p14="http://schemas.microsoft.com/office/powerpoint/2010/main" val="2449672567"/>
+      </p:ext>
+    </p:extLst>
+  </p:cSld>
+  <p:clrMapOvr>
+    <a:masterClrMapping/>
+  </p:clrMapOvr>
+</p:sld>
+</file>
+
+<file path=ppt/slides/slide26.xml><?xml version="1.0" encoding="utf-8"?>
+<p:sld xmlns:a="http://schemas.openxmlformats.org/drawingml/2006/main" xmlns:r="http://schemas.openxmlformats.org/officeDocument/2006/relationships" xmlns:p="http://schemas.openxmlformats.org/presentationml/2006/main">
+  <p:cSld>
+    <p:spTree>
+      <p:nvGrpSpPr>
+        <p:cNvPr id="1" name=""/>
+        <p:cNvGrpSpPr/>
+        <p:nvPr/>
+      </p:nvGrpSpPr>
+      <p:grpSpPr>
+        <a:xfrm>
+          <a:off x="0" y="0"/>
+          <a:ext cx="0" cy="0"/>
+          <a:chOff x="0" y="0"/>
+          <a:chExt cx="0" cy="0"/>
+        </a:xfrm>
+      </p:grpSpPr>
+      <p:sp>
+        <p:nvSpPr>
+          <p:cNvPr id="2" name="Title 1"/>
+          <p:cNvSpPr>
+            <a:spLocks noGrp="1"/>
+          </p:cNvSpPr>
+          <p:nvPr>
+            <p:ph type="title"/>
+          </p:nvPr>
+        </p:nvSpPr>
+        <p:spPr/>
+        <p:txBody>
+          <a:bodyPr/>
+          <a:lstStyle/>
+          <a:p>
+            <a:r>
               <a:rPr lang="en-US" dirty="0" err="1" smtClean="0"/>
               <a:t>RStudio</a:t>
             </a:r>
@@ -6689,7 +6799,7 @@
 </p:sld>
 </file>
 
-<file path=ppt/slides/slide26.xml><?xml version="1.0" encoding="utf-8"?>
+<file path=ppt/slides/slide27.xml><?xml version="1.0" encoding="utf-8"?>
 <p:sld xmlns:a="http://schemas.openxmlformats.org/drawingml/2006/main" xmlns:r="http://schemas.openxmlformats.org/officeDocument/2006/relationships" xmlns:p="http://schemas.openxmlformats.org/presentationml/2006/main">
   <p:cSld>
     <p:spTree>
@@ -6840,12 +6950,8 @@
           </a:p>
           <a:p>
             <a:r>
-              <a:rPr lang="en-US" smtClean="0"/>
-              <a:t>Basic Documentation </a:t>
-            </a:r>
-            <a:r>
-              <a:rPr lang="en-US" dirty="0" smtClean="0"/>
-              <a:t>integration</a:t>
+              <a:rPr lang="en-US" dirty="0" smtClean="0"/>
+              <a:t>Basic Documentation integration</a:t>
             </a:r>
           </a:p>
           <a:p>

</xml_diff>

<commit_message>
added dependency list to package cache
</commit_message>
<xml_diff>
--- a/R4Intellij.pptx
+++ b/R4Intellij.pptx
@@ -279,7 +279,7 @@
           <a:p>
             <a:fld id="{87682158-AFB6-1044-826E-FEC32920DECA}" type="datetimeFigureOut">
               <a:rPr lang="en-US" smtClean="0"/>
-              <a:t>1/14/12</a:t>
+              <a:t>1/24/12</a:t>
             </a:fld>
             <a:endParaRPr lang="en-US"/>
           </a:p>
@@ -1269,7 +1269,7 @@
           <a:p>
             <a:fld id="{903CF105-E729-A944-8550-FE8B359D2D68}" type="datetimeFigureOut">
               <a:rPr lang="en-US" smtClean="0"/>
-              <a:t>1/14/12</a:t>
+              <a:t>1/24/12</a:t>
             </a:fld>
             <a:endParaRPr lang="en-US"/>
           </a:p>
@@ -1439,7 +1439,7 @@
           <a:p>
             <a:fld id="{903CF105-E729-A944-8550-FE8B359D2D68}" type="datetimeFigureOut">
               <a:rPr lang="en-US" smtClean="0"/>
-              <a:t>1/14/12</a:t>
+              <a:t>1/24/12</a:t>
             </a:fld>
             <a:endParaRPr lang="en-US"/>
           </a:p>
@@ -1619,7 +1619,7 @@
           <a:p>
             <a:fld id="{903CF105-E729-A944-8550-FE8B359D2D68}" type="datetimeFigureOut">
               <a:rPr lang="en-US" smtClean="0"/>
-              <a:t>1/14/12</a:t>
+              <a:t>1/24/12</a:t>
             </a:fld>
             <a:endParaRPr lang="en-US"/>
           </a:p>
@@ -1789,7 +1789,7 @@
           <a:p>
             <a:fld id="{903CF105-E729-A944-8550-FE8B359D2D68}" type="datetimeFigureOut">
               <a:rPr lang="en-US" smtClean="0"/>
-              <a:t>1/14/12</a:t>
+              <a:t>1/24/12</a:t>
             </a:fld>
             <a:endParaRPr lang="en-US"/>
           </a:p>
@@ -2035,7 +2035,7 @@
           <a:p>
             <a:fld id="{903CF105-E729-A944-8550-FE8B359D2D68}" type="datetimeFigureOut">
               <a:rPr lang="en-US" smtClean="0"/>
-              <a:t>1/14/12</a:t>
+              <a:t>1/24/12</a:t>
             </a:fld>
             <a:endParaRPr lang="en-US"/>
           </a:p>
@@ -2323,7 +2323,7 @@
           <a:p>
             <a:fld id="{903CF105-E729-A944-8550-FE8B359D2D68}" type="datetimeFigureOut">
               <a:rPr lang="en-US" smtClean="0"/>
-              <a:t>1/14/12</a:t>
+              <a:t>1/24/12</a:t>
             </a:fld>
             <a:endParaRPr lang="en-US"/>
           </a:p>
@@ -2745,7 +2745,7 @@
           <a:p>
             <a:fld id="{903CF105-E729-A944-8550-FE8B359D2D68}" type="datetimeFigureOut">
               <a:rPr lang="en-US" smtClean="0"/>
-              <a:t>1/14/12</a:t>
+              <a:t>1/24/12</a:t>
             </a:fld>
             <a:endParaRPr lang="en-US"/>
           </a:p>
@@ -2863,7 +2863,7 @@
           <a:p>
             <a:fld id="{903CF105-E729-A944-8550-FE8B359D2D68}" type="datetimeFigureOut">
               <a:rPr lang="en-US" smtClean="0"/>
-              <a:t>1/14/12</a:t>
+              <a:t>1/24/12</a:t>
             </a:fld>
             <a:endParaRPr lang="en-US"/>
           </a:p>
@@ -2958,7 +2958,7 @@
           <a:p>
             <a:fld id="{903CF105-E729-A944-8550-FE8B359D2D68}" type="datetimeFigureOut">
               <a:rPr lang="en-US" smtClean="0"/>
-              <a:t>1/14/12</a:t>
+              <a:t>1/24/12</a:t>
             </a:fld>
             <a:endParaRPr lang="en-US"/>
           </a:p>
@@ -3235,7 +3235,7 @@
           <a:p>
             <a:fld id="{903CF105-E729-A944-8550-FE8B359D2D68}" type="datetimeFigureOut">
               <a:rPr lang="en-US" smtClean="0"/>
-              <a:t>1/14/12</a:t>
+              <a:t>1/24/12</a:t>
             </a:fld>
             <a:endParaRPr lang="en-US"/>
           </a:p>
@@ -3488,7 +3488,7 @@
           <a:p>
             <a:fld id="{903CF105-E729-A944-8550-FE8B359D2D68}" type="datetimeFigureOut">
               <a:rPr lang="en-US" smtClean="0"/>
-              <a:t>1/14/12</a:t>
+              <a:t>1/24/12</a:t>
             </a:fld>
             <a:endParaRPr lang="en-US"/>
           </a:p>
@@ -3701,7 +3701,7 @@
           <a:p>
             <a:fld id="{903CF105-E729-A944-8550-FE8B359D2D68}" type="datetimeFigureOut">
               <a:rPr lang="en-US" smtClean="0"/>
-              <a:t>1/14/12</a:t>
+              <a:t>1/24/12</a:t>
             </a:fld>
             <a:endParaRPr lang="en-US"/>
           </a:p>
@@ -5875,7 +5875,6 @@
               <a:rPr lang="en-US" dirty="0" smtClean="0"/>
               <a:t> via AppleScript)</a:t>
             </a:r>
-            <a:endParaRPr lang="en-US" dirty="0" smtClean="0"/>
           </a:p>
           <a:p>
             <a:endParaRPr lang="en-US" dirty="0"/>
@@ -6940,7 +6939,6 @@
               <a:rPr lang="en-US" dirty="0" smtClean="0"/>
               <a:t> of syntax elements</a:t>
             </a:r>
-            <a:endParaRPr lang="en-US" dirty="0" smtClean="0"/>
           </a:p>
           <a:p>
             <a:r>
@@ -7268,11 +7266,7 @@
           <a:p>
             <a:r>
               <a:rPr lang="en-US" dirty="0" smtClean="0"/>
-              <a:t>File path completion (learn from bash plugin</a:t>
-            </a:r>
-            <a:r>
-              <a:rPr lang="en-US" dirty="0" smtClean="0"/>
-              <a:t>)</a:t>
+              <a:t>File path completion (learn from bash plugin)</a:t>
             </a:r>
           </a:p>
           <a:p>
@@ -7281,7 +7275,6 @@
               <a:rPr lang="en-US" dirty="0" smtClean="0"/>
               <a:t>Already possible by injecting bash into literal</a:t>
             </a:r>
-            <a:endParaRPr lang="en-US" dirty="0" smtClean="0"/>
           </a:p>
           <a:p>
             <a:r>
@@ -7609,18 +7602,39 @@
             </a:r>
             <a:r>
               <a:rPr lang="en-US" dirty="0" smtClean="0"/>
-              <a:t> to access R session</a:t>
-            </a:r>
-          </a:p>
-          <a:p>
-            <a:r>
-              <a:rPr lang="en-US" dirty="0" smtClean="0"/>
-              <a:t>Provide intentions for </a:t>
+              <a:t> to access R </a:t>
+            </a:r>
+            <a:r>
+              <a:rPr lang="en-US" dirty="0" smtClean="0"/>
+              <a:t>session</a:t>
+            </a:r>
+          </a:p>
+          <a:p>
+            <a:r>
+              <a:rPr lang="en-US" dirty="0" smtClean="0"/>
+              <a:t>Implement </a:t>
             </a:r>
             <a:r>
               <a:rPr lang="en-US" dirty="0" smtClean="0">
                 <a:hlinkClick r:id="rId2"/>
               </a:rPr>
+              <a:t>Unwrap </a:t>
+            </a:r>
+            <a:r>
+              <a:rPr lang="en-US" dirty="0" smtClean="0"/>
+              <a:t>support</a:t>
+            </a:r>
+            <a:endParaRPr lang="en-US" dirty="0" smtClean="0"/>
+          </a:p>
+          <a:p>
+            <a:r>
+              <a:rPr lang="en-US" dirty="0" smtClean="0"/>
+              <a:t>Provide intentions for </a:t>
+            </a:r>
+            <a:r>
+              <a:rPr lang="en-US" dirty="0" smtClean="0">
+                <a:hlinkClick r:id="rId3"/>
+              </a:rPr>
               <a:t>ggplot</a:t>
             </a:r>
             <a:endParaRPr lang="en-US" dirty="0" smtClean="0"/>
@@ -7640,7 +7654,7 @@
             </a:r>
             <a:r>
               <a:rPr lang="en-US" dirty="0" smtClean="0">
-                <a:hlinkClick r:id="rId3"/>
+                <a:hlinkClick r:id="rId4"/>
               </a:rPr>
               <a:t>bash plugin</a:t>
             </a:r>
@@ -7657,7 +7671,7 @@
           <p:nvPr/>
         </p:nvPicPr>
         <p:blipFill>
-          <a:blip r:embed="rId4"/>
+          <a:blip r:embed="rId5"/>
           <a:stretch>
             <a:fillRect/>
           </a:stretch>

</xml_diff>

<commit_message>
more consistent defaults for action shortcuts
</commit_message>
<xml_diff>
--- a/R4Intellij.pptx
+++ b/R4Intellij.pptx
@@ -279,7 +279,7 @@
           <a:p>
             <a:fld id="{87682158-AFB6-1044-826E-FEC32920DECA}" type="datetimeFigureOut">
               <a:rPr lang="en-US" smtClean="0"/>
-              <a:t>1/24/12</a:t>
+              <a:t>2/2/12</a:t>
             </a:fld>
             <a:endParaRPr lang="en-US"/>
           </a:p>
@@ -1269,7 +1269,7 @@
           <a:p>
             <a:fld id="{903CF105-E729-A944-8550-FE8B359D2D68}" type="datetimeFigureOut">
               <a:rPr lang="en-US" smtClean="0"/>
-              <a:t>1/24/12</a:t>
+              <a:t>2/2/12</a:t>
             </a:fld>
             <a:endParaRPr lang="en-US"/>
           </a:p>
@@ -1439,7 +1439,7 @@
           <a:p>
             <a:fld id="{903CF105-E729-A944-8550-FE8B359D2D68}" type="datetimeFigureOut">
               <a:rPr lang="en-US" smtClean="0"/>
-              <a:t>1/24/12</a:t>
+              <a:t>2/2/12</a:t>
             </a:fld>
             <a:endParaRPr lang="en-US"/>
           </a:p>
@@ -1619,7 +1619,7 @@
           <a:p>
             <a:fld id="{903CF105-E729-A944-8550-FE8B359D2D68}" type="datetimeFigureOut">
               <a:rPr lang="en-US" smtClean="0"/>
-              <a:t>1/24/12</a:t>
+              <a:t>2/2/12</a:t>
             </a:fld>
             <a:endParaRPr lang="en-US"/>
           </a:p>
@@ -1789,7 +1789,7 @@
           <a:p>
             <a:fld id="{903CF105-E729-A944-8550-FE8B359D2D68}" type="datetimeFigureOut">
               <a:rPr lang="en-US" smtClean="0"/>
-              <a:t>1/24/12</a:t>
+              <a:t>2/2/12</a:t>
             </a:fld>
             <a:endParaRPr lang="en-US"/>
           </a:p>
@@ -2035,7 +2035,7 @@
           <a:p>
             <a:fld id="{903CF105-E729-A944-8550-FE8B359D2D68}" type="datetimeFigureOut">
               <a:rPr lang="en-US" smtClean="0"/>
-              <a:t>1/24/12</a:t>
+              <a:t>2/2/12</a:t>
             </a:fld>
             <a:endParaRPr lang="en-US"/>
           </a:p>
@@ -2323,7 +2323,7 @@
           <a:p>
             <a:fld id="{903CF105-E729-A944-8550-FE8B359D2D68}" type="datetimeFigureOut">
               <a:rPr lang="en-US" smtClean="0"/>
-              <a:t>1/24/12</a:t>
+              <a:t>2/2/12</a:t>
             </a:fld>
             <a:endParaRPr lang="en-US"/>
           </a:p>
@@ -2745,7 +2745,7 @@
           <a:p>
             <a:fld id="{903CF105-E729-A944-8550-FE8B359D2D68}" type="datetimeFigureOut">
               <a:rPr lang="en-US" smtClean="0"/>
-              <a:t>1/24/12</a:t>
+              <a:t>2/2/12</a:t>
             </a:fld>
             <a:endParaRPr lang="en-US"/>
           </a:p>
@@ -2863,7 +2863,7 @@
           <a:p>
             <a:fld id="{903CF105-E729-A944-8550-FE8B359D2D68}" type="datetimeFigureOut">
               <a:rPr lang="en-US" smtClean="0"/>
-              <a:t>1/24/12</a:t>
+              <a:t>2/2/12</a:t>
             </a:fld>
             <a:endParaRPr lang="en-US"/>
           </a:p>
@@ -2958,7 +2958,7 @@
           <a:p>
             <a:fld id="{903CF105-E729-A944-8550-FE8B359D2D68}" type="datetimeFigureOut">
               <a:rPr lang="en-US" smtClean="0"/>
-              <a:t>1/24/12</a:t>
+              <a:t>2/2/12</a:t>
             </a:fld>
             <a:endParaRPr lang="en-US"/>
           </a:p>
@@ -3235,7 +3235,7 @@
           <a:p>
             <a:fld id="{903CF105-E729-A944-8550-FE8B359D2D68}" type="datetimeFigureOut">
               <a:rPr lang="en-US" smtClean="0"/>
-              <a:t>1/24/12</a:t>
+              <a:t>2/2/12</a:t>
             </a:fld>
             <a:endParaRPr lang="en-US"/>
           </a:p>
@@ -3488,7 +3488,7 @@
           <a:p>
             <a:fld id="{903CF105-E729-A944-8550-FE8B359D2D68}" type="datetimeFigureOut">
               <a:rPr lang="en-US" smtClean="0"/>
-              <a:t>1/24/12</a:t>
+              <a:t>2/2/12</a:t>
             </a:fld>
             <a:endParaRPr lang="en-US"/>
           </a:p>
@@ -3701,7 +3701,7 @@
           <a:p>
             <a:fld id="{903CF105-E729-A944-8550-FE8B359D2D68}" type="datetimeFigureOut">
               <a:rPr lang="en-US" smtClean="0"/>
-              <a:t>1/24/12</a:t>
+              <a:t>2/2/12</a:t>
             </a:fld>
             <a:endParaRPr lang="en-US"/>
           </a:p>
@@ -6924,26 +6924,12 @@
           <a:lstStyle/>
           <a:p>
             <a:r>
-              <a:rPr lang="en-US" dirty="0" err="1" smtClean="0"/>
-              <a:t>BnfAnnotator</a:t>
-            </a:r>
-            <a:r>
-              <a:rPr lang="en-US" dirty="0" smtClean="0"/>
-              <a:t>: psi-aware </a:t>
-            </a:r>
-            <a:r>
-              <a:rPr lang="en-US" dirty="0" err="1" smtClean="0"/>
-              <a:t>highlightling</a:t>
-            </a:r>
-            <a:r>
-              <a:rPr lang="en-US" dirty="0" smtClean="0"/>
-              <a:t> of syntax elements</a:t>
-            </a:r>
-          </a:p>
-          <a:p>
-            <a:r>
-              <a:rPr lang="en-US" dirty="0" smtClean="0"/>
-              <a:t>Fix parser</a:t>
+              <a:rPr lang="en-US" dirty="0" smtClean="0"/>
+              <a:t>Fix </a:t>
+            </a:r>
+            <a:r>
+              <a:rPr lang="en-US" dirty="0" smtClean="0"/>
+              <a:t>parser</a:t>
             </a:r>
           </a:p>
           <a:p>
@@ -7429,7 +7415,7 @@
         <p:spPr/>
         <p:txBody>
           <a:bodyPr>
-            <a:normAutofit/>
+            <a:normAutofit fontScale="92500" lnSpcReduction="20000"/>
           </a:bodyPr>
           <a:lstStyle/>
           <a:p>
@@ -7497,8 +7483,35 @@
               <a:rPr lang="en-US" dirty="0" smtClean="0">
                 <a:hlinkClick r:id="rId2"/>
               </a:rPr>
-              <a:t>parameter info</a:t>
-            </a:r>
+              <a:t>parameter </a:t>
+            </a:r>
+            <a:r>
+              <a:rPr lang="en-US" dirty="0" smtClean="0">
+                <a:hlinkClick r:id="rId2"/>
+              </a:rPr>
+              <a:t>info</a:t>
+            </a:r>
+            <a:endParaRPr lang="en-US" dirty="0" smtClean="0"/>
+          </a:p>
+          <a:p>
+            <a:r>
+              <a:rPr lang="en-US" dirty="0" err="1"/>
+              <a:t>BnfAnnotator</a:t>
+            </a:r>
+            <a:r>
+              <a:rPr lang="en-US" dirty="0"/>
+              <a:t>: psi-aware </a:t>
+            </a:r>
+            <a:r>
+              <a:rPr lang="en-US" dirty="0" err="1"/>
+              <a:t>highlightling</a:t>
+            </a:r>
+            <a:r>
+              <a:rPr lang="en-US" dirty="0"/>
+              <a:t> of syntax elements</a:t>
+            </a:r>
+          </a:p>
+          <a:p>
             <a:endParaRPr lang="en-US" dirty="0"/>
           </a:p>
           <a:p>
@@ -7602,11 +7615,7 @@
             </a:r>
             <a:r>
               <a:rPr lang="en-US" dirty="0" smtClean="0"/>
-              <a:t> to access R </a:t>
-            </a:r>
-            <a:r>
-              <a:rPr lang="en-US" dirty="0" smtClean="0"/>
-              <a:t>session</a:t>
+              <a:t> to access R session</a:t>
             </a:r>
           </a:p>
           <a:p>
@@ -7624,7 +7633,6 @@
               <a:rPr lang="en-US" dirty="0" smtClean="0"/>
               <a:t>support</a:t>
             </a:r>
-            <a:endParaRPr lang="en-US" dirty="0" smtClean="0"/>
           </a:p>
           <a:p>
             <a:r>

</xml_diff>

<commit_message>
disable menu items in non-r documents
</commit_message>
<xml_diff>
--- a/R4Intellij.pptx
+++ b/R4Intellij.pptx
@@ -279,7 +279,7 @@
           <a:p>
             <a:fld id="{87682158-AFB6-1044-826E-FEC32920DECA}" type="datetimeFigureOut">
               <a:rPr lang="en-US" smtClean="0"/>
-              <a:t>2/2/12</a:t>
+              <a:t>2/10/12</a:t>
             </a:fld>
             <a:endParaRPr lang="en-US"/>
           </a:p>
@@ -1269,7 +1269,7 @@
           <a:p>
             <a:fld id="{903CF105-E729-A944-8550-FE8B359D2D68}" type="datetimeFigureOut">
               <a:rPr lang="en-US" smtClean="0"/>
-              <a:t>2/2/12</a:t>
+              <a:t>2/10/12</a:t>
             </a:fld>
             <a:endParaRPr lang="en-US"/>
           </a:p>
@@ -1439,7 +1439,7 @@
           <a:p>
             <a:fld id="{903CF105-E729-A944-8550-FE8B359D2D68}" type="datetimeFigureOut">
               <a:rPr lang="en-US" smtClean="0"/>
-              <a:t>2/2/12</a:t>
+              <a:t>2/10/12</a:t>
             </a:fld>
             <a:endParaRPr lang="en-US"/>
           </a:p>
@@ -1619,7 +1619,7 @@
           <a:p>
             <a:fld id="{903CF105-E729-A944-8550-FE8B359D2D68}" type="datetimeFigureOut">
               <a:rPr lang="en-US" smtClean="0"/>
-              <a:t>2/2/12</a:t>
+              <a:t>2/10/12</a:t>
             </a:fld>
             <a:endParaRPr lang="en-US"/>
           </a:p>
@@ -1789,7 +1789,7 @@
           <a:p>
             <a:fld id="{903CF105-E729-A944-8550-FE8B359D2D68}" type="datetimeFigureOut">
               <a:rPr lang="en-US" smtClean="0"/>
-              <a:t>2/2/12</a:t>
+              <a:t>2/10/12</a:t>
             </a:fld>
             <a:endParaRPr lang="en-US"/>
           </a:p>
@@ -2035,7 +2035,7 @@
           <a:p>
             <a:fld id="{903CF105-E729-A944-8550-FE8B359D2D68}" type="datetimeFigureOut">
               <a:rPr lang="en-US" smtClean="0"/>
-              <a:t>2/2/12</a:t>
+              <a:t>2/10/12</a:t>
             </a:fld>
             <a:endParaRPr lang="en-US"/>
           </a:p>
@@ -2323,7 +2323,7 @@
           <a:p>
             <a:fld id="{903CF105-E729-A944-8550-FE8B359D2D68}" type="datetimeFigureOut">
               <a:rPr lang="en-US" smtClean="0"/>
-              <a:t>2/2/12</a:t>
+              <a:t>2/10/12</a:t>
             </a:fld>
             <a:endParaRPr lang="en-US"/>
           </a:p>
@@ -2745,7 +2745,7 @@
           <a:p>
             <a:fld id="{903CF105-E729-A944-8550-FE8B359D2D68}" type="datetimeFigureOut">
               <a:rPr lang="en-US" smtClean="0"/>
-              <a:t>2/2/12</a:t>
+              <a:t>2/10/12</a:t>
             </a:fld>
             <a:endParaRPr lang="en-US"/>
           </a:p>
@@ -2863,7 +2863,7 @@
           <a:p>
             <a:fld id="{903CF105-E729-A944-8550-FE8B359D2D68}" type="datetimeFigureOut">
               <a:rPr lang="en-US" smtClean="0"/>
-              <a:t>2/2/12</a:t>
+              <a:t>2/10/12</a:t>
             </a:fld>
             <a:endParaRPr lang="en-US"/>
           </a:p>
@@ -2958,7 +2958,7 @@
           <a:p>
             <a:fld id="{903CF105-E729-A944-8550-FE8B359D2D68}" type="datetimeFigureOut">
               <a:rPr lang="en-US" smtClean="0"/>
-              <a:t>2/2/12</a:t>
+              <a:t>2/10/12</a:t>
             </a:fld>
             <a:endParaRPr lang="en-US"/>
           </a:p>
@@ -3235,7 +3235,7 @@
           <a:p>
             <a:fld id="{903CF105-E729-A944-8550-FE8B359D2D68}" type="datetimeFigureOut">
               <a:rPr lang="en-US" smtClean="0"/>
-              <a:t>2/2/12</a:t>
+              <a:t>2/10/12</a:t>
             </a:fld>
             <a:endParaRPr lang="en-US"/>
           </a:p>
@@ -3488,7 +3488,7 @@
           <a:p>
             <a:fld id="{903CF105-E729-A944-8550-FE8B359D2D68}" type="datetimeFigureOut">
               <a:rPr lang="en-US" smtClean="0"/>
-              <a:t>2/2/12</a:t>
+              <a:t>2/10/12</a:t>
             </a:fld>
             <a:endParaRPr lang="en-US"/>
           </a:p>
@@ -3701,7 +3701,7 @@
           <a:p>
             <a:fld id="{903CF105-E729-A944-8550-FE8B359D2D68}" type="datetimeFigureOut">
               <a:rPr lang="en-US" smtClean="0"/>
-              <a:t>2/2/12</a:t>
+              <a:t>2/10/12</a:t>
             </a:fld>
             <a:endParaRPr lang="en-US"/>
           </a:p>
@@ -5873,8 +5873,23 @@
             </a:r>
             <a:r>
               <a:rPr lang="en-US" dirty="0" smtClean="0"/>
-              <a:t> via AppleScript)</a:t>
-            </a:r>
+              <a:t> via AppleScript</a:t>
+            </a:r>
+            <a:r>
+              <a:rPr lang="en-US" dirty="0" smtClean="0"/>
+              <a:t>)</a:t>
+            </a:r>
+          </a:p>
+          <a:p>
+            <a:r>
+              <a:rPr lang="en-US" dirty="0" err="1" smtClean="0"/>
+              <a:t>Customatizable</a:t>
+            </a:r>
+            <a:r>
+              <a:rPr lang="en-US" dirty="0" smtClean="0"/>
+              <a:t> code evaluation snippets</a:t>
+            </a:r>
+            <a:endParaRPr lang="en-US" dirty="0" smtClean="0"/>
           </a:p>
           <a:p>
             <a:endParaRPr lang="en-US" dirty="0"/>
@@ -6925,11 +6940,7 @@
           <a:p>
             <a:r>
               <a:rPr lang="en-US" dirty="0" smtClean="0"/>
-              <a:t>Fix </a:t>
-            </a:r>
-            <a:r>
-              <a:rPr lang="en-US" dirty="0" smtClean="0"/>
-              <a:t>parser</a:t>
+              <a:t>Fix parser</a:t>
             </a:r>
           </a:p>
           <a:p>
@@ -6950,7 +6961,46 @@
             </a:r>
             <a:r>
               <a:rPr lang="en-US" dirty="0" smtClean="0"/>
-              <a:t> way of doing it</a:t>
+              <a:t> way of doing </a:t>
+            </a:r>
+            <a:r>
+              <a:rPr lang="en-US" dirty="0" smtClean="0"/>
+              <a:t>it</a:t>
+            </a:r>
+          </a:p>
+          <a:p>
+            <a:r>
+              <a:rPr lang="en-US" dirty="0" smtClean="0"/>
+              <a:t>Smart code completion</a:t>
+            </a:r>
+          </a:p>
+          <a:p>
+            <a:pPr lvl="1"/>
+            <a:r>
+              <a:rPr lang="en-US" dirty="0" smtClean="0"/>
+              <a:t>Package </a:t>
+            </a:r>
+            <a:r>
+              <a:rPr lang="en-US" dirty="0" smtClean="0"/>
+              <a:t>names in library statements</a:t>
+            </a:r>
+          </a:p>
+          <a:p>
+            <a:pPr lvl="1"/>
+            <a:r>
+              <a:rPr lang="en-US" dirty="0" smtClean="0"/>
+              <a:t>Named function arguments</a:t>
+            </a:r>
+          </a:p>
+          <a:p>
+            <a:pPr lvl="1"/>
+            <a:r>
+              <a:rPr lang="en-US" dirty="0" smtClean="0"/>
+              <a:t>Function names of </a:t>
+            </a:r>
+            <a:r>
+              <a:rPr lang="en-US" smtClean="0"/>
+              <a:t>imported packages</a:t>
             </a:r>
             <a:endParaRPr lang="en-US" dirty="0"/>
           </a:p>
@@ -7483,13 +7533,7 @@
               <a:rPr lang="en-US" dirty="0" smtClean="0">
                 <a:hlinkClick r:id="rId2"/>
               </a:rPr>
-              <a:t>parameter </a:t>
-            </a:r>
-            <a:r>
-              <a:rPr lang="en-US" dirty="0" smtClean="0">
-                <a:hlinkClick r:id="rId2"/>
-              </a:rPr>
-              <a:t>info</a:t>
+              <a:t>parameter info</a:t>
             </a:r>
             <a:endParaRPr lang="en-US" dirty="0" smtClean="0"/>
           </a:p>

</xml_diff>

<commit_message>
fixed custom action configuration
</commit_message>
<xml_diff>
--- a/R4Intellij.pptx
+++ b/R4Intellij.pptx
@@ -9,7 +9,7 @@
   </p:notesMasterIdLst>
   <p:sldIdLst>
     <p:sldId id="256" r:id="rId2"/>
-    <p:sldId id="281" r:id="rId3"/>
+    <p:sldId id="285" r:id="rId3"/>
     <p:sldId id="282" r:id="rId4"/>
     <p:sldId id="259" r:id="rId5"/>
     <p:sldId id="283" r:id="rId6"/>
@@ -143,7 +143,7 @@
         </p14:section>
         <p14:section name="Changelog" id="{7CC1A45F-6BB7-AE4F-9344-0C84E4E2767F}">
           <p14:sldIdLst>
-            <p14:sldId id="281"/>
+            <p14:sldId id="285"/>
           </p14:sldIdLst>
         </p14:section>
         <p14:section name="Roadmap" id="{94DA6817-C3E6-6E46-84C3-EF347EEFF33D}">
@@ -5800,7 +5800,11 @@
           <a:p>
             <a:r>
               <a:rPr lang="en-US" dirty="0" smtClean="0"/>
-              <a:t>v0.6</a:t>
+              <a:t>v0.7 </a:t>
+            </a:r>
+            <a:r>
+              <a:rPr lang="en-US" dirty="0" err="1" smtClean="0"/>
+              <a:t>Changelog</a:t>
             </a:r>
             <a:endParaRPr lang="en-US" dirty="0"/>
           </a:p>
@@ -5818,103 +5822,17 @@
         </p:nvSpPr>
         <p:spPr/>
         <p:txBody>
-          <a:bodyPr>
-            <a:normAutofit fontScale="92500" lnSpcReduction="10000"/>
-          </a:bodyPr>
-          <a:lstStyle/>
-          <a:p>
-            <a:r>
-              <a:rPr lang="en-US" dirty="0"/>
-              <a:t>Highlight usages of functions and variables in file</a:t>
-            </a:r>
-          </a:p>
-          <a:p>
-            <a:r>
-              <a:rPr lang="en-US" dirty="0" smtClean="0"/>
-              <a:t>Advanced </a:t>
-            </a:r>
-            <a:r>
-              <a:rPr lang="en-US" dirty="0"/>
-              <a:t>navigation (structure view, go to </a:t>
-            </a:r>
-            <a:r>
-              <a:rPr lang="en-US" dirty="0" smtClean="0"/>
-              <a:t>declaration) </a:t>
-            </a:r>
-          </a:p>
-          <a:p>
-            <a:r>
-              <a:rPr lang="en-US" dirty="0" smtClean="0"/>
-              <a:t>Code section folding</a:t>
-            </a:r>
-          </a:p>
-          <a:p>
-            <a:r>
-              <a:rPr lang="en-US" dirty="0" smtClean="0"/>
-              <a:t>Code evaluation connectors for Windows (</a:t>
-            </a:r>
-            <a:r>
-              <a:rPr lang="en-US" dirty="0" err="1" smtClean="0"/>
-              <a:t>Rgui</a:t>
-            </a:r>
-            <a:r>
-              <a:rPr lang="en-US" dirty="0" smtClean="0"/>
-              <a:t>) and </a:t>
-            </a:r>
-            <a:r>
-              <a:rPr lang="en-US" dirty="0" err="1" smtClean="0"/>
-              <a:t>MacOS</a:t>
-            </a:r>
-            <a:r>
-              <a:rPr lang="en-US" dirty="0" smtClean="0"/>
-              <a:t> </a:t>
-            </a:r>
-            <a:r>
-              <a:rPr lang="en-US" dirty="0" smtClean="0"/>
-              <a:t>(R, R64 </a:t>
-            </a:r>
-            <a:r>
-              <a:rPr lang="en-US" smtClean="0"/>
-              <a:t>and Terminal)</a:t>
-            </a:r>
-            <a:endParaRPr lang="en-US" dirty="0" smtClean="0"/>
-          </a:p>
-          <a:p>
-            <a:r>
-              <a:rPr lang="en-US" dirty="0" smtClean="0"/>
-              <a:t>Customizable </a:t>
-            </a:r>
-            <a:r>
-              <a:rPr lang="en-US" dirty="0" smtClean="0"/>
-              <a:t>code evaluation </a:t>
-            </a:r>
-            <a:r>
-              <a:rPr lang="en-US" dirty="0" smtClean="0"/>
-              <a:t>snippets</a:t>
-            </a:r>
-          </a:p>
-          <a:p>
-            <a:r>
-              <a:rPr lang="en-US" dirty="0" smtClean="0"/>
-              <a:t>Auto-import of functions</a:t>
-            </a:r>
-          </a:p>
-          <a:p>
-            <a:r>
-              <a:rPr lang="en-US" dirty="0" smtClean="0"/>
-              <a:t>Simple function help</a:t>
-            </a:r>
-            <a:endParaRPr lang="en-US" dirty="0" smtClean="0"/>
-          </a:p>
-          <a:p>
-            <a:endParaRPr lang="en-US" dirty="0"/>
+          <a:bodyPr/>
+          <a:lstStyle/>
+          <a:p>
+            <a:endParaRPr lang="en-US"/>
           </a:p>
         </p:txBody>
       </p:sp>
     </p:spTree>
     <p:extLst>
       <p:ext uri="{BB962C8B-B14F-4D97-AF65-F5344CB8AC3E}">
-        <p14:creationId xmlns:p14="http://schemas.microsoft.com/office/powerpoint/2010/main" val="1953636889"/>
+        <p14:creationId xmlns:p14="http://schemas.microsoft.com/office/powerpoint/2010/main" val="1085247129"/>
       </p:ext>
     </p:extLst>
   </p:cSld>

</xml_diff>